<commit_message>
#22 modify architecture exposition document for 3.5.0
</commit_message>
<xml_diff>
--- a/architecture/TERASOLUNA Batch Framework for Java Version 3.x 説明資料.pptx
+++ b/architecture/TERASOLUNA Batch Framework for Java Version 3.x 説明資料.pptx
@@ -233,7 +233,7 @@
             <a:fld id="{BB253DA6-D017-4D4C-A6F0-8D6175E3AD1A}" type="datetime1">
               <a:rPr lang="ja-JP" altLang="en-US" smtClean="0"/>
               <a:pPr/>
-              <a:t>2014/11/28</a:t>
+              <a:t>2015/1/21</a:t>
             </a:fld>
             <a:endParaRPr lang="en-US"/>
           </a:p>
@@ -401,7 +401,7 @@
             <a:fld id="{971E307F-04E7-4216-B3F9-BBF58478B729}" type="datetime1">
               <a:rPr lang="ja-JP" altLang="en-US" smtClean="0"/>
               <a:pPr/>
-              <a:t>2014/11/28</a:t>
+              <a:t>2015/1/21</a:t>
             </a:fld>
             <a:endParaRPr lang="en-US"/>
           </a:p>
@@ -759,7 +759,7 @@
             <a:fld id="{BB7B7D7C-7587-458D-9F40-96275B4E0BF8}" type="datetime1">
               <a:rPr lang="ja-JP" altLang="en-US" smtClean="0"/>
               <a:pPr/>
-              <a:t>2014/11/28</a:t>
+              <a:t>2015/1/21</a:t>
             </a:fld>
             <a:endParaRPr lang="en-US"/>
           </a:p>
@@ -977,7 +977,7 @@
             <a:fld id="{79DDA3DF-8EBA-4683-A96B-9C379AE68A32}" type="datetime1">
               <a:rPr lang="ja-JP" altLang="en-US" smtClean="0"/>
               <a:pPr/>
-              <a:t>2014/11/28</a:t>
+              <a:t>2015/1/21</a:t>
             </a:fld>
             <a:endParaRPr lang="en-US"/>
           </a:p>
@@ -1214,21 +1214,7 @@
                 <a:latin typeface="Arial"/>
                 <a:cs typeface="Arial"/>
               </a:rPr>
-              <a:t>Copyright © </a:t>
-            </a:r>
-            <a:r>
-              <a:rPr lang="en-US" sz="600" dirty="0" smtClean="0">
-                <a:latin typeface="Arial"/>
-                <a:cs typeface="Arial"/>
-              </a:rPr>
-              <a:t>2014 </a:t>
-            </a:r>
-            <a:r>
-              <a:rPr lang="en-US" sz="600" dirty="0" smtClean="0">
-                <a:latin typeface="Arial"/>
-                <a:cs typeface="Arial"/>
-              </a:rPr>
-              <a:t>NTT DATA </a:t>
+              <a:t>Copyright © 2015 NTT DATA </a:t>
             </a:r>
             <a:r>
               <a:rPr lang="en-US" sz="600" baseline="0" dirty="0" smtClean="0">
@@ -2321,21 +2307,7 @@
                 <a:latin typeface="Arial"/>
                 <a:cs typeface="Arial"/>
               </a:rPr>
-              <a:t>Copyright © </a:t>
-            </a:r>
-            <a:r>
-              <a:rPr lang="en-US" sz="600" dirty="0" smtClean="0">
-                <a:latin typeface="Arial"/>
-                <a:cs typeface="Arial"/>
-              </a:rPr>
-              <a:t>2014 </a:t>
-            </a:r>
-            <a:r>
-              <a:rPr lang="en-US" sz="600" dirty="0" smtClean="0">
-                <a:latin typeface="Arial"/>
-                <a:cs typeface="Arial"/>
-              </a:rPr>
-              <a:t>NTT DATA </a:t>
+              <a:t>Copyright © 2015 NTT DATA </a:t>
             </a:r>
             <a:r>
               <a:rPr lang="en-US" sz="600" baseline="0" dirty="0" smtClean="0">
@@ -2654,21 +2626,7 @@
                 <a:latin typeface="Arial"/>
                 <a:cs typeface="Arial"/>
               </a:rPr>
-              <a:t>Copyright © </a:t>
-            </a:r>
-            <a:r>
-              <a:rPr lang="en-US" sz="600" dirty="0" smtClean="0">
-                <a:latin typeface="Arial"/>
-                <a:cs typeface="Arial"/>
-              </a:rPr>
-              <a:t>2014 </a:t>
-            </a:r>
-            <a:r>
-              <a:rPr lang="en-US" sz="600" dirty="0" smtClean="0">
-                <a:latin typeface="Arial"/>
-                <a:cs typeface="Arial"/>
-              </a:rPr>
-              <a:t>NTT DATA </a:t>
+              <a:t>Copyright © 2015 NTT DATA </a:t>
             </a:r>
             <a:r>
               <a:rPr lang="en-US" sz="600" baseline="0" dirty="0" smtClean="0">
@@ -3308,21 +3266,7 @@
                 <a:latin typeface="Arial"/>
                 <a:cs typeface="Arial"/>
               </a:rPr>
-              <a:t>Copyright © </a:t>
-            </a:r>
-            <a:r>
-              <a:rPr lang="en-US" sz="600" dirty="0" smtClean="0">
-                <a:latin typeface="Arial"/>
-                <a:cs typeface="Arial"/>
-              </a:rPr>
-              <a:t>2014 </a:t>
-            </a:r>
-            <a:r>
-              <a:rPr lang="en-US" sz="600" dirty="0" smtClean="0">
-                <a:latin typeface="Arial"/>
-                <a:cs typeface="Arial"/>
-              </a:rPr>
-              <a:t>NTT DATA </a:t>
+              <a:t>Copyright © 2015 NTT DATA </a:t>
             </a:r>
             <a:r>
               <a:rPr lang="en-US" sz="600" baseline="0" dirty="0" smtClean="0">
@@ -3962,21 +3906,7 @@
                 <a:latin typeface="Arial"/>
                 <a:cs typeface="Arial"/>
               </a:rPr>
-              <a:t>Copyright © </a:t>
-            </a:r>
-            <a:r>
-              <a:rPr lang="en-US" sz="600" dirty="0" smtClean="0">
-                <a:latin typeface="Arial"/>
-                <a:cs typeface="Arial"/>
-              </a:rPr>
-              <a:t>2014 </a:t>
-            </a:r>
-            <a:r>
-              <a:rPr lang="en-US" sz="600" dirty="0" smtClean="0">
-                <a:latin typeface="Arial"/>
-                <a:cs typeface="Arial"/>
-              </a:rPr>
-              <a:t>NTT DATA </a:t>
+              <a:t>Copyright © 2015 NTT DATA </a:t>
             </a:r>
             <a:r>
               <a:rPr lang="en-US" sz="600" baseline="0" dirty="0" smtClean="0">
@@ -4610,21 +4540,7 @@
                 <a:latin typeface="Arial"/>
                 <a:cs typeface="Arial"/>
               </a:rPr>
-              <a:t>Copyright © </a:t>
-            </a:r>
-            <a:r>
-              <a:rPr lang="en-US" sz="600" dirty="0" smtClean="0">
-                <a:latin typeface="Arial"/>
-                <a:cs typeface="Arial"/>
-              </a:rPr>
-              <a:t>2014 </a:t>
-            </a:r>
-            <a:r>
-              <a:rPr lang="en-US" sz="600" dirty="0" smtClean="0">
-                <a:latin typeface="Arial"/>
-                <a:cs typeface="Arial"/>
-              </a:rPr>
-              <a:t>NTT DATA </a:t>
+              <a:t>Copyright © 2015 NTT DATA </a:t>
             </a:r>
             <a:r>
               <a:rPr lang="en-US" sz="600" baseline="0" dirty="0" smtClean="0">
@@ -5258,21 +5174,7 @@
                 <a:latin typeface="Arial"/>
                 <a:cs typeface="Arial"/>
               </a:rPr>
-              <a:t>Copyright © </a:t>
-            </a:r>
-            <a:r>
-              <a:rPr lang="en-US" sz="600" dirty="0" smtClean="0">
-                <a:latin typeface="Arial"/>
-                <a:cs typeface="Arial"/>
-              </a:rPr>
-              <a:t>2014 </a:t>
-            </a:r>
-            <a:r>
-              <a:rPr lang="en-US" sz="600" dirty="0" smtClean="0">
-                <a:latin typeface="Arial"/>
-                <a:cs typeface="Arial"/>
-              </a:rPr>
-              <a:t>NTT DATA </a:t>
+              <a:t>Copyright © 2015 NTT DATA </a:t>
             </a:r>
             <a:r>
               <a:rPr lang="en-US" sz="600" baseline="0" dirty="0" smtClean="0">
@@ -5820,21 +5722,7 @@
                 <a:latin typeface="Arial"/>
                 <a:cs typeface="Arial"/>
               </a:rPr>
-              <a:t>Copyright © </a:t>
-            </a:r>
-            <a:r>
-              <a:rPr lang="en-US" sz="600" dirty="0" smtClean="0">
-                <a:latin typeface="Arial"/>
-                <a:cs typeface="Arial"/>
-              </a:rPr>
-              <a:t>2014 </a:t>
-            </a:r>
-            <a:r>
-              <a:rPr lang="en-US" sz="600" dirty="0" smtClean="0">
-                <a:latin typeface="Arial"/>
-                <a:cs typeface="Arial"/>
-              </a:rPr>
-              <a:t>NTT DATA </a:t>
+              <a:t>Copyright © 2015 NTT DATA </a:t>
             </a:r>
             <a:r>
               <a:rPr lang="en-US" sz="600" baseline="0" dirty="0" smtClean="0">
@@ -6659,28 +6547,14 @@
                 <a:latin typeface="Arial"/>
                 <a:cs typeface="Arial"/>
               </a:rPr>
-              <a:t>Copyright © </a:t>
-            </a:r>
-            <a:r>
-              <a:rPr lang="en-US" sz="600" dirty="0" smtClean="0">
-                <a:latin typeface="Arial"/>
-                <a:cs typeface="Arial"/>
-              </a:rPr>
-              <a:t>201</a:t>
+              <a:t>Copyright © 2015</a:t>
             </a:r>
             <a:r>
               <a:rPr lang="en-US" sz="600" baseline="0" dirty="0" smtClean="0">
                 <a:latin typeface="Arial"/>
                 <a:cs typeface="Arial"/>
               </a:rPr>
-              <a:t>4 NTT </a:t>
-            </a:r>
-            <a:r>
-              <a:rPr lang="en-US" sz="600" baseline="0" dirty="0" smtClean="0">
-                <a:latin typeface="Arial"/>
-                <a:cs typeface="Arial"/>
-              </a:rPr>
-              <a:t>DATA Corporation</a:t>
+              <a:t> NTT DATA Corporation</a:t>
             </a:r>
             <a:endParaRPr lang="en-US" sz="600" dirty="0">
               <a:latin typeface="Arial"/>
@@ -7615,21 +7489,7 @@
                 <a:latin typeface="Arial"/>
                 <a:cs typeface="Arial"/>
               </a:rPr>
-              <a:t>Copyright © </a:t>
-            </a:r>
-            <a:r>
-              <a:rPr lang="en-US" sz="600" dirty="0" smtClean="0">
-                <a:latin typeface="Arial"/>
-                <a:cs typeface="Arial"/>
-              </a:rPr>
-              <a:t>2014 </a:t>
-            </a:r>
-            <a:r>
-              <a:rPr lang="en-US" sz="600" dirty="0" smtClean="0">
-                <a:latin typeface="Arial"/>
-                <a:cs typeface="Arial"/>
-              </a:rPr>
-              <a:t>NTT DATA </a:t>
+              <a:t>Copyright © 2015 NTT DATA </a:t>
             </a:r>
             <a:r>
               <a:rPr lang="en-US" sz="600" baseline="0" dirty="0" smtClean="0">
@@ -8120,118 +7980,45 @@
           <a:lstStyle/>
           <a:p>
             <a:r>
-              <a:rPr kumimoji="1" lang="en-US" altLang="ja-JP" dirty="0" err="1" smtClean="0"/>
-              <a:t>iBATIS</a:t>
+              <a:rPr kumimoji="1" lang="en-US" altLang="ja-JP" dirty="0" smtClean="0"/>
+              <a:t>MyBatis3</a:t>
             </a:r>
             <a:r>
               <a:rPr kumimoji="1" lang="ja-JP" altLang="en-US" dirty="0" smtClean="0"/>
-              <a:t>を利用して、データベースアクセスを行うコンポーネントです。</a:t>
+              <a:t>を</a:t>
+            </a:r>
+            <a:r>
+              <a:rPr kumimoji="1" lang="ja-JP" altLang="en-US" dirty="0" smtClean="0"/>
+              <a:t>利用して、データベースアクセスを行うコンポーネントです。</a:t>
             </a:r>
             <a:endParaRPr kumimoji="1" lang="en-US" altLang="ja-JP" dirty="0" smtClean="0"/>
           </a:p>
           <a:p>
             <a:r>
               <a:rPr lang="en-US" altLang="ja-JP" dirty="0" smtClean="0"/>
-              <a:t>TERASOLUNA Server/Batch Framework for Java Version2.x</a:t>
+              <a:t>TERASOLUNA </a:t>
+            </a:r>
+            <a:r>
+              <a:rPr lang="en-US" altLang="ja-JP" dirty="0" smtClean="0"/>
+              <a:t>Server </a:t>
+            </a:r>
+            <a:r>
+              <a:rPr lang="en-US" altLang="ja-JP" dirty="0" smtClean="0"/>
+              <a:t>Framework for Java </a:t>
+            </a:r>
+            <a:r>
+              <a:rPr lang="en-US" altLang="ja-JP" dirty="0" smtClean="0"/>
+              <a:t>Version5.x</a:t>
             </a:r>
             <a:r>
               <a:rPr lang="ja-JP" altLang="en-US" dirty="0" smtClean="0"/>
-              <a:t>と同じものを利用します。</a:t>
+              <a:t>と</a:t>
+            </a:r>
+            <a:r>
+              <a:rPr lang="ja-JP" altLang="en-US" dirty="0" smtClean="0"/>
+              <a:t>同じものを利用します。</a:t>
             </a:r>
             <a:endParaRPr lang="en-US" altLang="ja-JP" dirty="0" smtClean="0"/>
-          </a:p>
-          <a:p>
-            <a:pPr lvl="1"/>
-            <a:r>
-              <a:rPr lang="en-US" altLang="ja-JP" sz="1400" dirty="0" err="1" smtClean="0"/>
-              <a:t>QueryDAO</a:t>
-            </a:r>
-            <a:r>
-              <a:rPr lang="ja-JP" altLang="en-US" sz="1400" dirty="0" smtClean="0"/>
-              <a:t>・・・参照系のデータベースアクセスを行う</a:t>
-            </a:r>
-            <a:r>
-              <a:rPr lang="en-US" altLang="ja-JP" sz="1400" dirty="0" smtClean="0"/>
-              <a:t>DAO</a:t>
-            </a:r>
-            <a:endParaRPr lang="ja-JP" altLang="en-US" sz="1400" dirty="0" smtClean="0"/>
-          </a:p>
-          <a:p>
-            <a:pPr lvl="1"/>
-            <a:r>
-              <a:rPr lang="en-US" altLang="ja-JP" sz="1400" dirty="0" err="1" smtClean="0"/>
-              <a:t>UpdateDAO</a:t>
-            </a:r>
-            <a:r>
-              <a:rPr lang="ja-JP" altLang="en-US" sz="1400" dirty="0" smtClean="0"/>
-              <a:t>・・・更新系のデータベースアクセスを行う</a:t>
-            </a:r>
-            <a:r>
-              <a:rPr lang="en-US" altLang="ja-JP" sz="1400" dirty="0" smtClean="0"/>
-              <a:t>DAO</a:t>
-            </a:r>
-            <a:endParaRPr lang="ja-JP" altLang="en-US" sz="1400" dirty="0" smtClean="0"/>
-          </a:p>
-          <a:p>
-            <a:pPr lvl="1"/>
-            <a:r>
-              <a:rPr lang="en-US" altLang="ja-JP" sz="1400" dirty="0" err="1" smtClean="0"/>
-              <a:t>StoredProcedureDAO</a:t>
-            </a:r>
-            <a:r>
-              <a:rPr lang="ja-JP" altLang="en-US" sz="1400" dirty="0" smtClean="0"/>
-              <a:t>・・・ストアドプロシージャを実行する</a:t>
-            </a:r>
-            <a:r>
-              <a:rPr lang="en-US" altLang="ja-JP" sz="1400" dirty="0" smtClean="0"/>
-              <a:t>DAO</a:t>
-            </a:r>
-            <a:endParaRPr lang="ja-JP" altLang="en-US" sz="1400" dirty="0" smtClean="0"/>
-          </a:p>
-          <a:p>
-            <a:pPr lvl="1"/>
-            <a:r>
-              <a:rPr lang="en-US" altLang="ja-JP" sz="1400" dirty="0" err="1" smtClean="0"/>
-              <a:t>QueryRowHandleDAO</a:t>
-            </a:r>
-            <a:r>
-              <a:rPr lang="ja-JP" altLang="en-US" sz="1400" dirty="0" smtClean="0"/>
-              <a:t>・・・参照系のデータベースアクセスの結果を</a:t>
-            </a:r>
-            <a:r>
-              <a:rPr lang="en-US" altLang="ja-JP" sz="1400" dirty="0" smtClean="0"/>
-              <a:t>1</a:t>
-            </a:r>
-            <a:r>
-              <a:rPr lang="ja-JP" altLang="en-US" sz="1400" dirty="0" smtClean="0"/>
-              <a:t>件ずつ処理するための</a:t>
-            </a:r>
-            <a:r>
-              <a:rPr lang="en-US" altLang="ja-JP" sz="1400" dirty="0" smtClean="0"/>
-              <a:t>DAO</a:t>
-            </a:r>
-          </a:p>
-          <a:p>
-            <a:pPr>
-              <a:buNone/>
-            </a:pPr>
-            <a:r>
-              <a:rPr lang="en-US" altLang="ja-JP" sz="1100" dirty="0" smtClean="0"/>
-              <a:t>		</a:t>
-            </a:r>
-            <a:r>
-              <a:rPr lang="ja-JP" altLang="en-US" sz="1100" dirty="0" smtClean="0"/>
-              <a:t>　　 </a:t>
-            </a:r>
-            <a:r>
-              <a:rPr lang="en-US" altLang="ja-JP" sz="1100" dirty="0" smtClean="0"/>
-              <a:t>※</a:t>
-            </a:r>
-            <a:r>
-              <a:rPr lang="ja-JP" altLang="en-US" sz="1100" dirty="0" smtClean="0"/>
-              <a:t>大量データの読み込みを行う場合は、「コレクタ」を同時に利用します。</a:t>
-            </a:r>
-            <a:endParaRPr lang="ja-JP" altLang="en-US" sz="1600" dirty="0" smtClean="0"/>
           </a:p>
           <a:p>
             <a:endParaRPr kumimoji="1" lang="ja-JP" altLang="en-US" sz="1600" dirty="0"/>
@@ -8273,7 +8060,7 @@
         </p:nvSpPr>
         <p:spPr bwMode="auto">
           <a:xfrm>
-            <a:off x="272480" y="3140968"/>
+            <a:off x="272480" y="2471046"/>
             <a:ext cx="8928992" cy="3312368"/>
           </a:xfrm>
           <a:prstGeom prst="rect">
@@ -8322,14 +8109,21 @@
                 <a:latin typeface="Courier New" pitchFamily="49" charset="0"/>
                 <a:cs typeface="Courier New" pitchFamily="49" charset="0"/>
               </a:rPr>
-              <a:t>QueryBLogic</a:t>
+              <a:t>SampleLogic</a:t>
             </a:r>
             <a:r>
               <a:rPr lang="en-US" altLang="ja-JP" sz="1200" dirty="0" smtClean="0">
                 <a:latin typeface="Courier New" pitchFamily="49" charset="0"/>
                 <a:cs typeface="Courier New" pitchFamily="49" charset="0"/>
               </a:rPr>
-              <a:t> extends </a:t>
+              <a:t> </a:t>
+            </a:r>
+            <a:r>
+              <a:rPr lang="en-US" altLang="ja-JP" sz="1200" dirty="0" smtClean="0">
+                <a:latin typeface="Courier New" pitchFamily="49" charset="0"/>
+                <a:cs typeface="Courier New" pitchFamily="49" charset="0"/>
+              </a:rPr>
+              <a:t>extends </a:t>
             </a:r>
             <a:r>
               <a:rPr lang="en-US" altLang="ja-JP" sz="1200" dirty="0" err="1" smtClean="0">
@@ -8343,23 +8137,36 @@
                 <a:latin typeface="Courier New" pitchFamily="49" charset="0"/>
                 <a:cs typeface="Courier New" pitchFamily="49" charset="0"/>
               </a:rPr>
-              <a:t> {</a:t>
-            </a:r>
-          </a:p>
-          <a:p>
+              <a:t> </a:t>
+            </a:r>
             <a:r>
               <a:rPr lang="en-US" altLang="ja-JP" sz="1200" dirty="0" smtClean="0">
                 <a:latin typeface="Courier New" pitchFamily="49" charset="0"/>
                 <a:cs typeface="Courier New" pitchFamily="49" charset="0"/>
               </a:rPr>
-              <a:t>    @</a:t>
-            </a:r>
-            <a:r>
-              <a:rPr lang="en-US" altLang="ja-JP" sz="1200" dirty="0" err="1" smtClean="0">
+              <a:t>{</a:t>
+            </a:r>
+          </a:p>
+          <a:p>
+            <a:endParaRPr lang="en-US" altLang="ja-JP" sz="1200" dirty="0" smtClean="0">
+              <a:latin typeface="Courier New" pitchFamily="49" charset="0"/>
+              <a:cs typeface="Courier New" pitchFamily="49" charset="0"/>
+            </a:endParaRPr>
+          </a:p>
+          <a:p>
+            <a:r>
+              <a:rPr lang="en-US" altLang="ja-JP" sz="1200" dirty="0" smtClean="0">
                 <a:latin typeface="Courier New" pitchFamily="49" charset="0"/>
                 <a:cs typeface="Courier New" pitchFamily="49" charset="0"/>
               </a:rPr>
-              <a:t>Autowired</a:t>
+              <a:t>    </a:t>
+            </a:r>
+            <a:r>
+              <a:rPr lang="en-US" altLang="ja-JP" sz="1200" dirty="0" smtClean="0">
+                <a:latin typeface="Courier New" pitchFamily="49" charset="0"/>
+                <a:cs typeface="Courier New" pitchFamily="49" charset="0"/>
+              </a:rPr>
+              <a:t>@Inject</a:t>
             </a:r>
             <a:endParaRPr lang="en-US" altLang="ja-JP" sz="1200" dirty="0" smtClean="0">
               <a:latin typeface="Courier New" pitchFamily="49" charset="0"/>
@@ -8382,7 +8189,7 @@
                 <a:latin typeface="Courier New" pitchFamily="49" charset="0"/>
                 <a:cs typeface="Courier New" pitchFamily="49" charset="0"/>
               </a:rPr>
-              <a:t>QueryDAO</a:t>
+              <a:t>SampleDao</a:t>
             </a:r>
             <a:r>
               <a:rPr lang="en-US" altLang="ja-JP" sz="1200" b="1" dirty="0" smtClean="0">
@@ -8402,7 +8209,7 @@
                 <a:latin typeface="Courier New" pitchFamily="49" charset="0"/>
                 <a:cs typeface="Courier New" pitchFamily="49" charset="0"/>
               </a:rPr>
-              <a:t>queryDAO</a:t>
+              <a:t>sampleDao</a:t>
             </a:r>
             <a:r>
               <a:rPr lang="en-US" altLang="ja-JP" sz="1200" b="1" dirty="0" smtClean="0">
@@ -8527,28 +8334,42 @@
                 <a:latin typeface="Courier New" pitchFamily="49" charset="0"/>
                 <a:cs typeface="Courier New" pitchFamily="49" charset="0"/>
               </a:rPr>
-              <a:t>SelectUserArgBean</a:t>
+              <a:t>SelectUserInputDto</a:t>
             </a:r>
             <a:r>
               <a:rPr lang="en-US" altLang="ja-JP" sz="1200" dirty="0" smtClean="0">
                 <a:latin typeface="Courier New" pitchFamily="49" charset="0"/>
                 <a:cs typeface="Courier New" pitchFamily="49" charset="0"/>
               </a:rPr>
-              <a:t> bean = new </a:t>
-            </a:r>
-            <a:r>
-              <a:rPr lang="en-US" altLang="ja-JP" sz="1200" dirty="0" err="1" smtClean="0">
-                <a:latin typeface="Courier New" pitchFamily="49" charset="0"/>
-                <a:cs typeface="Courier New" pitchFamily="49" charset="0"/>
-              </a:rPr>
-              <a:t>SelectUserArgBean</a:t>
+              <a:t> </a:t>
             </a:r>
             <a:r>
               <a:rPr lang="en-US" altLang="ja-JP" sz="1200" dirty="0" smtClean="0">
                 <a:latin typeface="Courier New" pitchFamily="49" charset="0"/>
                 <a:cs typeface="Courier New" pitchFamily="49" charset="0"/>
               </a:rPr>
-              <a:t>(); //</a:t>
+              <a:t>bean = new </a:t>
+            </a:r>
+            <a:r>
+              <a:rPr lang="en-US" altLang="ja-JP" sz="1200" dirty="0" err="1">
+                <a:latin typeface="Courier New" pitchFamily="49" charset="0"/>
+                <a:cs typeface="Courier New" pitchFamily="49" charset="0"/>
+              </a:rPr>
+              <a:t>SelectUserInputDto</a:t>
+            </a:r>
+            <a:r>
+              <a:rPr lang="en-US" altLang="ja-JP" sz="1200" dirty="0">
+                <a:latin typeface="Courier New" pitchFamily="49" charset="0"/>
+                <a:cs typeface="Courier New" pitchFamily="49" charset="0"/>
+              </a:rPr>
+              <a:t>(); </a:t>
+            </a:r>
+            <a:r>
+              <a:rPr lang="en-US" altLang="ja-JP" sz="1200" dirty="0" smtClean="0">
+                <a:latin typeface="Courier New" pitchFamily="49" charset="0"/>
+                <a:cs typeface="Courier New" pitchFamily="49" charset="0"/>
+              </a:rPr>
+              <a:t>//</a:t>
             </a:r>
             <a:r>
               <a:rPr lang="ja-JP" altLang="en-US" sz="1200" dirty="0" smtClean="0">
@@ -8597,7 +8418,7 @@
                 <a:latin typeface="Courier New" pitchFamily="49" charset="0"/>
                 <a:cs typeface="Courier New" pitchFamily="49" charset="0"/>
               </a:rPr>
-              <a:t>SelectUserResult</a:t>
+              <a:t>SelectUserOutputDto</a:t>
             </a:r>
             <a:r>
               <a:rPr lang="en-US" altLang="ja-JP" sz="1200" b="1" dirty="0" smtClean="0">
@@ -8607,10 +8428,8 @@
                 <a:latin typeface="Courier New" pitchFamily="49" charset="0"/>
                 <a:cs typeface="Courier New" pitchFamily="49" charset="0"/>
               </a:rPr>
-              <a:t> result =</a:t>
-            </a:r>
-          </a:p>
-          <a:p>
+              <a:t> </a:t>
+            </a:r>
             <a:r>
               <a:rPr lang="en-US" altLang="ja-JP" sz="1200" b="1" dirty="0" smtClean="0">
                 <a:solidFill>
@@ -8619,7 +8438,17 @@
                 <a:latin typeface="Courier New" pitchFamily="49" charset="0"/>
                 <a:cs typeface="Courier New" pitchFamily="49" charset="0"/>
               </a:rPr>
-              <a:t>            </a:t>
+              <a:t>result </a:t>
+            </a:r>
+            <a:r>
+              <a:rPr lang="en-US" altLang="ja-JP" sz="1200" b="1" dirty="0" smtClean="0">
+                <a:solidFill>
+                  <a:srgbClr val="FF0000"/>
+                </a:solidFill>
+                <a:latin typeface="Courier New" pitchFamily="49" charset="0"/>
+                <a:cs typeface="Courier New" pitchFamily="49" charset="0"/>
+              </a:rPr>
+              <a:t>= </a:t>
             </a:r>
             <a:r>
               <a:rPr lang="en-US" altLang="ja-JP" sz="1200" b="1" dirty="0" err="1" smtClean="0">
@@ -8629,7 +8458,7 @@
                 <a:latin typeface="Courier New" pitchFamily="49" charset="0"/>
                 <a:cs typeface="Courier New" pitchFamily="49" charset="0"/>
               </a:rPr>
-              <a:t>queryDAO.queryForObject</a:t>
+              <a:t>sampleDao.selectUser</a:t>
             </a:r>
             <a:r>
               <a:rPr lang="en-US" altLang="ja-JP" sz="1200" b="1" dirty="0" smtClean="0">
@@ -8639,156 +8468,7 @@
                 <a:latin typeface="Courier New" pitchFamily="49" charset="0"/>
                 <a:cs typeface="Courier New" pitchFamily="49" charset="0"/>
               </a:rPr>
-              <a:t>("</a:t>
-            </a:r>
-            <a:r>
-              <a:rPr lang="en-US" altLang="ja-JP" sz="1200" b="1" dirty="0" err="1" smtClean="0">
-                <a:solidFill>
-                  <a:srgbClr val="FF0000"/>
-                </a:solidFill>
-                <a:latin typeface="Courier New" pitchFamily="49" charset="0"/>
-                <a:cs typeface="Courier New" pitchFamily="49" charset="0"/>
-              </a:rPr>
-              <a:t>select.user</a:t>
-            </a:r>
-            <a:r>
-              <a:rPr lang="en-US" altLang="ja-JP" sz="1200" b="1" dirty="0" smtClean="0">
-                <a:solidFill>
-                  <a:srgbClr val="FF0000"/>
-                </a:solidFill>
-                <a:latin typeface="Courier New" pitchFamily="49" charset="0"/>
-                <a:cs typeface="Courier New" pitchFamily="49" charset="0"/>
-              </a:rPr>
-              <a:t>", bean, </a:t>
-            </a:r>
-            <a:r>
-              <a:rPr lang="en-US" altLang="ja-JP" sz="1200" b="1" dirty="0" err="1" smtClean="0">
-                <a:solidFill>
-                  <a:srgbClr val="FF0000"/>
-                </a:solidFill>
-                <a:latin typeface="Courier New" pitchFamily="49" charset="0"/>
-                <a:cs typeface="Courier New" pitchFamily="49" charset="0"/>
-              </a:rPr>
-              <a:t>SelectUserResult.class</a:t>
-            </a:r>
-            <a:r>
-              <a:rPr lang="en-US" altLang="ja-JP" sz="1200" b="1" dirty="0" smtClean="0">
-                <a:solidFill>
-                  <a:srgbClr val="FF0000"/>
-                </a:solidFill>
-                <a:latin typeface="Courier New" pitchFamily="49" charset="0"/>
-                <a:cs typeface="Courier New" pitchFamily="49" charset="0"/>
-              </a:rPr>
-              <a:t>);</a:t>
-            </a:r>
-          </a:p>
-          <a:p>
-            <a:r>
-              <a:rPr lang="en-US" altLang="ja-JP" sz="1200" dirty="0" smtClean="0">
-                <a:latin typeface="Courier New" pitchFamily="49" charset="0"/>
-                <a:cs typeface="Courier New" pitchFamily="49" charset="0"/>
-              </a:rPr>
-              <a:t>        //</a:t>
-            </a:r>
-            <a:r>
-              <a:rPr lang="ja-JP" altLang="en-US" sz="1200" dirty="0" smtClean="0">
-                <a:latin typeface="Courier New" pitchFamily="49" charset="0"/>
-                <a:cs typeface="Courier New" pitchFamily="49" charset="0"/>
-              </a:rPr>
-              <a:t>第一引数は実行する設定の</a:t>
-            </a:r>
-            <a:r>
-              <a:rPr lang="en-US" altLang="ja-JP" sz="1200" dirty="0" smtClean="0">
-                <a:latin typeface="Courier New" pitchFamily="49" charset="0"/>
-                <a:cs typeface="Courier New" pitchFamily="49" charset="0"/>
-              </a:rPr>
-              <a:t>ID(DAO</a:t>
-            </a:r>
-            <a:r>
-              <a:rPr lang="ja-JP" altLang="en-US" sz="1200" dirty="0" smtClean="0">
-                <a:latin typeface="Courier New" pitchFamily="49" charset="0"/>
-                <a:cs typeface="Courier New" pitchFamily="49" charset="0"/>
-              </a:rPr>
-              <a:t>の実装に依存する</a:t>
-            </a:r>
-            <a:r>
-              <a:rPr lang="en-US" altLang="ja-JP" sz="1200" dirty="0" smtClean="0">
-                <a:latin typeface="Courier New" pitchFamily="49" charset="0"/>
-                <a:cs typeface="Courier New" pitchFamily="49" charset="0"/>
-              </a:rPr>
-              <a:t>)</a:t>
-            </a:r>
-          </a:p>
-          <a:p>
-            <a:r>
-              <a:rPr lang="ja-JP" altLang="en-US" sz="1200" dirty="0" smtClean="0">
-                <a:latin typeface="Courier New" pitchFamily="49" charset="0"/>
-                <a:cs typeface="Courier New" pitchFamily="49" charset="0"/>
-              </a:rPr>
-              <a:t>　　　　　　　</a:t>
-            </a:r>
-            <a:r>
-              <a:rPr lang="en-US" altLang="ja-JP" sz="1200" dirty="0" smtClean="0">
-                <a:latin typeface="Courier New" pitchFamily="49" charset="0"/>
-                <a:cs typeface="Courier New" pitchFamily="49" charset="0"/>
-              </a:rPr>
-              <a:t>//</a:t>
-            </a:r>
-            <a:r>
-              <a:rPr lang="ja-JP" altLang="en-US" sz="1200" dirty="0" smtClean="0">
-                <a:latin typeface="Courier New" pitchFamily="49" charset="0"/>
-                <a:cs typeface="Courier New" pitchFamily="49" charset="0"/>
-              </a:rPr>
-              <a:t>第二引数は</a:t>
-            </a:r>
-            <a:r>
-              <a:rPr lang="en-US" altLang="ja-JP" sz="1200" dirty="0" smtClean="0">
-                <a:latin typeface="Courier New" pitchFamily="49" charset="0"/>
-                <a:cs typeface="Courier New" pitchFamily="49" charset="0"/>
-              </a:rPr>
-              <a:t>SQL</a:t>
-            </a:r>
-            <a:r>
-              <a:rPr lang="ja-JP" altLang="en-US" sz="1200" dirty="0" smtClean="0">
-                <a:latin typeface="Courier New" pitchFamily="49" charset="0"/>
-                <a:cs typeface="Courier New" pitchFamily="49" charset="0"/>
-              </a:rPr>
-              <a:t>などにプレースホルダがある場合の置換文字列を格納した</a:t>
-            </a:r>
-            <a:r>
-              <a:rPr lang="en-US" altLang="ja-JP" sz="1200" dirty="0" smtClean="0">
-                <a:latin typeface="Courier New" pitchFamily="49" charset="0"/>
-                <a:cs typeface="Courier New" pitchFamily="49" charset="0"/>
-              </a:rPr>
-              <a:t>POJO</a:t>
-            </a:r>
-            <a:r>
-              <a:rPr lang="ja-JP" altLang="en-US" sz="1200" dirty="0" err="1" smtClean="0">
-                <a:latin typeface="Courier New" pitchFamily="49" charset="0"/>
-                <a:cs typeface="Courier New" pitchFamily="49" charset="0"/>
-              </a:rPr>
-              <a:t>。</a:t>
-            </a:r>
-            <a:r>
-              <a:rPr lang="ja-JP" altLang="en-US" sz="1200" dirty="0" smtClean="0">
-                <a:latin typeface="Courier New" pitchFamily="49" charset="0"/>
-                <a:cs typeface="Courier New" pitchFamily="49" charset="0"/>
-              </a:rPr>
-              <a:t>不要であれば</a:t>
-            </a:r>
-            <a:r>
-              <a:rPr lang="en-US" altLang="ja-JP" sz="1200" dirty="0" smtClean="0">
-                <a:latin typeface="Courier New" pitchFamily="49" charset="0"/>
-                <a:cs typeface="Courier New" pitchFamily="49" charset="0"/>
-              </a:rPr>
-              <a:t>null</a:t>
-            </a:r>
-            <a:r>
-              <a:rPr lang="ja-JP" altLang="en-US" sz="1200" dirty="0" err="1" smtClean="0">
-                <a:latin typeface="Courier New" pitchFamily="49" charset="0"/>
-                <a:cs typeface="Courier New" pitchFamily="49" charset="0"/>
-              </a:rPr>
-              <a:t>。</a:t>
+              <a:t>(bean);</a:t>
             </a:r>
             <a:endParaRPr lang="ja-JP" altLang="en-US" sz="1200" dirty="0" smtClean="0">
               <a:latin typeface="Courier New" pitchFamily="49" charset="0"/>
@@ -8801,40 +8481,17 @@
                 <a:latin typeface="Courier New" pitchFamily="49" charset="0"/>
                 <a:cs typeface="Courier New" pitchFamily="49" charset="0"/>
               </a:rPr>
-              <a:t>        </a:t>
+              <a:t>    </a:t>
             </a:r>
             <a:r>
               <a:rPr lang="en-US" altLang="ja-JP" sz="1200" dirty="0" smtClean="0">
                 <a:latin typeface="Courier New" pitchFamily="49" charset="0"/>
                 <a:cs typeface="Courier New" pitchFamily="49" charset="0"/>
               </a:rPr>
-              <a:t>//</a:t>
-            </a:r>
-            <a:r>
-              <a:rPr lang="ja-JP" altLang="en-US" sz="1200" dirty="0" smtClean="0">
-                <a:latin typeface="Courier New" pitchFamily="49" charset="0"/>
-                <a:cs typeface="Courier New" pitchFamily="49" charset="0"/>
-              </a:rPr>
-              <a:t>第三引数は戻り値のクラス</a:t>
-            </a:r>
-          </a:p>
-          <a:p>
-            <a:r>
-              <a:rPr lang="ja-JP" altLang="en-US" sz="1200" dirty="0" smtClean="0">
-                <a:latin typeface="Courier New" pitchFamily="49" charset="0"/>
-                <a:cs typeface="Courier New" pitchFamily="49" charset="0"/>
-              </a:rPr>
-              <a:t>　　　　　　　・・・省略</a:t>
-            </a:r>
-          </a:p>
-          <a:p>
-            <a:r>
-              <a:rPr lang="ja-JP" altLang="en-US" sz="1200" dirty="0" smtClean="0">
-                <a:latin typeface="Courier New" pitchFamily="49" charset="0"/>
-                <a:cs typeface="Courier New" pitchFamily="49" charset="0"/>
-              </a:rPr>
-              <a:t>    </a:t>
-            </a:r>
+              <a:t>}</a:t>
+            </a:r>
+          </a:p>
+          <a:p>
             <a:r>
               <a:rPr lang="en-US" altLang="ja-JP" sz="1200" dirty="0" smtClean="0">
                 <a:latin typeface="Courier New" pitchFamily="49" charset="0"/>
@@ -8842,15 +8499,10 @@
               </a:rPr>
               <a:t>}</a:t>
             </a:r>
-          </a:p>
-          <a:p>
-            <a:r>
-              <a:rPr lang="en-US" altLang="ja-JP" sz="1200" dirty="0" smtClean="0">
-                <a:latin typeface="Courier New" pitchFamily="49" charset="0"/>
-                <a:cs typeface="Courier New" pitchFamily="49" charset="0"/>
-              </a:rPr>
-              <a:t>}</a:t>
-            </a:r>
+            <a:endParaRPr lang="en-US" altLang="ja-JP" sz="1200" dirty="0" smtClean="0">
+              <a:latin typeface="Courier New" pitchFamily="49" charset="0"/>
+              <a:cs typeface="Courier New" pitchFamily="49" charset="0"/>
+            </a:endParaRPr>
           </a:p>
           <a:p>
             <a:endParaRPr lang="en-US" altLang="ja-JP" sz="1200" dirty="0" smtClean="0">
@@ -8925,17 +8577,6 @@
             <a:r>
               <a:rPr lang="ja-JP" altLang="en-US" dirty="0" smtClean="0"/>
               <a:t>形式、固定長形式、可変長形式ファイルの入出力機能を提供します。</a:t>
-            </a:r>
-            <a:endParaRPr lang="en-US" altLang="ja-JP" dirty="0" smtClean="0"/>
-          </a:p>
-          <a:p>
-            <a:r>
-              <a:rPr lang="en-US" altLang="ja-JP" dirty="0" smtClean="0"/>
-              <a:t>TERASOLUNA Batch Framework for Java Version2.x</a:t>
-            </a:r>
-            <a:r>
-              <a:rPr lang="ja-JP" altLang="en-US" dirty="0" smtClean="0"/>
-              <a:t>と同じものを利用します。</a:t>
             </a:r>
             <a:endParaRPr lang="en-US" altLang="ja-JP" dirty="0" smtClean="0"/>
           </a:p>
@@ -11241,11 +10882,11 @@
               <a:t>@</a:t>
             </a:r>
             <a:r>
-              <a:rPr lang="en-US" altLang="ja-JP" sz="1000" dirty="0" err="1" smtClean="0">
-                <a:latin typeface="Tahoma" pitchFamily="34" charset="0"/>
-                <a:ea typeface="ＭＳ Ｐゴシック" charset="-128"/>
-              </a:rPr>
-              <a:t>Aurtowired</a:t>
+              <a:rPr lang="en-US" altLang="ja-JP" sz="1000" dirty="0" smtClean="0">
+                <a:latin typeface="Tahoma" pitchFamily="34" charset="0"/>
+                <a:ea typeface="ＭＳ Ｐゴシック" charset="-128"/>
+              </a:rPr>
+              <a:t>Inject</a:t>
             </a:r>
             <a:endParaRPr lang="en-US" altLang="ja-JP" sz="1000" dirty="0" smtClean="0">
               <a:latin typeface="Tahoma" pitchFamily="34" charset="0"/>
@@ -11258,7 +10899,21 @@
                 <a:latin typeface="Tahoma" pitchFamily="34" charset="0"/>
                 <a:ea typeface="ＭＳ Ｐゴシック" charset="-128"/>
               </a:rPr>
-              <a:t>    @Qualifier(value = "</a:t>
+              <a:t>    </a:t>
+            </a:r>
+            <a:r>
+              <a:rPr lang="en-US" altLang="ja-JP" sz="1000" dirty="0" smtClean="0">
+                <a:latin typeface="Tahoma" pitchFamily="34" charset="0"/>
+                <a:ea typeface="ＭＳ Ｐゴシック" charset="-128"/>
+              </a:rPr>
+              <a:t>@Named(value </a:t>
+            </a:r>
+            <a:r>
+              <a:rPr lang="en-US" altLang="ja-JP" sz="1000" dirty="0" smtClean="0">
+                <a:latin typeface="Tahoma" pitchFamily="34" charset="0"/>
+                <a:ea typeface="ＭＳ Ｐゴシック" charset="-128"/>
+              </a:rPr>
+              <a:t>= "</a:t>
             </a:r>
             <a:r>
               <a:rPr lang="en-US" altLang="ja-JP" sz="1000" dirty="0" err="1" smtClean="0">
@@ -12277,12 +11932,24 @@
           <a:p>
             <a:pPr lvl="1"/>
             <a:r>
+              <a:rPr lang="en-US" altLang="ja-JP" dirty="0" smtClean="0"/>
+              <a:t>MyBatis3</a:t>
+            </a:r>
+            <a:r>
+              <a:rPr lang="ja-JP" altLang="en-US" dirty="0" smtClean="0"/>
+              <a:t>の</a:t>
+            </a:r>
+            <a:r>
               <a:rPr lang="en-US" altLang="ja-JP" dirty="0" err="1" smtClean="0"/>
-              <a:t>QueryRowHandleDAO</a:t>
+              <a:t>ResultHandler</a:t>
             </a:r>
             <a:r>
               <a:rPr lang="ja-JP" altLang="en-US" dirty="0" smtClean="0"/>
-              <a:t>と異なり、</a:t>
+              <a:t>と</a:t>
+            </a:r>
+            <a:r>
+              <a:rPr lang="ja-JP" altLang="en-US" dirty="0" smtClean="0"/>
+              <a:t>異なり、</a:t>
             </a:r>
             <a:r>
               <a:rPr lang="ja-JP" altLang="en-US" dirty="0" smtClean="0">
@@ -12602,7 +12269,7 @@
                 <a:latin typeface="Courier New" pitchFamily="49" charset="0"/>
                 <a:cs typeface="Courier New" pitchFamily="49" charset="0"/>
               </a:rPr>
-              <a:t>DBCollector</a:t>
+              <a:t>DaoCollector</a:t>
             </a:r>
             <a:r>
               <a:rPr lang="en-US" altLang="ja-JP" sz="1200" b="1" dirty="0" smtClean="0">
@@ -12654,7 +12321,7 @@
                 <a:latin typeface="Courier New" pitchFamily="49" charset="0"/>
                 <a:cs typeface="Courier New" pitchFamily="49" charset="0"/>
               </a:rPr>
-              <a:t>this.queryRowHandleDAO</a:t>
+              <a:t>this.sampleDao</a:t>
             </a:r>
             <a:r>
               <a:rPr lang="en-US" altLang="ja-JP" sz="1200" b="1" dirty="0" smtClean="0">
@@ -12664,7 +12331,7 @@
                 <a:latin typeface="Courier New" pitchFamily="49" charset="0"/>
                 <a:cs typeface="Courier New" pitchFamily="49" charset="0"/>
               </a:rPr>
-              <a:t>, "</a:t>
+              <a:t>, “</a:t>
             </a:r>
             <a:r>
               <a:rPr lang="en-US" altLang="ja-JP" sz="1200" b="1" dirty="0" err="1" smtClean="0">
@@ -12674,7 +12341,7 @@
                 <a:latin typeface="Courier New" pitchFamily="49" charset="0"/>
                 <a:cs typeface="Courier New" pitchFamily="49" charset="0"/>
               </a:rPr>
-              <a:t>selectUserList</a:t>
+              <a:t>collecttUserList</a:t>
             </a:r>
             <a:r>
               <a:rPr lang="en-US" altLang="ja-JP" sz="1200" b="1" dirty="0" smtClean="0">
@@ -12925,68 +12592,6 @@
               <a:latin typeface="Courier New" pitchFamily="49" charset="0"/>
               <a:cs typeface="Courier New" pitchFamily="49" charset="0"/>
             </a:endParaRPr>
-          </a:p>
-        </p:txBody>
-      </p:sp>
-      <p:pic>
-        <p:nvPicPr>
-          <p:cNvPr id="2051" name="Picture 3"/>
-          <p:cNvPicPr>
-            <a:picLocks noChangeAspect="1" noChangeArrowheads="1"/>
-          </p:cNvPicPr>
-          <p:nvPr/>
-        </p:nvPicPr>
-        <p:blipFill>
-          <a:blip r:embed="rId2" cstate="print"/>
-          <a:srcRect/>
-          <a:stretch>
-            <a:fillRect/>
-          </a:stretch>
-        </p:blipFill>
-        <p:spPr bwMode="auto">
-          <a:xfrm>
-            <a:off x="5055363" y="4354071"/>
-            <a:ext cx="4722173" cy="2027257"/>
-          </a:xfrm>
-          <a:prstGeom prst="rect">
-            <a:avLst/>
-          </a:prstGeom>
-          <a:noFill/>
-          <a:ln w="9525">
-            <a:noFill/>
-            <a:miter lim="800000"/>
-            <a:headEnd/>
-            <a:tailEnd/>
-          </a:ln>
-        </p:spPr>
-      </p:pic>
-      <p:sp>
-        <p:nvSpPr>
-          <p:cNvPr id="11" name="テキスト ボックス 10"/>
-          <p:cNvSpPr txBox="1"/>
-          <p:nvPr/>
-        </p:nvSpPr>
-        <p:spPr>
-          <a:xfrm>
-            <a:off x="5097016" y="4077072"/>
-            <a:ext cx="2448272" cy="276999"/>
-          </a:xfrm>
-          <a:prstGeom prst="rect">
-            <a:avLst/>
-          </a:prstGeom>
-          <a:noFill/>
-        </p:spPr>
-        <p:txBody>
-          <a:bodyPr wrap="square" rtlCol="0">
-            <a:spAutoFit/>
-          </a:bodyPr>
-          <a:lstStyle/>
-          <a:p>
-            <a:r>
-              <a:rPr lang="ja-JP" altLang="en-US" sz="1200" dirty="0" smtClean="0"/>
-              <a:t>コレクタの内部構造</a:t>
-            </a:r>
-            <a:endParaRPr kumimoji="1" lang="ja-JP" altLang="en-US" sz="1200" dirty="0"/>
           </a:p>
         </p:txBody>
       </p:sp>
@@ -13047,7 +12652,7 @@
           <a:p>
             <a:r>
               <a:rPr lang="en-US" altLang="ja-JP" sz="1600" dirty="0" smtClean="0"/>
-              <a:t>TERASOLUNA</a:t>
+              <a:t>Bean Validation</a:t>
             </a:r>
             <a:r>
               <a:rPr lang="ja-JP" altLang="en-US" sz="1600" dirty="0" smtClean="0"/>
@@ -13172,14 +12777,7 @@
                 <a:latin typeface="Tahoma" pitchFamily="34" charset="0"/>
                 <a:ea typeface="ＭＳ ゴシック" pitchFamily="49" charset="-128"/>
               </a:rPr>
-              <a:t>@</a:t>
-            </a:r>
-            <a:r>
-              <a:rPr lang="en-US" altLang="ja-JP" sz="1000" dirty="0" err="1" smtClean="0">
-                <a:latin typeface="Tahoma" pitchFamily="34" charset="0"/>
-                <a:ea typeface="ＭＳ ゴシック" pitchFamily="49" charset="-128"/>
-              </a:rPr>
-              <a:t>Autowired</a:t>
+              <a:t>@Inject</a:t>
             </a:r>
             <a:endParaRPr lang="en-US" altLang="ja-JP" sz="1000" dirty="0" smtClean="0">
               <a:latin typeface="Tahoma" pitchFamily="34" charset="0"/>
@@ -13192,14 +12790,14 @@
                 <a:latin typeface="Tahoma" pitchFamily="34" charset="0"/>
                 <a:ea typeface="ＭＳ ゴシック" pitchFamily="49" charset="-128"/>
               </a:rPr>
-              <a:t>    @Qualifier(value = "</a:t>
-            </a:r>
-            <a:r>
-              <a:rPr lang="en-US" altLang="ja-JP" sz="1000" dirty="0" err="1" smtClean="0">
+              <a:t>    </a:t>
+            </a:r>
+            <a:r>
+              <a:rPr lang="en-US" altLang="ja-JP" sz="1000" dirty="0" smtClean="0">
                 <a:latin typeface="Tahoma" pitchFamily="34" charset="0"/>
                 <a:ea typeface="ＭＳ ゴシック" pitchFamily="49" charset="-128"/>
               </a:rPr>
-              <a:t>beanValidator</a:t>
+              <a:t>@Named(“validator</a:t>
             </a:r>
             <a:r>
               <a:rPr lang="en-US" altLang="ja-JP" sz="1000" dirty="0" smtClean="0">
@@ -13402,7 +13000,7 @@
                 <a:latin typeface="Tahoma" pitchFamily="34" charset="0"/>
                 <a:ea typeface="ＭＳ ゴシック" pitchFamily="49" charset="-128"/>
               </a:rPr>
-              <a:t>DBValidateCollector</a:t>
+              <a:t>DaoValidateCollector</a:t>
             </a:r>
             <a:r>
               <a:rPr lang="en-US" altLang="ja-JP" sz="1000" dirty="0" smtClean="0">
@@ -13439,17 +13037,24 @@
                 <a:latin typeface="Tahoma" pitchFamily="34" charset="0"/>
                 <a:ea typeface="ＭＳ ゴシック" pitchFamily="49" charset="-128"/>
               </a:rPr>
-              <a:t>this.queryRowHandleDAO</a:t>
+              <a:t>this.sampleDao</a:t>
             </a:r>
             <a:r>
               <a:rPr lang="en-US" altLang="ja-JP" sz="1000" dirty="0" smtClean="0">
                 <a:latin typeface="Tahoma" pitchFamily="34" charset="0"/>
                 <a:ea typeface="ＭＳ ゴシック" pitchFamily="49" charset="-128"/>
               </a:rPr>
-              <a:t>, "Sample.selectData01", null, </a:t>
-            </a:r>
-            <a:r>
-              <a:rPr lang="en-US" altLang="ja-JP" sz="1000" dirty="0" err="1" smtClean="0">
+              <a:t>, “colletData01</a:t>
+            </a:r>
+            <a:r>
+              <a:rPr lang="en-US" altLang="ja-JP" sz="1000" dirty="0" smtClean="0">
+                <a:latin typeface="Tahoma" pitchFamily="34" charset="0"/>
+                <a:ea typeface="ＭＳ ゴシック" pitchFamily="49" charset="-128"/>
+              </a:rPr>
+              <a:t>", null, </a:t>
+            </a:r>
+            <a:r>
+              <a:rPr lang="en-US" altLang="ja-JP" sz="1000" dirty="0" smtClean="0">
                 <a:solidFill>
                   <a:srgbClr val="FF0000"/>
                 </a:solidFill>
@@ -13830,7 +13435,7 @@
                 <a:latin typeface="Arial" charset="0"/>
                 <a:ea typeface="ＭＳ Ｐゴシック" charset="-128"/>
               </a:rPr>
-              <a:t>DBValidateCollector</a:t>
+              <a:t>DaoValidateCollector</a:t>
             </a:r>
             <a:r>
               <a:rPr lang="en-US" altLang="ja-JP" sz="1000" dirty="0" smtClean="0">
@@ -13894,11 +13499,17 @@
           <p:cNvGraphicFramePr>
             <a:graphicFrameLocks noGrp="1"/>
           </p:cNvGraphicFramePr>
-          <p:nvPr/>
+          <p:nvPr>
+            <p:extLst>
+              <p:ext uri="{D42A27DB-BD31-4B8C-83A1-F6EECF244321}">
+                <p14:modId xmlns:p14="http://schemas.microsoft.com/office/powerpoint/2010/main" val="1151060304"/>
+              </p:ext>
+            </p:extLst>
+          </p:nvPr>
         </p:nvGraphicFramePr>
         <p:xfrm>
-          <a:off x="5889104" y="781756"/>
-          <a:ext cx="3806056" cy="6031620"/>
+          <a:off x="5889104" y="1080505"/>
+          <a:ext cx="3806056" cy="4070732"/>
         </p:xfrm>
         <a:graphic>
           <a:graphicData uri="http://schemas.openxmlformats.org/drawingml/2006/table">
@@ -13907,8 +13518,8 @@
                 <a:tableStyleId>{5C22544A-7EE6-4342-B048-85BDC9FD1C3A}</a:tableStyleId>
               </a:tblPr>
               <a:tblGrid>
-                <a:gridCol w="1468950"/>
-                <a:gridCol w="2337106"/>
+                <a:gridCol w="1190706"/>
+                <a:gridCol w="2615350"/>
               </a:tblGrid>
               <a:tr h="184311">
                 <a:tc>
@@ -14030,7 +13641,7 @@
                         </a:spcAft>
                       </a:pPr>
                       <a:r>
-                        <a:rPr lang="en-US" sz="1000" b="0" i="0" u="none" strike="noStrike" kern="1200" baseline="0" dirty="0">
+                        <a:rPr lang="en-US" sz="1000" b="0" i="0" u="none" strike="noStrike" kern="1200" baseline="0" dirty="0" err="1" smtClean="0">
                           <a:solidFill>
                             <a:schemeClr val="tx1"/>
                           </a:solidFill>
@@ -14038,7 +13649,7 @@
                           <a:ea typeface="ＭＳ Ｐ明朝"/>
                           <a:cs typeface="Times New Roman"/>
                         </a:rPr>
-                        <a:t>required</a:t>
+                        <a:t>NotNull</a:t>
                       </a:r>
                       <a:endParaRPr lang="en-US" altLang="ja-JP" sz="1800" b="0" i="0" u="none" strike="noStrike" dirty="0">
                         <a:latin typeface="Arial"/>
@@ -14064,7 +13675,7 @@
                         </a:spcAft>
                       </a:pPr>
                       <a:r>
-                        <a:rPr lang="ja-JP" altLang="en-US" sz="1000" b="0" i="0" u="none" strike="noStrike" kern="1200" baseline="0" dirty="0">
+                        <a:rPr lang="en-US" altLang="ja-JP" sz="1000" b="0" i="0" u="none" strike="noStrike" kern="1200" baseline="0" dirty="0" smtClean="0">
                           <a:solidFill>
                             <a:schemeClr val="tx1"/>
                           </a:solidFill>
@@ -14072,7 +13683,18 @@
                           <a:ea typeface="ＭＳ Ｐ明朝"/>
                           <a:cs typeface="Times New Roman"/>
                         </a:rPr>
-                        <a:t>必須入力チェック</a:t>
+                        <a:t>null</a:t>
+                      </a:r>
+                      <a:r>
+                        <a:rPr lang="ja-JP" altLang="en-US" sz="1000" b="0" i="0" u="none" strike="noStrike" kern="1200" baseline="0" dirty="0" smtClean="0">
+                          <a:solidFill>
+                            <a:schemeClr val="tx1"/>
+                          </a:solidFill>
+                          <a:latin typeface="Times New Roman"/>
+                          <a:ea typeface="ＭＳ Ｐ明朝"/>
+                          <a:cs typeface="Times New Roman"/>
+                        </a:rPr>
+                        <a:t>でないこと</a:t>
                       </a:r>
                       <a:endParaRPr lang="ja-JP" altLang="en-US" sz="1800" b="0" i="0" u="none" strike="noStrike" dirty="0">
                         <a:latin typeface="Arial"/>
@@ -14100,7 +13722,7 @@
                         </a:spcAft>
                       </a:pPr>
                       <a:r>
-                        <a:rPr lang="en-US" sz="1000" b="0" i="0" u="none" strike="noStrike" kern="1200" baseline="0" dirty="0">
+                        <a:rPr lang="en-US" sz="1000" b="0" i="0" u="none" strike="noStrike" kern="1200" baseline="0" dirty="0" smtClean="0">
                           <a:solidFill>
                             <a:schemeClr val="tx1"/>
                           </a:solidFill>
@@ -14108,7 +13730,7 @@
                           <a:ea typeface="ＭＳ Ｐ明朝"/>
                           <a:cs typeface="Times New Roman"/>
                         </a:rPr>
-                        <a:t>mask</a:t>
+                        <a:t>Null</a:t>
                       </a:r>
                       <a:endParaRPr lang="en-US" altLang="ja-JP" sz="1800" b="0" i="0" u="none" strike="noStrike" dirty="0">
                         <a:latin typeface="Arial"/>
@@ -14134,7 +13756,7 @@
                         </a:spcAft>
                       </a:pPr>
                       <a:r>
-                        <a:rPr lang="ja-JP" altLang="en-US" sz="1000" b="0" i="0" u="none" strike="noStrike" kern="1200" baseline="0">
+                        <a:rPr lang="en-US" altLang="ja-JP" sz="1000" b="0" i="0" u="none" strike="noStrike" kern="1200" baseline="0" dirty="0" smtClean="0">
                           <a:solidFill>
                             <a:schemeClr val="tx1"/>
                           </a:solidFill>
@@ -14142,9 +13764,20 @@
                           <a:ea typeface="ＭＳ Ｐ明朝"/>
                           <a:cs typeface="Times New Roman"/>
                         </a:rPr>
-                        <a:t>正規表現一致チェック</a:t>
+                        <a:t>null</a:t>
                       </a:r>
-                      <a:endParaRPr lang="ja-JP" altLang="en-US" sz="1800" b="0" i="0" u="none" strike="noStrike">
+                      <a:r>
+                        <a:rPr lang="ja-JP" altLang="en-US" sz="1000" b="0" i="0" u="none" strike="noStrike" kern="1200" baseline="0" dirty="0" smtClean="0">
+                          <a:solidFill>
+                            <a:schemeClr val="tx1"/>
+                          </a:solidFill>
+                          <a:latin typeface="Times New Roman"/>
+                          <a:ea typeface="ＭＳ Ｐ明朝"/>
+                          <a:cs typeface="Times New Roman"/>
+                        </a:rPr>
+                        <a:t>であること</a:t>
+                      </a:r>
+                      <a:endParaRPr lang="ja-JP" altLang="en-US" sz="1800" b="0" i="0" u="none" strike="noStrike" dirty="0">
                         <a:latin typeface="Arial"/>
                       </a:endParaRPr>
                     </a:p>
@@ -14170,7 +13803,7 @@
                         </a:spcAft>
                       </a:pPr>
                       <a:r>
-                        <a:rPr lang="en-US" sz="1000" b="0" i="0" u="none" strike="noStrike" kern="1200" baseline="0" dirty="0">
+                        <a:rPr lang="en-US" sz="1000" b="0" i="0" u="none" strike="noStrike" kern="1200" baseline="0" dirty="0" smtClean="0">
                           <a:solidFill>
                             <a:schemeClr val="tx1"/>
                           </a:solidFill>
@@ -14178,7 +13811,7 @@
                           <a:ea typeface="ＭＳ Ｐ明朝"/>
                           <a:cs typeface="Times New Roman"/>
                         </a:rPr>
-                        <a:t>byte</a:t>
+                        <a:t>Patter</a:t>
                       </a:r>
                       <a:endParaRPr lang="en-US" altLang="ja-JP" sz="1800" b="0" i="0" u="none" strike="noStrike" dirty="0">
                         <a:latin typeface="Arial"/>
@@ -14204,7 +13837,7 @@
                         </a:spcAft>
                       </a:pPr>
                       <a:r>
-                        <a:rPr lang="en-US" sz="1000" b="0" i="0" u="none" strike="noStrike" kern="1200" baseline="0">
+                        <a:rPr lang="ja-JP" altLang="en-US" sz="1000" b="0" i="0" u="none" strike="noStrike" kern="1200" baseline="0" dirty="0" smtClean="0">
                           <a:solidFill>
                             <a:schemeClr val="tx1"/>
                           </a:solidFill>
@@ -14212,20 +13845,9 @@
                           <a:ea typeface="ＭＳ Ｐ明朝"/>
                           <a:cs typeface="Times New Roman"/>
                         </a:rPr>
-                        <a:t>byte</a:t>
+                        <a:t>正規表現にマッチすること</a:t>
                       </a:r>
-                      <a:r>
-                        <a:rPr lang="ja-JP" altLang="en-US" sz="1000" b="0" i="0" u="none" strike="noStrike" kern="1200" baseline="0">
-                          <a:solidFill>
-                            <a:schemeClr val="tx1"/>
-                          </a:solidFill>
-                          <a:latin typeface="Times New Roman"/>
-                          <a:ea typeface="ＭＳ Ｐ明朝"/>
-                          <a:cs typeface="Times New Roman"/>
-                        </a:rPr>
-                        <a:t>型チェック</a:t>
-                      </a:r>
-                      <a:endParaRPr lang="ja-JP" altLang="en-US" sz="1800" b="0" i="0" u="none" strike="noStrike">
+                      <a:endParaRPr lang="ja-JP" altLang="en-US" sz="1800" b="0" i="0" u="none" strike="noStrike" dirty="0">
                         <a:latin typeface="Arial"/>
                       </a:endParaRPr>
                     </a:p>
@@ -14251,7 +13873,7 @@
                         </a:spcAft>
                       </a:pPr>
                       <a:r>
-                        <a:rPr lang="en-US" sz="1000" b="0" i="0" u="none" strike="noStrike" kern="1200" baseline="0">
+                        <a:rPr lang="en-US" sz="1000" b="0" i="0" u="none" strike="noStrike" kern="1200" baseline="0" dirty="0" smtClean="0">
                           <a:solidFill>
                             <a:schemeClr val="tx1"/>
                           </a:solidFill>
@@ -14259,9 +13881,9 @@
                           <a:ea typeface="ＭＳ Ｐ明朝"/>
                           <a:cs typeface="Times New Roman"/>
                         </a:rPr>
-                        <a:t>short</a:t>
+                        <a:t>Min</a:t>
                       </a:r>
-                      <a:endParaRPr lang="en-US" altLang="ja-JP" sz="1800" b="0" i="0" u="none" strike="noStrike">
+                      <a:endParaRPr lang="en-US" altLang="ja-JP" sz="1800" b="0" i="0" u="none" strike="noStrike" dirty="0">
                         <a:latin typeface="Arial"/>
                       </a:endParaRPr>
                     </a:p>
@@ -14285,7 +13907,7 @@
                         </a:spcAft>
                       </a:pPr>
                       <a:r>
-                        <a:rPr lang="en-US" sz="1000" b="0" i="0" u="none" strike="noStrike" kern="1200" baseline="0">
+                        <a:rPr lang="ja-JP" altLang="en-US" sz="1000" b="0" i="0" u="none" strike="noStrike" kern="1200" baseline="0" dirty="0" smtClean="0">
                           <a:solidFill>
                             <a:schemeClr val="tx1"/>
                           </a:solidFill>
@@ -14293,20 +13915,9 @@
                           <a:ea typeface="ＭＳ Ｐ明朝"/>
                           <a:cs typeface="Times New Roman"/>
                         </a:rPr>
-                        <a:t>short</a:t>
+                        <a:t>指定された値以上であること</a:t>
                       </a:r>
-                      <a:r>
-                        <a:rPr lang="ja-JP" altLang="en-US" sz="1000" b="0" i="0" u="none" strike="noStrike" kern="1200" baseline="0">
-                          <a:solidFill>
-                            <a:schemeClr val="tx1"/>
-                          </a:solidFill>
-                          <a:latin typeface="Times New Roman"/>
-                          <a:ea typeface="ＭＳ Ｐ明朝"/>
-                          <a:cs typeface="Times New Roman"/>
-                        </a:rPr>
-                        <a:t>型チェック</a:t>
-                      </a:r>
-                      <a:endParaRPr lang="ja-JP" altLang="en-US" sz="1800" b="0" i="0" u="none" strike="noStrike">
+                      <a:endParaRPr lang="ja-JP" altLang="en-US" sz="1800" b="0" i="0" u="none" strike="noStrike" dirty="0">
                         <a:latin typeface="Arial"/>
                       </a:endParaRPr>
                     </a:p>
@@ -14332,7 +13943,7 @@
                         </a:spcAft>
                       </a:pPr>
                       <a:r>
-                        <a:rPr lang="en-US" sz="1000" b="0" i="0" u="none" strike="noStrike" kern="1200" baseline="0">
+                        <a:rPr lang="en-US" altLang="ja-JP" sz="1000" b="0" i="0" u="none" strike="noStrike" kern="1200" baseline="0" dirty="0" smtClean="0">
                           <a:solidFill>
                             <a:schemeClr val="tx1"/>
                           </a:solidFill>
@@ -14340,9 +13951,9 @@
                           <a:ea typeface="ＭＳ Ｐ明朝"/>
                           <a:cs typeface="Times New Roman"/>
                         </a:rPr>
-                        <a:t>integer</a:t>
+                        <a:t>Max</a:t>
                       </a:r>
-                      <a:endParaRPr lang="en-US" altLang="ja-JP" sz="1800" b="0" i="0" u="none" strike="noStrike">
+                      <a:endParaRPr lang="en-US" altLang="ja-JP" sz="1800" b="0" i="0" u="none" strike="noStrike" dirty="0">
                         <a:latin typeface="Arial"/>
                       </a:endParaRPr>
                     </a:p>
@@ -14366,7 +13977,7 @@
                         </a:spcAft>
                       </a:pPr>
                       <a:r>
-                        <a:rPr lang="en-US" sz="1000" b="0" i="0" u="none" strike="noStrike" kern="1200" baseline="0">
+                        <a:rPr lang="ja-JP" altLang="en-US" sz="1000" b="0" i="0" u="none" strike="noStrike" kern="1200" baseline="0" dirty="0" smtClean="0">
                           <a:solidFill>
                             <a:schemeClr val="tx1"/>
                           </a:solidFill>
@@ -14374,20 +13985,9 @@
                           <a:ea typeface="ＭＳ Ｐ明朝"/>
                           <a:cs typeface="Times New Roman"/>
                         </a:rPr>
-                        <a:t>int</a:t>
+                        <a:t>指定された値以下であること</a:t>
                       </a:r>
-                      <a:r>
-                        <a:rPr lang="ja-JP" altLang="en-US" sz="1000" b="0" i="0" u="none" strike="noStrike" kern="1200" baseline="0">
-                          <a:solidFill>
-                            <a:schemeClr val="tx1"/>
-                          </a:solidFill>
-                          <a:latin typeface="Times New Roman"/>
-                          <a:ea typeface="ＭＳ Ｐ明朝"/>
-                          <a:cs typeface="Times New Roman"/>
-                        </a:rPr>
-                        <a:t>型チェック</a:t>
-                      </a:r>
-                      <a:endParaRPr lang="ja-JP" altLang="en-US" sz="1800" b="0" i="0" u="none" strike="noStrike">
+                      <a:endParaRPr lang="ja-JP" altLang="en-US" sz="1800" b="0" i="0" u="none" strike="noStrike" dirty="0">
                         <a:latin typeface="Arial"/>
                       </a:endParaRPr>
                     </a:p>
@@ -14413,7 +14013,7 @@
                         </a:spcAft>
                       </a:pPr>
                       <a:r>
-                        <a:rPr lang="en-US" sz="1000" b="0" i="0" u="none" strike="noStrike" kern="1200" baseline="0">
+                        <a:rPr lang="en-US" sz="1000" b="0" i="0" u="none" strike="noStrike" kern="1200" baseline="0" dirty="0" err="1" smtClean="0">
                           <a:solidFill>
                             <a:schemeClr val="tx1"/>
                           </a:solidFill>
@@ -14421,9 +14021,9 @@
                           <a:ea typeface="ＭＳ Ｐ明朝"/>
                           <a:cs typeface="Times New Roman"/>
                         </a:rPr>
-                        <a:t>long</a:t>
+                        <a:t>DecimalMin</a:t>
                       </a:r>
-                      <a:endParaRPr lang="en-US" altLang="ja-JP" sz="1800" b="0" i="0" u="none" strike="noStrike">
+                      <a:endParaRPr lang="en-US" altLang="ja-JP" sz="1800" b="0" i="0" u="none" strike="noStrike" dirty="0">
                         <a:latin typeface="Arial"/>
                       </a:endParaRPr>
                     </a:p>
@@ -14447,7 +14047,7 @@
                         </a:spcAft>
                       </a:pPr>
                       <a:r>
-                        <a:rPr lang="en-US" sz="1000" b="0" i="0" u="none" strike="noStrike" kern="1200" baseline="0">
+                        <a:rPr lang="en-US" sz="1000" b="0" i="0" u="none" strike="noStrike" kern="1200" baseline="0" dirty="0" smtClean="0">
                           <a:solidFill>
                             <a:schemeClr val="tx1"/>
                           </a:solidFill>
@@ -14455,10 +14055,10 @@
                           <a:ea typeface="ＭＳ Ｐ明朝"/>
                           <a:cs typeface="Times New Roman"/>
                         </a:rPr>
-                        <a:t>long</a:t>
+                        <a:t>Decimal</a:t>
                       </a:r>
                       <a:r>
-                        <a:rPr lang="ja-JP" altLang="en-US" sz="1000" b="0" i="0" u="none" strike="noStrike" kern="1200" baseline="0">
+                        <a:rPr lang="ja-JP" altLang="en-US" sz="1000" b="0" i="0" u="none" strike="noStrike" kern="1200" baseline="0" dirty="0" smtClean="0">
                           <a:solidFill>
                             <a:schemeClr val="tx1"/>
                           </a:solidFill>
@@ -14466,9 +14066,9 @@
                           <a:ea typeface="ＭＳ Ｐ明朝"/>
                           <a:cs typeface="Times New Roman"/>
                         </a:rPr>
-                        <a:t>型チェック</a:t>
+                        <a:t>型の値が指定された値以上であること</a:t>
                       </a:r>
-                      <a:endParaRPr lang="ja-JP" altLang="en-US" sz="1800" b="0" i="0" u="none" strike="noStrike">
+                      <a:endParaRPr lang="ja-JP" altLang="en-US" sz="1800" b="0" i="0" u="none" strike="noStrike" dirty="0">
                         <a:latin typeface="Arial"/>
                       </a:endParaRPr>
                     </a:p>
@@ -14494,7 +14094,7 @@
                         </a:spcAft>
                       </a:pPr>
                       <a:r>
-                        <a:rPr lang="en-US" sz="1000" b="0" i="0" u="none" strike="noStrike" kern="1200" baseline="0">
+                        <a:rPr lang="en-US" sz="1000" b="0" i="0" u="none" strike="noStrike" kern="1200" baseline="0" dirty="0" err="1" smtClean="0">
                           <a:solidFill>
                             <a:schemeClr val="tx1"/>
                           </a:solidFill>
@@ -14502,9 +14102,9 @@
                           <a:ea typeface="ＭＳ Ｐ明朝"/>
                           <a:cs typeface="Times New Roman"/>
                         </a:rPr>
-                        <a:t>float</a:t>
+                        <a:t>DecimalMax</a:t>
                       </a:r>
-                      <a:endParaRPr lang="en-US" altLang="ja-JP" sz="1800" b="0" i="0" u="none" strike="noStrike">
+                      <a:endParaRPr lang="en-US" altLang="ja-JP" sz="1800" b="0" i="0" u="none" strike="noStrike" dirty="0">
                         <a:latin typeface="Arial"/>
                       </a:endParaRPr>
                     </a:p>
@@ -14528,7 +14128,7 @@
                         </a:spcAft>
                       </a:pPr>
                       <a:r>
-                        <a:rPr lang="en-US" sz="1000" b="0" i="0" u="none" strike="noStrike" kern="1200" baseline="0">
+                        <a:rPr lang="en-US" altLang="ja-JP" sz="1000" b="0" i="0" u="none" strike="noStrike" kern="1200" baseline="0" dirty="0" smtClean="0">
                           <a:solidFill>
                             <a:schemeClr val="tx1"/>
                           </a:solidFill>
@@ -14536,10 +14136,10 @@
                           <a:ea typeface="ＭＳ Ｐ明朝"/>
                           <a:cs typeface="Times New Roman"/>
                         </a:rPr>
-                        <a:t>float</a:t>
+                        <a:t>Decimal</a:t>
                       </a:r>
                       <a:r>
-                        <a:rPr lang="ja-JP" altLang="en-US" sz="1000" b="0" i="0" u="none" strike="noStrike" kern="1200" baseline="0">
+                        <a:rPr lang="ja-JP" altLang="en-US" sz="1000" b="0" i="0" u="none" strike="noStrike" kern="1200" baseline="0" dirty="0" smtClean="0">
                           <a:solidFill>
                             <a:schemeClr val="tx1"/>
                           </a:solidFill>
@@ -14547,9 +14147,9 @@
                           <a:ea typeface="ＭＳ Ｐ明朝"/>
                           <a:cs typeface="Times New Roman"/>
                         </a:rPr>
-                        <a:t>型チェック</a:t>
+                        <a:t>型の値が指定された値以下であること</a:t>
                       </a:r>
-                      <a:endParaRPr lang="ja-JP" altLang="en-US" sz="1800" b="0" i="0" u="none" strike="noStrike">
+                      <a:endParaRPr lang="ja-JP" altLang="en-US" sz="1800" b="0" i="0" u="none" strike="noStrike" dirty="0">
                         <a:latin typeface="Arial"/>
                       </a:endParaRPr>
                     </a:p>
@@ -14575,7 +14175,7 @@
                         </a:spcAft>
                       </a:pPr>
                       <a:r>
-                        <a:rPr lang="en-US" sz="1000" b="0" i="0" u="none" strike="noStrike" kern="1200" baseline="0">
+                        <a:rPr lang="en-US" sz="1000" b="0" i="0" u="none" strike="noStrike" kern="1200" baseline="0" dirty="0" smtClean="0">
                           <a:solidFill>
                             <a:schemeClr val="tx1"/>
                           </a:solidFill>
@@ -14583,9 +14183,9 @@
                           <a:ea typeface="ＭＳ Ｐ明朝"/>
                           <a:cs typeface="Times New Roman"/>
                         </a:rPr>
-                        <a:t>double</a:t>
+                        <a:t>Size</a:t>
                       </a:r>
-                      <a:endParaRPr lang="en-US" altLang="ja-JP" sz="1800" b="0" i="0" u="none" strike="noStrike">
+                      <a:endParaRPr lang="en-US" altLang="ja-JP" sz="1800" b="0" i="0" u="none" strike="noStrike" dirty="0">
                         <a:latin typeface="Arial"/>
                       </a:endParaRPr>
                     </a:p>
@@ -14609,7 +14209,7 @@
                         </a:spcAft>
                       </a:pPr>
                       <a:r>
-                        <a:rPr lang="en-US" sz="1000" b="0" i="0" u="none" strike="noStrike" kern="1200" baseline="0">
+                        <a:rPr lang="ja-JP" altLang="en-US" sz="1000" b="0" i="0" u="none" strike="noStrike" kern="1200" baseline="0" dirty="0" smtClean="0">
                           <a:solidFill>
                             <a:schemeClr val="tx1"/>
                           </a:solidFill>
@@ -14617,10 +14217,10 @@
                           <a:ea typeface="ＭＳ Ｐ明朝"/>
                           <a:cs typeface="Times New Roman"/>
                         </a:rPr>
-                        <a:t>double</a:t>
+                        <a:t>文字列の</a:t>
                       </a:r>
                       <a:r>
-                        <a:rPr lang="ja-JP" altLang="en-US" sz="1000" b="0" i="0" u="none" strike="noStrike" kern="1200" baseline="0">
+                        <a:rPr lang="en-US" altLang="ja-JP" sz="1000" b="0" i="0" u="none" strike="noStrike" kern="1200" baseline="0" dirty="0" smtClean="0">
                           <a:solidFill>
                             <a:schemeClr val="tx1"/>
                           </a:solidFill>
@@ -14628,9 +14228,64 @@
                           <a:ea typeface="ＭＳ Ｐ明朝"/>
                           <a:cs typeface="Times New Roman"/>
                         </a:rPr>
-                        <a:t>型チェック</a:t>
+                        <a:t>length</a:t>
                       </a:r>
-                      <a:endParaRPr lang="ja-JP" altLang="en-US" sz="1800" b="0" i="0" u="none" strike="noStrike">
+                      <a:r>
+                        <a:rPr lang="ja-JP" altLang="en-US" sz="1000" b="0" i="0" u="none" strike="noStrike" kern="1200" baseline="0" dirty="0" smtClean="0">
+                          <a:solidFill>
+                            <a:schemeClr val="tx1"/>
+                          </a:solidFill>
+                          <a:latin typeface="Times New Roman"/>
+                          <a:ea typeface="ＭＳ Ｐ明朝"/>
+                          <a:cs typeface="Times New Roman"/>
+                        </a:rPr>
+                        <a:t>が</a:t>
+                      </a:r>
+                      <a:r>
+                        <a:rPr lang="en-US" altLang="ja-JP" sz="1000" b="0" i="0" u="none" strike="noStrike" kern="1200" baseline="0" dirty="0" smtClean="0">
+                          <a:solidFill>
+                            <a:schemeClr val="tx1"/>
+                          </a:solidFill>
+                          <a:latin typeface="Times New Roman"/>
+                          <a:ea typeface="ＭＳ Ｐ明朝"/>
+                          <a:cs typeface="Times New Roman"/>
+                        </a:rPr>
+                        <a:t>min</a:t>
+                      </a:r>
+                      <a:r>
+                        <a:rPr lang="ja-JP" altLang="en-US" sz="1000" b="0" i="0" u="none" strike="noStrike" kern="1200" baseline="0" dirty="0" smtClean="0">
+                          <a:solidFill>
+                            <a:schemeClr val="tx1"/>
+                          </a:solidFill>
+                          <a:latin typeface="Times New Roman"/>
+                          <a:ea typeface="ＭＳ Ｐ明朝"/>
+                          <a:cs typeface="Times New Roman"/>
+                        </a:rPr>
+                        <a:t>と</a:t>
+                      </a:r>
+                      <a:r>
+                        <a:rPr lang="en-US" altLang="ja-JP" sz="1000" b="0" i="0" u="none" strike="noStrike" kern="1200" baseline="0" dirty="0" smtClean="0">
+                          <a:solidFill>
+                            <a:schemeClr val="tx1"/>
+                          </a:solidFill>
+                          <a:latin typeface="Times New Roman"/>
+                          <a:ea typeface="ＭＳ Ｐ明朝"/>
+                          <a:cs typeface="Times New Roman"/>
+                        </a:rPr>
+                        <a:t>max</a:t>
+                      </a:r>
+                      <a:r>
+                        <a:rPr lang="ja-JP" altLang="en-US" sz="1000" b="0" i="0" u="none" strike="noStrike" kern="1200" baseline="0" dirty="0" smtClean="0">
+                          <a:solidFill>
+                            <a:schemeClr val="tx1"/>
+                          </a:solidFill>
+                          <a:latin typeface="Times New Roman"/>
+                          <a:ea typeface="ＭＳ Ｐ明朝"/>
+                          <a:cs typeface="Times New Roman"/>
+                        </a:rPr>
+                        <a:t>の間であること</a:t>
+                      </a:r>
+                      <a:endParaRPr lang="ja-JP" altLang="en-US" sz="1800" b="0" i="0" u="none" strike="noStrike" dirty="0">
                         <a:latin typeface="Arial"/>
                       </a:endParaRPr>
                     </a:p>
@@ -14656,7 +14311,7 @@
                         </a:spcAft>
                       </a:pPr>
                       <a:r>
-                        <a:rPr lang="en-US" sz="1000" b="0" i="0" u="none" strike="noStrike" kern="1200" baseline="0">
+                        <a:rPr lang="en-US" sz="1000" b="0" i="0" u="none" strike="noStrike" kern="1200" baseline="0" dirty="0" smtClean="0">
                           <a:solidFill>
                             <a:schemeClr val="tx1"/>
                           </a:solidFill>
@@ -14664,9 +14319,9 @@
                           <a:ea typeface="ＭＳ Ｐ明朝"/>
                           <a:cs typeface="Times New Roman"/>
                         </a:rPr>
-                        <a:t>date</a:t>
+                        <a:t>Digits</a:t>
                       </a:r>
-                      <a:endParaRPr lang="en-US" altLang="ja-JP" sz="1800" b="0" i="0" u="none" strike="noStrike">
+                      <a:endParaRPr lang="en-US" altLang="ja-JP" sz="1800" b="0" i="0" u="none" strike="noStrike" dirty="0">
                         <a:latin typeface="Arial"/>
                       </a:endParaRPr>
                     </a:p>
@@ -14690,7 +14345,7 @@
                         </a:spcAft>
                       </a:pPr>
                       <a:r>
-                        <a:rPr lang="ja-JP" altLang="en-US" sz="1000" b="0" i="0" u="none" strike="noStrike" kern="1200" baseline="0">
+                        <a:rPr lang="ja-JP" altLang="en-US" sz="1000" b="0" i="0" u="none" strike="noStrike" kern="1200" baseline="0" dirty="0" smtClean="0">
                           <a:solidFill>
                             <a:schemeClr val="tx1"/>
                           </a:solidFill>
@@ -14698,9 +14353,9 @@
                           <a:ea typeface="ＭＳ Ｐ明朝"/>
                           <a:cs typeface="Times New Roman"/>
                         </a:rPr>
-                        <a:t>日付形式チェック</a:t>
+                        <a:t>指定された範囲内の数値であること</a:t>
                       </a:r>
-                      <a:endParaRPr lang="ja-JP" altLang="en-US" sz="1800" b="0" i="0" u="none" strike="noStrike">
+                      <a:endParaRPr lang="ja-JP" altLang="en-US" sz="1800" b="0" i="0" u="none" strike="noStrike" dirty="0">
                         <a:latin typeface="Arial"/>
                       </a:endParaRPr>
                     </a:p>
@@ -14726,7 +14381,7 @@
                         </a:spcAft>
                       </a:pPr>
                       <a:r>
-                        <a:rPr lang="en-US" sz="1000" b="0" i="0" u="none" strike="noStrike" kern="1200" baseline="0">
+                        <a:rPr lang="en-US" altLang="ja-JP" sz="1000" b="0" i="0" u="none" strike="noStrike" kern="1200" baseline="0" dirty="0" err="1" smtClean="0">
                           <a:solidFill>
                             <a:schemeClr val="tx1"/>
                           </a:solidFill>
@@ -14734,9 +14389,9 @@
                           <a:ea typeface="ＭＳ Ｐ明朝"/>
                           <a:cs typeface="Times New Roman"/>
                         </a:rPr>
-                        <a:t>intRange</a:t>
+                        <a:t>AssertTrue</a:t>
                       </a:r>
-                      <a:endParaRPr lang="en-US" altLang="ja-JP" sz="1800" b="0" i="0" u="none" strike="noStrike">
+                      <a:endParaRPr lang="en-US" altLang="ja-JP" sz="1800" b="0" i="0" u="none" strike="noStrike" dirty="0">
                         <a:latin typeface="Arial"/>
                       </a:endParaRPr>
                     </a:p>
@@ -14760,7 +14415,7 @@
                         </a:spcAft>
                       </a:pPr>
                       <a:r>
-                        <a:rPr lang="en-US" altLang="ja-JP" sz="1000" b="0" i="0" u="none" strike="noStrike" kern="1200" baseline="0">
+                        <a:rPr lang="en-US" altLang="ja-JP" sz="1000" b="0" i="0" u="none" strike="noStrike" kern="1200" baseline="0" dirty="0" smtClean="0">
                           <a:solidFill>
                             <a:schemeClr val="tx1"/>
                           </a:solidFill>
@@ -14768,10 +14423,10 @@
                           <a:ea typeface="ＭＳ Ｐ明朝"/>
                           <a:cs typeface="Times New Roman"/>
                         </a:rPr>
-                        <a:t>int</a:t>
+                        <a:t>true</a:t>
                       </a:r>
                       <a:r>
-                        <a:rPr lang="ja-JP" altLang="en-US" sz="1000" b="0" i="0" u="none" strike="noStrike" kern="1200" baseline="0">
+                        <a:rPr lang="ja-JP" altLang="en-US" sz="1000" b="0" i="0" u="none" strike="noStrike" kern="1200" baseline="0" dirty="0" smtClean="0">
                           <a:solidFill>
                             <a:schemeClr val="tx1"/>
                           </a:solidFill>
@@ -14779,9 +14434,9 @@
                           <a:ea typeface="ＭＳ Ｐ明朝"/>
                           <a:cs typeface="Times New Roman"/>
                         </a:rPr>
-                        <a:t>型範囲チェック</a:t>
+                        <a:t>であること</a:t>
                       </a:r>
-                      <a:endParaRPr lang="ja-JP" altLang="en-US" sz="1800" b="0" i="0" u="none" strike="noStrike">
+                      <a:endParaRPr lang="ja-JP" altLang="en-US" sz="1800" b="0" i="0" u="none" strike="noStrike" dirty="0">
                         <a:latin typeface="Arial"/>
                       </a:endParaRPr>
                     </a:p>
@@ -14807,7 +14462,7 @@
                         </a:spcAft>
                       </a:pPr>
                       <a:r>
-                        <a:rPr lang="en-US" sz="1000" b="0" i="0" u="none" strike="noStrike" kern="1200" baseline="0">
+                        <a:rPr lang="en-US" sz="1000" b="0" i="0" u="none" strike="noStrike" kern="1200" baseline="0" dirty="0" err="1" smtClean="0">
                           <a:solidFill>
                             <a:schemeClr val="tx1"/>
                           </a:solidFill>
@@ -14815,9 +14470,9 @@
                           <a:ea typeface="ＭＳ Ｐ明朝"/>
                           <a:cs typeface="Times New Roman"/>
                         </a:rPr>
-                        <a:t>doubleRange</a:t>
+                        <a:t>AssertFalse</a:t>
                       </a:r>
-                      <a:endParaRPr lang="en-US" altLang="ja-JP" sz="1800" b="0" i="0" u="none" strike="noStrike">
+                      <a:endParaRPr lang="en-US" altLang="ja-JP" sz="1800" b="0" i="0" u="none" strike="noStrike" dirty="0">
                         <a:latin typeface="Arial"/>
                       </a:endParaRPr>
                     </a:p>
@@ -14841,7 +14496,7 @@
                         </a:spcAft>
                       </a:pPr>
                       <a:r>
-                        <a:rPr lang="en-US" sz="1000" b="0" i="0" u="none" strike="noStrike" kern="1200" baseline="0">
+                        <a:rPr lang="en-US" sz="1000" b="0" i="0" u="none" strike="noStrike" kern="1200" baseline="0" dirty="0" smtClean="0">
                           <a:solidFill>
                             <a:schemeClr val="tx1"/>
                           </a:solidFill>
@@ -14849,10 +14504,10 @@
                           <a:ea typeface="ＭＳ Ｐ明朝"/>
                           <a:cs typeface="Times New Roman"/>
                         </a:rPr>
-                        <a:t>double</a:t>
+                        <a:t>False</a:t>
                       </a:r>
                       <a:r>
-                        <a:rPr lang="ja-JP" altLang="en-US" sz="1000" b="0" i="0" u="none" strike="noStrike" kern="1200" baseline="0">
+                        <a:rPr lang="ja-JP" altLang="en-US" sz="1000" b="0" i="0" u="none" strike="noStrike" kern="1200" baseline="0" dirty="0" smtClean="0">
                           <a:solidFill>
                             <a:schemeClr val="tx1"/>
                           </a:solidFill>
@@ -14860,9 +14515,9 @@
                           <a:ea typeface="ＭＳ Ｐ明朝"/>
                           <a:cs typeface="Times New Roman"/>
                         </a:rPr>
-                        <a:t>型範囲チェック</a:t>
+                        <a:t>であること</a:t>
                       </a:r>
-                      <a:endParaRPr lang="ja-JP" altLang="en-US" sz="1800" b="0" i="0" u="none" strike="noStrike">
+                      <a:endParaRPr lang="ja-JP" altLang="en-US" sz="1800" b="0" i="0" u="none" strike="noStrike" dirty="0">
                         <a:latin typeface="Arial"/>
                       </a:endParaRPr>
                     </a:p>
@@ -14888,7 +14543,7 @@
                         </a:spcAft>
                       </a:pPr>
                       <a:r>
-                        <a:rPr lang="en-US" sz="1000" b="0" i="0" u="none" strike="noStrike" kern="1200" baseline="0">
+                        <a:rPr lang="en-US" sz="1000" b="0" i="0" u="none" strike="noStrike" kern="1200" baseline="0" dirty="0" smtClean="0">
                           <a:solidFill>
                             <a:schemeClr val="tx1"/>
                           </a:solidFill>
@@ -14896,9 +14551,9 @@
                           <a:ea typeface="ＭＳ Ｐ明朝"/>
                           <a:cs typeface="Times New Roman"/>
                         </a:rPr>
-                        <a:t>floatRange</a:t>
+                        <a:t>Future</a:t>
                       </a:r>
-                      <a:endParaRPr lang="en-US" altLang="ja-JP" sz="1800" b="0" i="0" u="none" strike="noStrike">
+                      <a:endParaRPr lang="en-US" altLang="ja-JP" sz="1800" b="0" i="0" u="none" strike="noStrike" dirty="0">
                         <a:latin typeface="Arial"/>
                       </a:endParaRPr>
                     </a:p>
@@ -14922,7 +14577,7 @@
                         </a:spcAft>
                       </a:pPr>
                       <a:r>
-                        <a:rPr lang="en-US" sz="1000" b="0" i="0" u="none" strike="noStrike" kern="1200" baseline="0">
+                        <a:rPr lang="ja-JP" altLang="en-US" sz="1000" b="0" i="0" u="none" strike="noStrike" kern="1200" baseline="0" dirty="0" smtClean="0">
                           <a:solidFill>
                             <a:schemeClr val="tx1"/>
                           </a:solidFill>
@@ -14930,20 +14585,9 @@
                           <a:ea typeface="ＭＳ Ｐ明朝"/>
                           <a:cs typeface="Times New Roman"/>
                         </a:rPr>
-                        <a:t>float</a:t>
+                        <a:t>未来日付であること</a:t>
                       </a:r>
-                      <a:r>
-                        <a:rPr lang="ja-JP" altLang="en-US" sz="1000" b="0" i="0" u="none" strike="noStrike" kern="1200" baseline="0">
-                          <a:solidFill>
-                            <a:schemeClr val="tx1"/>
-                          </a:solidFill>
-                          <a:latin typeface="Times New Roman"/>
-                          <a:ea typeface="ＭＳ Ｐ明朝"/>
-                          <a:cs typeface="Times New Roman"/>
-                        </a:rPr>
-                        <a:t>型範囲</a:t>
-                      </a:r>
-                      <a:endParaRPr lang="ja-JP" altLang="en-US" sz="1800" b="0" i="0" u="none" strike="noStrike">
+                      <a:endParaRPr lang="ja-JP" altLang="en-US" sz="1800" b="0" i="0" u="none" strike="noStrike" dirty="0">
                         <a:latin typeface="Arial"/>
                       </a:endParaRPr>
                     </a:p>
@@ -14969,7 +14613,7 @@
                         </a:spcAft>
                       </a:pPr>
                       <a:r>
-                        <a:rPr lang="en-US" sz="1000" b="0" i="0" u="none" strike="noStrike" kern="1200" baseline="0">
+                        <a:rPr lang="en-US" sz="1000" b="0" i="0" u="none" strike="noStrike" kern="1200" baseline="0" dirty="0" smtClean="0">
                           <a:solidFill>
                             <a:schemeClr val="tx1"/>
                           </a:solidFill>
@@ -14977,9 +14621,9 @@
                           <a:ea typeface="ＭＳ Ｐ明朝"/>
                           <a:cs typeface="Times New Roman"/>
                         </a:rPr>
-                        <a:t>maxLength</a:t>
+                        <a:t>Past</a:t>
                       </a:r>
-                      <a:endParaRPr lang="en-US" altLang="ja-JP" sz="1800" b="0" i="0" u="none" strike="noStrike">
+                      <a:endParaRPr lang="en-US" altLang="ja-JP" sz="1800" b="0" i="0" u="none" strike="noStrike" dirty="0">
                         <a:latin typeface="Arial"/>
                       </a:endParaRPr>
                     </a:p>
@@ -15003,7 +14647,7 @@
                         </a:spcAft>
                       </a:pPr>
                       <a:r>
-                        <a:rPr lang="zh-CN" altLang="en-US" sz="1000" b="0" i="0" u="none" strike="noStrike" kern="1200" baseline="0">
+                        <a:rPr lang="ja-JP" altLang="en-US" sz="1000" b="0" i="0" u="none" strike="noStrike" kern="1200" baseline="0" dirty="0" smtClean="0">
                           <a:solidFill>
                             <a:schemeClr val="tx1"/>
                           </a:solidFill>
@@ -15011,9 +14655,9 @@
                           <a:ea typeface="ＭＳ Ｐ明朝"/>
                           <a:cs typeface="Times New Roman"/>
                         </a:rPr>
-                        <a:t>最大文字数制限</a:t>
+                        <a:t>過去日付であること</a:t>
                       </a:r>
-                      <a:endParaRPr lang="zh-CN" altLang="en-US" sz="1800" b="0" i="0" u="none" strike="noStrike">
+                      <a:endParaRPr lang="zh-CN" altLang="en-US" sz="1800" b="0" i="0" u="none" strike="noStrike" dirty="0">
                         <a:latin typeface="Arial"/>
                       </a:endParaRPr>
                     </a:p>
@@ -15039,7 +14683,7 @@
                         </a:spcAft>
                       </a:pPr>
                       <a:r>
-                        <a:rPr lang="en-US" sz="1000" b="0" i="0" u="none" strike="noStrike" kern="1200" baseline="0">
+                        <a:rPr lang="en-US" altLang="ja-JP" sz="1000" b="0" i="0" u="none" strike="noStrike" kern="1200" baseline="0" dirty="0" err="1" smtClean="0">
                           <a:solidFill>
                             <a:schemeClr val="tx1"/>
                           </a:solidFill>
@@ -15047,9 +14691,9 @@
                           <a:ea typeface="ＭＳ Ｐ明朝"/>
                           <a:cs typeface="Times New Roman"/>
                         </a:rPr>
-                        <a:t>minLength</a:t>
+                        <a:t>CreditCardNumber</a:t>
                       </a:r>
-                      <a:endParaRPr lang="en-US" altLang="ja-JP" sz="1800" b="0" i="0" u="none" strike="noStrike">
+                      <a:endParaRPr lang="en-US" altLang="ja-JP" sz="1800" b="0" i="0" u="none" strike="noStrike" dirty="0">
                         <a:latin typeface="Arial"/>
                       </a:endParaRPr>
                     </a:p>
@@ -15073,7 +14717,7 @@
                         </a:spcAft>
                       </a:pPr>
                       <a:r>
-                        <a:rPr lang="zh-CN" altLang="en-US" sz="1000" b="0" i="0" u="none" strike="noStrike" kern="1200" baseline="0">
+                        <a:rPr lang="en-US" altLang="ja-JP" sz="1000" b="0" i="0" u="none" strike="noStrike" kern="1200" baseline="0" dirty="0" err="1" smtClean="0">
                           <a:solidFill>
                             <a:schemeClr val="tx1"/>
                           </a:solidFill>
@@ -15081,9 +14725,20 @@
                           <a:ea typeface="ＭＳ Ｐ明朝"/>
                           <a:cs typeface="Times New Roman"/>
                         </a:rPr>
-                        <a:t>最小文字数制限</a:t>
+                        <a:t>Luhn</a:t>
                       </a:r>
-                      <a:endParaRPr lang="zh-CN" altLang="en-US" sz="1800" b="0" i="0" u="none" strike="noStrike">
+                      <a:r>
+                        <a:rPr lang="ja-JP" altLang="en-US" sz="1000" b="0" i="0" u="none" strike="noStrike" kern="1200" baseline="0" dirty="0" smtClean="0">
+                          <a:solidFill>
+                            <a:schemeClr val="tx1"/>
+                          </a:solidFill>
+                          <a:latin typeface="Times New Roman"/>
+                          <a:ea typeface="ＭＳ Ｐ明朝"/>
+                          <a:cs typeface="Times New Roman"/>
+                        </a:rPr>
+                        <a:t>アルゴリズムでクレジットカード番号が妥当であること</a:t>
+                      </a:r>
+                      <a:endParaRPr lang="zh-CN" altLang="en-US" sz="1800" b="0" i="0" u="none" strike="noStrike" dirty="0">
                         <a:latin typeface="Arial"/>
                       </a:endParaRPr>
                     </a:p>
@@ -15109,7 +14764,7 @@
                         </a:spcAft>
                       </a:pPr>
                       <a:r>
-                        <a:rPr lang="en-US" sz="1000" b="0" i="0" u="none" strike="noStrike" kern="1200" baseline="0">
+                        <a:rPr lang="en-US" sz="1000" b="0" i="0" u="none" strike="noStrike" kern="1200" baseline="0" dirty="0" smtClean="0">
                           <a:solidFill>
                             <a:schemeClr val="tx1"/>
                           </a:solidFill>
@@ -15117,9 +14772,9 @@
                           <a:ea typeface="ＭＳ Ｐ明朝"/>
                           <a:cs typeface="Times New Roman"/>
                         </a:rPr>
-                        <a:t>alphaNumericString</a:t>
+                        <a:t>Email</a:t>
                       </a:r>
-                      <a:endParaRPr lang="en-US" altLang="ja-JP" sz="1800" b="0" i="0" u="none" strike="noStrike">
+                      <a:endParaRPr lang="en-US" altLang="ja-JP" sz="1800" b="0" i="0" u="none" strike="noStrike" dirty="0">
                         <a:latin typeface="Arial"/>
                       </a:endParaRPr>
                     </a:p>
@@ -15143,7 +14798,7 @@
                         </a:spcAft>
                       </a:pPr>
                       <a:r>
-                        <a:rPr lang="ja-JP" altLang="en-US" sz="1000" b="0" i="0" u="none" strike="noStrike" kern="1200" baseline="0">
+                        <a:rPr lang="en-US" altLang="ja-JP" sz="1000" b="0" i="0" u="none" strike="noStrike" kern="1200" baseline="0" dirty="0" smtClean="0">
                           <a:solidFill>
                             <a:schemeClr val="tx1"/>
                           </a:solidFill>
@@ -15151,9 +14806,20 @@
                           <a:ea typeface="ＭＳ Ｐ明朝"/>
                           <a:cs typeface="Times New Roman"/>
                         </a:rPr>
-                        <a:t>半角英数字文字列チェック</a:t>
+                        <a:t>RFC2822</a:t>
                       </a:r>
-                      <a:endParaRPr lang="ja-JP" altLang="en-US" sz="1800" b="0" i="0" u="none" strike="noStrike">
+                      <a:r>
+                        <a:rPr lang="ja-JP" altLang="en-US" sz="1000" b="0" i="0" u="none" strike="noStrike" kern="1200" baseline="0" dirty="0" smtClean="0">
+                          <a:solidFill>
+                            <a:schemeClr val="tx1"/>
+                          </a:solidFill>
+                          <a:latin typeface="Times New Roman"/>
+                          <a:ea typeface="ＭＳ Ｐ明朝"/>
+                          <a:cs typeface="Times New Roman"/>
+                        </a:rPr>
+                        <a:t>に準拠していること</a:t>
+                      </a:r>
+                      <a:endParaRPr lang="zh-CN" altLang="en-US" sz="1800" b="0" i="0" u="none" strike="noStrike" dirty="0">
                         <a:latin typeface="Arial"/>
                       </a:endParaRPr>
                     </a:p>
@@ -15179,7 +14845,7 @@
                         </a:spcAft>
                       </a:pPr>
                       <a:r>
-                        <a:rPr lang="en-US" sz="1000" b="0" i="0" u="none" strike="noStrike" kern="1200" baseline="0">
+                        <a:rPr lang="en-US" sz="1000" b="0" i="0" u="none" strike="noStrike" kern="1200" baseline="0" dirty="0" smtClean="0">
                           <a:solidFill>
                             <a:schemeClr val="tx1"/>
                           </a:solidFill>
@@ -15187,9 +14853,9 @@
                           <a:ea typeface="ＭＳ Ｐ明朝"/>
                           <a:cs typeface="Times New Roman"/>
                         </a:rPr>
-                        <a:t>hankakuKanaString</a:t>
+                        <a:t>URL</a:t>
                       </a:r>
-                      <a:endParaRPr lang="en-US" altLang="ja-JP" sz="1800" b="0" i="0" u="none" strike="noStrike">
+                      <a:endParaRPr lang="en-US" altLang="ja-JP" sz="1800" b="0" i="0" u="none" strike="noStrike" dirty="0">
                         <a:latin typeface="Arial"/>
                       </a:endParaRPr>
                     </a:p>
@@ -15213,7 +14879,7 @@
                         </a:spcAft>
                       </a:pPr>
                       <a:r>
-                        <a:rPr lang="ja-JP" altLang="en-US" sz="1000" b="0" i="0" u="none" strike="noStrike" kern="1200" baseline="0">
+                        <a:rPr lang="en-US" altLang="ja-JP" sz="1000" b="0" i="0" u="none" strike="noStrike" kern="1200" baseline="0" dirty="0" smtClean="0">
                           <a:solidFill>
                             <a:schemeClr val="tx1"/>
                           </a:solidFill>
@@ -15221,9 +14887,20 @@
                           <a:ea typeface="ＭＳ Ｐ明朝"/>
                           <a:cs typeface="Times New Roman"/>
                         </a:rPr>
-                        <a:t>半角カナ文字列チェック</a:t>
+                        <a:t>RFC2396</a:t>
                       </a:r>
-                      <a:endParaRPr lang="ja-JP" altLang="en-US" sz="1800" b="0" i="0" u="none" strike="noStrike">
+                      <a:r>
+                        <a:rPr lang="ja-JP" altLang="en-US" sz="1000" b="0" i="0" u="none" strike="noStrike" kern="1200" baseline="0" dirty="0" smtClean="0">
+                          <a:solidFill>
+                            <a:schemeClr val="tx1"/>
+                          </a:solidFill>
+                          <a:latin typeface="Times New Roman"/>
+                          <a:ea typeface="ＭＳ Ｐ明朝"/>
+                          <a:cs typeface="Times New Roman"/>
+                        </a:rPr>
+                        <a:t>に準拠していること</a:t>
+                      </a:r>
+                      <a:endParaRPr lang="zh-CN" altLang="en-US" sz="1800" b="0" i="0" u="none" strike="noStrike" dirty="0">
                         <a:latin typeface="Arial"/>
                       </a:endParaRPr>
                     </a:p>
@@ -15249,7 +14926,7 @@
                         </a:spcAft>
                       </a:pPr>
                       <a:r>
-                        <a:rPr lang="en-US" sz="1000" b="0" i="0" u="none" strike="noStrike" kern="1200" baseline="0">
+                        <a:rPr lang="en-US" sz="1000" b="0" i="0" u="none" strike="noStrike" kern="1200" baseline="0" dirty="0" err="1" smtClean="0">
                           <a:solidFill>
                             <a:schemeClr val="tx1"/>
                           </a:solidFill>
@@ -15257,9 +14934,9 @@
                           <a:ea typeface="ＭＳ Ｐ明朝"/>
                           <a:cs typeface="Times New Roman"/>
                         </a:rPr>
-                        <a:t>hankakuString</a:t>
+                        <a:t>NotBlank</a:t>
                       </a:r>
-                      <a:endParaRPr lang="en-US" altLang="ja-JP" sz="1800" b="0" i="0" u="none" strike="noStrike">
+                      <a:endParaRPr lang="en-US" altLang="ja-JP" sz="1800" b="0" i="0" u="none" strike="noStrike" dirty="0">
                         <a:latin typeface="Arial"/>
                       </a:endParaRPr>
                     </a:p>
@@ -15283,7 +14960,7 @@
                         </a:spcAft>
                       </a:pPr>
                       <a:r>
-                        <a:rPr lang="ja-JP" altLang="en-US" sz="1000" b="0" i="0" u="none" strike="noStrike" kern="1200" baseline="0">
+                        <a:rPr lang="en-US" altLang="ja-JP" sz="1000" b="0" i="0" u="none" strike="noStrike" kern="1200" baseline="0" dirty="0" smtClean="0">
                           <a:solidFill>
                             <a:schemeClr val="tx1"/>
                           </a:solidFill>
@@ -15291,9 +14968,42 @@
                           <a:ea typeface="ＭＳ Ｐ明朝"/>
                           <a:cs typeface="Times New Roman"/>
                         </a:rPr>
-                        <a:t>半角文字列チェック</a:t>
+                        <a:t>Null, </a:t>
                       </a:r>
-                      <a:endParaRPr lang="ja-JP" altLang="en-US" sz="1800" b="0" i="0" u="none" strike="noStrike">
+                      <a:r>
+                        <a:rPr lang="ja-JP" altLang="en-US" sz="1000" b="0" i="0" u="none" strike="noStrike" kern="1200" baseline="0" dirty="0" smtClean="0">
+                          <a:solidFill>
+                            <a:schemeClr val="tx1"/>
+                          </a:solidFill>
+                          <a:latin typeface="Times New Roman"/>
+                          <a:ea typeface="ＭＳ Ｐ明朝"/>
+                          <a:cs typeface="Times New Roman"/>
+                        </a:rPr>
+                        <a:t>空文字</a:t>
+                      </a:r>
+                      <a:r>
+                        <a:rPr lang="en-US" altLang="ja-JP" sz="1000" b="0" i="0" u="none" strike="noStrike" kern="1200" baseline="0" dirty="0" smtClean="0">
+                          <a:solidFill>
+                            <a:schemeClr val="tx1"/>
+                          </a:solidFill>
+                          <a:latin typeface="Times New Roman"/>
+                          <a:ea typeface="ＭＳ Ｐ明朝"/>
+                          <a:cs typeface="Times New Roman"/>
+                        </a:rPr>
+                        <a:t>, </a:t>
+                      </a:r>
+                      <a:r>
+                        <a:rPr lang="ja-JP" altLang="en-US" sz="1000" b="0" i="0" u="none" strike="noStrike" kern="1200" baseline="0" dirty="0" smtClean="0">
+                          <a:solidFill>
+                            <a:schemeClr val="tx1"/>
+                          </a:solidFill>
+                          <a:latin typeface="Times New Roman"/>
+                          <a:ea typeface="ＭＳ Ｐ明朝"/>
+                          <a:cs typeface="Times New Roman"/>
+                        </a:rPr>
+                        <a:t>空白のみでないこと</a:t>
+                      </a:r>
+                      <a:endParaRPr lang="zh-CN" altLang="en-US" sz="1800" b="0" i="0" u="none" strike="noStrike" dirty="0">
                         <a:latin typeface="Arial"/>
                       </a:endParaRPr>
                     </a:p>
@@ -15319,7 +15029,7 @@
                         </a:spcAft>
                       </a:pPr>
                       <a:r>
-                        <a:rPr lang="en-US" sz="1000" b="0" i="0" u="none" strike="noStrike" kern="1200" baseline="0">
+                        <a:rPr lang="en-US" sz="1000" b="0" i="0" u="none" strike="noStrike" kern="1200" baseline="0" dirty="0" err="1" smtClean="0">
                           <a:solidFill>
                             <a:schemeClr val="tx1"/>
                           </a:solidFill>
@@ -15327,147 +15037,7 @@
                           <a:ea typeface="ＭＳ Ｐ明朝"/>
                           <a:cs typeface="Times New Roman"/>
                         </a:rPr>
-                        <a:t>zenkakuString</a:t>
-                      </a:r>
-                      <a:endParaRPr lang="en-US" altLang="ja-JP" sz="1800" b="0" i="0" u="none" strike="noStrike">
-                        <a:latin typeface="Arial"/>
-                      </a:endParaRPr>
-                    </a:p>
-                  </a:txBody>
-                  <a:tcPr marL="90043" marR="90043" marT="46863" marB="46863"/>
-                </a:tc>
-                <a:tc>
-                  <a:txBody>
-                    <a:bodyPr/>
-                    <a:lstStyle/>
-                    <a:p>
-                      <a:pPr marL="347472" marR="0" indent="-347472" algn="l" rtl="0" eaLnBrk="0" fontAlgn="base" latinLnBrk="0" hangingPunct="0">
-                        <a:lnSpc>
-                          <a:spcPts val="900"/>
-                        </a:lnSpc>
-                        <a:spcBef>
-                          <a:spcPts val="0"/>
-                        </a:spcBef>
-                        <a:spcAft>
-                          <a:spcPts val="0"/>
-                        </a:spcAft>
-                      </a:pPr>
-                      <a:r>
-                        <a:rPr lang="ja-JP" altLang="en-US" sz="1000" b="0" i="0" u="none" strike="noStrike" kern="1200" baseline="0">
-                          <a:solidFill>
-                            <a:schemeClr val="tx1"/>
-                          </a:solidFill>
-                          <a:latin typeface="Times New Roman"/>
-                          <a:ea typeface="ＭＳ Ｐ明朝"/>
-                          <a:cs typeface="Times New Roman"/>
-                        </a:rPr>
-                        <a:t>全角文字列チェック</a:t>
-                      </a:r>
-                      <a:endParaRPr lang="ja-JP" altLang="en-US" sz="1800" b="0" i="0" u="none" strike="noStrike">
-                        <a:latin typeface="Arial"/>
-                      </a:endParaRPr>
-                    </a:p>
-                  </a:txBody>
-                  <a:tcPr marL="90043" marR="90043" marT="46863" marB="46863"/>
-                </a:tc>
-              </a:tr>
-              <a:tr h="0">
-                <a:tc>
-                  <a:txBody>
-                    <a:bodyPr/>
-                    <a:lstStyle/>
-                    <a:p>
-                      <a:pPr marL="347472" marR="0" indent="-347472" algn="l" rtl="0" eaLnBrk="0" fontAlgn="base" latinLnBrk="0" hangingPunct="0">
-                        <a:lnSpc>
-                          <a:spcPts val="900"/>
-                        </a:lnSpc>
-                        <a:spcBef>
-                          <a:spcPts val="0"/>
-                        </a:spcBef>
-                        <a:spcAft>
-                          <a:spcPts val="0"/>
-                        </a:spcAft>
-                      </a:pPr>
-                      <a:r>
-                        <a:rPr lang="en-US" sz="1000" b="0" i="0" u="none" strike="noStrike" kern="1200" baseline="0">
-                          <a:solidFill>
-                            <a:schemeClr val="tx1"/>
-                          </a:solidFill>
-                          <a:latin typeface="Times New Roman"/>
-                          <a:ea typeface="ＭＳ Ｐ明朝"/>
-                          <a:cs typeface="Times New Roman"/>
-                        </a:rPr>
-                        <a:t>zenkakuKanaString</a:t>
-                      </a:r>
-                      <a:endParaRPr lang="en-US" altLang="ja-JP" sz="1800" b="0" i="0" u="none" strike="noStrike">
-                        <a:latin typeface="Arial"/>
-                      </a:endParaRPr>
-                    </a:p>
-                  </a:txBody>
-                  <a:tcPr marL="90043" marR="90043" marT="46863" marB="46863"/>
-                </a:tc>
-                <a:tc>
-                  <a:txBody>
-                    <a:bodyPr/>
-                    <a:lstStyle/>
-                    <a:p>
-                      <a:pPr marL="347472" marR="0" indent="-347472" algn="l" rtl="0" eaLnBrk="0" fontAlgn="base" latinLnBrk="0" hangingPunct="0">
-                        <a:lnSpc>
-                          <a:spcPts val="900"/>
-                        </a:lnSpc>
-                        <a:spcBef>
-                          <a:spcPts val="0"/>
-                        </a:spcBef>
-                        <a:spcAft>
-                          <a:spcPts val="0"/>
-                        </a:spcAft>
-                      </a:pPr>
-                      <a:r>
-                        <a:rPr lang="ja-JP" altLang="en-US" sz="1000" b="0" i="0" u="none" strike="noStrike" kern="1200" baseline="0">
-                          <a:solidFill>
-                            <a:schemeClr val="tx1"/>
-                          </a:solidFill>
-                          <a:latin typeface="Times New Roman"/>
-                          <a:ea typeface="ＭＳ Ｐ明朝"/>
-                          <a:cs typeface="Times New Roman"/>
-                        </a:rPr>
-                        <a:t>全角カナ文字列チェック</a:t>
-                      </a:r>
-                      <a:endParaRPr lang="ja-JP" altLang="en-US" sz="1800" b="0" i="0" u="none" strike="noStrike">
-                        <a:latin typeface="Arial"/>
-                      </a:endParaRPr>
-                    </a:p>
-                  </a:txBody>
-                  <a:tcPr marL="90043" marR="90043" marT="46863" marB="46863"/>
-                </a:tc>
-              </a:tr>
-              <a:tr h="162424">
-                <a:tc>
-                  <a:txBody>
-                    <a:bodyPr/>
-                    <a:lstStyle/>
-                    <a:p>
-                      <a:pPr marL="347472" marR="0" indent="-347472" algn="l" rtl="0" eaLnBrk="0" fontAlgn="base" latinLnBrk="0" hangingPunct="0">
-                        <a:lnSpc>
-                          <a:spcPts val="900"/>
-                        </a:lnSpc>
-                        <a:spcBef>
-                          <a:spcPts val="0"/>
-                        </a:spcBef>
-                        <a:spcAft>
-                          <a:spcPts val="0"/>
-                        </a:spcAft>
-                      </a:pPr>
-                      <a:r>
-                        <a:rPr lang="en-US" sz="1000" b="0" i="0" u="none" strike="noStrike" kern="1200" baseline="0" dirty="0" err="1">
-                          <a:solidFill>
-                            <a:schemeClr val="tx1"/>
-                          </a:solidFill>
-                          <a:latin typeface="Times New Roman"/>
-                          <a:ea typeface="ＭＳ Ｐ明朝"/>
-                          <a:cs typeface="Times New Roman"/>
-                        </a:rPr>
-                        <a:t>capAlphaNumericString</a:t>
+                        <a:t>NotEmpty</a:t>
                       </a:r>
                       <a:endParaRPr lang="en-US" altLang="ja-JP" sz="1800" b="0" i="0" u="none" strike="noStrike" dirty="0">
                         <a:latin typeface="Arial"/>
@@ -15493,7 +15063,7 @@
                         </a:spcAft>
                       </a:pPr>
                       <a:r>
-                        <a:rPr lang="ja-JP" altLang="en-US" sz="1000" b="0" i="0" u="none" strike="noStrike" kern="1200" baseline="0" dirty="0">
+                        <a:rPr lang="en-US" altLang="ja-JP" sz="1000" b="0" i="0" u="none" strike="noStrike" kern="1200" baseline="0" dirty="0" err="1" smtClean="0">
                           <a:solidFill>
                             <a:schemeClr val="tx1"/>
                           </a:solidFill>
@@ -15501,775 +15071,36 @@
                           <a:ea typeface="ＭＳ Ｐ明朝"/>
                           <a:cs typeface="Times New Roman"/>
                         </a:rPr>
-                        <a:t>大文字半角英数字文字列チェック</a:t>
+                        <a:t>Nnll</a:t>
                       </a:r>
-                      <a:endParaRPr lang="ja-JP" altLang="en-US" sz="1800" b="0" i="0" u="none" strike="noStrike" dirty="0">
+                      <a:r>
+                        <a:rPr lang="en-US" altLang="ja-JP" sz="1000" b="0" i="0" u="none" strike="noStrike" kern="1200" baseline="0" dirty="0" smtClean="0">
+                          <a:solidFill>
+                            <a:schemeClr val="tx1"/>
+                          </a:solidFill>
+                          <a:latin typeface="Times New Roman"/>
+                          <a:ea typeface="ＭＳ Ｐ明朝"/>
+                          <a:cs typeface="Times New Roman"/>
+                        </a:rPr>
+                        <a:t>, </a:t>
+                      </a:r>
+                      <a:r>
+                        <a:rPr lang="ja-JP" altLang="en-US" sz="1000" b="0" i="0" u="none" strike="noStrike" kern="1200" baseline="0" dirty="0" smtClean="0">
+                          <a:solidFill>
+                            <a:schemeClr val="tx1"/>
+                          </a:solidFill>
+                          <a:latin typeface="Times New Roman"/>
+                          <a:ea typeface="ＭＳ Ｐ明朝"/>
+                          <a:cs typeface="Times New Roman"/>
+                        </a:rPr>
+                        <a:t>または空でないこと</a:t>
+                      </a:r>
+                      <a:endParaRPr lang="zh-CN" altLang="en-US" sz="1800" b="0" i="0" u="none" strike="noStrike" dirty="0">
                         <a:latin typeface="Arial"/>
                       </a:endParaRPr>
                     </a:p>
                   </a:txBody>
                   <a:tcPr marL="90043" marR="90043" marT="46863" marB="46863"/>
-                </a:tc>
-              </a:tr>
-              <a:tr h="0">
-                <a:tc>
-                  <a:txBody>
-                    <a:bodyPr/>
-                    <a:lstStyle/>
-                    <a:p>
-                      <a:pPr marL="342900" marR="0" lvl="0" indent="-342900" algn="l" defTabSz="914400" rtl="0" eaLnBrk="0" fontAlgn="base" latinLnBrk="0" hangingPunct="0">
-                        <a:lnSpc>
-                          <a:spcPts val="900"/>
-                        </a:lnSpc>
-                        <a:spcBef>
-                          <a:spcPct val="0"/>
-                        </a:spcBef>
-                        <a:spcAft>
-                          <a:spcPct val="0"/>
-                        </a:spcAft>
-                        <a:buClrTx/>
-                        <a:buSzTx/>
-                        <a:buFontTx/>
-                        <a:buNone/>
-                        <a:tabLst/>
-                      </a:pPr>
-                      <a:r>
-                        <a:rPr kumimoji="0" lang="en-US" altLang="ja-JP" sz="1000" b="0" i="0" u="none" strike="noStrike" cap="none" normalizeH="0" baseline="0" dirty="0" smtClean="0">
-                          <a:ln>
-                            <a:noFill/>
-                          </a:ln>
-                          <a:solidFill>
-                            <a:schemeClr val="tx1"/>
-                          </a:solidFill>
-                          <a:effectLst/>
-                          <a:latin typeface="Times New Roman" pitchFamily="18" charset="0"/>
-                          <a:ea typeface="ＭＳ Ｐ明朝" charset="-128"/>
-                          <a:cs typeface="Times New Roman" pitchFamily="18" charset="0"/>
-                        </a:rPr>
-                        <a:t>number</a:t>
-                      </a:r>
-                    </a:p>
-                  </a:txBody>
-                  <a:tcPr marL="90000" marR="90000" marT="46800" marB="46800" horzOverflow="overflow"/>
-                </a:tc>
-                <a:tc>
-                  <a:txBody>
-                    <a:bodyPr/>
-                    <a:lstStyle/>
-                    <a:p>
-                      <a:pPr marL="342900" marR="0" lvl="0" indent="-342900" algn="l" defTabSz="914400" rtl="0" eaLnBrk="0" fontAlgn="base" latinLnBrk="0" hangingPunct="0">
-                        <a:lnSpc>
-                          <a:spcPts val="900"/>
-                        </a:lnSpc>
-                        <a:spcBef>
-                          <a:spcPct val="0"/>
-                        </a:spcBef>
-                        <a:spcAft>
-                          <a:spcPct val="0"/>
-                        </a:spcAft>
-                        <a:buClrTx/>
-                        <a:buSzTx/>
-                        <a:buFontTx/>
-                        <a:buNone/>
-                        <a:tabLst/>
-                      </a:pPr>
-                      <a:r>
-                        <a:rPr kumimoji="0" lang="ja-JP" altLang="en-US" sz="1000" b="0" i="0" u="none" strike="noStrike" cap="none" normalizeH="0" baseline="0" smtClean="0">
-                          <a:ln>
-                            <a:noFill/>
-                          </a:ln>
-                          <a:solidFill>
-                            <a:schemeClr val="tx1"/>
-                          </a:solidFill>
-                          <a:effectLst/>
-                          <a:latin typeface="Times New Roman" pitchFamily="18" charset="0"/>
-                          <a:ea typeface="ＭＳ Ｐ明朝" charset="-128"/>
-                          <a:cs typeface="Times New Roman" pitchFamily="18" charset="0"/>
-                        </a:rPr>
-                        <a:t>数値チェック</a:t>
-                      </a:r>
-                    </a:p>
-                  </a:txBody>
-                  <a:tcPr marL="90000" marR="90000" marT="46800" marB="46800" horzOverflow="overflow"/>
-                </a:tc>
-              </a:tr>
-              <a:tr h="0">
-                <a:tc>
-                  <a:txBody>
-                    <a:bodyPr/>
-                    <a:lstStyle/>
-                    <a:p>
-                      <a:pPr marL="342900" marR="0" lvl="0" indent="-342900" algn="l" defTabSz="914400" rtl="0" eaLnBrk="0" fontAlgn="base" latinLnBrk="0" hangingPunct="0">
-                        <a:lnSpc>
-                          <a:spcPts val="900"/>
-                        </a:lnSpc>
-                        <a:spcBef>
-                          <a:spcPct val="0"/>
-                        </a:spcBef>
-                        <a:spcAft>
-                          <a:spcPct val="0"/>
-                        </a:spcAft>
-                        <a:buClrTx/>
-                        <a:buSzTx/>
-                        <a:buFontTx/>
-                        <a:buNone/>
-                        <a:tabLst/>
-                      </a:pPr>
-                      <a:r>
-                        <a:rPr kumimoji="0" lang="en-US" altLang="ja-JP" sz="1000" b="0" i="0" u="none" strike="noStrike" cap="none" normalizeH="0" baseline="0" dirty="0" err="1" smtClean="0">
-                          <a:ln>
-                            <a:noFill/>
-                          </a:ln>
-                          <a:solidFill>
-                            <a:schemeClr val="tx1"/>
-                          </a:solidFill>
-                          <a:effectLst/>
-                          <a:latin typeface="Times New Roman" pitchFamily="18" charset="0"/>
-                          <a:ea typeface="ＭＳ Ｐ明朝" charset="-128"/>
-                          <a:cs typeface="Times New Roman" pitchFamily="18" charset="0"/>
-                        </a:rPr>
-                        <a:t>numericString</a:t>
-                      </a:r>
-                      <a:endParaRPr kumimoji="0" lang="en-US" altLang="ja-JP" sz="1000" b="0" i="0" u="none" strike="noStrike" cap="none" normalizeH="0" baseline="0" dirty="0" smtClean="0">
-                        <a:ln>
-                          <a:noFill/>
-                        </a:ln>
-                        <a:solidFill>
-                          <a:schemeClr val="tx1"/>
-                        </a:solidFill>
-                        <a:effectLst/>
-                        <a:latin typeface="Times New Roman" pitchFamily="18" charset="0"/>
-                        <a:ea typeface="ＭＳ Ｐ明朝" charset="-128"/>
-                        <a:cs typeface="Times New Roman" pitchFamily="18" charset="0"/>
-                      </a:endParaRPr>
-                    </a:p>
-                  </a:txBody>
-                  <a:tcPr marL="90000" marR="90000" marT="46800" marB="46800" horzOverflow="overflow"/>
-                </a:tc>
-                <a:tc>
-                  <a:txBody>
-                    <a:bodyPr/>
-                    <a:lstStyle/>
-                    <a:p>
-                      <a:pPr marL="342900" marR="0" lvl="0" indent="-342900" algn="l" defTabSz="914400" rtl="0" eaLnBrk="0" fontAlgn="base" latinLnBrk="0" hangingPunct="0">
-                        <a:lnSpc>
-                          <a:spcPts val="900"/>
-                        </a:lnSpc>
-                        <a:spcBef>
-                          <a:spcPct val="0"/>
-                        </a:spcBef>
-                        <a:spcAft>
-                          <a:spcPct val="0"/>
-                        </a:spcAft>
-                        <a:buClrTx/>
-                        <a:buSzTx/>
-                        <a:buFontTx/>
-                        <a:buNone/>
-                        <a:tabLst/>
-                      </a:pPr>
-                      <a:r>
-                        <a:rPr kumimoji="0" lang="ja-JP" altLang="en-US" sz="1000" b="0" i="0" u="none" strike="noStrike" cap="none" normalizeH="0" baseline="0" smtClean="0">
-                          <a:ln>
-                            <a:noFill/>
-                          </a:ln>
-                          <a:solidFill>
-                            <a:schemeClr val="tx1"/>
-                          </a:solidFill>
-                          <a:effectLst/>
-                          <a:latin typeface="Times New Roman" pitchFamily="18" charset="0"/>
-                          <a:ea typeface="ＭＳ Ｐ明朝" charset="-128"/>
-                          <a:cs typeface="Times New Roman" pitchFamily="18" charset="0"/>
-                        </a:rPr>
-                        <a:t>数字文字列チェック</a:t>
-                      </a:r>
-                    </a:p>
-                  </a:txBody>
-                  <a:tcPr marL="90000" marR="90000" marT="46800" marB="46800" horzOverflow="overflow"/>
-                </a:tc>
-              </a:tr>
-              <a:tr h="0">
-                <a:tc>
-                  <a:txBody>
-                    <a:bodyPr/>
-                    <a:lstStyle/>
-                    <a:p>
-                      <a:pPr marL="342900" marR="0" lvl="0" indent="-342900" algn="l" defTabSz="914400" rtl="0" eaLnBrk="0" fontAlgn="base" latinLnBrk="0" hangingPunct="0">
-                        <a:lnSpc>
-                          <a:spcPts val="900"/>
-                        </a:lnSpc>
-                        <a:spcBef>
-                          <a:spcPct val="0"/>
-                        </a:spcBef>
-                        <a:spcAft>
-                          <a:spcPct val="0"/>
-                        </a:spcAft>
-                        <a:buClrTx/>
-                        <a:buSzTx/>
-                        <a:buFontTx/>
-                        <a:buNone/>
-                        <a:tabLst/>
-                      </a:pPr>
-                      <a:r>
-                        <a:rPr kumimoji="0" lang="en-US" altLang="ja-JP" sz="1000" b="0" i="0" u="none" strike="noStrike" cap="none" normalizeH="0" baseline="0" dirty="0" smtClean="0">
-                          <a:ln>
-                            <a:noFill/>
-                          </a:ln>
-                          <a:solidFill>
-                            <a:schemeClr val="tx1"/>
-                          </a:solidFill>
-                          <a:effectLst/>
-                          <a:latin typeface="Times New Roman" pitchFamily="18" charset="0"/>
-                          <a:ea typeface="ＭＳ Ｐ明朝" charset="-128"/>
-                          <a:cs typeface="Times New Roman" pitchFamily="18" charset="0"/>
-                        </a:rPr>
-                        <a:t>prohibited</a:t>
-                      </a:r>
-                    </a:p>
-                  </a:txBody>
-                  <a:tcPr marL="90000" marR="90000" marT="46800" marB="46800" horzOverflow="overflow"/>
-                </a:tc>
-                <a:tc>
-                  <a:txBody>
-                    <a:bodyPr/>
-                    <a:lstStyle/>
-                    <a:p>
-                      <a:pPr marL="342900" marR="0" lvl="0" indent="-342900" algn="l" defTabSz="914400" rtl="0" eaLnBrk="0" fontAlgn="base" latinLnBrk="0" hangingPunct="0">
-                        <a:lnSpc>
-                          <a:spcPts val="900"/>
-                        </a:lnSpc>
-                        <a:spcBef>
-                          <a:spcPct val="0"/>
-                        </a:spcBef>
-                        <a:spcAft>
-                          <a:spcPct val="0"/>
-                        </a:spcAft>
-                        <a:buClrTx/>
-                        <a:buSzTx/>
-                        <a:buFontTx/>
-                        <a:buNone/>
-                        <a:tabLst/>
-                      </a:pPr>
-                      <a:r>
-                        <a:rPr kumimoji="0" lang="ja-JP" altLang="en-US" sz="1000" b="0" i="0" u="none" strike="noStrike" cap="none" normalizeH="0" baseline="0" smtClean="0">
-                          <a:ln>
-                            <a:noFill/>
-                          </a:ln>
-                          <a:solidFill>
-                            <a:schemeClr val="tx1"/>
-                          </a:solidFill>
-                          <a:effectLst/>
-                          <a:latin typeface="Times New Roman" pitchFamily="18" charset="0"/>
-                          <a:ea typeface="ＭＳ Ｐ明朝" charset="-128"/>
-                          <a:cs typeface="Times New Roman" pitchFamily="18" charset="0"/>
-                        </a:rPr>
-                        <a:t>禁止文字列チェック</a:t>
-                      </a:r>
-                    </a:p>
-                  </a:txBody>
-                  <a:tcPr marL="90000" marR="90000" marT="46800" marB="46800" horzOverflow="overflow"/>
-                </a:tc>
-              </a:tr>
-              <a:tr h="0">
-                <a:tc>
-                  <a:txBody>
-                    <a:bodyPr/>
-                    <a:lstStyle/>
-                    <a:p>
-                      <a:pPr marL="342900" marR="0" lvl="0" indent="-342900" algn="l" defTabSz="914400" rtl="0" eaLnBrk="0" fontAlgn="base" latinLnBrk="0" hangingPunct="0">
-                        <a:lnSpc>
-                          <a:spcPts val="900"/>
-                        </a:lnSpc>
-                        <a:spcBef>
-                          <a:spcPct val="0"/>
-                        </a:spcBef>
-                        <a:spcAft>
-                          <a:spcPct val="0"/>
-                        </a:spcAft>
-                        <a:buClrTx/>
-                        <a:buSzTx/>
-                        <a:buFontTx/>
-                        <a:buNone/>
-                        <a:tabLst/>
-                      </a:pPr>
-                      <a:r>
-                        <a:rPr kumimoji="0" lang="en-US" altLang="ja-JP" sz="1000" b="0" i="0" u="none" strike="noStrike" cap="none" normalizeH="0" baseline="0" dirty="0" err="1" smtClean="0">
-                          <a:ln>
-                            <a:noFill/>
-                          </a:ln>
-                          <a:solidFill>
-                            <a:schemeClr val="tx1"/>
-                          </a:solidFill>
-                          <a:effectLst/>
-                          <a:latin typeface="Times New Roman" pitchFamily="18" charset="0"/>
-                          <a:ea typeface="ＭＳ Ｐ明朝" charset="-128"/>
-                          <a:cs typeface="Times New Roman" pitchFamily="18" charset="0"/>
-                        </a:rPr>
-                        <a:t>stringLength</a:t>
-                      </a:r>
-                      <a:endParaRPr kumimoji="0" lang="en-US" altLang="ja-JP" sz="1000" b="0" i="0" u="none" strike="noStrike" cap="none" normalizeH="0" baseline="0" dirty="0" smtClean="0">
-                        <a:ln>
-                          <a:noFill/>
-                        </a:ln>
-                        <a:solidFill>
-                          <a:schemeClr val="tx1"/>
-                        </a:solidFill>
-                        <a:effectLst/>
-                        <a:latin typeface="Times New Roman" pitchFamily="18" charset="0"/>
-                        <a:ea typeface="ＭＳ Ｐ明朝" charset="-128"/>
-                        <a:cs typeface="Times New Roman" pitchFamily="18" charset="0"/>
-                      </a:endParaRPr>
-                    </a:p>
-                  </a:txBody>
-                  <a:tcPr marL="90000" marR="90000" marT="46800" marB="46800" horzOverflow="overflow"/>
-                </a:tc>
-                <a:tc>
-                  <a:txBody>
-                    <a:bodyPr/>
-                    <a:lstStyle/>
-                    <a:p>
-                      <a:pPr marL="342900" marR="0" lvl="0" indent="-342900" algn="l" defTabSz="914400" rtl="0" eaLnBrk="0" fontAlgn="base" latinLnBrk="0" hangingPunct="0">
-                        <a:lnSpc>
-                          <a:spcPts val="900"/>
-                        </a:lnSpc>
-                        <a:spcBef>
-                          <a:spcPct val="0"/>
-                        </a:spcBef>
-                        <a:spcAft>
-                          <a:spcPct val="0"/>
-                        </a:spcAft>
-                        <a:buClrTx/>
-                        <a:buSzTx/>
-                        <a:buFontTx/>
-                        <a:buNone/>
-                        <a:tabLst/>
-                      </a:pPr>
-                      <a:r>
-                        <a:rPr kumimoji="0" lang="ja-JP" altLang="en-US" sz="1000" b="0" i="0" u="none" strike="noStrike" cap="none" normalizeH="0" baseline="0" smtClean="0">
-                          <a:ln>
-                            <a:noFill/>
-                          </a:ln>
-                          <a:solidFill>
-                            <a:schemeClr val="tx1"/>
-                          </a:solidFill>
-                          <a:effectLst/>
-                          <a:latin typeface="Times New Roman" pitchFamily="18" charset="0"/>
-                          <a:ea typeface="ＭＳ Ｐ明朝" charset="-128"/>
-                          <a:cs typeface="Times New Roman" pitchFamily="18" charset="0"/>
-                        </a:rPr>
-                        <a:t>文字列長チェック</a:t>
-                      </a:r>
-                    </a:p>
-                  </a:txBody>
-                  <a:tcPr marL="90000" marR="90000" marT="46800" marB="46800" horzOverflow="overflow"/>
-                </a:tc>
-              </a:tr>
-              <a:tr h="0">
-                <a:tc>
-                  <a:txBody>
-                    <a:bodyPr/>
-                    <a:lstStyle/>
-                    <a:p>
-                      <a:pPr marL="342900" marR="0" lvl="0" indent="-342900" algn="l" defTabSz="914400" rtl="0" eaLnBrk="0" fontAlgn="base" latinLnBrk="0" hangingPunct="0">
-                        <a:lnSpc>
-                          <a:spcPts val="900"/>
-                        </a:lnSpc>
-                        <a:spcBef>
-                          <a:spcPct val="0"/>
-                        </a:spcBef>
-                        <a:spcAft>
-                          <a:spcPct val="0"/>
-                        </a:spcAft>
-                        <a:buClrTx/>
-                        <a:buSzTx/>
-                        <a:buFontTx/>
-                        <a:buNone/>
-                        <a:tabLst/>
-                      </a:pPr>
-                      <a:r>
-                        <a:rPr kumimoji="0" lang="en-US" altLang="ja-JP" sz="1000" b="0" i="0" u="none" strike="noStrike" cap="none" normalizeH="0" baseline="0" dirty="0" err="1" smtClean="0">
-                          <a:ln>
-                            <a:noFill/>
-                          </a:ln>
-                          <a:solidFill>
-                            <a:schemeClr val="tx1"/>
-                          </a:solidFill>
-                          <a:effectLst/>
-                          <a:latin typeface="Times New Roman" pitchFamily="18" charset="0"/>
-                          <a:ea typeface="ＭＳ Ｐ明朝" charset="-128"/>
-                          <a:cs typeface="Times New Roman" pitchFamily="18" charset="0"/>
-                        </a:rPr>
-                        <a:t>byteRange</a:t>
-                      </a:r>
-                      <a:endParaRPr kumimoji="0" lang="en-US" altLang="ja-JP" sz="1000" b="0" i="0" u="none" strike="noStrike" cap="none" normalizeH="0" baseline="0" dirty="0" smtClean="0">
-                        <a:ln>
-                          <a:noFill/>
-                        </a:ln>
-                        <a:solidFill>
-                          <a:schemeClr val="tx1"/>
-                        </a:solidFill>
-                        <a:effectLst/>
-                        <a:latin typeface="Times New Roman" pitchFamily="18" charset="0"/>
-                        <a:ea typeface="ＭＳ Ｐ明朝" charset="-128"/>
-                        <a:cs typeface="Times New Roman" pitchFamily="18" charset="0"/>
-                      </a:endParaRPr>
-                    </a:p>
-                  </a:txBody>
-                  <a:tcPr marL="90000" marR="90000" marT="46800" marB="46800" horzOverflow="overflow"/>
-                </a:tc>
-                <a:tc>
-                  <a:txBody>
-                    <a:bodyPr/>
-                    <a:lstStyle/>
-                    <a:p>
-                      <a:pPr marL="342900" marR="0" lvl="0" indent="-342900" algn="l" defTabSz="914400" rtl="0" eaLnBrk="0" fontAlgn="base" latinLnBrk="0" hangingPunct="0">
-                        <a:lnSpc>
-                          <a:spcPts val="900"/>
-                        </a:lnSpc>
-                        <a:spcBef>
-                          <a:spcPct val="0"/>
-                        </a:spcBef>
-                        <a:spcAft>
-                          <a:spcPct val="0"/>
-                        </a:spcAft>
-                        <a:buClrTx/>
-                        <a:buSzTx/>
-                        <a:buFontTx/>
-                        <a:buNone/>
-                        <a:tabLst/>
-                      </a:pPr>
-                      <a:r>
-                        <a:rPr kumimoji="0" lang="en-US" altLang="ja-JP" sz="1000" b="0" i="0" u="none" strike="noStrike" cap="none" normalizeH="0" baseline="0" smtClean="0">
-                          <a:ln>
-                            <a:noFill/>
-                          </a:ln>
-                          <a:solidFill>
-                            <a:schemeClr val="tx1"/>
-                          </a:solidFill>
-                          <a:effectLst/>
-                          <a:latin typeface="Times New Roman" pitchFamily="18" charset="0"/>
-                          <a:ea typeface="ＭＳ Ｐ明朝" charset="-128"/>
-                          <a:cs typeface="Times New Roman" pitchFamily="18" charset="0"/>
-                        </a:rPr>
-                        <a:t>byte</a:t>
-                      </a:r>
-                      <a:r>
-                        <a:rPr kumimoji="0" lang="ja-JP" altLang="en-US" sz="1000" b="0" i="0" u="none" strike="noStrike" cap="none" normalizeH="0" baseline="0" smtClean="0">
-                          <a:ln>
-                            <a:noFill/>
-                          </a:ln>
-                          <a:solidFill>
-                            <a:schemeClr val="tx1"/>
-                          </a:solidFill>
-                          <a:effectLst/>
-                          <a:latin typeface="Times New Roman" pitchFamily="18" charset="0"/>
-                          <a:ea typeface="ＭＳ Ｐ明朝" charset="-128"/>
-                          <a:cs typeface="Times New Roman" pitchFamily="18" charset="0"/>
-                        </a:rPr>
-                        <a:t>列長範囲チェック</a:t>
-                      </a:r>
-                    </a:p>
-                  </a:txBody>
-                  <a:tcPr marL="90000" marR="90000" marT="46800" marB="46800" horzOverflow="overflow"/>
-                </a:tc>
-              </a:tr>
-              <a:tr h="0">
-                <a:tc>
-                  <a:txBody>
-                    <a:bodyPr/>
-                    <a:lstStyle/>
-                    <a:p>
-                      <a:pPr marL="342900" marR="0" lvl="0" indent="-342900" algn="l" defTabSz="914400" rtl="0" eaLnBrk="0" fontAlgn="base" latinLnBrk="0" hangingPunct="0">
-                        <a:lnSpc>
-                          <a:spcPts val="900"/>
-                        </a:lnSpc>
-                        <a:spcBef>
-                          <a:spcPct val="0"/>
-                        </a:spcBef>
-                        <a:spcAft>
-                          <a:spcPct val="0"/>
-                        </a:spcAft>
-                        <a:buClrTx/>
-                        <a:buSzTx/>
-                        <a:buFontTx/>
-                        <a:buNone/>
-                        <a:tabLst/>
-                      </a:pPr>
-                      <a:r>
-                        <a:rPr kumimoji="0" lang="en-US" altLang="ja-JP" sz="1000" b="0" i="0" u="none" strike="noStrike" cap="none" normalizeH="0" baseline="0" dirty="0" err="1" smtClean="0">
-                          <a:ln>
-                            <a:noFill/>
-                          </a:ln>
-                          <a:solidFill>
-                            <a:schemeClr val="tx1"/>
-                          </a:solidFill>
-                          <a:effectLst/>
-                          <a:latin typeface="Times New Roman" pitchFamily="18" charset="0"/>
-                          <a:ea typeface="ＭＳ Ｐ明朝" charset="-128"/>
-                          <a:cs typeface="Times New Roman" pitchFamily="18" charset="0"/>
-                        </a:rPr>
-                        <a:t>dateRange</a:t>
-                      </a:r>
-                      <a:endParaRPr kumimoji="0" lang="en-US" altLang="ja-JP" sz="1000" b="0" i="0" u="none" strike="noStrike" cap="none" normalizeH="0" baseline="0" dirty="0" smtClean="0">
-                        <a:ln>
-                          <a:noFill/>
-                        </a:ln>
-                        <a:solidFill>
-                          <a:schemeClr val="tx1"/>
-                        </a:solidFill>
-                        <a:effectLst/>
-                        <a:latin typeface="Times New Roman" pitchFamily="18" charset="0"/>
-                        <a:ea typeface="ＭＳ Ｐ明朝" charset="-128"/>
-                        <a:cs typeface="Times New Roman" pitchFamily="18" charset="0"/>
-                      </a:endParaRPr>
-                    </a:p>
-                  </a:txBody>
-                  <a:tcPr marL="90000" marR="90000" marT="46800" marB="46800" horzOverflow="overflow"/>
-                </a:tc>
-                <a:tc>
-                  <a:txBody>
-                    <a:bodyPr/>
-                    <a:lstStyle/>
-                    <a:p>
-                      <a:pPr marL="342900" marR="0" lvl="0" indent="-342900" algn="l" defTabSz="914400" rtl="0" eaLnBrk="0" fontAlgn="base" latinLnBrk="0" hangingPunct="0">
-                        <a:lnSpc>
-                          <a:spcPts val="900"/>
-                        </a:lnSpc>
-                        <a:spcBef>
-                          <a:spcPct val="0"/>
-                        </a:spcBef>
-                        <a:spcAft>
-                          <a:spcPct val="0"/>
-                        </a:spcAft>
-                        <a:buClrTx/>
-                        <a:buSzTx/>
-                        <a:buFontTx/>
-                        <a:buNone/>
-                        <a:tabLst/>
-                      </a:pPr>
-                      <a:r>
-                        <a:rPr kumimoji="0" lang="en-US" altLang="ja-JP" sz="1000" b="0" i="0" u="none" strike="noStrike" cap="none" normalizeH="0" baseline="0" smtClean="0">
-                          <a:ln>
-                            <a:noFill/>
-                          </a:ln>
-                          <a:solidFill>
-                            <a:schemeClr val="tx1"/>
-                          </a:solidFill>
-                          <a:effectLst/>
-                          <a:latin typeface="Times New Roman" pitchFamily="18" charset="0"/>
-                          <a:ea typeface="ＭＳ Ｐ明朝" charset="-128"/>
-                          <a:cs typeface="Times New Roman" pitchFamily="18" charset="0"/>
-                        </a:rPr>
-                        <a:t>date</a:t>
-                      </a:r>
-                      <a:r>
-                        <a:rPr kumimoji="0" lang="ja-JP" altLang="en-US" sz="1000" b="0" i="0" u="none" strike="noStrike" cap="none" normalizeH="0" baseline="0" smtClean="0">
-                          <a:ln>
-                            <a:noFill/>
-                          </a:ln>
-                          <a:solidFill>
-                            <a:schemeClr val="tx1"/>
-                          </a:solidFill>
-                          <a:effectLst/>
-                          <a:latin typeface="Times New Roman" pitchFamily="18" charset="0"/>
-                          <a:ea typeface="ＭＳ Ｐ明朝" charset="-128"/>
-                          <a:cs typeface="Times New Roman" pitchFamily="18" charset="0"/>
-                        </a:rPr>
-                        <a:t>型範囲チェック</a:t>
-                      </a:r>
-                    </a:p>
-                  </a:txBody>
-                  <a:tcPr marL="90000" marR="90000" marT="46800" marB="46800" horzOverflow="overflow"/>
-                </a:tc>
-              </a:tr>
-              <a:tr h="0">
-                <a:tc>
-                  <a:txBody>
-                    <a:bodyPr/>
-                    <a:lstStyle/>
-                    <a:p>
-                      <a:pPr marL="342900" marR="0" lvl="0" indent="-342900" algn="l" defTabSz="914400" rtl="0" eaLnBrk="0" fontAlgn="base" latinLnBrk="0" hangingPunct="0">
-                        <a:lnSpc>
-                          <a:spcPts val="900"/>
-                        </a:lnSpc>
-                        <a:spcBef>
-                          <a:spcPct val="0"/>
-                        </a:spcBef>
-                        <a:spcAft>
-                          <a:spcPct val="0"/>
-                        </a:spcAft>
-                        <a:buClrTx/>
-                        <a:buSzTx/>
-                        <a:buFontTx/>
-                        <a:buNone/>
-                        <a:tabLst/>
-                      </a:pPr>
-                      <a:r>
-                        <a:rPr kumimoji="0" lang="en-US" altLang="ja-JP" sz="1000" b="0" i="0" u="none" strike="noStrike" cap="none" normalizeH="0" baseline="0" dirty="0" err="1" smtClean="0">
-                          <a:ln>
-                            <a:noFill/>
-                          </a:ln>
-                          <a:solidFill>
-                            <a:schemeClr val="tx1"/>
-                          </a:solidFill>
-                          <a:effectLst/>
-                          <a:latin typeface="Times New Roman" pitchFamily="18" charset="0"/>
-                          <a:ea typeface="ＭＳ Ｐ明朝" charset="-128"/>
-                          <a:cs typeface="Times New Roman" pitchFamily="18" charset="0"/>
-                        </a:rPr>
-                        <a:t>arrayRange</a:t>
-                      </a:r>
-                      <a:endParaRPr kumimoji="0" lang="en-US" altLang="ja-JP" sz="1000" b="0" i="0" u="none" strike="noStrike" cap="none" normalizeH="0" baseline="0" dirty="0" smtClean="0">
-                        <a:ln>
-                          <a:noFill/>
-                        </a:ln>
-                        <a:solidFill>
-                          <a:schemeClr val="tx1"/>
-                        </a:solidFill>
-                        <a:effectLst/>
-                        <a:latin typeface="Times New Roman" pitchFamily="18" charset="0"/>
-                        <a:ea typeface="ＭＳ Ｐ明朝" charset="-128"/>
-                        <a:cs typeface="Times New Roman" pitchFamily="18" charset="0"/>
-                      </a:endParaRPr>
-                    </a:p>
-                  </a:txBody>
-                  <a:tcPr marL="90000" marR="90000" marT="46800" marB="46800" horzOverflow="overflow"/>
-                </a:tc>
-                <a:tc>
-                  <a:txBody>
-                    <a:bodyPr/>
-                    <a:lstStyle/>
-                    <a:p>
-                      <a:pPr marL="342900" marR="0" lvl="0" indent="-342900" algn="l" defTabSz="914400" rtl="0" eaLnBrk="0" fontAlgn="base" latinLnBrk="0" hangingPunct="0">
-                        <a:lnSpc>
-                          <a:spcPts val="900"/>
-                        </a:lnSpc>
-                        <a:spcBef>
-                          <a:spcPct val="0"/>
-                        </a:spcBef>
-                        <a:spcAft>
-                          <a:spcPct val="0"/>
-                        </a:spcAft>
-                        <a:buClrTx/>
-                        <a:buSzTx/>
-                        <a:buFontTx/>
-                        <a:buNone/>
-                        <a:tabLst/>
-                      </a:pPr>
-                      <a:r>
-                        <a:rPr kumimoji="0" lang="ja-JP" altLang="en-US" sz="1000" b="0" i="0" u="none" strike="noStrike" cap="none" normalizeH="0" baseline="0" dirty="0" smtClean="0">
-                          <a:ln>
-                            <a:noFill/>
-                          </a:ln>
-                          <a:solidFill>
-                            <a:schemeClr val="tx1"/>
-                          </a:solidFill>
-                          <a:effectLst/>
-                          <a:latin typeface="Times New Roman" pitchFamily="18" charset="0"/>
-                          <a:ea typeface="ＭＳ Ｐ明朝" charset="-128"/>
-                          <a:cs typeface="Times New Roman" pitchFamily="18" charset="0"/>
-                        </a:rPr>
-                        <a:t>配列要素数チェック</a:t>
-                      </a:r>
-                    </a:p>
-                  </a:txBody>
-                  <a:tcPr marL="90000" marR="90000" marT="46800" marB="46800" horzOverflow="overflow"/>
-                </a:tc>
-              </a:tr>
-              <a:tr h="0">
-                <a:tc>
-                  <a:txBody>
-                    <a:bodyPr/>
-                    <a:lstStyle/>
-                    <a:p>
-                      <a:pPr marL="342900" marR="0" lvl="0" indent="-342900" algn="l" defTabSz="914400" rtl="0" eaLnBrk="0" fontAlgn="base" latinLnBrk="0" hangingPunct="0">
-                        <a:lnSpc>
-                          <a:spcPts val="900"/>
-                        </a:lnSpc>
-                        <a:spcBef>
-                          <a:spcPct val="0"/>
-                        </a:spcBef>
-                        <a:spcAft>
-                          <a:spcPct val="0"/>
-                        </a:spcAft>
-                        <a:buClrTx/>
-                        <a:buSzTx/>
-                        <a:buFontTx/>
-                        <a:buNone/>
-                        <a:tabLst/>
-                      </a:pPr>
-                      <a:r>
-                        <a:rPr kumimoji="0" lang="en-US" altLang="ja-JP" sz="1000" b="0" i="0" u="none" strike="noStrike" cap="none" normalizeH="0" baseline="0" smtClean="0">
-                          <a:ln>
-                            <a:noFill/>
-                          </a:ln>
-                          <a:solidFill>
-                            <a:schemeClr val="tx1"/>
-                          </a:solidFill>
-                          <a:effectLst/>
-                          <a:latin typeface="Times New Roman" pitchFamily="18" charset="0"/>
-                          <a:ea typeface="ＭＳ Ｐ明朝" charset="-128"/>
-                          <a:cs typeface="Times New Roman" pitchFamily="18" charset="0"/>
-                        </a:rPr>
-                        <a:t>url</a:t>
-                      </a:r>
-                    </a:p>
-                  </a:txBody>
-                  <a:tcPr marL="90000" marR="90000" marT="46800" marB="46800" horzOverflow="overflow"/>
-                </a:tc>
-                <a:tc>
-                  <a:txBody>
-                    <a:bodyPr/>
-                    <a:lstStyle/>
-                    <a:p>
-                      <a:pPr marL="342900" marR="0" lvl="0" indent="-342900" algn="l" defTabSz="914400" rtl="0" eaLnBrk="0" fontAlgn="base" latinLnBrk="0" hangingPunct="0">
-                        <a:lnSpc>
-                          <a:spcPts val="900"/>
-                        </a:lnSpc>
-                        <a:spcBef>
-                          <a:spcPct val="0"/>
-                        </a:spcBef>
-                        <a:spcAft>
-                          <a:spcPct val="0"/>
-                        </a:spcAft>
-                        <a:buClrTx/>
-                        <a:buSzTx/>
-                        <a:buFontTx/>
-                        <a:buNone/>
-                        <a:tabLst/>
-                      </a:pPr>
-                      <a:r>
-                        <a:rPr kumimoji="0" lang="en-US" altLang="ja-JP" sz="1000" b="0" i="0" u="none" strike="noStrike" cap="none" normalizeH="0" baseline="0" dirty="0" smtClean="0">
-                          <a:ln>
-                            <a:noFill/>
-                          </a:ln>
-                          <a:solidFill>
-                            <a:schemeClr val="tx1"/>
-                          </a:solidFill>
-                          <a:effectLst/>
-                          <a:latin typeface="Times New Roman" pitchFamily="18" charset="0"/>
-                          <a:ea typeface="ＭＳ Ｐ明朝" charset="-128"/>
-                          <a:cs typeface="Times New Roman" pitchFamily="18" charset="0"/>
-                        </a:rPr>
-                        <a:t>URL</a:t>
-                      </a:r>
-                      <a:r>
-                        <a:rPr kumimoji="0" lang="ja-JP" altLang="en-US" sz="1000" b="0" i="0" u="none" strike="noStrike" cap="none" normalizeH="0" baseline="0" dirty="0" smtClean="0">
-                          <a:ln>
-                            <a:noFill/>
-                          </a:ln>
-                          <a:solidFill>
-                            <a:schemeClr val="tx1"/>
-                          </a:solidFill>
-                          <a:effectLst/>
-                          <a:latin typeface="Times New Roman" pitchFamily="18" charset="0"/>
-                          <a:ea typeface="ＭＳ Ｐ明朝" charset="-128"/>
-                          <a:cs typeface="Times New Roman" pitchFamily="18" charset="0"/>
-                        </a:rPr>
-                        <a:t>形式チェック</a:t>
-                      </a:r>
-                    </a:p>
-                  </a:txBody>
-                  <a:tcPr marL="90000" marR="90000" marT="46800" marB="46800" horzOverflow="overflow"/>
                 </a:tc>
               </a:tr>
             </a:tbl>
@@ -16315,304 +15146,163 @@
                 <a:latin typeface="Tahoma" pitchFamily="34" charset="0"/>
                 <a:ea typeface="ＭＳ Ｐゴシック" charset="-128"/>
               </a:rPr>
-              <a:t>&lt;</a:t>
-            </a:r>
-            <a:r>
-              <a:rPr kumimoji="1" lang="en-US" altLang="ja-JP" sz="800" b="0" dirty="0">
-                <a:latin typeface="Tahoma" pitchFamily="34" charset="0"/>
-                <a:ea typeface="ＭＳ Ｐゴシック" charset="-128"/>
-              </a:rPr>
-              <a:t>form-validation&gt;</a:t>
+              <a:t>public class </a:t>
+            </a:r>
+            <a:r>
+              <a:rPr kumimoji="1" lang="en-US" altLang="ja-JP" sz="800" b="0" dirty="0" err="1" smtClean="0">
+                <a:latin typeface="Tahoma" pitchFamily="34" charset="0"/>
+                <a:ea typeface="ＭＳ Ｐゴシック" charset="-128"/>
+              </a:rPr>
+              <a:t>UserBean</a:t>
+            </a:r>
+            <a:r>
+              <a:rPr kumimoji="1" lang="en-US" altLang="ja-JP" sz="800" b="0" dirty="0" smtClean="0">
+                <a:latin typeface="Tahoma" pitchFamily="34" charset="0"/>
+                <a:ea typeface="ＭＳ Ｐゴシック" charset="-128"/>
+              </a:rPr>
+              <a:t> {</a:t>
             </a:r>
           </a:p>
           <a:p>
             <a:pPr algn="l"/>
-            <a:r>
-              <a:rPr kumimoji="1" lang="en-US" altLang="ja-JP" sz="800" b="0" dirty="0">
-                <a:latin typeface="Tahoma" pitchFamily="34" charset="0"/>
-                <a:ea typeface="ＭＳ Ｐゴシック" charset="-128"/>
-              </a:rPr>
-              <a:t>    &lt;</a:t>
-            </a:r>
-            <a:r>
-              <a:rPr kumimoji="1" lang="en-US" altLang="ja-JP" sz="800" b="0" dirty="0" err="1">
-                <a:latin typeface="Tahoma" pitchFamily="34" charset="0"/>
-                <a:ea typeface="ＭＳ Ｐゴシック" charset="-128"/>
-              </a:rPr>
-              <a:t>formset</a:t>
-            </a:r>
-            <a:r>
-              <a:rPr kumimoji="1" lang="en-US" altLang="ja-JP" sz="800" b="0" dirty="0" smtClean="0">
-                <a:latin typeface="Tahoma" pitchFamily="34" charset="0"/>
-                <a:ea typeface="ＭＳ Ｐゴシック" charset="-128"/>
-              </a:rPr>
-              <a:t>&gt;</a:t>
-            </a:r>
+            <a:endParaRPr kumimoji="1" lang="en-US" altLang="ja-JP" sz="800" dirty="0" smtClean="0">
+              <a:latin typeface="Tahoma" pitchFamily="34" charset="0"/>
+              <a:ea typeface="ＭＳ Ｐゴシック" charset="-128"/>
+            </a:endParaRPr>
+          </a:p>
+          <a:p>
+            <a:r>
+              <a:rPr kumimoji="1" lang="ja-JP" altLang="en-US" sz="800" dirty="0">
+                <a:latin typeface="Tahoma" pitchFamily="34" charset="0"/>
+                <a:ea typeface="ＭＳ Ｐゴシック" charset="-128"/>
+              </a:rPr>
+              <a:t> </a:t>
+            </a:r>
+            <a:r>
+              <a:rPr kumimoji="1" lang="ja-JP" altLang="en-US" sz="800" dirty="0" smtClean="0">
+                <a:latin typeface="Tahoma" pitchFamily="34" charset="0"/>
+                <a:ea typeface="ＭＳ Ｐゴシック" charset="-128"/>
+              </a:rPr>
+              <a:t>   </a:t>
+            </a:r>
+            <a:r>
+              <a:rPr kumimoji="1" lang="en-US" altLang="ja-JP" sz="800" dirty="0" smtClean="0">
+                <a:latin typeface="Tahoma" pitchFamily="34" charset="0"/>
+                <a:ea typeface="ＭＳ Ｐゴシック" charset="-128"/>
+              </a:rPr>
+              <a:t>// </a:t>
+            </a:r>
+            <a:r>
+              <a:rPr kumimoji="1" lang="en-US" altLang="ja-JP" sz="800" dirty="0">
+                <a:latin typeface="Tahoma" pitchFamily="34" charset="0"/>
+                <a:ea typeface="ＭＳ Ｐゴシック" charset="-128"/>
+              </a:rPr>
+              <a:t>name</a:t>
+            </a:r>
+            <a:r>
+              <a:rPr kumimoji="1" lang="ja-JP" altLang="en-US" sz="800" dirty="0" smtClean="0">
+                <a:latin typeface="Tahoma" pitchFamily="34" charset="0"/>
+                <a:ea typeface="ＭＳ Ｐゴシック" charset="-128"/>
+              </a:rPr>
+              <a:t>プロパティが、</a:t>
+            </a:r>
+            <a:r>
+              <a:rPr kumimoji="1" lang="en-US" altLang="ja-JP" sz="800" dirty="0">
+                <a:latin typeface="Tahoma" pitchFamily="34" charset="0"/>
+                <a:ea typeface="ＭＳ Ｐゴシック" charset="-128"/>
+              </a:rPr>
+              <a:t>null</a:t>
+            </a:r>
+            <a:r>
+              <a:rPr kumimoji="1" lang="ja-JP" altLang="en-US" sz="800" dirty="0">
+                <a:latin typeface="Tahoma" pitchFamily="34" charset="0"/>
+                <a:ea typeface="ＭＳ Ｐゴシック" charset="-128"/>
+              </a:rPr>
+              <a:t>を許容せず、</a:t>
+            </a:r>
+            <a:r>
+              <a:rPr kumimoji="1" lang="en-US" altLang="ja-JP" sz="800" dirty="0">
+                <a:latin typeface="Tahoma" pitchFamily="34" charset="0"/>
+                <a:ea typeface="ＭＳ Ｐゴシック" charset="-128"/>
+              </a:rPr>
+              <a:t>1</a:t>
+            </a:r>
+            <a:r>
+              <a:rPr kumimoji="1" lang="ja-JP" altLang="en-US" sz="800" dirty="0">
+                <a:latin typeface="Tahoma" pitchFamily="34" charset="0"/>
+                <a:ea typeface="ＭＳ Ｐゴシック" charset="-128"/>
+              </a:rPr>
+              <a:t>文字以上</a:t>
+            </a:r>
+            <a:r>
+              <a:rPr kumimoji="1" lang="en-US" altLang="ja-JP" sz="800" dirty="0">
+                <a:latin typeface="Tahoma" pitchFamily="34" charset="0"/>
+                <a:ea typeface="ＭＳ Ｐゴシック" charset="-128"/>
+              </a:rPr>
+              <a:t>20</a:t>
+            </a:r>
+            <a:r>
+              <a:rPr kumimoji="1" lang="ja-JP" altLang="en-US" sz="800" dirty="0">
+                <a:latin typeface="Tahoma" pitchFamily="34" charset="0"/>
+                <a:ea typeface="ＭＳ Ｐゴシック" charset="-128"/>
+              </a:rPr>
+              <a:t>文字</a:t>
+            </a:r>
+            <a:r>
+              <a:rPr kumimoji="1" lang="ja-JP" altLang="en-US" sz="800" dirty="0" smtClean="0">
+                <a:latin typeface="Tahoma" pitchFamily="34" charset="0"/>
+                <a:ea typeface="ＭＳ Ｐゴシック" charset="-128"/>
+              </a:rPr>
+              <a:t>以下の場合の設定例</a:t>
+            </a:r>
+            <a:endParaRPr kumimoji="1" lang="en-US" altLang="ja-JP" sz="800" dirty="0" smtClean="0">
+              <a:latin typeface="Tahoma" pitchFamily="34" charset="0"/>
+              <a:ea typeface="ＭＳ Ｐゴシック" charset="-128"/>
+            </a:endParaRPr>
           </a:p>
           <a:p>
             <a:pPr algn="l"/>
             <a:r>
+              <a:rPr kumimoji="1" lang="en-US" altLang="ja-JP" sz="800" dirty="0">
+                <a:latin typeface="Tahoma" pitchFamily="34" charset="0"/>
+                <a:ea typeface="ＭＳ Ｐゴシック" charset="-128"/>
+              </a:rPr>
+              <a:t> </a:t>
+            </a:r>
+            <a:r>
               <a:rPr kumimoji="1" lang="en-US" altLang="ja-JP" sz="800" dirty="0" smtClean="0">
                 <a:latin typeface="Tahoma" pitchFamily="34" charset="0"/>
                 <a:ea typeface="ＭＳ Ｐゴシック" charset="-128"/>
               </a:rPr>
-              <a:t>        &lt;form name="jp.terasoluna.batch.sample.b000010.dto.CsvRecord"&gt;</a:t>
-            </a:r>
+              <a:t>   @</a:t>
+            </a:r>
+            <a:r>
+              <a:rPr kumimoji="1" lang="en-US" altLang="ja-JP" sz="800" dirty="0" err="1" smtClean="0">
+                <a:latin typeface="Tahoma" pitchFamily="34" charset="0"/>
+                <a:ea typeface="ＭＳ Ｐゴシック" charset="-128"/>
+              </a:rPr>
+              <a:t>NotNull</a:t>
+            </a:r>
+            <a:endParaRPr kumimoji="1" lang="en-US" altLang="ja-JP" sz="800" dirty="0" smtClean="0">
+              <a:latin typeface="Tahoma" pitchFamily="34" charset="0"/>
+              <a:ea typeface="ＭＳ Ｐゴシック" charset="-128"/>
+            </a:endParaRPr>
           </a:p>
           <a:p>
             <a:pPr algn="l"/>
             <a:r>
+              <a:rPr kumimoji="1" lang="en-US" altLang="ja-JP" sz="800" dirty="0">
+                <a:latin typeface="Tahoma" pitchFamily="34" charset="0"/>
+                <a:ea typeface="ＭＳ Ｐゴシック" charset="-128"/>
+              </a:rPr>
+              <a:t> </a:t>
+            </a:r>
+            <a:r>
               <a:rPr kumimoji="1" lang="en-US" altLang="ja-JP" sz="800" dirty="0" smtClean="0">
                 <a:latin typeface="Tahoma" pitchFamily="34" charset="0"/>
                 <a:ea typeface="ＭＳ Ｐゴシック" charset="-128"/>
               </a:rPr>
-              <a:t>            </a:t>
-            </a:r>
-            <a:r>
-              <a:rPr kumimoji="1" lang="en-US" altLang="ja-JP" sz="800" dirty="0">
-                <a:latin typeface="Tahoma" pitchFamily="34" charset="0"/>
-                <a:ea typeface="ＭＳ Ｐゴシック" charset="-128"/>
-              </a:rPr>
-              <a:t>&lt;field property="id" depends="required"&gt;</a:t>
-            </a:r>
-          </a:p>
-          <a:p>
-            <a:pPr algn="l"/>
-            <a:r>
-              <a:rPr kumimoji="1" lang="en-US" altLang="ja-JP" sz="800" dirty="0">
-                <a:latin typeface="Tahoma" pitchFamily="34" charset="0"/>
-                <a:ea typeface="ＭＳ Ｐゴシック" charset="-128"/>
-              </a:rPr>
-              <a:t>                &lt;</a:t>
-            </a:r>
-            <a:r>
-              <a:rPr kumimoji="1" lang="en-US" altLang="ja-JP" sz="800" dirty="0" err="1">
-                <a:latin typeface="Tahoma" pitchFamily="34" charset="0"/>
-                <a:ea typeface="ＭＳ Ｐゴシック" charset="-128"/>
-              </a:rPr>
-              <a:t>arg</a:t>
-            </a:r>
-            <a:r>
-              <a:rPr kumimoji="1" lang="en-US" altLang="ja-JP" sz="800" dirty="0">
-                <a:latin typeface="Tahoma" pitchFamily="34" charset="0"/>
-                <a:ea typeface="ＭＳ Ｐゴシック" charset="-128"/>
-              </a:rPr>
-              <a:t> key="id</a:t>
-            </a:r>
-            <a:r>
-              <a:rPr kumimoji="1" lang="ja-JP" altLang="en-US" sz="800" dirty="0">
-                <a:latin typeface="Tahoma" pitchFamily="34" charset="0"/>
-                <a:ea typeface="ＭＳ Ｐゴシック" charset="-128"/>
-              </a:rPr>
-              <a:t>要素</a:t>
-            </a:r>
-            <a:r>
-              <a:rPr kumimoji="1" lang="en-US" altLang="ja-JP" sz="800" dirty="0">
-                <a:latin typeface="Tahoma" pitchFamily="34" charset="0"/>
-                <a:ea typeface="ＭＳ Ｐゴシック" charset="-128"/>
-              </a:rPr>
-              <a:t>" position="0"/&gt;</a:t>
-            </a:r>
-          </a:p>
-          <a:p>
-            <a:pPr algn="l"/>
-            <a:r>
-              <a:rPr kumimoji="1" lang="en-US" altLang="ja-JP" sz="800" dirty="0">
-                <a:latin typeface="Tahoma" pitchFamily="34" charset="0"/>
-                <a:ea typeface="ＭＳ Ｐゴシック" charset="-128"/>
-              </a:rPr>
-              <a:t>            &lt;/field&gt;</a:t>
-            </a:r>
-          </a:p>
-          <a:p>
-            <a:pPr algn="l"/>
-            <a:r>
-              <a:rPr kumimoji="1" lang="en-US" altLang="ja-JP" sz="800" dirty="0">
-                <a:latin typeface="Tahoma" pitchFamily="34" charset="0"/>
-                <a:ea typeface="ＭＳ Ｐゴシック" charset="-128"/>
-              </a:rPr>
-              <a:t>            &lt;field property="num" depends="required"&gt;</a:t>
-            </a:r>
-          </a:p>
-          <a:p>
-            <a:pPr algn="l"/>
-            <a:r>
-              <a:rPr kumimoji="1" lang="en-US" altLang="ja-JP" sz="800" dirty="0">
-                <a:latin typeface="Tahoma" pitchFamily="34" charset="0"/>
-                <a:ea typeface="ＭＳ Ｐゴシック" charset="-128"/>
-              </a:rPr>
-              <a:t>                &lt;</a:t>
-            </a:r>
-            <a:r>
-              <a:rPr kumimoji="1" lang="en-US" altLang="ja-JP" sz="800" dirty="0" err="1">
-                <a:latin typeface="Tahoma" pitchFamily="34" charset="0"/>
-                <a:ea typeface="ＭＳ Ｐゴシック" charset="-128"/>
-              </a:rPr>
-              <a:t>arg</a:t>
-            </a:r>
-            <a:r>
-              <a:rPr kumimoji="1" lang="en-US" altLang="ja-JP" sz="800" dirty="0">
-                <a:latin typeface="Tahoma" pitchFamily="34" charset="0"/>
-                <a:ea typeface="ＭＳ Ｐゴシック" charset="-128"/>
-              </a:rPr>
-              <a:t> key="num</a:t>
-            </a:r>
-            <a:r>
-              <a:rPr kumimoji="1" lang="ja-JP" altLang="en-US" sz="800" dirty="0">
-                <a:latin typeface="Tahoma" pitchFamily="34" charset="0"/>
-                <a:ea typeface="ＭＳ Ｐゴシック" charset="-128"/>
-              </a:rPr>
-              <a:t>要素</a:t>
-            </a:r>
-            <a:r>
-              <a:rPr kumimoji="1" lang="en-US" altLang="ja-JP" sz="800" dirty="0">
-                <a:latin typeface="Tahoma" pitchFamily="34" charset="0"/>
-                <a:ea typeface="ＭＳ Ｐゴシック" charset="-128"/>
-              </a:rPr>
-              <a:t>" position="0"/&gt;</a:t>
-            </a:r>
-          </a:p>
-          <a:p>
-            <a:pPr algn="l"/>
-            <a:r>
-              <a:rPr kumimoji="1" lang="en-US" altLang="ja-JP" sz="800" dirty="0">
-                <a:latin typeface="Tahoma" pitchFamily="34" charset="0"/>
-                <a:ea typeface="ＭＳ Ｐゴシック" charset="-128"/>
-              </a:rPr>
-              <a:t>            &lt;/field&gt;</a:t>
-            </a:r>
-          </a:p>
-          <a:p>
-            <a:pPr algn="l"/>
-            <a:r>
-              <a:rPr kumimoji="1" lang="en-US" altLang="ja-JP" sz="800" dirty="0">
-                <a:latin typeface="Tahoma" pitchFamily="34" charset="0"/>
-                <a:ea typeface="ＭＳ Ｐゴシック" charset="-128"/>
-              </a:rPr>
-              <a:t>            &lt;field property="name" depends="required"&gt;</a:t>
-            </a:r>
-          </a:p>
-          <a:p>
-            <a:pPr algn="l"/>
-            <a:r>
-              <a:rPr kumimoji="1" lang="en-US" altLang="ja-JP" sz="800" dirty="0">
-                <a:latin typeface="Tahoma" pitchFamily="34" charset="0"/>
-                <a:ea typeface="ＭＳ Ｐゴシック" charset="-128"/>
-              </a:rPr>
-              <a:t>                &lt;</a:t>
-            </a:r>
-            <a:r>
-              <a:rPr kumimoji="1" lang="en-US" altLang="ja-JP" sz="800" dirty="0" err="1">
-                <a:latin typeface="Tahoma" pitchFamily="34" charset="0"/>
-                <a:ea typeface="ＭＳ Ｐゴシック" charset="-128"/>
-              </a:rPr>
-              <a:t>arg</a:t>
-            </a:r>
-            <a:r>
-              <a:rPr kumimoji="1" lang="en-US" altLang="ja-JP" sz="800" dirty="0">
-                <a:latin typeface="Tahoma" pitchFamily="34" charset="0"/>
-                <a:ea typeface="ＭＳ Ｐゴシック" charset="-128"/>
-              </a:rPr>
-              <a:t> key="name</a:t>
-            </a:r>
-            <a:r>
-              <a:rPr kumimoji="1" lang="ja-JP" altLang="en-US" sz="800" dirty="0">
-                <a:latin typeface="Tahoma" pitchFamily="34" charset="0"/>
-                <a:ea typeface="ＭＳ Ｐゴシック" charset="-128"/>
-              </a:rPr>
-              <a:t>要素</a:t>
-            </a:r>
-            <a:r>
-              <a:rPr kumimoji="1" lang="en-US" altLang="ja-JP" sz="800" dirty="0">
-                <a:latin typeface="Tahoma" pitchFamily="34" charset="0"/>
-                <a:ea typeface="ＭＳ Ｐゴシック" charset="-128"/>
-              </a:rPr>
-              <a:t>" position="0"/&gt;</a:t>
-            </a:r>
-          </a:p>
-          <a:p>
-            <a:pPr algn="l"/>
-            <a:r>
-              <a:rPr kumimoji="1" lang="en-US" altLang="ja-JP" sz="800" dirty="0">
-                <a:latin typeface="Tahoma" pitchFamily="34" charset="0"/>
-                <a:ea typeface="ＭＳ Ｐゴシック" charset="-128"/>
-              </a:rPr>
-              <a:t>            &lt;/field&gt;</a:t>
-            </a:r>
-          </a:p>
-          <a:p>
-            <a:pPr algn="l"/>
-            <a:r>
-              <a:rPr kumimoji="1" lang="en-US" altLang="ja-JP" sz="800" dirty="0">
-                <a:latin typeface="Tahoma" pitchFamily="34" charset="0"/>
-                <a:ea typeface="ＭＳ Ｐゴシック" charset="-128"/>
-              </a:rPr>
-              <a:t>            &lt;field property="old" depends="required"&gt;</a:t>
-            </a:r>
-          </a:p>
-          <a:p>
-            <a:pPr algn="l"/>
-            <a:r>
-              <a:rPr kumimoji="1" lang="en-US" altLang="ja-JP" sz="800" dirty="0">
-                <a:latin typeface="Tahoma" pitchFamily="34" charset="0"/>
-                <a:ea typeface="ＭＳ Ｐゴシック" charset="-128"/>
-              </a:rPr>
-              <a:t>                &lt;</a:t>
-            </a:r>
-            <a:r>
-              <a:rPr kumimoji="1" lang="en-US" altLang="ja-JP" sz="800" dirty="0" err="1">
-                <a:latin typeface="Tahoma" pitchFamily="34" charset="0"/>
-                <a:ea typeface="ＭＳ Ｐゴシック" charset="-128"/>
-              </a:rPr>
-              <a:t>arg</a:t>
-            </a:r>
-            <a:r>
-              <a:rPr kumimoji="1" lang="en-US" altLang="ja-JP" sz="800" dirty="0">
-                <a:latin typeface="Tahoma" pitchFamily="34" charset="0"/>
-                <a:ea typeface="ＭＳ Ｐゴシック" charset="-128"/>
-              </a:rPr>
-              <a:t> key="old</a:t>
-            </a:r>
-            <a:r>
-              <a:rPr kumimoji="1" lang="ja-JP" altLang="en-US" sz="800" dirty="0">
-                <a:latin typeface="Tahoma" pitchFamily="34" charset="0"/>
-                <a:ea typeface="ＭＳ Ｐゴシック" charset="-128"/>
-              </a:rPr>
-              <a:t>要素</a:t>
-            </a:r>
-            <a:r>
-              <a:rPr kumimoji="1" lang="en-US" altLang="ja-JP" sz="800" dirty="0">
-                <a:latin typeface="Tahoma" pitchFamily="34" charset="0"/>
-                <a:ea typeface="ＭＳ Ｐゴシック" charset="-128"/>
-              </a:rPr>
-              <a:t>" position="0"/&gt;</a:t>
-            </a:r>
-          </a:p>
-          <a:p>
-            <a:pPr algn="l"/>
-            <a:r>
-              <a:rPr kumimoji="1" lang="en-US" altLang="ja-JP" sz="800" dirty="0">
-                <a:latin typeface="Tahoma" pitchFamily="34" charset="0"/>
-                <a:ea typeface="ＭＳ Ｐゴシック" charset="-128"/>
-              </a:rPr>
-              <a:t>            &lt;/field&gt;</a:t>
-            </a:r>
-          </a:p>
-          <a:p>
-            <a:pPr algn="l"/>
-            <a:r>
-              <a:rPr kumimoji="1" lang="en-US" altLang="ja-JP" sz="800" dirty="0">
-                <a:latin typeface="Tahoma" pitchFamily="34" charset="0"/>
-                <a:ea typeface="ＭＳ Ｐゴシック" charset="-128"/>
-              </a:rPr>
-              <a:t>       &lt;/form</a:t>
-            </a:r>
-            <a:r>
-              <a:rPr kumimoji="1" lang="en-US" altLang="ja-JP" sz="800" dirty="0" smtClean="0">
-                <a:latin typeface="Tahoma" pitchFamily="34" charset="0"/>
-                <a:ea typeface="ＭＳ Ｐゴシック" charset="-128"/>
-              </a:rPr>
-              <a:t>&gt;</a:t>
+              <a:t>   @Size(min=1, max=20)</a:t>
             </a:r>
             <a:endParaRPr kumimoji="1" lang="en-US" altLang="ja-JP" sz="800" dirty="0">
               <a:latin typeface="Tahoma" pitchFamily="34" charset="0"/>
@@ -16622,27 +15312,16 @@
           <a:p>
             <a:pPr algn="l"/>
             <a:r>
-              <a:rPr kumimoji="1" lang="en-US" altLang="ja-JP" sz="800" b="0" dirty="0">
-                <a:latin typeface="Tahoma" pitchFamily="34" charset="0"/>
-                <a:ea typeface="ＭＳ Ｐゴシック" charset="-128"/>
-              </a:rPr>
-              <a:t>    &lt;/</a:t>
-            </a:r>
-            <a:r>
-              <a:rPr kumimoji="1" lang="en-US" altLang="ja-JP" sz="800" b="0" dirty="0" err="1">
-                <a:latin typeface="Tahoma" pitchFamily="34" charset="0"/>
-                <a:ea typeface="ＭＳ Ｐゴシック" charset="-128"/>
-              </a:rPr>
-              <a:t>formset</a:t>
-            </a:r>
-            <a:r>
               <a:rPr kumimoji="1" lang="en-US" altLang="ja-JP" sz="800" b="0" dirty="0" smtClean="0">
                 <a:latin typeface="Tahoma" pitchFamily="34" charset="0"/>
                 <a:ea typeface="ＭＳ Ｐゴシック" charset="-128"/>
               </a:rPr>
-              <a:t>&gt;</a:t>
-            </a:r>
-            <a:endParaRPr kumimoji="1" lang="en-US" altLang="ja-JP" sz="800" b="0" dirty="0">
+              <a:t>    private String name;        </a:t>
+            </a:r>
+          </a:p>
+          <a:p>
+            <a:pPr algn="l"/>
+            <a:endParaRPr kumimoji="1" lang="en-US" altLang="ja-JP" sz="800" dirty="0" smtClean="0">
               <a:latin typeface="Tahoma" pitchFamily="34" charset="0"/>
               <a:ea typeface="ＭＳ Ｐゴシック" charset="-128"/>
             </a:endParaRPr>
@@ -16650,11 +15329,150 @@
           <a:p>
             <a:pPr algn="l"/>
             <a:r>
-              <a:rPr kumimoji="1" lang="en-US" altLang="ja-JP" sz="800" b="0" dirty="0">
-                <a:latin typeface="Tahoma" pitchFamily="34" charset="0"/>
-                <a:ea typeface="ＭＳ Ｐゴシック" charset="-128"/>
-              </a:rPr>
-              <a:t>&lt;/form-validation&gt;</a:t>
+              <a:rPr kumimoji="1" lang="en-US" altLang="ja-JP" sz="800" dirty="0" smtClean="0">
+                <a:latin typeface="Tahoma" pitchFamily="34" charset="0"/>
+                <a:ea typeface="ＭＳ Ｐゴシック" charset="-128"/>
+              </a:rPr>
+              <a:t>    // age</a:t>
+            </a:r>
+            <a:r>
+              <a:rPr kumimoji="1" lang="ja-JP" altLang="en-US" sz="800" dirty="0" smtClean="0">
+                <a:latin typeface="Tahoma" pitchFamily="34" charset="0"/>
+                <a:ea typeface="ＭＳ Ｐゴシック" charset="-128"/>
+              </a:rPr>
+              <a:t>プロパティが</a:t>
+            </a:r>
+            <a:r>
+              <a:rPr kumimoji="1" lang="en-US" altLang="ja-JP" sz="800" dirty="0" smtClean="0">
+                <a:latin typeface="Tahoma" pitchFamily="34" charset="0"/>
+                <a:ea typeface="ＭＳ Ｐゴシック" charset="-128"/>
+              </a:rPr>
+              <a:t>1</a:t>
+            </a:r>
+            <a:r>
+              <a:rPr kumimoji="1" lang="ja-JP" altLang="en-US" sz="800" dirty="0" smtClean="0">
+                <a:latin typeface="Tahoma" pitchFamily="34" charset="0"/>
+                <a:ea typeface="ＭＳ Ｐゴシック" charset="-128"/>
+              </a:rPr>
+              <a:t>以上、</a:t>
+            </a:r>
+            <a:r>
+              <a:rPr kumimoji="1" lang="en-US" altLang="ja-JP" sz="800" dirty="0" smtClean="0">
+                <a:latin typeface="Tahoma" pitchFamily="34" charset="0"/>
+                <a:ea typeface="ＭＳ Ｐゴシック" charset="-128"/>
+              </a:rPr>
+              <a:t>200</a:t>
+            </a:r>
+            <a:r>
+              <a:rPr kumimoji="1" lang="ja-JP" altLang="en-US" sz="800" dirty="0" smtClean="0">
+                <a:latin typeface="Tahoma" pitchFamily="34" charset="0"/>
+                <a:ea typeface="ＭＳ Ｐゴシック" charset="-128"/>
+              </a:rPr>
+              <a:t>以下の場合の設定例</a:t>
+            </a:r>
+            <a:endParaRPr kumimoji="1" lang="en-US" altLang="ja-JP" sz="800" dirty="0" smtClean="0">
+              <a:latin typeface="Tahoma" pitchFamily="34" charset="0"/>
+              <a:ea typeface="ＭＳ Ｐゴシック" charset="-128"/>
+            </a:endParaRPr>
+          </a:p>
+          <a:p>
+            <a:pPr algn="l"/>
+            <a:r>
+              <a:rPr kumimoji="1" lang="en-US" altLang="ja-JP" sz="800" dirty="0">
+                <a:latin typeface="Tahoma" pitchFamily="34" charset="0"/>
+                <a:ea typeface="ＭＳ Ｐゴシック" charset="-128"/>
+              </a:rPr>
+              <a:t> </a:t>
+            </a:r>
+            <a:r>
+              <a:rPr kumimoji="1" lang="en-US" altLang="ja-JP" sz="800" dirty="0" smtClean="0">
+                <a:latin typeface="Tahoma" pitchFamily="34" charset="0"/>
+                <a:ea typeface="ＭＳ Ｐゴシック" charset="-128"/>
+              </a:rPr>
+              <a:t>   @Min(1)</a:t>
+            </a:r>
+          </a:p>
+          <a:p>
+            <a:pPr algn="l"/>
+            <a:r>
+              <a:rPr kumimoji="1" lang="en-US" altLang="ja-JP" sz="800" dirty="0">
+                <a:latin typeface="Tahoma" pitchFamily="34" charset="0"/>
+                <a:ea typeface="ＭＳ Ｐゴシック" charset="-128"/>
+              </a:rPr>
+              <a:t> </a:t>
+            </a:r>
+            <a:r>
+              <a:rPr kumimoji="1" lang="en-US" altLang="ja-JP" sz="800" dirty="0" smtClean="0">
+                <a:latin typeface="Tahoma" pitchFamily="34" charset="0"/>
+                <a:ea typeface="ＭＳ Ｐゴシック" charset="-128"/>
+              </a:rPr>
+              <a:t>   @Max(200)</a:t>
+            </a:r>
+            <a:endParaRPr kumimoji="1" lang="en-US" altLang="ja-JP" sz="800" dirty="0">
+              <a:latin typeface="Tahoma" pitchFamily="34" charset="0"/>
+              <a:ea typeface="ＭＳ Ｐゴシック" charset="-128"/>
+            </a:endParaRPr>
+          </a:p>
+          <a:p>
+            <a:pPr algn="l"/>
+            <a:r>
+              <a:rPr kumimoji="1" lang="en-US" altLang="ja-JP" sz="800" b="0" dirty="0" smtClean="0">
+                <a:latin typeface="Tahoma" pitchFamily="34" charset="0"/>
+                <a:ea typeface="ＭＳ Ｐゴシック" charset="-128"/>
+              </a:rPr>
+              <a:t>    private </a:t>
+            </a:r>
+            <a:r>
+              <a:rPr kumimoji="1" lang="en-US" altLang="ja-JP" sz="800" b="0" dirty="0" err="1" smtClean="0">
+                <a:latin typeface="Tahoma" pitchFamily="34" charset="0"/>
+                <a:ea typeface="ＭＳ Ｐゴシック" charset="-128"/>
+              </a:rPr>
+              <a:t>int</a:t>
+            </a:r>
+            <a:r>
+              <a:rPr kumimoji="1" lang="en-US" altLang="ja-JP" sz="800" b="0" dirty="0" smtClean="0">
+                <a:latin typeface="Tahoma" pitchFamily="34" charset="0"/>
+                <a:ea typeface="ＭＳ Ｐゴシック" charset="-128"/>
+              </a:rPr>
+              <a:t> age;</a:t>
+            </a:r>
+          </a:p>
+          <a:p>
+            <a:pPr algn="l"/>
+            <a:endParaRPr kumimoji="1" lang="en-US" altLang="ja-JP" sz="800" dirty="0">
+              <a:latin typeface="Tahoma" pitchFamily="34" charset="0"/>
+              <a:ea typeface="ＭＳ Ｐゴシック" charset="-128"/>
+            </a:endParaRPr>
+          </a:p>
+          <a:p>
+            <a:pPr algn="l"/>
+            <a:r>
+              <a:rPr kumimoji="1" lang="en-US" altLang="ja-JP" sz="800" b="0" dirty="0" smtClean="0">
+                <a:latin typeface="Tahoma" pitchFamily="34" charset="0"/>
+                <a:ea typeface="ＭＳ Ｐゴシック" charset="-128"/>
+              </a:rPr>
+              <a:t>    // setter, getter</a:t>
+            </a:r>
+            <a:r>
+              <a:rPr kumimoji="1" lang="ja-JP" altLang="en-US" sz="800" b="0" dirty="0" smtClean="0">
+                <a:latin typeface="Tahoma" pitchFamily="34" charset="0"/>
+                <a:ea typeface="ＭＳ Ｐゴシック" charset="-128"/>
+              </a:rPr>
+              <a:t>は省略するが必要</a:t>
+            </a:r>
+            <a:endParaRPr kumimoji="1" lang="en-US" altLang="ja-JP" sz="800" b="0" dirty="0" smtClean="0">
+              <a:latin typeface="Tahoma" pitchFamily="34" charset="0"/>
+              <a:ea typeface="ＭＳ Ｐゴシック" charset="-128"/>
+            </a:endParaRPr>
+          </a:p>
+          <a:p>
+            <a:pPr algn="l"/>
+            <a:r>
+              <a:rPr kumimoji="1" lang="en-US" altLang="ja-JP" sz="800" dirty="0">
+                <a:latin typeface="Tahoma" pitchFamily="34" charset="0"/>
+                <a:ea typeface="ＭＳ Ｐゴシック" charset="-128"/>
+              </a:rPr>
+              <a:t>}</a:t>
             </a:r>
             <a:endParaRPr kumimoji="1" lang="ja-JP" altLang="en-US" sz="800" b="0" dirty="0">
               <a:latin typeface="Tahoma" pitchFamily="34" charset="0"/>
@@ -18129,14 +16947,20 @@
       </p:sp>
       <p:pic>
         <p:nvPicPr>
-          <p:cNvPr id="1028" name="Picture 4" descr="C:\Users\btfujimotoku\Desktop\TERASOLUNA Batch Framework for Java Version 3.x 説明資料.png"/>
+          <p:cNvPr id="4098" name="Picture 2"/>
           <p:cNvPicPr>
             <a:picLocks noChangeAspect="1" noChangeArrowheads="1"/>
           </p:cNvPicPr>
           <p:nvPr/>
         </p:nvPicPr>
         <p:blipFill>
-          <a:blip r:embed="rId2"/>
+          <a:blip r:embed="rId2">
+            <a:extLst>
+              <a:ext uri="{28A0092B-C50C-407E-A947-70E740481C1C}">
+                <a14:useLocalDpi xmlns:a14="http://schemas.microsoft.com/office/drawing/2010/main" val="0"/>
+              </a:ext>
+            </a:extLst>
+          </a:blip>
           <a:srcRect/>
           <a:stretch>
             <a:fillRect/>
@@ -18144,13 +16968,45 @@
         </p:blipFill>
         <p:spPr bwMode="auto">
           <a:xfrm>
-            <a:off x="0" y="2653577"/>
-            <a:ext cx="9906000" cy="4002328"/>
+            <a:off x="251949" y="2659317"/>
+            <a:ext cx="9380926" cy="4078977"/>
           </a:xfrm>
           <a:prstGeom prst="rect">
             <a:avLst/>
           </a:prstGeom>
           <a:noFill/>
+          <a:ln>
+            <a:noFill/>
+          </a:ln>
+          <a:effectLst/>
+          <a:extLst>
+            <a:ext uri="{909E8E84-426E-40DD-AFC4-6F175D3DCCD1}">
+              <a14:hiddenFill xmlns:a14="http://schemas.microsoft.com/office/drawing/2010/main">
+                <a:solidFill>
+                  <a:schemeClr val="accent1"/>
+                </a:solidFill>
+              </a14:hiddenFill>
+            </a:ext>
+            <a:ext uri="{91240B29-F687-4F45-9708-019B960494DF}">
+              <a14:hiddenLine xmlns:a14="http://schemas.microsoft.com/office/drawing/2010/main" w="9525">
+                <a:solidFill>
+                  <a:schemeClr val="tx1"/>
+                </a:solidFill>
+                <a:miter lim="800000"/>
+                <a:headEnd/>
+                <a:tailEnd/>
+              </a14:hiddenLine>
+            </a:ext>
+            <a:ext uri="{AF507438-7753-43E0-B8FC-AC1667EBCBE1}">
+              <a14:hiddenEffects xmlns:a14="http://schemas.microsoft.com/office/drawing/2010/main">
+                <a:effectLst>
+                  <a:outerShdw dist="35921" dir="2700000" algn="ctr" rotWithShape="0">
+                    <a:schemeClr val="bg2"/>
+                  </a:outerShdw>
+                </a:effectLst>
+              </a14:hiddenEffects>
+            </a:ext>
+          </a:extLst>
         </p:spPr>
       </p:pic>
     </p:spTree>
@@ -18245,11 +17101,17 @@
           <p:cNvGraphicFramePr>
             <a:graphicFrameLocks/>
           </p:cNvGraphicFramePr>
-          <p:nvPr/>
+          <p:nvPr>
+            <p:extLst>
+              <p:ext uri="{D42A27DB-BD31-4B8C-83A1-F6EECF244321}">
+                <p14:modId xmlns:p14="http://schemas.microsoft.com/office/powerpoint/2010/main" val="1179424584"/>
+              </p:ext>
+            </p:extLst>
+          </p:nvPr>
         </p:nvGraphicFramePr>
         <p:xfrm>
           <a:off x="380968" y="1484784"/>
-          <a:ext cx="9110902" cy="4068430"/>
+          <a:ext cx="9110902" cy="3116500"/>
         </p:xfrm>
         <a:graphic>
           <a:graphicData uri="http://schemas.openxmlformats.org/drawingml/2006/table">
@@ -18381,7 +17243,7 @@
                   <a:tcPr/>
                 </a:tc>
               </a:tr>
-              <a:tr h="463850">
+              <a:tr h="294173">
                 <a:tc>
                   <a:txBody>
                     <a:bodyPr/>
@@ -18406,12 +17268,16 @@
                     <a:lstStyle/>
                     <a:p>
                       <a:r>
-                        <a:rPr kumimoji="1" lang="en-US" altLang="ja-JP" sz="1200" dirty="0" err="1" smtClean="0"/>
-                        <a:t>iBATIS</a:t>
+                        <a:rPr kumimoji="1" lang="en-US" altLang="ja-JP" sz="1200" dirty="0" smtClean="0"/>
+                        <a:t>MyBatis3</a:t>
                       </a:r>
                       <a:r>
                         <a:rPr kumimoji="1" lang="ja-JP" altLang="en-US" sz="1200" dirty="0" smtClean="0"/>
-                        <a:t>を利用した、</a:t>
+                        <a:t>を</a:t>
+                      </a:r>
+                      <a:r>
+                        <a:rPr kumimoji="1" lang="ja-JP" altLang="en-US" sz="1200" dirty="0" smtClean="0"/>
+                        <a:t>利用した、</a:t>
                       </a:r>
                       <a:r>
                         <a:rPr kumimoji="1" lang="en-US" altLang="ja-JP" sz="1200" dirty="0" smtClean="0"/>
@@ -18419,39 +17285,11 @@
                       </a:r>
                       <a:r>
                         <a:rPr kumimoji="1" lang="ja-JP" altLang="en-US" sz="1200" dirty="0" smtClean="0"/>
-                        <a:t>マッピング機能（</a:t>
-                      </a:r>
-                      <a:r>
-                        <a:rPr kumimoji="1" lang="en-US" altLang="ja-JP" sz="1200" dirty="0" smtClean="0"/>
-                        <a:t>TERASOLUNA</a:t>
+                        <a:t>マッピング</a:t>
                       </a:r>
                       <a:r>
                         <a:rPr kumimoji="1" lang="ja-JP" altLang="en-US" sz="1200" dirty="0" smtClean="0"/>
-                        <a:t>の、</a:t>
-                      </a:r>
-                      <a:r>
-                        <a:rPr kumimoji="1" lang="en-US" altLang="ja-JP" sz="1200" dirty="0" err="1" smtClean="0"/>
-                        <a:t>QueryDAO</a:t>
-                      </a:r>
-                      <a:r>
-                        <a:rPr kumimoji="1" lang="ja-JP" altLang="en-US" sz="1200" dirty="0" err="1" smtClean="0"/>
-                        <a:t>、</a:t>
-                      </a:r>
-                      <a:r>
-                        <a:rPr kumimoji="1" lang="en-US" altLang="ja-JP" sz="1200" dirty="0" err="1" smtClean="0"/>
-                        <a:t>UpdateDAO</a:t>
-                      </a:r>
-                      <a:r>
-                        <a:rPr kumimoji="1" lang="ja-JP" altLang="en-US" sz="1200" dirty="0" err="1" smtClean="0"/>
-                        <a:t>、</a:t>
-                      </a:r>
-                      <a:r>
-                        <a:rPr kumimoji="1" lang="en-US" altLang="ja-JP" sz="1200" dirty="0" err="1" smtClean="0"/>
-                        <a:t>QueryRowHandleDAO</a:t>
-                      </a:r>
-                      <a:r>
-                        <a:rPr kumimoji="1" lang="ja-JP" altLang="en-US" sz="1200" dirty="0" smtClean="0"/>
-                        <a:t>などをそのまま利用）</a:t>
+                        <a:t>機能</a:t>
                       </a:r>
                       <a:endParaRPr kumimoji="1" lang="en-US" altLang="ja-JP" sz="1200" dirty="0" smtClean="0"/>
                     </a:p>
@@ -18459,7 +17297,7 @@
                   <a:tcPr/>
                 </a:tc>
               </a:tr>
-              <a:tr h="463850">
+              <a:tr h="280657">
                 <a:tc>
                   <a:txBody>
                     <a:bodyPr/>
@@ -18485,31 +17323,11 @@
                       </a:r>
                       <a:r>
                         <a:rPr kumimoji="1" lang="ja-JP" altLang="en-US" sz="1200" dirty="0" smtClean="0"/>
-                        <a:t>や固定長ファイルを、オブジェクトにマッピングする機能（現行バッチ</a:t>
-                      </a:r>
-                      <a:r>
-                        <a:rPr kumimoji="1" lang="en-US" altLang="ja-JP" sz="1200" dirty="0" smtClean="0"/>
-                        <a:t>FW</a:t>
+                        <a:t>や固定長ファイルを、オブジェクトにマッピングする</a:t>
                       </a:r>
                       <a:r>
                         <a:rPr kumimoji="1" lang="ja-JP" altLang="en-US" sz="1200" dirty="0" smtClean="0"/>
-                        <a:t>（</a:t>
-                      </a:r>
-                      <a:r>
-                        <a:rPr kumimoji="1" lang="en-US" altLang="ja-JP" sz="1200" dirty="0" smtClean="0"/>
-                        <a:t>Version2</a:t>
-                      </a:r>
-                      <a:r>
-                        <a:rPr kumimoji="1" lang="ja-JP" altLang="en-US" sz="1200" dirty="0" smtClean="0"/>
-                        <a:t>）の、</a:t>
-                      </a:r>
-                      <a:r>
-                        <a:rPr kumimoji="1" lang="en-US" altLang="ja-JP" sz="1200" dirty="0" err="1" smtClean="0"/>
-                        <a:t>FileDAO</a:t>
-                      </a:r>
-                      <a:r>
-                        <a:rPr kumimoji="1" lang="ja-JP" altLang="en-US" sz="1200" dirty="0" smtClean="0"/>
-                        <a:t>をそのまま利用）</a:t>
+                        <a:t>機能</a:t>
                       </a:r>
                       <a:endParaRPr kumimoji="1" lang="ja-JP" altLang="en-US" sz="1200" dirty="0"/>
                     </a:p>
@@ -18563,7 +17381,11 @@
                       </a:pPr>
                       <a:r>
                         <a:rPr kumimoji="1" lang="ja-JP" altLang="en-US" sz="1200" dirty="0" smtClean="0"/>
-                        <a:t>・大量データ取得時にメモリを大量消費しない（フェッチサイズ分のみ）</a:t>
+                        <a:t>・大量データ取得時にメモリを大量消費しない（フェッチサイズ分のみ</a:t>
+                      </a:r>
+                      <a:r>
+                        <a:rPr kumimoji="1" lang="ja-JP" altLang="en-US" sz="1200" dirty="0" smtClean="0"/>
+                        <a:t>）</a:t>
                       </a:r>
                       <a:endParaRPr kumimoji="1" lang="en-US" altLang="ja-JP" sz="1200" dirty="0" smtClean="0"/>
                     </a:p>
@@ -18590,12 +17412,20 @@
                         <a:t>・</a:t>
                       </a:r>
                       <a:r>
-                        <a:rPr kumimoji="1" lang="en-US" altLang="ja-JP" sz="1200" dirty="0" err="1" smtClean="0"/>
-                        <a:t>QueryRowHandleDAO</a:t>
+                        <a:rPr kumimoji="1" lang="en-US" altLang="ja-JP" sz="1200" dirty="0" smtClean="0"/>
+                        <a:t>MyBatis3</a:t>
                       </a:r>
                       <a:r>
                         <a:rPr kumimoji="1" lang="ja-JP" altLang="en-US" sz="1200" dirty="0" smtClean="0"/>
-                        <a:t>と異なり、構造化プログラミング（</a:t>
+                        <a:t>の</a:t>
+                      </a:r>
+                      <a:r>
+                        <a:rPr kumimoji="1" lang="en-US" altLang="ja-JP" sz="1200" dirty="0" err="1" smtClean="0"/>
+                        <a:t>ResultHandler</a:t>
+                      </a:r>
+                      <a:r>
+                        <a:rPr kumimoji="1" lang="ja-JP" altLang="en-US" sz="1200" dirty="0" smtClean="0"/>
+                        <a:t>を利用する場合と異なり、構造化プログラミング（</a:t>
                       </a:r>
                       <a:r>
                         <a:rPr kumimoji="1" lang="en-US" altLang="ja-JP" sz="1200" dirty="0" smtClean="0"/>
@@ -18611,7 +17441,7 @@
                   <a:tcPr/>
                 </a:tc>
               </a:tr>
-              <a:tr h="436691">
+              <a:tr h="301481">
                 <a:tc>
                   <a:txBody>
                     <a:bodyPr/>
@@ -18633,31 +17463,7 @@
                     <a:p>
                       <a:r>
                         <a:rPr kumimoji="1" lang="ja-JP" altLang="en-US" sz="1200" dirty="0" smtClean="0"/>
-                        <a:t>設定ファイルベースのバリデータ（</a:t>
-                      </a:r>
-                      <a:r>
-                        <a:rPr kumimoji="1" lang="en-US" altLang="ja-JP" sz="1200" dirty="0" smtClean="0"/>
-                        <a:t>TERASOLUNA</a:t>
-                      </a:r>
-                      <a:r>
-                        <a:rPr kumimoji="1" lang="ja-JP" altLang="en-US" sz="1200" baseline="0" dirty="0" smtClean="0"/>
-                        <a:t> </a:t>
-                      </a:r>
-                      <a:r>
-                        <a:rPr kumimoji="1" lang="en-US" altLang="ja-JP" sz="1200" baseline="0" dirty="0" smtClean="0"/>
-                        <a:t>Server Framework for Java(Rich</a:t>
-                      </a:r>
-                      <a:r>
-                        <a:rPr kumimoji="1" lang="ja-JP" altLang="en-US" sz="1200" baseline="0" dirty="0" smtClean="0"/>
-                        <a:t>版</a:t>
-                      </a:r>
-                      <a:r>
-                        <a:rPr kumimoji="1" lang="en-US" altLang="ja-JP" sz="1200" baseline="0" dirty="0" smtClean="0"/>
-                        <a:t>)</a:t>
-                      </a:r>
-                      <a:r>
-                        <a:rPr kumimoji="1" lang="ja-JP" altLang="en-US" sz="1200" baseline="0" dirty="0" smtClean="0"/>
-                        <a:t>で利用しているバリデータ）</a:t>
+                        <a:t>アノテーションを利用した入力チェック機能</a:t>
                       </a:r>
                       <a:endParaRPr kumimoji="1" lang="ja-JP" altLang="en-US" sz="1200" dirty="0"/>
                     </a:p>
@@ -18690,44 +17496,6 @@
                         <a:t>現在読んだデータと、次に読むデータで、キーが切り替わるのを判定するユーティリティ</a:t>
                       </a:r>
                       <a:endParaRPr kumimoji="1" lang="en-US" altLang="ja-JP" sz="1200" dirty="0" smtClean="0"/>
-                    </a:p>
-                  </a:txBody>
-                  <a:tcPr/>
-                </a:tc>
-              </a:tr>
-              <a:tr h="463850">
-                <a:tc>
-                  <a:txBody>
-                    <a:bodyPr/>
-                    <a:lstStyle/>
-                    <a:p>
-                      <a:r>
-                        <a:rPr kumimoji="1" lang="ja-JP" altLang="en-US" sz="1200" dirty="0" smtClean="0"/>
-                        <a:t>バッチ更新最適化</a:t>
-                      </a:r>
-                      <a:endParaRPr kumimoji="1" lang="ja-JP" altLang="en-US" sz="1200" dirty="0"/>
-                    </a:p>
-                  </a:txBody>
-                  <a:tcPr/>
-                </a:tc>
-                <a:tc>
-                  <a:txBody>
-                    <a:bodyPr/>
-                    <a:lstStyle/>
-                    <a:p>
-                      <a:r>
-                        <a:rPr kumimoji="1" lang="ja-JP" altLang="en-US" sz="1200" dirty="0" smtClean="0"/>
-                        <a:t>一括して同種の</a:t>
-                      </a:r>
-                      <a:r>
-                        <a:rPr kumimoji="1" lang="en-US" altLang="ja-JP" sz="1200" dirty="0" smtClean="0"/>
-                        <a:t>SQL</a:t>
-                      </a:r>
-                      <a:r>
-                        <a:rPr kumimoji="1" lang="ja-JP" altLang="en-US" sz="1200" dirty="0" smtClean="0"/>
-                        <a:t>を実行することでスループット向上を実現するしくみ</a:t>
-                      </a:r>
-                      <a:endParaRPr kumimoji="1" lang="ja-JP" altLang="en-US" sz="1200" dirty="0"/>
                     </a:p>
                   </a:txBody>
                   <a:tcPr/>
@@ -20957,7 +19725,7 @@
             <a:graphicData uri="http://schemas.openxmlformats.org/presentationml/2006/ole">
               <mc:AlternateContent xmlns:mc="http://schemas.openxmlformats.org/markup-compatibility/2006">
                 <mc:Choice xmlns:v="urn:schemas-microsoft-com:vml" Requires="v">
-                  <p:oleObj spid="_x0000_s2051" name="Visio" r:id="rId4" imgW="1046607" imgH="1232154" progId="">
+                  <p:oleObj spid="_x0000_s2055" name="Visio" r:id="rId4" imgW="1046607" imgH="1232154" progId="">
                     <p:embed/>
                   </p:oleObj>
                 </mc:Choice>
@@ -24865,7 +23633,7 @@
             <a:graphicData uri="http://schemas.openxmlformats.org/presentationml/2006/ole">
               <mc:AlternateContent xmlns:mc="http://schemas.openxmlformats.org/markup-compatibility/2006">
                 <mc:Choice xmlns:v="urn:schemas-microsoft-com:vml" Requires="v">
-                  <p:oleObj spid="_x0000_s3075" name="Visio" r:id="rId3" imgW="1046765" imgH="1232170" progId="">
+                  <p:oleObj spid="_x0000_s3079" name="Visio" r:id="rId3" imgW="1046765" imgH="1232170" progId="">
                     <p:embed/>
                   </p:oleObj>
                 </mc:Choice>
@@ -26888,31 +25656,31 @@
                 <a:latin typeface="Tahoma" pitchFamily="34" charset="0"/>
                 <a:ea typeface="ＭＳ Ｐゴシック" charset="-128"/>
               </a:rPr>
-              <a:t>    private static Log </a:t>
-            </a:r>
-            <a:r>
-              <a:rPr kumimoji="1" lang="en-US" altLang="ja-JP" sz="1200" dirty="0" err="1">
-                <a:latin typeface="Tahoma" pitchFamily="34" charset="0"/>
-                <a:ea typeface="ＭＳ Ｐゴシック" charset="-128"/>
-              </a:rPr>
-              <a:t>log</a:t>
+              <a:t>    private static </a:t>
+            </a:r>
+            <a:r>
+              <a:rPr kumimoji="1" lang="en-US" altLang="ja-JP" sz="1200" dirty="0" smtClean="0">
+                <a:latin typeface="Tahoma" pitchFamily="34" charset="0"/>
+                <a:ea typeface="ＭＳ Ｐゴシック" charset="-128"/>
+              </a:rPr>
+              <a:t>Logger </a:t>
             </a:r>
             <a:r>
               <a:rPr kumimoji="1" lang="en-US" altLang="ja-JP" sz="1200" dirty="0">
                 <a:latin typeface="Tahoma" pitchFamily="34" charset="0"/>
                 <a:ea typeface="ＭＳ Ｐゴシック" charset="-128"/>
               </a:rPr>
-              <a:t> = </a:t>
-            </a:r>
-            <a:r>
-              <a:rPr kumimoji="1" lang="en-US" altLang="ja-JP" sz="1200" dirty="0" err="1">
-                <a:latin typeface="Tahoma" pitchFamily="34" charset="0"/>
-                <a:ea typeface="ＭＳ Ｐゴシック" charset="-128"/>
-              </a:rPr>
-              <a:t>LogFactory.getLog</a:t>
-            </a:r>
-            <a:r>
-              <a:rPr kumimoji="1" lang="en-US" altLang="ja-JP" sz="1200" dirty="0">
+              <a:t>log = </a:t>
+            </a:r>
+            <a:r>
+              <a:rPr kumimoji="1" lang="en-US" altLang="ja-JP" sz="1200" dirty="0" err="1" smtClean="0">
+                <a:latin typeface="Tahoma" pitchFamily="34" charset="0"/>
+                <a:ea typeface="ＭＳ Ｐゴシック" charset="-128"/>
+              </a:rPr>
+              <a:t>LoggerFactory.getLogger</a:t>
+            </a:r>
+            <a:r>
+              <a:rPr kumimoji="1" lang="en-US" altLang="ja-JP" sz="1200" dirty="0" smtClean="0">
                 <a:latin typeface="Tahoma" pitchFamily="34" charset="0"/>
                 <a:ea typeface="ＭＳ Ｐゴシック" charset="-128"/>
               </a:rPr>
@@ -26957,14 +25725,7 @@
                 <a:latin typeface="Tahoma" pitchFamily="34" charset="0"/>
                 <a:ea typeface="ＭＳ Ｐゴシック" charset="-128"/>
               </a:rPr>
-              <a:t>@</a:t>
-            </a:r>
-            <a:r>
-              <a:rPr lang="en-US" altLang="ja-JP" sz="1200" dirty="0" err="1" smtClean="0">
-                <a:latin typeface="Tahoma" pitchFamily="34" charset="0"/>
-                <a:ea typeface="ＭＳ Ｐゴシック" charset="-128"/>
-              </a:rPr>
-              <a:t>Autowired</a:t>
+              <a:t>@Inject</a:t>
             </a:r>
             <a:endParaRPr kumimoji="1" lang="en-US" altLang="ja-JP" sz="1200" dirty="0">
               <a:latin typeface="Tahoma" pitchFamily="34" charset="0"/>
@@ -26988,32 +25749,32 @@
               <a:t>protected </a:t>
             </a:r>
             <a:r>
-              <a:rPr kumimoji="1" lang="en-US" altLang="ja-JP" sz="1200" dirty="0" err="1">
-                <a:latin typeface="Tahoma" pitchFamily="34" charset="0"/>
-                <a:ea typeface="ＭＳ Ｐゴシック" charset="-128"/>
-              </a:rPr>
-              <a:t>UpdateDAO</a:t>
+              <a:rPr kumimoji="1" lang="en-US" altLang="ja-JP" sz="1200" dirty="0" smtClean="0">
+                <a:latin typeface="Tahoma" pitchFamily="34" charset="0"/>
+                <a:ea typeface="ＭＳ Ｐゴシック" charset="-128"/>
+              </a:rPr>
+              <a:t>B000002Dao </a:t>
+            </a:r>
+            <a:r>
+              <a:rPr kumimoji="1" lang="en-US" altLang="ja-JP" sz="1200" dirty="0" err="1" smtClean="0">
+                <a:latin typeface="Tahoma" pitchFamily="34" charset="0"/>
+                <a:ea typeface="ＭＳ Ｐゴシック" charset="-128"/>
+              </a:rPr>
+              <a:t>b000002Dao</a:t>
+            </a:r>
+            <a:r>
+              <a:rPr kumimoji="1" lang="en-US" altLang="ja-JP" sz="1200" dirty="0" smtClean="0">
+                <a:latin typeface="Tahoma" pitchFamily="34" charset="0"/>
+                <a:ea typeface="ＭＳ Ｐゴシック" charset="-128"/>
+              </a:rPr>
+              <a:t> </a:t>
             </a:r>
             <a:r>
               <a:rPr kumimoji="1" lang="en-US" altLang="ja-JP" sz="1200" dirty="0">
                 <a:latin typeface="Tahoma" pitchFamily="34" charset="0"/>
                 <a:ea typeface="ＭＳ Ｐゴシック" charset="-128"/>
               </a:rPr>
-              <a:t> </a:t>
-            </a:r>
-            <a:r>
-              <a:rPr kumimoji="1" lang="en-US" altLang="ja-JP" sz="1200" dirty="0" err="1">
-                <a:latin typeface="Tahoma" pitchFamily="34" charset="0"/>
-                <a:ea typeface="ＭＳ Ｐゴシック" charset="-128"/>
-              </a:rPr>
-              <a:t>updateDAO</a:t>
-            </a:r>
-            <a:r>
-              <a:rPr kumimoji="1" lang="en-US" altLang="ja-JP" sz="1200" dirty="0">
-                <a:latin typeface="Tahoma" pitchFamily="34" charset="0"/>
-                <a:ea typeface="ＭＳ Ｐゴシック" charset="-128"/>
-              </a:rPr>
-              <a:t> = null;</a:t>
+              <a:t>= null;</a:t>
             </a:r>
           </a:p>
           <a:p>
@@ -27197,30 +25958,36 @@
             </a:endParaRPr>
           </a:p>
           <a:p>
-            <a:pPr algn="l"/>
             <a:r>
               <a:rPr kumimoji="1" lang="en-US" altLang="ja-JP" sz="1200" dirty="0">
                 <a:latin typeface="Tahoma" pitchFamily="34" charset="0"/>
                 <a:ea typeface="ＭＳ Ｐゴシック" charset="-128"/>
               </a:rPr>
-              <a:t>        </a:t>
-            </a:r>
-            <a:r>
-              <a:rPr kumimoji="1" lang="en-US" altLang="ja-JP" sz="1200" dirty="0" err="1">
-                <a:latin typeface="Tahoma" pitchFamily="34" charset="0"/>
-                <a:ea typeface="ＭＳ Ｐゴシック" charset="-128"/>
-              </a:rPr>
-              <a:t>updateDAO.execute</a:t>
-            </a:r>
-            <a:r>
-              <a:rPr kumimoji="1" lang="en-US" altLang="ja-JP" sz="1200" dirty="0">
-                <a:latin typeface="Tahoma" pitchFamily="34" charset="0"/>
-                <a:ea typeface="ＭＳ Ｐゴシック" charset="-128"/>
-              </a:rPr>
-              <a:t>("b000002.insertUser", </a:t>
-            </a:r>
-            <a:r>
-              <a:rPr kumimoji="1" lang="en-US" altLang="ja-JP" sz="1200" dirty="0" err="1">
+              <a:t> </a:t>
+            </a:r>
+            <a:r>
+              <a:rPr kumimoji="1" lang="en-US" altLang="ja-JP" sz="1200" dirty="0" smtClean="0">
+                <a:latin typeface="Tahoma" pitchFamily="34" charset="0"/>
+                <a:ea typeface="ＭＳ Ｐゴシック" charset="-128"/>
+              </a:rPr>
+              <a:t>       </a:t>
+            </a:r>
+            <a:r>
+              <a:rPr kumimoji="1" lang="en-US" altLang="ja-JP" sz="1200" dirty="0" smtClean="0">
+                <a:latin typeface="Tahoma" pitchFamily="34" charset="0"/>
+                <a:ea typeface="ＭＳ Ｐゴシック" charset="-128"/>
+              </a:rPr>
+              <a:t>b000002Dao.</a:t>
+            </a:r>
+            <a:r>
+              <a:rPr kumimoji="1" lang="en-US" altLang="ja-JP" sz="1200" dirty="0" smtClean="0">
+                <a:latin typeface="Tahoma" pitchFamily="34" charset="0"/>
+                <a:ea typeface="ＭＳ Ｐゴシック" charset="-128"/>
+              </a:rPr>
+              <a:t>insertUser(</a:t>
+            </a:r>
+            <a:r>
+              <a:rPr kumimoji="1" lang="en-US" altLang="ja-JP" sz="1200" dirty="0" err="1" smtClean="0">
                 <a:latin typeface="Tahoma" pitchFamily="34" charset="0"/>
                 <a:ea typeface="ＭＳ Ｐゴシック" charset="-128"/>
               </a:rPr>
@@ -27582,14 +26349,7 @@
                 <a:latin typeface="Tahoma" pitchFamily="34" charset="0"/>
                 <a:ea typeface="ＭＳ Ｐゴシック" charset="-128"/>
               </a:rPr>
-              <a:t>@</a:t>
-            </a:r>
-            <a:r>
-              <a:rPr lang="en-US" altLang="ja-JP" sz="1100" dirty="0" err="1" smtClean="0">
-                <a:latin typeface="Tahoma" pitchFamily="34" charset="0"/>
-                <a:ea typeface="ＭＳ Ｐゴシック" charset="-128"/>
-              </a:rPr>
-              <a:t>Autowired</a:t>
+              <a:t>@Inject</a:t>
             </a:r>
             <a:endParaRPr lang="en-US" altLang="ja-JP" sz="1100" dirty="0" smtClean="0">
               <a:latin typeface="Tahoma" pitchFamily="34" charset="0"/>
@@ -27939,11 +26699,18 @@
               <a:t>                //DB</a:t>
             </a:r>
             <a:r>
-              <a:rPr lang="ja-JP" altLang="en-US" sz="1100" smtClean="0">
-                <a:latin typeface="Tahoma" pitchFamily="34" charset="0"/>
-                <a:ea typeface="ＭＳ Ｐゴシック" charset="-128"/>
-              </a:rPr>
-              <a:t>への更新処理</a:t>
+              <a:rPr lang="ja-JP" altLang="en-US" sz="1100" dirty="0" err="1" smtClean="0">
+                <a:latin typeface="Tahoma" pitchFamily="34" charset="0"/>
+                <a:ea typeface="ＭＳ Ｐゴシック" charset="-128"/>
+              </a:rPr>
+              <a:t>への</a:t>
+            </a:r>
+            <a:r>
+              <a:rPr lang="ja-JP" altLang="en-US" sz="1100" dirty="0" smtClean="0">
+                <a:latin typeface="Tahoma" pitchFamily="34" charset="0"/>
+                <a:ea typeface="ＭＳ Ｐゴシック" charset="-128"/>
+              </a:rPr>
+              <a:t>更新処理</a:t>
             </a:r>
             <a:endParaRPr lang="en-US" altLang="ja-JP" sz="1100" dirty="0" smtClean="0">
               <a:latin typeface="Tahoma" pitchFamily="34" charset="0"/>
@@ -28002,34 +26769,57 @@
                 <a:latin typeface="Tahoma" pitchFamily="34" charset="0"/>
                 <a:ea typeface="ＭＳ Ｐゴシック" charset="-128"/>
               </a:rPr>
-              <a:t>BatchUtil</a:t>
+              <a:t>BatchUtil.commitTransaction</a:t>
             </a:r>
             <a:r>
               <a:rPr lang="en-US" altLang="ja-JP" sz="1100" dirty="0" smtClean="0">
                 <a:latin typeface="Tahoma" pitchFamily="34" charset="0"/>
                 <a:ea typeface="ＭＳ Ｐゴシック" charset="-128"/>
               </a:rPr>
-              <a:t>. </a:t>
+              <a:t>(</a:t>
             </a:r>
             <a:r>
               <a:rPr lang="en-US" altLang="ja-JP" sz="1100" dirty="0" err="1" smtClean="0">
                 <a:latin typeface="Tahoma" pitchFamily="34" charset="0"/>
                 <a:ea typeface="ＭＳ Ｐゴシック" charset="-128"/>
               </a:rPr>
-              <a:t>commitTransaction</a:t>
+              <a:t>transactionManager</a:t>
             </a:r>
             <a:r>
               <a:rPr lang="en-US" altLang="ja-JP" sz="1100" dirty="0" smtClean="0">
                 <a:latin typeface="Tahoma" pitchFamily="34" charset="0"/>
                 <a:ea typeface="ＭＳ Ｐゴシック" charset="-128"/>
               </a:rPr>
-              <a:t> (</a:t>
+              <a:t>, stat);</a:t>
+            </a:r>
+          </a:p>
+          <a:p>
+            <a:r>
+              <a:rPr lang="en-US" altLang="ja-JP" sz="1100" dirty="0" smtClean="0">
+                <a:latin typeface="Tahoma" pitchFamily="34" charset="0"/>
+                <a:ea typeface="ＭＳ Ｐゴシック" charset="-128"/>
+              </a:rPr>
+              <a:t>                   stat = </a:t>
             </a:r>
             <a:r>
               <a:rPr lang="en-US" altLang="ja-JP" sz="1100" dirty="0" err="1" smtClean="0">
                 <a:latin typeface="Tahoma" pitchFamily="34" charset="0"/>
                 <a:ea typeface="ＭＳ Ｐゴシック" charset="-128"/>
               </a:rPr>
+              <a:t>BatchUtil.startTransaction</a:t>
+            </a:r>
+            <a:r>
+              <a:rPr lang="en-US" altLang="ja-JP" sz="1100" dirty="0" smtClean="0">
+                <a:latin typeface="Tahoma" pitchFamily="34" charset="0"/>
+                <a:ea typeface="ＭＳ Ｐゴシック" charset="-128"/>
+              </a:rPr>
+              <a:t>(</a:t>
+            </a:r>
+            <a:r>
+              <a:rPr lang="en-US" altLang="ja-JP" sz="1100" dirty="0" err="1" smtClean="0">
+                <a:latin typeface="Tahoma" pitchFamily="34" charset="0"/>
+                <a:ea typeface="ＭＳ Ｐゴシック" charset="-128"/>
+              </a:rPr>
               <a:t>transactionManager</a:t>
             </a:r>
             <a:r>
@@ -28037,7 +26827,7 @@
                 <a:latin typeface="Tahoma" pitchFamily="34" charset="0"/>
                 <a:ea typeface="ＭＳ Ｐゴシック" charset="-128"/>
               </a:rPr>
-              <a:t>, stat);</a:t>
+              <a:t>);</a:t>
             </a:r>
           </a:p>
           <a:p>
@@ -28046,14 +26836,48 @@
                 <a:latin typeface="Tahoma" pitchFamily="34" charset="0"/>
                 <a:ea typeface="ＭＳ Ｐゴシック" charset="-128"/>
               </a:rPr>
-              <a:t>                   stat = </a:t>
+              <a:t>                }</a:t>
+            </a:r>
+          </a:p>
+          <a:p>
+            <a:r>
+              <a:rPr lang="en-US" altLang="ja-JP" sz="1100" dirty="0" smtClean="0">
+                <a:latin typeface="Tahoma" pitchFamily="34" charset="0"/>
+                <a:ea typeface="ＭＳ Ｐゴシック" charset="-128"/>
+              </a:rPr>
+              <a:t>            }</a:t>
+            </a:r>
+          </a:p>
+          <a:p>
+            <a:r>
+              <a:rPr lang="en-US" altLang="ja-JP" sz="1100" dirty="0" smtClean="0">
+                <a:latin typeface="Tahoma" pitchFamily="34" charset="0"/>
+                <a:ea typeface="ＭＳ Ｐゴシック" charset="-128"/>
+              </a:rPr>
+              <a:t>            //</a:t>
+            </a:r>
+            <a:r>
+              <a:rPr lang="ja-JP" altLang="en-US" sz="1100" dirty="0" smtClean="0">
+                <a:latin typeface="Tahoma" pitchFamily="34" charset="0"/>
+                <a:ea typeface="ＭＳ Ｐゴシック" charset="-128"/>
+              </a:rPr>
+              <a:t>残りのデータのコミット</a:t>
+            </a:r>
+          </a:p>
+          <a:p>
+            <a:r>
+              <a:rPr lang="ja-JP" altLang="en-US" sz="1100" dirty="0" smtClean="0">
+                <a:latin typeface="Tahoma" pitchFamily="34" charset="0"/>
+                <a:ea typeface="ＭＳ Ｐゴシック" charset="-128"/>
+              </a:rPr>
+              <a:t>            </a:t>
             </a:r>
             <a:r>
               <a:rPr lang="en-US" altLang="ja-JP" sz="1100" dirty="0" err="1" smtClean="0">
                 <a:latin typeface="Tahoma" pitchFamily="34" charset="0"/>
                 <a:ea typeface="ＭＳ Ｐゴシック" charset="-128"/>
               </a:rPr>
-              <a:t>BatchUtil.startTransaction</a:t>
+              <a:t>BatchUtil.commitTransaction</a:t>
             </a:r>
             <a:r>
               <a:rPr lang="en-US" altLang="ja-JP" sz="1100" dirty="0" smtClean="0">
@@ -28061,91 +26885,6 @@
                 <a:ea typeface="ＭＳ Ｐゴシック" charset="-128"/>
               </a:rPr>
               <a:t>(</a:t>
-            </a:r>
-            <a:r>
-              <a:rPr lang="en-US" altLang="ja-JP" sz="1100" dirty="0" err="1" smtClean="0">
-                <a:latin typeface="Tahoma" pitchFamily="34" charset="0"/>
-                <a:ea typeface="ＭＳ Ｐゴシック" charset="-128"/>
-              </a:rPr>
-              <a:t>transactionManager</a:t>
-            </a:r>
-            <a:r>
-              <a:rPr lang="en-US" altLang="ja-JP" sz="1100" dirty="0" smtClean="0">
-                <a:latin typeface="Tahoma" pitchFamily="34" charset="0"/>
-                <a:ea typeface="ＭＳ Ｐゴシック" charset="-128"/>
-              </a:rPr>
-              <a:t>);</a:t>
-            </a:r>
-          </a:p>
-          <a:p>
-            <a:r>
-              <a:rPr lang="en-US" altLang="ja-JP" sz="1100" dirty="0" smtClean="0">
-                <a:latin typeface="Tahoma" pitchFamily="34" charset="0"/>
-                <a:ea typeface="ＭＳ Ｐゴシック" charset="-128"/>
-              </a:rPr>
-              <a:t>                }</a:t>
-            </a:r>
-          </a:p>
-          <a:p>
-            <a:r>
-              <a:rPr lang="en-US" altLang="ja-JP" sz="1100" dirty="0" smtClean="0">
-                <a:latin typeface="Tahoma" pitchFamily="34" charset="0"/>
-                <a:ea typeface="ＭＳ Ｐゴシック" charset="-128"/>
-              </a:rPr>
-              <a:t>            }</a:t>
-            </a:r>
-          </a:p>
-          <a:p>
-            <a:r>
-              <a:rPr lang="en-US" altLang="ja-JP" sz="1100" dirty="0" smtClean="0">
-                <a:latin typeface="Tahoma" pitchFamily="34" charset="0"/>
-                <a:ea typeface="ＭＳ Ｐゴシック" charset="-128"/>
-              </a:rPr>
-              <a:t>            //</a:t>
-            </a:r>
-            <a:r>
-              <a:rPr lang="ja-JP" altLang="en-US" sz="1100" dirty="0" smtClean="0">
-                <a:latin typeface="Tahoma" pitchFamily="34" charset="0"/>
-                <a:ea typeface="ＭＳ Ｐゴシック" charset="-128"/>
-              </a:rPr>
-              <a:t>残りのデータのコミット</a:t>
-            </a:r>
-          </a:p>
-          <a:p>
-            <a:r>
-              <a:rPr lang="ja-JP" altLang="en-US" sz="1100" dirty="0" smtClean="0">
-                <a:latin typeface="Tahoma" pitchFamily="34" charset="0"/>
-                <a:ea typeface="ＭＳ Ｐゴシック" charset="-128"/>
-              </a:rPr>
-              <a:t>            </a:t>
-            </a:r>
-            <a:r>
-              <a:rPr lang="en-US" altLang="ja-JP" sz="1100" dirty="0" err="1" smtClean="0">
-                <a:latin typeface="Tahoma" pitchFamily="34" charset="0"/>
-                <a:ea typeface="ＭＳ Ｐゴシック" charset="-128"/>
-              </a:rPr>
-              <a:t>BatchUtil</a:t>
-            </a:r>
-            <a:r>
-              <a:rPr lang="en-US" altLang="ja-JP" sz="1100" dirty="0" smtClean="0">
-                <a:latin typeface="Tahoma" pitchFamily="34" charset="0"/>
-                <a:ea typeface="ＭＳ Ｐゴシック" charset="-128"/>
-              </a:rPr>
-              <a:t>. </a:t>
-            </a:r>
-            <a:r>
-              <a:rPr lang="en-US" altLang="ja-JP" sz="1100" dirty="0" err="1" smtClean="0">
-                <a:latin typeface="Tahoma" pitchFamily="34" charset="0"/>
-                <a:ea typeface="ＭＳ Ｐゴシック" charset="-128"/>
-              </a:rPr>
-              <a:t>commitTransaction</a:t>
-            </a:r>
-            <a:r>
-              <a:rPr lang="en-US" altLang="ja-JP" sz="1100" dirty="0" smtClean="0">
-                <a:latin typeface="Tahoma" pitchFamily="34" charset="0"/>
-                <a:ea typeface="ＭＳ Ｐゴシック" charset="-128"/>
-              </a:rPr>
-              <a:t> (</a:t>
             </a:r>
             <a:r>
               <a:rPr lang="en-US" altLang="ja-JP" sz="1100" dirty="0" err="1" smtClean="0">
@@ -29228,32 +27967,18 @@
           <a:lstStyle/>
           <a:p>
             <a:r>
-              <a:rPr kumimoji="1" lang="en-US" altLang="ja-JP" sz="1000" dirty="0" err="1" smtClean="0">
-                <a:latin typeface="Arial" charset="0"/>
-                <a:ea typeface="ＭＳ Ｐゴシック" charset="-128"/>
-              </a:rPr>
-              <a:t>QueryDAO</a:t>
-            </a:r>
-            <a:r>
               <a:rPr kumimoji="1" lang="ja-JP" altLang="en-US" sz="1000" dirty="0" smtClean="0">
                 <a:latin typeface="Arial" charset="0"/>
                 <a:ea typeface="ＭＳ Ｐゴシック" charset="-128"/>
               </a:rPr>
-              <a:t>や</a:t>
-            </a:r>
-            <a:r>
-              <a:rPr kumimoji="1" lang="en-US" altLang="ja-JP" sz="1000" dirty="0" err="1">
-                <a:latin typeface="Arial" charset="0"/>
-                <a:ea typeface="ＭＳ Ｐゴシック" charset="-128"/>
-              </a:rPr>
-              <a:t>UpdateDAO</a:t>
+              <a:t>データベースアクセス機能を</a:t>
             </a:r>
             <a:r>
               <a:rPr kumimoji="1" lang="ja-JP" altLang="en-US" sz="1000" dirty="0">
                 <a:latin typeface="Arial" charset="0"/>
                 <a:ea typeface="ＭＳ Ｐゴシック" charset="-128"/>
               </a:rPr>
-              <a:t>を使用する場合に追加する</a:t>
+              <a:t>使用する場合に追加する</a:t>
             </a:r>
           </a:p>
         </p:txBody>

</xml_diff>

<commit_message>
#22 modify against komodan comments
</commit_message>
<xml_diff>
--- a/architecture/TERASOLUNA Batch Framework for Java Version 3.x 説明資料.pptx
+++ b/architecture/TERASOLUNA Batch Framework for Java Version 3.x 説明資料.pptx
@@ -32,24 +32,24 @@
   <p:notesSz cx="6794500" cy="9931400"/>
   <p:embeddedFontLst>
     <p:embeddedFont>
+      <p:font typeface="Tahoma" panose="020B0604030504040204" pitchFamily="34" charset="0"/>
+      <p:regular r:id="rId20"/>
+      <p:bold r:id="rId21"/>
+    </p:embeddedFont>
+    <p:embeddedFont>
+      <p:font typeface="HGP創英角ｺﾞｼｯｸUB" panose="020B0900000000000000" pitchFamily="50" charset="-128"/>
+      <p:regular r:id="rId22"/>
+    </p:embeddedFont>
+    <p:embeddedFont>
       <p:font typeface="HGPｺﾞｼｯｸE" panose="020B0900000000000000" pitchFamily="50" charset="-128"/>
-      <p:regular r:id="rId20"/>
+      <p:regular r:id="rId23"/>
     </p:embeddedFont>
     <p:embeddedFont>
       <p:font typeface="Calibri" panose="020F0502020204030204" pitchFamily="34" charset="0"/>
-      <p:regular r:id="rId21"/>
-      <p:bold r:id="rId22"/>
-      <p:italic r:id="rId23"/>
-      <p:boldItalic r:id="rId24"/>
-    </p:embeddedFont>
-    <p:embeddedFont>
-      <p:font typeface="HGP創英角ｺﾞｼｯｸUB" panose="020B0900000000000000" pitchFamily="50" charset="-128"/>
-      <p:regular r:id="rId25"/>
-    </p:embeddedFont>
-    <p:embeddedFont>
-      <p:font typeface="Tahoma" panose="020B0604030504040204" pitchFamily="34" charset="0"/>
-      <p:regular r:id="rId26"/>
-      <p:bold r:id="rId27"/>
+      <p:regular r:id="rId24"/>
+      <p:bold r:id="rId25"/>
+      <p:italic r:id="rId26"/>
+      <p:boldItalic r:id="rId27"/>
     </p:embeddedFont>
   </p:embeddedFontLst>
   <p:defaultTextStyle>
@@ -233,7 +233,7 @@
             <a:fld id="{BB253DA6-D017-4D4C-A6F0-8D6175E3AD1A}" type="datetime1">
               <a:rPr lang="ja-JP" altLang="en-US" smtClean="0"/>
               <a:pPr/>
-              <a:t>2015/1/21</a:t>
+              <a:t>2015/1/26</a:t>
             </a:fld>
             <a:endParaRPr lang="en-US"/>
           </a:p>
@@ -401,7 +401,7 @@
             <a:fld id="{971E307F-04E7-4216-B3F9-BBF58478B729}" type="datetime1">
               <a:rPr lang="ja-JP" altLang="en-US" smtClean="0"/>
               <a:pPr/>
-              <a:t>2015/1/21</a:t>
+              <a:t>2015/1/26</a:t>
             </a:fld>
             <a:endParaRPr lang="en-US"/>
           </a:p>
@@ -759,7 +759,7 @@
             <a:fld id="{BB7B7D7C-7587-458D-9F40-96275B4E0BF8}" type="datetime1">
               <a:rPr lang="ja-JP" altLang="en-US" smtClean="0"/>
               <a:pPr/>
-              <a:t>2015/1/21</a:t>
+              <a:t>2015/1/26</a:t>
             </a:fld>
             <a:endParaRPr lang="en-US"/>
           </a:p>
@@ -977,7 +977,7 @@
             <a:fld id="{79DDA3DF-8EBA-4683-A96B-9C379AE68A32}" type="datetime1">
               <a:rPr lang="ja-JP" altLang="en-US" smtClean="0"/>
               <a:pPr/>
-              <a:t>2015/1/21</a:t>
+              <a:t>2015/1/26</a:t>
             </a:fld>
             <a:endParaRPr lang="en-US"/>
           </a:p>
@@ -7915,11 +7915,15 @@
             </a:r>
             <a:r>
               <a:rPr lang="en-US" altLang="ja-JP" dirty="0" smtClean="0"/>
-              <a:t>3.x</a:t>
+              <a:t>3.5.0</a:t>
             </a:r>
             <a:r>
               <a:rPr lang="ja-JP" altLang="en-US" dirty="0" smtClean="0"/>
-              <a:t> 説明資料</a:t>
+              <a:t> </a:t>
+            </a:r>
+            <a:r>
+              <a:rPr lang="ja-JP" altLang="en-US" dirty="0" smtClean="0"/>
+              <a:t>説明資料</a:t>
             </a:r>
           </a:p>
         </p:txBody>
@@ -7985,38 +7989,18 @@
             </a:r>
             <a:r>
               <a:rPr kumimoji="1" lang="ja-JP" altLang="en-US" dirty="0" smtClean="0"/>
-              <a:t>を</a:t>
-            </a:r>
-            <a:r>
-              <a:rPr kumimoji="1" lang="ja-JP" altLang="en-US" dirty="0" smtClean="0"/>
-              <a:t>利用して、データベースアクセスを行うコンポーネントです。</a:t>
+              <a:t>を利用して、データベースアクセスを行うコンポーネントです。</a:t>
             </a:r>
             <a:endParaRPr kumimoji="1" lang="en-US" altLang="ja-JP" dirty="0" smtClean="0"/>
           </a:p>
           <a:p>
             <a:r>
               <a:rPr lang="en-US" altLang="ja-JP" dirty="0" smtClean="0"/>
-              <a:t>TERASOLUNA </a:t>
-            </a:r>
-            <a:r>
-              <a:rPr lang="en-US" altLang="ja-JP" dirty="0" smtClean="0"/>
-              <a:t>Server </a:t>
-            </a:r>
-            <a:r>
-              <a:rPr lang="en-US" altLang="ja-JP" dirty="0" smtClean="0"/>
-              <a:t>Framework for Java </a:t>
-            </a:r>
-            <a:r>
-              <a:rPr lang="en-US" altLang="ja-JP" dirty="0" smtClean="0"/>
-              <a:t>Version5.x</a:t>
+              <a:t>TERASOLUNA Server Framework for Java Version5.x</a:t>
             </a:r>
             <a:r>
               <a:rPr lang="ja-JP" altLang="en-US" dirty="0" smtClean="0"/>
-              <a:t>と</a:t>
-            </a:r>
-            <a:r>
-              <a:rPr lang="ja-JP" altLang="en-US" dirty="0" smtClean="0"/>
-              <a:t>同じものを利用します。</a:t>
+              <a:t>と同じものを利用します。</a:t>
             </a:r>
             <a:endParaRPr lang="en-US" altLang="ja-JP" dirty="0" smtClean="0"/>
           </a:p>
@@ -8060,8 +8044,8 @@
         </p:nvSpPr>
         <p:spPr bwMode="auto">
           <a:xfrm>
-            <a:off x="272480" y="2471046"/>
-            <a:ext cx="8928992" cy="3312368"/>
+            <a:off x="290113" y="1891625"/>
+            <a:ext cx="8928992" cy="2490252"/>
           </a:xfrm>
           <a:prstGeom prst="rect">
             <a:avLst/>
@@ -8116,35 +8100,21 @@
                 <a:latin typeface="Courier New" pitchFamily="49" charset="0"/>
                 <a:cs typeface="Courier New" pitchFamily="49" charset="0"/>
               </a:rPr>
-              <a:t> </a:t>
+              <a:t> extends </a:t>
+            </a:r>
+            <a:r>
+              <a:rPr lang="en-US" altLang="ja-JP" sz="1200" dirty="0" err="1" smtClean="0">
+                <a:latin typeface="Courier New" pitchFamily="49" charset="0"/>
+                <a:cs typeface="Courier New" pitchFamily="49" charset="0"/>
+              </a:rPr>
+              <a:t>AbstractTransactionBLogic</a:t>
             </a:r>
             <a:r>
               <a:rPr lang="en-US" altLang="ja-JP" sz="1200" dirty="0" smtClean="0">
                 <a:latin typeface="Courier New" pitchFamily="49" charset="0"/>
                 <a:cs typeface="Courier New" pitchFamily="49" charset="0"/>
               </a:rPr>
-              <a:t>extends </a:t>
-            </a:r>
-            <a:r>
-              <a:rPr lang="en-US" altLang="ja-JP" sz="1200" dirty="0" err="1" smtClean="0">
-                <a:latin typeface="Courier New" pitchFamily="49" charset="0"/>
-                <a:cs typeface="Courier New" pitchFamily="49" charset="0"/>
-              </a:rPr>
-              <a:t>AbstractTransactionBLogic</a:t>
-            </a:r>
-            <a:r>
-              <a:rPr lang="en-US" altLang="ja-JP" sz="1200" dirty="0" smtClean="0">
-                <a:latin typeface="Courier New" pitchFamily="49" charset="0"/>
-                <a:cs typeface="Courier New" pitchFamily="49" charset="0"/>
-              </a:rPr>
-              <a:t> </a:t>
-            </a:r>
-            <a:r>
-              <a:rPr lang="en-US" altLang="ja-JP" sz="1200" dirty="0" smtClean="0">
-                <a:latin typeface="Courier New" pitchFamily="49" charset="0"/>
-                <a:cs typeface="Courier New" pitchFamily="49" charset="0"/>
-              </a:rPr>
-              <a:t>{</a:t>
+              <a:t> {</a:t>
             </a:r>
           </a:p>
           <a:p>
@@ -8159,19 +8129,8 @@
                 <a:latin typeface="Courier New" pitchFamily="49" charset="0"/>
                 <a:cs typeface="Courier New" pitchFamily="49" charset="0"/>
               </a:rPr>
-              <a:t>    </a:t>
-            </a:r>
-            <a:r>
-              <a:rPr lang="en-US" altLang="ja-JP" sz="1200" dirty="0" smtClean="0">
-                <a:latin typeface="Courier New" pitchFamily="49" charset="0"/>
-                <a:cs typeface="Courier New" pitchFamily="49" charset="0"/>
-              </a:rPr>
-              <a:t>@Inject</a:t>
-            </a:r>
-            <a:endParaRPr lang="en-US" altLang="ja-JP" sz="1200" dirty="0" smtClean="0">
-              <a:latin typeface="Courier New" pitchFamily="49" charset="0"/>
-              <a:cs typeface="Courier New" pitchFamily="49" charset="0"/>
-            </a:endParaRPr>
+              <a:t>    @Inject</a:t>
+            </a:r>
           </a:p>
           <a:p>
             <a:r>
@@ -8341,14 +8300,7 @@
                 <a:latin typeface="Courier New" pitchFamily="49" charset="0"/>
                 <a:cs typeface="Courier New" pitchFamily="49" charset="0"/>
               </a:rPr>
-              <a:t> </a:t>
-            </a:r>
-            <a:r>
-              <a:rPr lang="en-US" altLang="ja-JP" sz="1200" dirty="0" smtClean="0">
-                <a:latin typeface="Courier New" pitchFamily="49" charset="0"/>
-                <a:cs typeface="Courier New" pitchFamily="49" charset="0"/>
-              </a:rPr>
-              <a:t>bean = new </a:t>
+              <a:t> bean = new </a:t>
             </a:r>
             <a:r>
               <a:rPr lang="en-US" altLang="ja-JP" sz="1200" dirty="0" err="1">
@@ -8428,7 +8380,17 @@
                 <a:latin typeface="Courier New" pitchFamily="49" charset="0"/>
                 <a:cs typeface="Courier New" pitchFamily="49" charset="0"/>
               </a:rPr>
-              <a:t> </a:t>
+              <a:t> result = </a:t>
+            </a:r>
+            <a:r>
+              <a:rPr lang="en-US" altLang="ja-JP" sz="1200" b="1" dirty="0" err="1" smtClean="0">
+                <a:solidFill>
+                  <a:srgbClr val="FF0000"/>
+                </a:solidFill>
+                <a:latin typeface="Courier New" pitchFamily="49" charset="0"/>
+                <a:cs typeface="Courier New" pitchFamily="49" charset="0"/>
+              </a:rPr>
+              <a:t>sampleDao.selectUser</a:t>
             </a:r>
             <a:r>
               <a:rPr lang="en-US" altLang="ja-JP" sz="1200" b="1" dirty="0" smtClean="0">
@@ -8438,36 +8400,6 @@
                 <a:latin typeface="Courier New" pitchFamily="49" charset="0"/>
                 <a:cs typeface="Courier New" pitchFamily="49" charset="0"/>
               </a:rPr>
-              <a:t>result </a:t>
-            </a:r>
-            <a:r>
-              <a:rPr lang="en-US" altLang="ja-JP" sz="1200" b="1" dirty="0" smtClean="0">
-                <a:solidFill>
-                  <a:srgbClr val="FF0000"/>
-                </a:solidFill>
-                <a:latin typeface="Courier New" pitchFamily="49" charset="0"/>
-                <a:cs typeface="Courier New" pitchFamily="49" charset="0"/>
-              </a:rPr>
-              <a:t>= </a:t>
-            </a:r>
-            <a:r>
-              <a:rPr lang="en-US" altLang="ja-JP" sz="1200" b="1" dirty="0" err="1" smtClean="0">
-                <a:solidFill>
-                  <a:srgbClr val="FF0000"/>
-                </a:solidFill>
-                <a:latin typeface="Courier New" pitchFamily="49" charset="0"/>
-                <a:cs typeface="Courier New" pitchFamily="49" charset="0"/>
-              </a:rPr>
-              <a:t>sampleDao.selectUser</a:t>
-            </a:r>
-            <a:r>
-              <a:rPr lang="en-US" altLang="ja-JP" sz="1200" b="1" dirty="0" smtClean="0">
-                <a:solidFill>
-                  <a:srgbClr val="FF0000"/>
-                </a:solidFill>
-                <a:latin typeface="Courier New" pitchFamily="49" charset="0"/>
-                <a:cs typeface="Courier New" pitchFamily="49" charset="0"/>
-              </a:rPr>
               <a:t>(bean);</a:t>
             </a:r>
             <a:endParaRPr lang="ja-JP" altLang="en-US" sz="1200" dirty="0" smtClean="0">
@@ -8499,10 +8431,6 @@
               </a:rPr>
               <a:t>}</a:t>
             </a:r>
-            <a:endParaRPr lang="en-US" altLang="ja-JP" sz="1200" dirty="0" smtClean="0">
-              <a:latin typeface="Courier New" pitchFamily="49" charset="0"/>
-              <a:cs typeface="Courier New" pitchFamily="49" charset="0"/>
-            </a:endParaRPr>
           </a:p>
           <a:p>
             <a:endParaRPr lang="en-US" altLang="ja-JP" sz="1200" dirty="0" smtClean="0">
@@ -8512,6 +8440,255 @@
               <a:latin typeface="Courier New" pitchFamily="49" charset="0"/>
               <a:cs typeface="Courier New" pitchFamily="49" charset="0"/>
             </a:endParaRPr>
+          </a:p>
+        </p:txBody>
+      </p:sp>
+      <p:sp>
+        <p:nvSpPr>
+          <p:cNvPr id="5" name="Rectangle 12"/>
+          <p:cNvSpPr>
+            <a:spLocks noChangeArrowheads="1"/>
+          </p:cNvSpPr>
+          <p:nvPr/>
+        </p:nvSpPr>
+        <p:spPr bwMode="auto">
+          <a:xfrm>
+            <a:off x="272480" y="1622286"/>
+            <a:ext cx="1678963" cy="263791"/>
+          </a:xfrm>
+          <a:prstGeom prst="rect">
+            <a:avLst/>
+          </a:prstGeom>
+          <a:noFill/>
+          <a:ln w="9525">
+            <a:solidFill>
+              <a:schemeClr val="tx1"/>
+            </a:solidFill>
+            <a:miter lim="800000"/>
+            <a:headEnd/>
+            <a:tailEnd/>
+          </a:ln>
+          <a:effectLst/>
+        </p:spPr>
+        <p:txBody>
+          <a:bodyPr wrap="none" lIns="90000" tIns="46800" rIns="90000" bIns="46800">
+            <a:spAutoFit/>
+          </a:bodyPr>
+          <a:lstStyle/>
+          <a:p>
+            <a:pPr algn="r"/>
+            <a:r>
+              <a:rPr kumimoji="1" lang="ja-JP" altLang="en-US" sz="1100" dirty="0" smtClean="0"/>
+              <a:t>ビジネスロジックの実装例</a:t>
+            </a:r>
+            <a:endParaRPr kumimoji="1" lang="ja-JP" altLang="en-US" sz="1100" b="0" dirty="0"/>
+          </a:p>
+        </p:txBody>
+      </p:sp>
+      <p:sp>
+        <p:nvSpPr>
+          <p:cNvPr id="6" name="正方形/長方形 5"/>
+          <p:cNvSpPr/>
+          <p:nvPr/>
+        </p:nvSpPr>
+        <p:spPr bwMode="auto">
+          <a:xfrm>
+            <a:off x="290112" y="4877759"/>
+            <a:ext cx="8928992" cy="1577362"/>
+          </a:xfrm>
+          <a:prstGeom prst="rect">
+            <a:avLst/>
+          </a:prstGeom>
+          <a:solidFill>
+            <a:schemeClr val="bg1"/>
+          </a:solidFill>
+          <a:ln w="9525" cap="flat" cmpd="sng" algn="ctr">
+            <a:solidFill>
+              <a:schemeClr val="tx1"/>
+            </a:solidFill>
+            <a:prstDash val="solid"/>
+            <a:round/>
+            <a:headEnd type="none" w="med" len="med"/>
+            <a:tailEnd type="none" w="med" len="med"/>
+          </a:ln>
+          <a:effectLst/>
+        </p:spPr>
+        <p:txBody>
+          <a:bodyPr vert="horz" wrap="square" lIns="91440" tIns="45720" rIns="91440" bIns="45720" numCol="1" rtlCol="0" anchor="ctr" anchorCtr="0" compatLnSpc="1">
+            <a:prstTxWarp prst="textNoShape">
+              <a:avLst/>
+            </a:prstTxWarp>
+          </a:bodyPr>
+          <a:lstStyle/>
+          <a:p>
+            <a:r>
+              <a:rPr lang="en-US" altLang="ja-JP" sz="1200" dirty="0" smtClean="0">
+                <a:latin typeface="Courier New" pitchFamily="49" charset="0"/>
+                <a:cs typeface="Courier New" pitchFamily="49" charset="0"/>
+              </a:rPr>
+              <a:t>@Component</a:t>
+            </a:r>
+          </a:p>
+          <a:p>
+            <a:r>
+              <a:rPr lang="en-US" altLang="ja-JP" sz="1200" dirty="0" smtClean="0">
+                <a:latin typeface="Courier New" pitchFamily="49" charset="0"/>
+                <a:cs typeface="Courier New" pitchFamily="49" charset="0"/>
+              </a:rPr>
+              <a:t>public class </a:t>
+            </a:r>
+            <a:r>
+              <a:rPr lang="en-US" altLang="ja-JP" sz="1200" dirty="0" err="1" smtClean="0">
+                <a:latin typeface="Courier New" pitchFamily="49" charset="0"/>
+                <a:cs typeface="Courier New" pitchFamily="49" charset="0"/>
+              </a:rPr>
+              <a:t>SampleDao</a:t>
+            </a:r>
+            <a:r>
+              <a:rPr lang="en-US" altLang="ja-JP" sz="1200" dirty="0" smtClean="0">
+                <a:latin typeface="Courier New" pitchFamily="49" charset="0"/>
+                <a:cs typeface="Courier New" pitchFamily="49" charset="0"/>
+              </a:rPr>
+              <a:t> {</a:t>
+            </a:r>
+            <a:endParaRPr lang="en-US" altLang="ja-JP" sz="1200" dirty="0" smtClean="0">
+              <a:latin typeface="Courier New" pitchFamily="49" charset="0"/>
+              <a:cs typeface="Courier New" pitchFamily="49" charset="0"/>
+            </a:endParaRPr>
+          </a:p>
+          <a:p>
+            <a:r>
+              <a:rPr lang="en-US" altLang="ja-JP" sz="1200" dirty="0" smtClean="0">
+                <a:latin typeface="Courier New" pitchFamily="49" charset="0"/>
+                <a:cs typeface="Courier New" pitchFamily="49" charset="0"/>
+              </a:rPr>
+              <a:t>    // SQL</a:t>
+            </a:r>
+            <a:r>
+              <a:rPr lang="ja-JP" altLang="en-US" sz="1200" dirty="0" smtClean="0">
+                <a:latin typeface="Courier New" pitchFamily="49" charset="0"/>
+                <a:cs typeface="Courier New" pitchFamily="49" charset="0"/>
+              </a:rPr>
+              <a:t>を呼び出すメソッドを定義</a:t>
+            </a:r>
+            <a:endParaRPr lang="en-US" altLang="ja-JP" sz="1200" dirty="0" smtClean="0">
+              <a:latin typeface="Courier New" pitchFamily="49" charset="0"/>
+              <a:cs typeface="Courier New" pitchFamily="49" charset="0"/>
+            </a:endParaRPr>
+          </a:p>
+          <a:p>
+            <a:r>
+              <a:rPr lang="en-US" altLang="ja-JP" sz="1200" dirty="0">
+                <a:latin typeface="Courier New" pitchFamily="49" charset="0"/>
+                <a:cs typeface="Courier New" pitchFamily="49" charset="0"/>
+              </a:rPr>
+              <a:t> </a:t>
+            </a:r>
+            <a:r>
+              <a:rPr lang="en-US" altLang="ja-JP" sz="1200" dirty="0" smtClean="0">
+                <a:latin typeface="Courier New" pitchFamily="49" charset="0"/>
+                <a:cs typeface="Courier New" pitchFamily="49" charset="0"/>
+              </a:rPr>
+              <a:t>   public </a:t>
+            </a:r>
+            <a:r>
+              <a:rPr lang="en-US" altLang="ja-JP" sz="1200" dirty="0" err="1" smtClean="0">
+                <a:latin typeface="Courier New" pitchFamily="49" charset="0"/>
+                <a:cs typeface="Courier New" pitchFamily="49" charset="0"/>
+              </a:rPr>
+              <a:t>SelectUserOutputDto</a:t>
+            </a:r>
+            <a:r>
+              <a:rPr lang="en-US" altLang="ja-JP" sz="1200" dirty="0" smtClean="0">
+                <a:latin typeface="Courier New" pitchFamily="49" charset="0"/>
+                <a:cs typeface="Courier New" pitchFamily="49" charset="0"/>
+              </a:rPr>
+              <a:t> </a:t>
+            </a:r>
+            <a:r>
+              <a:rPr lang="en-US" altLang="ja-JP" sz="1200" dirty="0" err="1" smtClean="0">
+                <a:latin typeface="Courier New" pitchFamily="49" charset="0"/>
+                <a:cs typeface="Courier New" pitchFamily="49" charset="0"/>
+              </a:rPr>
+              <a:t>selectUser</a:t>
+            </a:r>
+            <a:r>
+              <a:rPr lang="en-US" altLang="ja-JP" sz="1200" dirty="0" smtClean="0">
+                <a:latin typeface="Courier New" pitchFamily="49" charset="0"/>
+                <a:cs typeface="Courier New" pitchFamily="49" charset="0"/>
+              </a:rPr>
+              <a:t>()</a:t>
+            </a:r>
+          </a:p>
+          <a:p>
+            <a:endParaRPr lang="en-US" altLang="ja-JP" sz="1200" dirty="0" smtClean="0">
+              <a:latin typeface="Courier New" pitchFamily="49" charset="0"/>
+              <a:cs typeface="Courier New" pitchFamily="49" charset="0"/>
+            </a:endParaRPr>
+          </a:p>
+          <a:p>
+            <a:r>
+              <a:rPr lang="en-US" altLang="ja-JP" sz="1200" dirty="0" smtClean="0">
+                <a:latin typeface="Courier New" pitchFamily="49" charset="0"/>
+                <a:cs typeface="Courier New" pitchFamily="49" charset="0"/>
+              </a:rPr>
+              <a:t>}</a:t>
+            </a:r>
+          </a:p>
+          <a:p>
+            <a:endParaRPr lang="en-US" altLang="ja-JP" sz="1200" dirty="0" smtClean="0">
+              <a:solidFill>
+                <a:srgbClr val="FF0000"/>
+              </a:solidFill>
+              <a:latin typeface="Courier New" pitchFamily="49" charset="0"/>
+              <a:cs typeface="Courier New" pitchFamily="49" charset="0"/>
+            </a:endParaRPr>
+          </a:p>
+        </p:txBody>
+      </p:sp>
+      <p:sp>
+        <p:nvSpPr>
+          <p:cNvPr id="7" name="Rectangle 12"/>
+          <p:cNvSpPr>
+            <a:spLocks noChangeArrowheads="1"/>
+          </p:cNvSpPr>
+          <p:nvPr/>
+        </p:nvSpPr>
+        <p:spPr bwMode="auto">
+          <a:xfrm>
+            <a:off x="312596" y="4608420"/>
+            <a:ext cx="996083" cy="263791"/>
+          </a:xfrm>
+          <a:prstGeom prst="rect">
+            <a:avLst/>
+          </a:prstGeom>
+          <a:noFill/>
+          <a:ln w="9525">
+            <a:solidFill>
+              <a:schemeClr val="tx1"/>
+            </a:solidFill>
+            <a:miter lim="800000"/>
+            <a:headEnd/>
+            <a:tailEnd/>
+          </a:ln>
+          <a:effectLst/>
+        </p:spPr>
+        <p:txBody>
+          <a:bodyPr wrap="none" lIns="90000" tIns="46800" rIns="90000" bIns="46800">
+            <a:spAutoFit/>
+          </a:bodyPr>
+          <a:lstStyle/>
+          <a:p>
+            <a:pPr algn="r"/>
+            <a:r>
+              <a:rPr kumimoji="1" lang="en-US" altLang="ja-JP" sz="1100" dirty="0" smtClean="0"/>
+              <a:t>DAO</a:t>
+            </a:r>
+            <a:r>
+              <a:rPr kumimoji="1" lang="ja-JP" altLang="en-US" sz="1100" dirty="0" smtClean="0"/>
+              <a:t>の作成例</a:t>
+            </a:r>
+            <a:endParaRPr kumimoji="1" lang="ja-JP" altLang="en-US" sz="1100" b="0" dirty="0"/>
           </a:p>
         </p:txBody>
       </p:sp>
@@ -10888,10 +11065,6 @@
               </a:rPr>
               <a:t>Inject</a:t>
             </a:r>
-            <a:endParaRPr lang="en-US" altLang="ja-JP" sz="1000" dirty="0" smtClean="0">
-              <a:latin typeface="Tahoma" pitchFamily="34" charset="0"/>
-              <a:ea typeface="ＭＳ Ｐゴシック" charset="-128"/>
-            </a:endParaRPr>
           </a:p>
           <a:p>
             <a:r>
@@ -10899,21 +11072,7 @@
                 <a:latin typeface="Tahoma" pitchFamily="34" charset="0"/>
                 <a:ea typeface="ＭＳ Ｐゴシック" charset="-128"/>
               </a:rPr>
-              <a:t>    </a:t>
-            </a:r>
-            <a:r>
-              <a:rPr lang="en-US" altLang="ja-JP" sz="1000" dirty="0" smtClean="0">
-                <a:latin typeface="Tahoma" pitchFamily="34" charset="0"/>
-                <a:ea typeface="ＭＳ Ｐゴシック" charset="-128"/>
-              </a:rPr>
-              <a:t>@Named(value </a:t>
-            </a:r>
-            <a:r>
-              <a:rPr lang="en-US" altLang="ja-JP" sz="1000" dirty="0" smtClean="0">
-                <a:latin typeface="Tahoma" pitchFamily="34" charset="0"/>
-                <a:ea typeface="ＭＳ Ｐゴシック" charset="-128"/>
-              </a:rPr>
-              <a:t>= "</a:t>
+              <a:t>    @Named(value = "</a:t>
             </a:r>
             <a:r>
               <a:rPr lang="en-US" altLang="ja-JP" sz="1000" dirty="0" err="1" smtClean="0">
@@ -10941,7 +11100,35 @@
                 <a:latin typeface="Tahoma" pitchFamily="34" charset="0"/>
                 <a:ea typeface="ＭＳ Ｐゴシック" charset="-128"/>
               </a:rPr>
-              <a:t>    private FileQueryDAO csvFileQueryDAO = null;</a:t>
+              <a:t>    private FileQueryDAO </a:t>
+            </a:r>
+            <a:r>
+              <a:rPr kumimoji="1" lang="ja-JP" altLang="ja-JP" sz="1000" b="0" dirty="0" smtClean="0">
+                <a:latin typeface="Tahoma" pitchFamily="34" charset="0"/>
+                <a:ea typeface="ＭＳ Ｐゴシック" charset="-128"/>
+              </a:rPr>
+              <a:t>csvFileQueryD</a:t>
+            </a:r>
+            <a:r>
+              <a:rPr kumimoji="1" lang="en-US" altLang="ja-JP" sz="1000" b="0" dirty="0" err="1" smtClean="0">
+                <a:latin typeface="Tahoma" pitchFamily="34" charset="0"/>
+                <a:ea typeface="ＭＳ Ｐゴシック" charset="-128"/>
+              </a:rPr>
+              <a:t>ao</a:t>
+            </a:r>
+            <a:r>
+              <a:rPr kumimoji="1" lang="ja-JP" altLang="ja-JP" sz="1000" b="0" dirty="0" smtClean="0">
+                <a:latin typeface="Tahoma" pitchFamily="34" charset="0"/>
+                <a:ea typeface="ＭＳ Ｐゴシック" charset="-128"/>
+              </a:rPr>
+              <a:t> </a:t>
+            </a:r>
+            <a:r>
+              <a:rPr kumimoji="1" lang="ja-JP" altLang="ja-JP" sz="1000" b="0" dirty="0">
+                <a:latin typeface="Tahoma" pitchFamily="34" charset="0"/>
+                <a:ea typeface="ＭＳ Ｐゴシック" charset="-128"/>
+              </a:rPr>
+              <a:t>= null;</a:t>
             </a:r>
           </a:p>
           <a:p>
@@ -10992,7 +11179,35 @@
                 <a:latin typeface="Tahoma" pitchFamily="34" charset="0"/>
                 <a:ea typeface="ＭＳ Ｐゴシック" charset="-128"/>
               </a:rPr>
-              <a:t>        = csvFileQueryDAO.execute(basePath + </a:t>
+              <a:t>        = </a:t>
+            </a:r>
+            <a:r>
+              <a:rPr kumimoji="1" lang="ja-JP" altLang="ja-JP" sz="1000" b="0" dirty="0" smtClean="0">
+                <a:latin typeface="Tahoma" pitchFamily="34" charset="0"/>
+                <a:ea typeface="ＭＳ Ｐゴシック" charset="-128"/>
+              </a:rPr>
+              <a:t>csvFileQueryD</a:t>
+            </a:r>
+            <a:r>
+              <a:rPr kumimoji="1" lang="en-US" altLang="ja-JP" sz="1000" b="0" dirty="0" err="1" smtClean="0">
+                <a:latin typeface="Tahoma" pitchFamily="34" charset="0"/>
+                <a:ea typeface="ＭＳ Ｐゴシック" charset="-128"/>
+              </a:rPr>
+              <a:t>ao</a:t>
+            </a:r>
+            <a:r>
+              <a:rPr kumimoji="1" lang="ja-JP" altLang="ja-JP" sz="1000" b="0" dirty="0" err="1" smtClean="0">
+                <a:latin typeface="Tahoma" pitchFamily="34" charset="0"/>
+                <a:ea typeface="ＭＳ Ｐゴシック" charset="-128"/>
+              </a:rPr>
+              <a:t>.</a:t>
+            </a:r>
+            <a:r>
+              <a:rPr kumimoji="1" lang="ja-JP" altLang="ja-JP" sz="1000" b="0" dirty="0">
+                <a:latin typeface="Tahoma" pitchFamily="34" charset="0"/>
+                <a:ea typeface="ＭＳ Ｐゴシック" charset="-128"/>
+              </a:rPr>
+              <a:t>execute(basePath + </a:t>
             </a:r>
             <a:r>
               <a:rPr kumimoji="1" lang="ja-JP" altLang="ja-JP" sz="1000" b="0" dirty="0">
@@ -11945,7 +12160,7 @@
             </a:r>
             <a:r>
               <a:rPr lang="ja-JP" altLang="en-US" dirty="0" smtClean="0"/>
-              <a:t>と</a:t>
+              <a:t>のみを利用して実装した場合と</a:t>
             </a:r>
             <a:r>
               <a:rPr lang="ja-JP" altLang="en-US" dirty="0" smtClean="0"/>
@@ -12032,7 +12247,7 @@
         </p:nvSpPr>
         <p:spPr bwMode="auto">
           <a:xfrm>
-            <a:off x="200472" y="2564904"/>
+            <a:off x="200472" y="2628275"/>
             <a:ext cx="8928992" cy="3528392"/>
           </a:xfrm>
           <a:prstGeom prst="rect">
@@ -12341,7 +12556,7 @@
                 <a:latin typeface="Courier New" pitchFamily="49" charset="0"/>
                 <a:cs typeface="Courier New" pitchFamily="49" charset="0"/>
               </a:rPr>
-              <a:t>collecttUserList</a:t>
+              <a:t>collectUserList</a:t>
             </a:r>
             <a:r>
               <a:rPr lang="en-US" altLang="ja-JP" sz="1200" b="1" dirty="0" smtClean="0">
@@ -12777,82 +12992,75 @@
                 <a:latin typeface="Tahoma" pitchFamily="34" charset="0"/>
                 <a:ea typeface="ＭＳ ゴシック" pitchFamily="49" charset="-128"/>
               </a:rPr>
-              <a:t>@Inject</a:t>
+              <a:t>@</a:t>
+            </a:r>
+            <a:r>
+              <a:rPr lang="en-US" altLang="ja-JP" sz="1000" dirty="0" smtClean="0">
+                <a:latin typeface="Tahoma" pitchFamily="34" charset="0"/>
+                <a:ea typeface="ＭＳ ゴシック" pitchFamily="49" charset="-128"/>
+              </a:rPr>
+              <a:t>Inject</a:t>
+            </a:r>
+          </a:p>
+          <a:p>
+            <a:r>
+              <a:rPr lang="en-US" altLang="ja-JP" sz="1000" dirty="0" smtClean="0">
+                <a:latin typeface="Tahoma" pitchFamily="34" charset="0"/>
+                <a:ea typeface="ＭＳ ゴシック" pitchFamily="49" charset="-128"/>
+              </a:rPr>
+              <a:t>    @Named(“</a:t>
+            </a:r>
+            <a:r>
+              <a:rPr lang="en-US" altLang="ja-JP" sz="1000" dirty="0" err="1" smtClean="0">
+                <a:latin typeface="Tahoma" pitchFamily="34" charset="0"/>
+                <a:ea typeface="ＭＳ ゴシック" pitchFamily="49" charset="-128"/>
+              </a:rPr>
+              <a:t>beanValidator</a:t>
+            </a:r>
+            <a:r>
+              <a:rPr lang="en-US" altLang="ja-JP" sz="1000" dirty="0" smtClean="0">
+                <a:latin typeface="Tahoma" pitchFamily="34" charset="0"/>
+                <a:ea typeface="ＭＳ ゴシック" pitchFamily="49" charset="-128"/>
+              </a:rPr>
+              <a:t>")</a:t>
+            </a:r>
+          </a:p>
+          <a:p>
+            <a:r>
+              <a:rPr lang="en-US" altLang="ja-JP" sz="1000" dirty="0" smtClean="0">
+                <a:latin typeface="Tahoma" pitchFamily="34" charset="0"/>
+                <a:ea typeface="ＭＳ ゴシック" pitchFamily="49" charset="-128"/>
+              </a:rPr>
+              <a:t>    private Validator </a:t>
+            </a:r>
+            <a:r>
+              <a:rPr lang="en-US" altLang="ja-JP" sz="1000" dirty="0" err="1" smtClean="0">
+                <a:latin typeface="Tahoma" pitchFamily="34" charset="0"/>
+                <a:ea typeface="ＭＳ ゴシック" pitchFamily="49" charset="-128"/>
+              </a:rPr>
+              <a:t>validator</a:t>
+            </a:r>
+            <a:r>
+              <a:rPr lang="en-US" altLang="ja-JP" sz="1000" dirty="0" smtClean="0">
+                <a:latin typeface="Tahoma" pitchFamily="34" charset="0"/>
+                <a:ea typeface="ＭＳ ゴシック" pitchFamily="49" charset="-128"/>
+              </a:rPr>
+              <a:t>;</a:t>
+            </a:r>
+          </a:p>
+          <a:p>
+            <a:pPr algn="l"/>
+            <a:r>
+              <a:rPr lang="en-US" altLang="ja-JP" sz="1000" dirty="0" smtClean="0">
+                <a:latin typeface="Tahoma" pitchFamily="34" charset="0"/>
+                <a:ea typeface="ＭＳ Ｐゴシック" charset="-128"/>
+              </a:rPr>
+              <a:t>    </a:t>
             </a:r>
             <a:endParaRPr lang="en-US" altLang="ja-JP" sz="1000" dirty="0" smtClean="0">
               <a:latin typeface="Tahoma" pitchFamily="34" charset="0"/>
-              <a:ea typeface="ＭＳ ゴシック" pitchFamily="49" charset="-128"/>
+              <a:ea typeface="ＭＳ Ｐゴシック" charset="-128"/>
             </a:endParaRPr>
-          </a:p>
-          <a:p>
-            <a:r>
-              <a:rPr lang="en-US" altLang="ja-JP" sz="1000" dirty="0" smtClean="0">
-                <a:latin typeface="Tahoma" pitchFamily="34" charset="0"/>
-                <a:ea typeface="ＭＳ ゴシック" pitchFamily="49" charset="-128"/>
-              </a:rPr>
-              <a:t>    </a:t>
-            </a:r>
-            <a:r>
-              <a:rPr lang="en-US" altLang="ja-JP" sz="1000" dirty="0" smtClean="0">
-                <a:latin typeface="Tahoma" pitchFamily="34" charset="0"/>
-                <a:ea typeface="ＭＳ ゴシック" pitchFamily="49" charset="-128"/>
-              </a:rPr>
-              <a:t>@Named(“validator</a:t>
-            </a:r>
-            <a:r>
-              <a:rPr lang="en-US" altLang="ja-JP" sz="1000" dirty="0" smtClean="0">
-                <a:latin typeface="Tahoma" pitchFamily="34" charset="0"/>
-                <a:ea typeface="ＭＳ ゴシック" pitchFamily="49" charset="-128"/>
-              </a:rPr>
-              <a:t>")</a:t>
-            </a:r>
-          </a:p>
-          <a:p>
-            <a:r>
-              <a:rPr lang="en-US" altLang="ja-JP" sz="1000" dirty="0" smtClean="0">
-                <a:latin typeface="Tahoma" pitchFamily="34" charset="0"/>
-                <a:ea typeface="ＭＳ ゴシック" pitchFamily="49" charset="-128"/>
-              </a:rPr>
-              <a:t>    private </a:t>
-            </a:r>
-            <a:r>
-              <a:rPr lang="en-US" altLang="ja-JP" sz="1000" dirty="0" err="1" smtClean="0">
-                <a:latin typeface="Tahoma" pitchFamily="34" charset="0"/>
-                <a:ea typeface="ＭＳ ゴシック" pitchFamily="49" charset="-128"/>
-              </a:rPr>
-              <a:t>Validator</a:t>
-            </a:r>
-            <a:r>
-              <a:rPr lang="en-US" altLang="ja-JP" sz="1000" dirty="0" smtClean="0">
-                <a:latin typeface="Tahoma" pitchFamily="34" charset="0"/>
-                <a:ea typeface="ＭＳ ゴシック" pitchFamily="49" charset="-128"/>
-              </a:rPr>
-              <a:t> </a:t>
-            </a:r>
-            <a:r>
-              <a:rPr lang="en-US" altLang="ja-JP" sz="1000" dirty="0" err="1" smtClean="0">
-                <a:latin typeface="Tahoma" pitchFamily="34" charset="0"/>
-                <a:ea typeface="ＭＳ ゴシック" pitchFamily="49" charset="-128"/>
-              </a:rPr>
-              <a:t>validator</a:t>
-            </a:r>
-            <a:r>
-              <a:rPr lang="en-US" altLang="ja-JP" sz="1000" dirty="0" smtClean="0">
-                <a:latin typeface="Tahoma" pitchFamily="34" charset="0"/>
-                <a:ea typeface="ＭＳ ゴシック" pitchFamily="49" charset="-128"/>
-              </a:rPr>
-              <a:t>;</a:t>
-            </a:r>
-          </a:p>
-          <a:p>
-            <a:pPr algn="l"/>
-            <a:r>
-              <a:rPr lang="en-US" altLang="ja-JP" sz="1000" dirty="0" smtClean="0">
-                <a:latin typeface="Tahoma" pitchFamily="34" charset="0"/>
-                <a:ea typeface="ＭＳ Ｐゴシック" charset="-128"/>
-              </a:rPr>
-              <a:t>    </a:t>
-            </a:r>
           </a:p>
           <a:p>
             <a:pPr algn="l"/>
@@ -13044,14 +13252,7 @@
                 <a:latin typeface="Tahoma" pitchFamily="34" charset="0"/>
                 <a:ea typeface="ＭＳ ゴシック" pitchFamily="49" charset="-128"/>
               </a:rPr>
-              <a:t>, “colletData01</a:t>
-            </a:r>
-            <a:r>
-              <a:rPr lang="en-US" altLang="ja-JP" sz="1000" dirty="0" smtClean="0">
-                <a:latin typeface="Tahoma" pitchFamily="34" charset="0"/>
-                <a:ea typeface="ＭＳ ゴシック" pitchFamily="49" charset="-128"/>
-              </a:rPr>
-              <a:t>", null, </a:t>
+              <a:t>, “colletData01", null, </a:t>
             </a:r>
             <a:r>
               <a:rPr lang="en-US" altLang="ja-JP" sz="1000" dirty="0" smtClean="0">
@@ -13470,14 +13671,21 @@
                 <a:latin typeface="Arial" charset="0"/>
                 <a:ea typeface="ＭＳ Ｐゴシック" charset="-128"/>
               </a:rPr>
-              <a:t>を生成する。第四引数に入力チェックを行う</a:t>
-            </a:r>
-            <a:r>
-              <a:rPr lang="en-US" altLang="ja-JP" sz="1000" dirty="0" err="1" smtClean="0">
+              <a:t>を生成する。第四引数に入力チェックを</a:t>
+            </a:r>
+            <a:r>
+              <a:rPr lang="ja-JP" altLang="en-US" sz="1000" dirty="0" smtClean="0">
                 <a:latin typeface="Arial" charset="0"/>
                 <a:ea typeface="ＭＳ Ｐゴシック" charset="-128"/>
               </a:rPr>
-              <a:t>BeanValidator</a:t>
+              <a:t>行う</a:t>
+            </a:r>
+            <a:r>
+              <a:rPr lang="en-US" altLang="ja-JP" sz="1000" dirty="0" smtClean="0">
+                <a:latin typeface="Arial" charset="0"/>
+                <a:ea typeface="ＭＳ Ｐゴシック" charset="-128"/>
+              </a:rPr>
+              <a:t>Validator</a:t>
             </a:r>
             <a:r>
               <a:rPr lang="ja-JP" altLang="en-US" sz="1000" dirty="0" smtClean="0">
@@ -13509,7 +13717,7 @@
         </p:nvGraphicFramePr>
         <p:xfrm>
           <a:off x="5889104" y="1080505"/>
-          <a:ext cx="3806056" cy="4070732"/>
+          <a:ext cx="3806056" cy="4066668"/>
         </p:xfrm>
         <a:graphic>
           <a:graphicData uri="http://schemas.openxmlformats.org/drawingml/2006/table">
@@ -16865,30 +17073,7 @@
                   </a:schemeClr>
                 </a:solidFill>
               </a:rPr>
-              <a:t>処理設計書との親和性が高いです</a:t>
-            </a:r>
-            <a:endParaRPr lang="en-US" altLang="ja-JP" sz="1600" dirty="0" smtClean="0">
-              <a:solidFill>
-                <a:schemeClr val="bg1">
-                  <a:lumMod val="10000"/>
-                </a:schemeClr>
-              </a:solidFill>
-            </a:endParaRPr>
-          </a:p>
-          <a:p>
-            <a:pPr>
-              <a:buFont typeface="Arial" pitchFamily="34" charset="0"/>
-              <a:buChar char="•"/>
-            </a:pPr>
-            <a:r>
-              <a:rPr kumimoji="1" lang="en-US" altLang="ja-JP" sz="1600" dirty="0" err="1" smtClean="0">
-                <a:solidFill>
-                  <a:schemeClr val="bg1">
-                    <a:lumMod val="10000"/>
-                  </a:schemeClr>
-                </a:solidFill>
-              </a:rPr>
-              <a:t>Visc</a:t>
+              <a:t>処理設計書との親和性が高い</a:t>
             </a:r>
             <a:r>
               <a:rPr lang="ja-JP" altLang="en-US" sz="1600" dirty="0" smtClean="0">
@@ -16898,9 +17083,9 @@
                   </a:schemeClr>
                 </a:solidFill>
               </a:rPr>
-              <a:t>に採用されています</a:t>
-            </a:r>
-            <a:endParaRPr kumimoji="1" lang="ja-JP" altLang="en-US" sz="1600" dirty="0">
+              <a:t>です</a:t>
+            </a:r>
+            <a:endParaRPr lang="en-US" altLang="ja-JP" sz="1600" dirty="0" smtClean="0">
               <a:solidFill>
                 <a:schemeClr val="bg1">
                   <a:lumMod val="10000"/>
@@ -16935,11 +17120,15 @@
             </a:r>
             <a:r>
               <a:rPr kumimoji="1" lang="en-US" altLang="ja-JP" dirty="0" smtClean="0"/>
-              <a:t>3.x</a:t>
+              <a:t>3.5.0</a:t>
             </a:r>
             <a:r>
               <a:rPr kumimoji="1" lang="ja-JP" altLang="en-US" dirty="0" smtClean="0"/>
-              <a:t>アーキテクチャのコンセプト</a:t>
+              <a:t>アーキテクチャ</a:t>
+            </a:r>
+            <a:r>
+              <a:rPr kumimoji="1" lang="ja-JP" altLang="en-US" dirty="0" smtClean="0"/>
+              <a:t>のコンセプト</a:t>
             </a:r>
             <a:endParaRPr kumimoji="1" lang="ja-JP" altLang="en-US" dirty="0"/>
           </a:p>
@@ -16947,7 +17136,7 @@
       </p:sp>
       <p:pic>
         <p:nvPicPr>
-          <p:cNvPr id="4098" name="Picture 2"/>
+          <p:cNvPr id="6" name="Picture 2"/>
           <p:cNvPicPr>
             <a:picLocks noChangeAspect="1" noChangeArrowheads="1"/>
           </p:cNvPicPr>
@@ -16968,8 +17157,8 @@
         </p:blipFill>
         <p:spPr bwMode="auto">
           <a:xfrm>
-            <a:off x="251949" y="2659317"/>
-            <a:ext cx="9380926" cy="4078977"/>
+            <a:off x="987703" y="2675837"/>
+            <a:ext cx="7661081" cy="3828925"/>
           </a:xfrm>
           <a:prstGeom prst="rect">
             <a:avLst/>
@@ -17104,14 +17293,14 @@
           <p:nvPr>
             <p:extLst>
               <p:ext uri="{D42A27DB-BD31-4B8C-83A1-F6EECF244321}">
-                <p14:modId xmlns:p14="http://schemas.microsoft.com/office/powerpoint/2010/main" val="1179424584"/>
+                <p14:modId xmlns:p14="http://schemas.microsoft.com/office/powerpoint/2010/main" val="2875161230"/>
               </p:ext>
             </p:extLst>
           </p:nvPr>
         </p:nvGraphicFramePr>
         <p:xfrm>
           <a:off x="380968" y="1484784"/>
-          <a:ext cx="9110902" cy="3116500"/>
+          <a:ext cx="9110902" cy="3279527"/>
         </p:xfrm>
         <a:graphic>
           <a:graphicData uri="http://schemas.openxmlformats.org/drawingml/2006/table">
@@ -17273,23 +17462,18 @@
                       </a:r>
                       <a:r>
                         <a:rPr kumimoji="1" lang="ja-JP" altLang="en-US" sz="1200" dirty="0" smtClean="0"/>
-                        <a:t>を</a:t>
+                        <a:t>を利用し、データベースアクセスを行う</a:t>
+                      </a:r>
+                      <a:endParaRPr kumimoji="1" lang="en-US" altLang="ja-JP" sz="1200" dirty="0" smtClean="0"/>
+                    </a:p>
+                    <a:p>
+                      <a:r>
+                        <a:rPr kumimoji="1" lang="en-US" altLang="ja-JP" sz="1200" dirty="0" smtClean="0"/>
+                        <a:t>TERASOLUNA Server Framework for Java ver.5.x</a:t>
                       </a:r>
                       <a:r>
                         <a:rPr kumimoji="1" lang="ja-JP" altLang="en-US" sz="1200" dirty="0" smtClean="0"/>
-                        <a:t>利用した、</a:t>
-                      </a:r>
-                      <a:r>
-                        <a:rPr kumimoji="1" lang="en-US" altLang="ja-JP" sz="1200" dirty="0" smtClean="0"/>
-                        <a:t>OR</a:t>
-                      </a:r>
-                      <a:r>
-                        <a:rPr kumimoji="1" lang="ja-JP" altLang="en-US" sz="1200" dirty="0" smtClean="0"/>
-                        <a:t>マッピング</a:t>
-                      </a:r>
-                      <a:r>
-                        <a:rPr kumimoji="1" lang="ja-JP" altLang="en-US" sz="1200" dirty="0" smtClean="0"/>
-                        <a:t>機能</a:t>
+                        <a:t>と同じものを利用する</a:t>
                       </a:r>
                       <a:endParaRPr kumimoji="1" lang="en-US" altLang="ja-JP" sz="1200" dirty="0" smtClean="0"/>
                     </a:p>
@@ -17323,11 +17507,7 @@
                       </a:r>
                       <a:r>
                         <a:rPr kumimoji="1" lang="ja-JP" altLang="en-US" sz="1200" dirty="0" smtClean="0"/>
-                        <a:t>や固定長ファイルを、オブジェクトにマッピングする</a:t>
-                      </a:r>
-                      <a:r>
-                        <a:rPr kumimoji="1" lang="ja-JP" altLang="en-US" sz="1200" dirty="0" smtClean="0"/>
-                        <a:t>機能</a:t>
+                        <a:t>や固定長ファイルを、オブジェクトにマッピングする機能</a:t>
                       </a:r>
                       <a:endParaRPr kumimoji="1" lang="ja-JP" altLang="en-US" sz="1200" dirty="0"/>
                     </a:p>
@@ -17381,11 +17561,7 @@
                       </a:pPr>
                       <a:r>
                         <a:rPr kumimoji="1" lang="ja-JP" altLang="en-US" sz="1200" dirty="0" smtClean="0"/>
-                        <a:t>・大量データ取得時にメモリを大量消費しない（フェッチサイズ分のみ</a:t>
-                      </a:r>
-                      <a:r>
-                        <a:rPr kumimoji="1" lang="ja-JP" altLang="en-US" sz="1200" dirty="0" smtClean="0"/>
-                        <a:t>）</a:t>
+                        <a:t>・大量データ取得時にメモリを大量消費しない（フェッチサイズ分のみ）</a:t>
                       </a:r>
                       <a:endParaRPr kumimoji="1" lang="en-US" altLang="ja-JP" sz="1200" dirty="0" smtClean="0"/>
                     </a:p>
@@ -19725,7 +19901,7 @@
             <a:graphicData uri="http://schemas.openxmlformats.org/presentationml/2006/ole">
               <mc:AlternateContent xmlns:mc="http://schemas.openxmlformats.org/markup-compatibility/2006">
                 <mc:Choice xmlns:v="urn:schemas-microsoft-com:vml" Requires="v">
-                  <p:oleObj spid="_x0000_s2055" name="Visio" r:id="rId4" imgW="1046607" imgH="1232154" progId="">
+                  <p:oleObj spid="_x0000_s2057" name="Visio" r:id="rId4" imgW="1046607" imgH="1232154" progId="">
                     <p:embed/>
                   </p:oleObj>
                 </mc:Choice>
@@ -23633,7 +23809,7 @@
             <a:graphicData uri="http://schemas.openxmlformats.org/presentationml/2006/ole">
               <mc:AlternateContent xmlns:mc="http://schemas.openxmlformats.org/markup-compatibility/2006">
                 <mc:Choice xmlns:v="urn:schemas-microsoft-com:vml" Requires="v">
-                  <p:oleObj spid="_x0000_s3079" name="Visio" r:id="rId3" imgW="1046765" imgH="1232170" progId="">
+                  <p:oleObj spid="_x0000_s3081" name="Visio" r:id="rId3" imgW="1046765" imgH="1232170" progId="">
                     <p:embed/>
                   </p:oleObj>
                 </mc:Choice>
@@ -25684,14 +25860,7 @@
                 <a:latin typeface="Tahoma" pitchFamily="34" charset="0"/>
                 <a:ea typeface="ＭＳ Ｐゴシック" charset="-128"/>
               </a:rPr>
-              <a:t>(B000002BLogic.class</a:t>
-            </a:r>
-            <a:r>
-              <a:rPr kumimoji="1" lang="en-US" altLang="ja-JP" sz="1200" dirty="0" smtClean="0">
-                <a:latin typeface="Tahoma" pitchFamily="34" charset="0"/>
-                <a:ea typeface="ＭＳ Ｐゴシック" charset="-128"/>
-              </a:rPr>
-              <a:t>);</a:t>
+              <a:t>(B000002BLogic.class);</a:t>
             </a:r>
             <a:endParaRPr kumimoji="1" lang="en-US" altLang="ja-JP" sz="1200" dirty="0">
               <a:latin typeface="Tahoma" pitchFamily="34" charset="0"/>
@@ -25746,14 +25915,7 @@
                 <a:latin typeface="Tahoma" pitchFamily="34" charset="0"/>
                 <a:ea typeface="ＭＳ Ｐゴシック" charset="-128"/>
               </a:rPr>
-              <a:t>protected </a:t>
-            </a:r>
-            <a:r>
-              <a:rPr kumimoji="1" lang="en-US" altLang="ja-JP" sz="1200" dirty="0" smtClean="0">
-                <a:latin typeface="Tahoma" pitchFamily="34" charset="0"/>
-                <a:ea typeface="ＭＳ Ｐゴシック" charset="-128"/>
-              </a:rPr>
-              <a:t>B000002Dao </a:t>
+              <a:t>protected B000002Dao </a:t>
             </a:r>
             <a:r>
               <a:rPr kumimoji="1" lang="en-US" altLang="ja-JP" sz="1200" dirty="0" err="1" smtClean="0">
@@ -25970,21 +26132,7 @@
                 <a:latin typeface="Tahoma" pitchFamily="34" charset="0"/>
                 <a:ea typeface="ＭＳ Ｐゴシック" charset="-128"/>
               </a:rPr>
-              <a:t>       </a:t>
-            </a:r>
-            <a:r>
-              <a:rPr kumimoji="1" lang="en-US" altLang="ja-JP" sz="1200" dirty="0" smtClean="0">
-                <a:latin typeface="Tahoma" pitchFamily="34" charset="0"/>
-                <a:ea typeface="ＭＳ Ｐゴシック" charset="-128"/>
-              </a:rPr>
-              <a:t>b000002Dao.</a:t>
-            </a:r>
-            <a:r>
-              <a:rPr kumimoji="1" lang="en-US" altLang="ja-JP" sz="1200" dirty="0" smtClean="0">
-                <a:latin typeface="Tahoma" pitchFamily="34" charset="0"/>
-                <a:ea typeface="ＭＳ Ｐゴシック" charset="-128"/>
-              </a:rPr>
-              <a:t>insertUser(</a:t>
+              <a:t>       b000002Dao.insertUser(</a:t>
             </a:r>
             <a:r>
               <a:rPr kumimoji="1" lang="en-US" altLang="ja-JP" sz="1200" dirty="0" err="1" smtClean="0">
@@ -26351,10 +26499,6 @@
               </a:rPr>
               <a:t>@Inject</a:t>
             </a:r>
-            <a:endParaRPr lang="en-US" altLang="ja-JP" sz="1100" dirty="0" smtClean="0">
-              <a:latin typeface="Tahoma" pitchFamily="34" charset="0"/>
-              <a:ea typeface="ＭＳ Ｐゴシック" charset="-128"/>
-            </a:endParaRPr>
           </a:p>
           <a:p>
             <a:r>

</xml_diff>

<commit_message>
#22 convert File Dao to File DAO
</commit_message>
<xml_diff>
--- a/architecture/TERASOLUNA Batch Framework for Java Version 3.x 説明資料.pptx
+++ b/architecture/TERASOLUNA Batch Framework for Java Version 3.x 説明資料.pptx
@@ -33,13 +33,13 @@
   <p:notesSz cx="6794500" cy="9931400"/>
   <p:embeddedFontLst>
     <p:embeddedFont>
-      <p:font typeface="Tahoma" panose="020B0604030504040204" pitchFamily="34" charset="0"/>
+      <p:font typeface="HGP創英角ｺﾞｼｯｸUB" panose="020B0900000000000000" pitchFamily="50" charset="-128"/>
       <p:regular r:id="rId21"/>
-      <p:bold r:id="rId22"/>
     </p:embeddedFont>
     <p:embeddedFont>
-      <p:font typeface="HGP創英角ｺﾞｼｯｸUB" panose="020B0900000000000000" pitchFamily="50" charset="-128"/>
-      <p:regular r:id="rId23"/>
+      <p:font typeface="Tahoma" panose="020B0604030504040204" pitchFamily="34" charset="0"/>
+      <p:regular r:id="rId22"/>
+      <p:bold r:id="rId23"/>
     </p:embeddedFont>
     <p:embeddedFont>
       <p:font typeface="HGPｺﾞｼｯｸE" panose="020B0900000000000000" pitchFamily="50" charset="-128"/>
@@ -234,7 +234,7 @@
             <a:fld id="{BB253DA6-D017-4D4C-A6F0-8D6175E3AD1A}" type="datetime1">
               <a:rPr lang="ja-JP" altLang="en-US" smtClean="0"/>
               <a:pPr/>
-              <a:t>2015/2/2</a:t>
+              <a:t>2015/2/6</a:t>
             </a:fld>
             <a:endParaRPr lang="en-US"/>
           </a:p>
@@ -402,7 +402,7 @@
             <a:fld id="{971E307F-04E7-4216-B3F9-BBF58478B729}" type="datetime1">
               <a:rPr lang="ja-JP" altLang="en-US" smtClean="0"/>
               <a:pPr/>
-              <a:t>2015/2/2</a:t>
+              <a:t>2015/2/6</a:t>
             </a:fld>
             <a:endParaRPr lang="en-US"/>
           </a:p>
@@ -760,7 +760,7 @@
             <a:fld id="{BB7B7D7C-7587-458D-9F40-96275B4E0BF8}" type="datetime1">
               <a:rPr lang="ja-JP" altLang="en-US" smtClean="0"/>
               <a:pPr/>
-              <a:t>2015/2/2</a:t>
+              <a:t>2015/2/6</a:t>
             </a:fld>
             <a:endParaRPr lang="en-US"/>
           </a:p>
@@ -978,7 +978,7 @@
             <a:fld id="{79DDA3DF-8EBA-4683-A96B-9C379AE68A32}" type="datetime1">
               <a:rPr lang="ja-JP" altLang="en-US" smtClean="0"/>
               <a:pPr/>
-              <a:t>2015/2/2</a:t>
+              <a:t>2015/2/6</a:t>
             </a:fld>
             <a:endParaRPr lang="en-US"/>
           </a:p>
@@ -12550,14 +12550,14 @@
                 <a:latin typeface="Tahoma" pitchFamily="34" charset="0"/>
                 <a:ea typeface="ＭＳ Ｐゴシック" charset="-128"/>
               </a:rPr>
-              <a:t>csvFileQueryD</a:t>
-            </a:r>
-            <a:r>
-              <a:rPr kumimoji="1" lang="en-US" altLang="ja-JP" sz="1000" b="0" dirty="0" err="1" smtClean="0">
-                <a:latin typeface="Tahoma" pitchFamily="34" charset="0"/>
-                <a:ea typeface="ＭＳ Ｐゴシック" charset="-128"/>
-              </a:rPr>
-              <a:t>ao</a:t>
+              <a:t>csvFileQuery</a:t>
+            </a:r>
+            <a:r>
+              <a:rPr kumimoji="1" lang="en-US" altLang="ja-JP" sz="1000" b="0" dirty="0" smtClean="0">
+                <a:latin typeface="Tahoma" pitchFamily="34" charset="0"/>
+                <a:ea typeface="ＭＳ Ｐゴシック" charset="-128"/>
+              </a:rPr>
+              <a:t>DAO</a:t>
             </a:r>
             <a:r>
               <a:rPr kumimoji="1" lang="ja-JP" altLang="ja-JP" sz="1000" b="0" dirty="0" smtClean="0">
@@ -12629,14 +12629,14 @@
                 <a:latin typeface="Tahoma" pitchFamily="34" charset="0"/>
                 <a:ea typeface="ＭＳ Ｐゴシック" charset="-128"/>
               </a:rPr>
-              <a:t>csvFileQueryD</a:t>
-            </a:r>
-            <a:r>
-              <a:rPr kumimoji="1" lang="en-US" altLang="ja-JP" sz="1000" b="0" dirty="0" err="1" smtClean="0">
-                <a:latin typeface="Tahoma" pitchFamily="34" charset="0"/>
-                <a:ea typeface="ＭＳ Ｐゴシック" charset="-128"/>
-              </a:rPr>
-              <a:t>ao</a:t>
+              <a:t>csvFileQuery</a:t>
+            </a:r>
+            <a:r>
+              <a:rPr kumimoji="1" lang="en-US" altLang="ja-JP" sz="1000" b="0" dirty="0" smtClean="0">
+                <a:latin typeface="Tahoma" pitchFamily="34" charset="0"/>
+                <a:ea typeface="ＭＳ Ｐゴシック" charset="-128"/>
+              </a:rPr>
+              <a:t>DAO</a:t>
             </a:r>
             <a:r>
               <a:rPr kumimoji="1" lang="ja-JP" altLang="ja-JP" sz="1000" b="0" dirty="0" err="1" smtClean="0">
@@ -21521,7 +21521,7 @@
             <a:graphicData uri="http://schemas.openxmlformats.org/presentationml/2006/ole">
               <mc:AlternateContent xmlns:mc="http://schemas.openxmlformats.org/markup-compatibility/2006">
                 <mc:Choice xmlns:v="urn:schemas-microsoft-com:vml" Requires="v">
-                  <p:oleObj spid="_x0000_s2065" name="Visio" r:id="rId4" imgW="1046607" imgH="1232154" progId="">
+                  <p:oleObj spid="_x0000_s2066" name="Visio" r:id="rId4" imgW="1046607" imgH="1232154" progId="">
                     <p:embed/>
                   </p:oleObj>
                 </mc:Choice>
@@ -25429,7 +25429,7 @@
             <a:graphicData uri="http://schemas.openxmlformats.org/presentationml/2006/ole">
               <mc:AlternateContent xmlns:mc="http://schemas.openxmlformats.org/markup-compatibility/2006">
                 <mc:Choice xmlns:v="urn:schemas-microsoft-com:vml" Requires="v">
-                  <p:oleObj spid="_x0000_s3089" name="Visio" r:id="rId3" imgW="1046765" imgH="1232170" progId="">
+                  <p:oleObj spid="_x0000_s3090" name="Visio" r:id="rId3" imgW="1046765" imgH="1232170" progId="">
                     <p:embed/>
                   </p:oleObj>
                 </mc:Choice>

</xml_diff>

<commit_message>
#22 delete semicolon from SQL Mapper
</commit_message>
<xml_diff>
--- a/architecture/TERASOLUNA Batch Framework for Java Version 3.x 説明資料.pptx
+++ b/architecture/TERASOLUNA Batch Framework for Java Version 3.x 説明資料.pptx
@@ -33,13 +33,13 @@
   <p:notesSz cx="6794500" cy="9931400"/>
   <p:embeddedFontLst>
     <p:embeddedFont>
-      <p:font typeface="HGP創英角ｺﾞｼｯｸUB" panose="020B0900000000000000" pitchFamily="50" charset="-128"/>
+      <p:font typeface="Tahoma" panose="020B0604030504040204" pitchFamily="34" charset="0"/>
       <p:regular r:id="rId21"/>
+      <p:bold r:id="rId22"/>
     </p:embeddedFont>
     <p:embeddedFont>
-      <p:font typeface="Tahoma" panose="020B0604030504040204" pitchFamily="34" charset="0"/>
-      <p:regular r:id="rId22"/>
-      <p:bold r:id="rId23"/>
+      <p:font typeface="HGP創英角ｺﾞｼｯｸUB" panose="020B0900000000000000" pitchFamily="50" charset="-128"/>
+      <p:regular r:id="rId23"/>
     </p:embeddedFont>
     <p:embeddedFont>
       <p:font typeface="HGPｺﾞｼｯｸE" panose="020B0900000000000000" pitchFamily="50" charset="-128"/>
@@ -8738,8 +8738,21 @@
                 <a:ea typeface="ＭＳ Ｐゴシック" charset="-128"/>
                 <a:cs typeface="Courier New" panose="02070309020205020404" pitchFamily="49" charset="0"/>
               </a:rPr>
-              <a:t>           USER_ID = #{id};</a:t>
-            </a:r>
+              <a:t>           USER_ID = #{id</a:t>
+            </a:r>
+            <a:r>
+              <a:rPr kumimoji="1" lang="en-US" altLang="ja-JP" sz="1100" dirty="0" smtClean="0">
+                <a:latin typeface="Courier New" panose="02070309020205020404" pitchFamily="49" charset="0"/>
+                <a:ea typeface="ＭＳ Ｐゴシック" charset="-128"/>
+                <a:cs typeface="Courier New" panose="02070309020205020404" pitchFamily="49" charset="0"/>
+              </a:rPr>
+              <a:t>}</a:t>
+            </a:r>
+            <a:endParaRPr kumimoji="1" lang="en-US" altLang="ja-JP" sz="1100" dirty="0" smtClean="0">
+              <a:latin typeface="Courier New" panose="02070309020205020404" pitchFamily="49" charset="0"/>
+              <a:ea typeface="ＭＳ Ｐゴシック" charset="-128"/>
+              <a:cs typeface="Courier New" panose="02070309020205020404" pitchFamily="49" charset="0"/>
+            </a:endParaRPr>
           </a:p>
           <a:p>
             <a:r>
@@ -9833,7 +9846,7 @@
                 <a:latin typeface="Courier New" pitchFamily="49" charset="0"/>
                 <a:cs typeface="Courier New" pitchFamily="49" charset="0"/>
               </a:rPr>
-              <a:t>interface </a:t>
+              <a:t>public interface </a:t>
             </a:r>
             <a:r>
               <a:rPr lang="en-US" altLang="ja-JP" sz="1200" dirty="0" err="1" smtClean="0">
@@ -9872,18 +9885,11 @@
           </a:p>
           <a:p>
             <a:r>
-              <a:rPr lang="en-US" altLang="ja-JP" sz="1200" dirty="0">
-                <a:latin typeface="Courier New" pitchFamily="49" charset="0"/>
-                <a:cs typeface="Courier New" pitchFamily="49" charset="0"/>
-              </a:rPr>
-              <a:t> </a:t>
-            </a:r>
-            <a:r>
               <a:rPr lang="en-US" altLang="ja-JP" sz="1200" dirty="0" smtClean="0">
                 <a:latin typeface="Courier New" pitchFamily="49" charset="0"/>
                 <a:cs typeface="Courier New" pitchFamily="49" charset="0"/>
               </a:rPr>
-              <a:t>   public </a:t>
+              <a:t>    </a:t>
             </a:r>
             <a:r>
               <a:rPr lang="en-US" altLang="ja-JP" sz="1200" dirty="0" err="1" smtClean="0">
@@ -12564,23 +12570,7 @@
                 <a:ea typeface="ＭＳ Ｐゴシック" charset="-128"/>
                 <a:cs typeface="Courier New" panose="02070309020205020404" pitchFamily="49" charset="0"/>
               </a:rPr>
-              <a:t>  </a:t>
-            </a:r>
-            <a:r>
-              <a:rPr lang="en-US" altLang="ja-JP" sz="1000" dirty="0" smtClean="0">
-                <a:latin typeface="Courier New" panose="02070309020205020404" pitchFamily="49" charset="0"/>
-                <a:ea typeface="ＭＳ Ｐゴシック" charset="-128"/>
-                <a:cs typeface="Courier New" panose="02070309020205020404" pitchFamily="49" charset="0"/>
-              </a:rPr>
-              <a:t>@</a:t>
-            </a:r>
-            <a:r>
-              <a:rPr lang="en-US" altLang="ja-JP" sz="1000" dirty="0" smtClean="0">
-                <a:latin typeface="Courier New" panose="02070309020205020404" pitchFamily="49" charset="0"/>
-                <a:ea typeface="ＭＳ Ｐゴシック" charset="-128"/>
-                <a:cs typeface="Courier New" panose="02070309020205020404" pitchFamily="49" charset="0"/>
-              </a:rPr>
-              <a:t>Named(value = "</a:t>
+              <a:t>  @Named(value = "</a:t>
             </a:r>
             <a:r>
               <a:rPr lang="en-US" altLang="ja-JP" sz="1000" dirty="0" err="1" smtClean="0">
@@ -12744,15 +12734,7 @@
                 <a:ea typeface="ＭＳ Ｐゴシック" charset="-128"/>
                 <a:cs typeface="Courier New" panose="02070309020205020404" pitchFamily="49" charset="0"/>
               </a:rPr>
-              <a:t>= </a:t>
-            </a:r>
-            <a:r>
-              <a:rPr kumimoji="1" lang="ja-JP" altLang="ja-JP" sz="1000" b="0" dirty="0" smtClean="0">
-                <a:latin typeface="Courier New" panose="02070309020205020404" pitchFamily="49" charset="0"/>
-                <a:ea typeface="ＭＳ Ｐゴシック" charset="-128"/>
-                <a:cs typeface="Courier New" panose="02070309020205020404" pitchFamily="49" charset="0"/>
-              </a:rPr>
-              <a:t>csvFileQuery</a:t>
+              <a:t>= csvFileQuery</a:t>
             </a:r>
             <a:r>
               <a:rPr kumimoji="1" lang="en-US" altLang="ja-JP" sz="1000" b="0" dirty="0" smtClean="0">
@@ -15227,11 +15209,6 @@
               </a:rPr>
               <a:t>&gt; collector = </a:t>
             </a:r>
-            <a:endParaRPr lang="en-US" altLang="ja-JP" sz="1200" dirty="0" smtClean="0">
-              <a:latin typeface="Courier New" panose="02070309020205020404" pitchFamily="49" charset="0"/>
-              <a:ea typeface="ＭＳ ゴシック" pitchFamily="49" charset="-128"/>
-              <a:cs typeface="Courier New" panose="02070309020205020404" pitchFamily="49" charset="0"/>
-            </a:endParaRPr>
           </a:p>
           <a:p>
             <a:r>
@@ -15248,7 +15225,15 @@
                 <a:ea typeface="ＭＳ ゴシック" pitchFamily="49" charset="-128"/>
                 <a:cs typeface="Courier New" panose="02070309020205020404" pitchFamily="49" charset="0"/>
               </a:rPr>
-              <a:t>               </a:t>
+              <a:t>               new </a:t>
+            </a:r>
+            <a:r>
+              <a:rPr lang="en-US" altLang="ja-JP" sz="1200" dirty="0" err="1" smtClean="0">
+                <a:latin typeface="Courier New" panose="02070309020205020404" pitchFamily="49" charset="0"/>
+                <a:ea typeface="ＭＳ ゴシック" pitchFamily="49" charset="-128"/>
+                <a:cs typeface="Courier New" panose="02070309020205020404" pitchFamily="49" charset="0"/>
+              </a:rPr>
+              <a:t>DaoValidateCollector</a:t>
             </a:r>
             <a:r>
               <a:rPr lang="en-US" altLang="ja-JP" sz="1200" dirty="0" smtClean="0">
@@ -15256,7 +15241,7 @@
                 <a:ea typeface="ＭＳ ゴシック" pitchFamily="49" charset="-128"/>
                 <a:cs typeface="Courier New" panose="02070309020205020404" pitchFamily="49" charset="0"/>
               </a:rPr>
-              <a:t>new </a:t>
+              <a:t>&lt;</a:t>
             </a:r>
             <a:r>
               <a:rPr lang="en-US" altLang="ja-JP" sz="1200" dirty="0" err="1" smtClean="0">
@@ -15264,7 +15249,7 @@
                 <a:ea typeface="ＭＳ ゴシック" pitchFamily="49" charset="-128"/>
                 <a:cs typeface="Courier New" panose="02070309020205020404" pitchFamily="49" charset="0"/>
               </a:rPr>
-              <a:t>DaoValidateCollector</a:t>
+              <a:t>UserBean</a:t>
             </a:r>
             <a:r>
               <a:rPr lang="en-US" altLang="ja-JP" sz="1200" dirty="0" smtClean="0">
@@ -15272,7 +15257,17 @@
                 <a:ea typeface="ＭＳ ゴシック" pitchFamily="49" charset="-128"/>
                 <a:cs typeface="Courier New" panose="02070309020205020404" pitchFamily="49" charset="0"/>
               </a:rPr>
-              <a:t>&lt;</a:t>
+              <a:t>&gt;(</a:t>
+            </a:r>
+          </a:p>
+          <a:p>
+            <a:r>
+              <a:rPr lang="en-US" altLang="ja-JP" sz="1200" dirty="0" smtClean="0">
+                <a:latin typeface="Courier New" panose="02070309020205020404" pitchFamily="49" charset="0"/>
+                <a:ea typeface="ＭＳ ゴシック" pitchFamily="49" charset="-128"/>
+                <a:cs typeface="Courier New" panose="02070309020205020404" pitchFamily="49" charset="0"/>
+              </a:rPr>
+              <a:t>                    </a:t>
             </a:r>
             <a:r>
               <a:rPr lang="en-US" altLang="ja-JP" sz="1200" dirty="0" err="1" smtClean="0">
@@ -15280,7 +15275,7 @@
                 <a:ea typeface="ＭＳ ゴシック" pitchFamily="49" charset="-128"/>
                 <a:cs typeface="Courier New" panose="02070309020205020404" pitchFamily="49" charset="0"/>
               </a:rPr>
-              <a:t>UserBean</a:t>
+              <a:t>this.sampleDao</a:t>
             </a:r>
             <a:r>
               <a:rPr lang="en-US" altLang="ja-JP" sz="1200" dirty="0" smtClean="0">
@@ -15288,7 +15283,7 @@
                 <a:ea typeface="ＭＳ ゴシック" pitchFamily="49" charset="-128"/>
                 <a:cs typeface="Courier New" panose="02070309020205020404" pitchFamily="49" charset="0"/>
               </a:rPr>
-              <a:t>&gt;(</a:t>
+              <a:t>, “colletData01",</a:t>
             </a:r>
           </a:p>
           <a:p>
@@ -15298,57 +15293,7 @@
                 <a:ea typeface="ＭＳ ゴシック" pitchFamily="49" charset="-128"/>
                 <a:cs typeface="Courier New" panose="02070309020205020404" pitchFamily="49" charset="0"/>
               </a:rPr>
-              <a:t>                </a:t>
-            </a:r>
-            <a:r>
-              <a:rPr lang="en-US" altLang="ja-JP" sz="1200" dirty="0" smtClean="0">
-                <a:latin typeface="Courier New" panose="02070309020205020404" pitchFamily="49" charset="0"/>
-                <a:ea typeface="ＭＳ ゴシック" pitchFamily="49" charset="-128"/>
-                <a:cs typeface="Courier New" panose="02070309020205020404" pitchFamily="49" charset="0"/>
-              </a:rPr>
-              <a:t>    </a:t>
-            </a:r>
-            <a:r>
-              <a:rPr lang="en-US" altLang="ja-JP" sz="1200" dirty="0" err="1" smtClean="0">
-                <a:latin typeface="Courier New" panose="02070309020205020404" pitchFamily="49" charset="0"/>
-                <a:ea typeface="ＭＳ ゴシック" pitchFamily="49" charset="-128"/>
-                <a:cs typeface="Courier New" panose="02070309020205020404" pitchFamily="49" charset="0"/>
-              </a:rPr>
-              <a:t>this.sampleDao</a:t>
-            </a:r>
-            <a:r>
-              <a:rPr lang="en-US" altLang="ja-JP" sz="1200" dirty="0" smtClean="0">
-                <a:latin typeface="Courier New" panose="02070309020205020404" pitchFamily="49" charset="0"/>
-                <a:ea typeface="ＭＳ ゴシック" pitchFamily="49" charset="-128"/>
-                <a:cs typeface="Courier New" panose="02070309020205020404" pitchFamily="49" charset="0"/>
-              </a:rPr>
-              <a:t>, “colletData01</a:t>
-            </a:r>
-            <a:r>
-              <a:rPr lang="en-US" altLang="ja-JP" sz="1200" dirty="0" smtClean="0">
-                <a:latin typeface="Courier New" panose="02070309020205020404" pitchFamily="49" charset="0"/>
-                <a:ea typeface="ＭＳ ゴシック" pitchFamily="49" charset="-128"/>
-                <a:cs typeface="Courier New" panose="02070309020205020404" pitchFamily="49" charset="0"/>
-              </a:rPr>
-              <a:t>",</a:t>
-            </a:r>
-          </a:p>
-          <a:p>
-            <a:r>
-              <a:rPr lang="en-US" altLang="ja-JP" sz="1200" dirty="0" smtClean="0">
-                <a:latin typeface="Courier New" panose="02070309020205020404" pitchFamily="49" charset="0"/>
-                <a:ea typeface="ＭＳ ゴシック" pitchFamily="49" charset="-128"/>
-                <a:cs typeface="Courier New" panose="02070309020205020404" pitchFamily="49" charset="0"/>
-              </a:rPr>
-              <a:t>                    null</a:t>
-            </a:r>
-            <a:r>
-              <a:rPr lang="en-US" altLang="ja-JP" sz="1200" dirty="0" smtClean="0">
-                <a:latin typeface="Courier New" panose="02070309020205020404" pitchFamily="49" charset="0"/>
-                <a:ea typeface="ＭＳ ゴシック" pitchFamily="49" charset="-128"/>
-                <a:cs typeface="Courier New" panose="02070309020205020404" pitchFamily="49" charset="0"/>
-              </a:rPr>
-              <a:t>, </a:t>
+              <a:t>                    null, </a:t>
             </a:r>
             <a:r>
               <a:rPr lang="en-US" altLang="ja-JP" sz="1200" dirty="0" smtClean="0">
@@ -15457,15 +15402,7 @@
                 <a:ea typeface="ＭＳ ゴシック" pitchFamily="49" charset="-128"/>
                 <a:cs typeface="Courier New" panose="02070309020205020404" pitchFamily="49" charset="0"/>
               </a:rPr>
-              <a:t>                </a:t>
-            </a:r>
-            <a:r>
-              <a:rPr lang="en-US" altLang="ja-JP" sz="1200" dirty="0" smtClean="0">
-                <a:latin typeface="Courier New" panose="02070309020205020404" pitchFamily="49" charset="0"/>
-                <a:ea typeface="ＭＳ ゴシック" pitchFamily="49" charset="-128"/>
-                <a:cs typeface="Courier New" panose="02070309020205020404" pitchFamily="49" charset="0"/>
-              </a:rPr>
-              <a:t>// </a:t>
+              <a:t>                // </a:t>
             </a:r>
             <a:r>
               <a:rPr lang="ja-JP" altLang="en-US" sz="1200" dirty="0" smtClean="0">
@@ -15549,15 +15486,7 @@
                 <a:ea typeface="ＭＳ Ｐゴシック" charset="-128"/>
                 <a:cs typeface="Courier New" panose="02070309020205020404" pitchFamily="49" charset="0"/>
               </a:rPr>
-              <a:t>            </a:t>
-            </a:r>
-            <a:r>
-              <a:rPr lang="en-US" altLang="ja-JP" sz="1200" dirty="0" smtClean="0">
-                <a:latin typeface="Courier New" panose="02070309020205020404" pitchFamily="49" charset="0"/>
-                <a:ea typeface="ＭＳ Ｐゴシック" charset="-128"/>
-                <a:cs typeface="Courier New" panose="02070309020205020404" pitchFamily="49" charset="0"/>
-              </a:rPr>
-              <a:t>}</a:t>
+              <a:t>            }</a:t>
             </a:r>
             <a:endParaRPr kumimoji="1" lang="en-US" altLang="ja-JP" sz="1200" b="0" dirty="0" smtClean="0">
               <a:latin typeface="Courier New" panose="02070309020205020404" pitchFamily="49" charset="0"/>
@@ -15675,37 +15604,16 @@
                 <a:latin typeface="Arial" charset="0"/>
                 <a:ea typeface="ＭＳ Ｐゴシック" charset="-128"/>
               </a:rPr>
-              <a:t>メソッド実行時に次の対象データの入力</a:t>
-            </a:r>
+              <a:t>メソッド実行時に次の対象データの入力チェックが行われる。</a:t>
+            </a:r>
+          </a:p>
+          <a:p>
             <a:r>
               <a:rPr lang="ja-JP" altLang="en-US" sz="1000" dirty="0" smtClean="0">
                 <a:latin typeface="Arial" charset="0"/>
                 <a:ea typeface="ＭＳ Ｐゴシック" charset="-128"/>
               </a:rPr>
-              <a:t>チェックが行われる。</a:t>
-            </a:r>
-          </a:p>
-          <a:p>
-            <a:r>
-              <a:rPr lang="ja-JP" altLang="en-US" sz="1000" dirty="0" smtClean="0">
-                <a:latin typeface="Arial" charset="0"/>
-                <a:ea typeface="ＭＳ Ｐゴシック" charset="-128"/>
-              </a:rPr>
-              <a:t>入力チェックエラー発生</a:t>
-            </a:r>
-            <a:r>
-              <a:rPr lang="ja-JP" altLang="en-US" sz="1000" dirty="0" smtClean="0">
-                <a:latin typeface="Arial" charset="0"/>
-                <a:ea typeface="ＭＳ Ｐゴシック" charset="-128"/>
-              </a:rPr>
-              <a:t>時</a:t>
-            </a:r>
-            <a:r>
-              <a:rPr lang="ja-JP" altLang="en-US" sz="1000" dirty="0" smtClean="0">
-                <a:latin typeface="Arial" charset="0"/>
-                <a:ea typeface="ＭＳ Ｐゴシック" charset="-128"/>
-              </a:rPr>
-              <a:t>、拡張入力チェックエラーハンドラを使用しない場合は、「</a:t>
+              <a:t>入力チェックエラー発生時、拡張入力チェックエラーハンドラを使用しない場合は、「</a:t>
             </a:r>
             <a:r>
               <a:rPr lang="en-US" altLang="ja-JP" sz="1000" dirty="0" err="1" smtClean="0">
@@ -17405,15 +17313,7 @@
                 <a:ea typeface="ＭＳ Ｐゴシック" charset="-128"/>
                 <a:cs typeface="Courier New" panose="02070309020205020404" pitchFamily="49" charset="0"/>
               </a:rPr>
-              <a:t> </a:t>
-            </a:r>
-            <a:r>
-              <a:rPr kumimoji="1" lang="en-US" altLang="ja-JP" sz="1200" b="0" dirty="0" smtClean="0">
-                <a:latin typeface="Courier New" panose="02070309020205020404" pitchFamily="49" charset="0"/>
-                <a:ea typeface="ＭＳ Ｐゴシック" charset="-128"/>
-                <a:cs typeface="Courier New" panose="02070309020205020404" pitchFamily="49" charset="0"/>
-              </a:rPr>
-              <a:t>{</a:t>
+              <a:t> {</a:t>
             </a:r>
             <a:endParaRPr kumimoji="1" lang="en-US" altLang="ja-JP" sz="1200" dirty="0" smtClean="0">
               <a:latin typeface="Courier New" panose="02070309020205020404" pitchFamily="49" charset="0"/>
@@ -17507,15 +17407,7 @@
                 <a:ea typeface="ＭＳ Ｐゴシック" charset="-128"/>
                 <a:cs typeface="Courier New" panose="02070309020205020404" pitchFamily="49" charset="0"/>
               </a:rPr>
-              <a:t>   // </a:t>
-            </a:r>
-            <a:r>
-              <a:rPr kumimoji="1" lang="en-US" altLang="ja-JP" sz="1200" dirty="0" smtClean="0">
-                <a:latin typeface="Courier New" panose="02070309020205020404" pitchFamily="49" charset="0"/>
-                <a:ea typeface="ＭＳ Ｐゴシック" charset="-128"/>
-                <a:cs typeface="Courier New" panose="02070309020205020404" pitchFamily="49" charset="0"/>
-              </a:rPr>
-              <a:t>1</a:t>
+              <a:t>   // 1</a:t>
             </a:r>
             <a:r>
               <a:rPr kumimoji="1" lang="ja-JP" altLang="en-US" sz="1200" dirty="0">
@@ -17764,15 +17656,7 @@
                 <a:ea typeface="ＭＳ Ｐゴシック" charset="-128"/>
                 <a:cs typeface="Courier New" panose="02070309020205020404" pitchFamily="49" charset="0"/>
               </a:rPr>
-              <a:t>    </a:t>
-            </a:r>
-            <a:r>
-              <a:rPr kumimoji="1" lang="en-US" altLang="ja-JP" sz="1200" b="0" dirty="0" smtClean="0">
-                <a:latin typeface="Courier New" panose="02070309020205020404" pitchFamily="49" charset="0"/>
-                <a:ea typeface="ＭＳ Ｐゴシック" charset="-128"/>
-                <a:cs typeface="Courier New" panose="02070309020205020404" pitchFamily="49" charset="0"/>
-              </a:rPr>
-              <a:t>// setter, getter</a:t>
+              <a:t>    // setter, getter</a:t>
             </a:r>
             <a:r>
               <a:rPr kumimoji="1" lang="ja-JP" altLang="en-US" sz="1200" b="0" dirty="0" smtClean="0">
@@ -18045,11 +17929,7 @@
           <a:p>
             <a:r>
               <a:rPr lang="ja-JP" altLang="en-US" dirty="0" smtClean="0"/>
-              <a:t>「キーの切り替わり」を検知する</a:t>
-            </a:r>
-            <a:r>
-              <a:rPr lang="ja-JP" altLang="en-US" dirty="0" smtClean="0"/>
-              <a:t>ユーティリティ</a:t>
+              <a:t>「キーの切り替わり」を検知するユーティリティ</a:t>
             </a:r>
             <a:r>
               <a:rPr lang="en-US" altLang="ja-JP" dirty="0" smtClean="0"/>
@@ -18065,11 +17945,7 @@
             </a:r>
             <a:r>
               <a:rPr lang="ja-JP" altLang="en-US" dirty="0" err="1" smtClean="0"/>
-              <a:t>を</a:t>
-            </a:r>
-            <a:r>
-              <a:rPr lang="ja-JP" altLang="en-US" dirty="0" err="1" smtClean="0"/>
-              <a:t>提</a:t>
+              <a:t>を提</a:t>
             </a:r>
             <a:r>
               <a:rPr lang="ja-JP" altLang="en-US" dirty="0" smtClean="0"/>
@@ -18793,35 +18669,17 @@
                 <a:latin typeface="Courier New" pitchFamily="49" charset="0"/>
                 <a:cs typeface="Courier New" pitchFamily="49" charset="0"/>
               </a:rPr>
-              <a:t>        </a:t>
-            </a:r>
+              <a:t>        }</a:t>
+            </a:r>
+          </a:p>
+          <a:p>
             <a:r>
               <a:rPr lang="en-US" altLang="ja-JP" sz="1200" dirty="0" smtClean="0">
                 <a:latin typeface="Courier New" pitchFamily="49" charset="0"/>
                 <a:cs typeface="Courier New" pitchFamily="49" charset="0"/>
               </a:rPr>
-              <a:t>}</a:t>
-            </a:r>
-          </a:p>
-          <a:p>
-            <a:r>
-              <a:rPr lang="en-US" altLang="ja-JP" sz="1200" dirty="0" smtClean="0">
-                <a:latin typeface="Courier New" pitchFamily="49" charset="0"/>
-                <a:cs typeface="Courier New" pitchFamily="49" charset="0"/>
-              </a:rPr>
-              <a:t>    </a:t>
-            </a:r>
-            <a:r>
-              <a:rPr lang="en-US" altLang="ja-JP" sz="1200" dirty="0" smtClean="0">
-                <a:latin typeface="Courier New" pitchFamily="49" charset="0"/>
-                <a:cs typeface="Courier New" pitchFamily="49" charset="0"/>
-              </a:rPr>
-              <a:t>}</a:t>
-            </a:r>
-            <a:endParaRPr lang="en-US" altLang="ja-JP" sz="1200" dirty="0" smtClean="0">
-              <a:latin typeface="Courier New" pitchFamily="49" charset="0"/>
-              <a:cs typeface="Courier New" pitchFamily="49" charset="0"/>
-            </a:endParaRPr>
+              <a:t>    }</a:t>
+            </a:r>
           </a:p>
           <a:p>
             <a:r>
@@ -18956,17 +18814,6 @@
                         </a:rPr>
                         <a:t>のメソッド</a:t>
                       </a:r>
-                      <a:endParaRPr kumimoji="0" lang="ja-JP" altLang="en-US" sz="1000" b="1" i="0" u="none" strike="noStrike" cap="none" normalizeH="0" baseline="0" dirty="0" smtClean="0">
-                        <a:ln>
-                          <a:noFill/>
-                        </a:ln>
-                        <a:solidFill>
-                          <a:schemeClr val="tx1"/>
-                        </a:solidFill>
-                        <a:effectLst/>
-                        <a:latin typeface="Times New Roman" pitchFamily="18" charset="0"/>
-                        <a:ea typeface="ＭＳ Ｐ明朝" charset="-128"/>
-                      </a:endParaRPr>
                     </a:p>
                   </a:txBody>
                   <a:tcPr marL="90000" marR="90000" marT="46800" marB="46800" horzOverflow="overflow"/>
@@ -19006,17 +18853,6 @@
                         </a:rPr>
                         <a:t>戻り値</a:t>
                       </a:r>
-                      <a:endParaRPr kumimoji="0" lang="ja-JP" altLang="en-US" sz="1000" b="1" i="0" u="none" strike="noStrike" cap="none" normalizeH="0" baseline="0" dirty="0" smtClean="0">
-                        <a:ln>
-                          <a:noFill/>
-                        </a:ln>
-                        <a:solidFill>
-                          <a:schemeClr val="tx1"/>
-                        </a:solidFill>
-                        <a:effectLst/>
-                        <a:latin typeface="Times New Roman" pitchFamily="18" charset="0"/>
-                        <a:ea typeface="ＭＳ Ｐ明朝" charset="-128"/>
-                      </a:endParaRPr>
                     </a:p>
                   </a:txBody>
                   <a:tcPr marL="90000" marR="90000" marT="46800" marB="46800" horzOverflow="overflow"/>
@@ -19550,27 +19386,7 @@
                           <a:latin typeface="ＭＳ Ｐ明朝" panose="02020600040205080304" pitchFamily="18" charset="-128"/>
                           <a:ea typeface="ＭＳ Ｐ明朝" panose="02020600040205080304" pitchFamily="18" charset="-128"/>
                         </a:rPr>
-                        <a:t>のカラムに対し、現在の値と</a:t>
-                      </a:r>
-                      <a:r>
-                        <a:rPr lang="ja-JP" altLang="en-US" sz="1000" b="0" i="0" u="none" strike="noStrike" dirty="0" smtClean="0">
-                          <a:solidFill>
-                            <a:schemeClr val="tx1"/>
-                          </a:solidFill>
-                          <a:latin typeface="ＭＳ Ｐ明朝" panose="02020600040205080304" pitchFamily="18" charset="-128"/>
-                          <a:ea typeface="ＭＳ Ｐ明朝" panose="02020600040205080304" pitchFamily="18" charset="-128"/>
-                        </a:rPr>
-                        <a:t>一つ前の</a:t>
-                      </a:r>
-                      <a:r>
-                        <a:rPr lang="ja-JP" altLang="en-US" sz="1000" b="0" i="0" u="none" strike="noStrike" dirty="0" smtClean="0">
-                          <a:solidFill>
-                            <a:schemeClr val="tx1"/>
-                          </a:solidFill>
-                          <a:latin typeface="ＭＳ Ｐ明朝" panose="02020600040205080304" pitchFamily="18" charset="-128"/>
-                          <a:ea typeface="ＭＳ Ｐ明朝" panose="02020600040205080304" pitchFamily="18" charset="-128"/>
-                        </a:rPr>
-                        <a:t>値を比較し、値が切り替わっている</a:t>
+                        <a:t>のカラムに対し、現在の値と一つ前の値を比較し、値が切り替わっている</a:t>
                       </a:r>
                       <a:r>
                         <a:rPr lang="en-US" altLang="ja-JP" sz="1000" b="0" i="0" u="none" strike="noStrike" dirty="0" smtClean="0">
@@ -19764,21 +19580,7 @@
                           <a:latin typeface="ＭＳ Ｐ明朝" panose="02020600040205080304" pitchFamily="18" charset="-128"/>
                           <a:ea typeface="ＭＳ Ｐ明朝" panose="02020600040205080304" pitchFamily="18" charset="-128"/>
                         </a:rPr>
-                        <a:t>のカラムに</a:t>
-                      </a:r>
-                      <a:r>
-                        <a:rPr lang="ja-JP" altLang="en-US" sz="1000" b="0" i="0" u="none" strike="noStrike" dirty="0" smtClean="0">
-                          <a:latin typeface="ＭＳ Ｐ明朝" panose="02020600040205080304" pitchFamily="18" charset="-128"/>
-                          <a:ea typeface="ＭＳ Ｐ明朝" panose="02020600040205080304" pitchFamily="18" charset="-128"/>
-                        </a:rPr>
-                        <a:t>対し前ブレイク</a:t>
-                      </a:r>
-                      <a:r>
-                        <a:rPr lang="ja-JP" altLang="en-US" sz="1000" b="0" i="0" u="none" strike="noStrike" dirty="0" smtClean="0">
-                          <a:latin typeface="ＭＳ Ｐ明朝" panose="02020600040205080304" pitchFamily="18" charset="-128"/>
-                          <a:ea typeface="ＭＳ Ｐ明朝" panose="02020600040205080304" pitchFamily="18" charset="-128"/>
-                        </a:rPr>
-                        <a:t>が発生した際に、キーの切り替わりが発生したカラム名と値のマップを返す</a:t>
+                        <a:t>のカラムに対し前ブレイクが発生した際に、キーの切り替わりが発生したカラム名と値のマップを返す</a:t>
                       </a:r>
                       <a:endParaRPr lang="ja-JP" altLang="en-US" sz="1000" b="0" i="0" u="none" strike="noStrike" dirty="0">
                         <a:latin typeface="ＭＳ Ｐ明朝" panose="02020600040205080304" pitchFamily="18" charset="-128"/>
@@ -23100,7 +22902,7 @@
             <a:graphicData uri="http://schemas.openxmlformats.org/presentationml/2006/ole">
               <mc:AlternateContent xmlns:mc="http://schemas.openxmlformats.org/markup-compatibility/2006">
                 <mc:Choice xmlns:v="urn:schemas-microsoft-com:vml" Requires="v">
-                  <p:oleObj spid="_x0000_s2074" name="Visio" r:id="rId4" imgW="1046607" imgH="1232154" progId="">
+                  <p:oleObj spid="_x0000_s2076" name="Visio" r:id="rId4" imgW="1046607" imgH="1232154" progId="">
                     <p:embed/>
                   </p:oleObj>
                 </mc:Choice>
@@ -27008,7 +26810,7 @@
             <a:graphicData uri="http://schemas.openxmlformats.org/presentationml/2006/ole">
               <mc:AlternateContent xmlns:mc="http://schemas.openxmlformats.org/markup-compatibility/2006">
                 <mc:Choice xmlns:v="urn:schemas-microsoft-com:vml" Requires="v">
-                  <p:oleObj spid="_x0000_s3098" name="Visio" r:id="rId3" imgW="1046765" imgH="1232170" progId="">
+                  <p:oleObj spid="_x0000_s3100" name="Visio" r:id="rId3" imgW="1046765" imgH="1232170" progId="">
                     <p:embed/>
                   </p:oleObj>
                 </mc:Choice>
@@ -29736,23 +29538,7 @@
                 <a:ea typeface="ＭＳ Ｐゴシック" charset="-128"/>
                 <a:cs typeface="Courier New" panose="02070309020205020404" pitchFamily="49" charset="0"/>
               </a:rPr>
-              <a:t>　　 </a:t>
-            </a:r>
-            <a:r>
-              <a:rPr lang="ja-JP" altLang="en-US" sz="1100" dirty="0" smtClean="0">
-                <a:latin typeface="Courier New" panose="02070309020205020404" pitchFamily="49" charset="0"/>
-                <a:ea typeface="ＭＳ Ｐゴシック" charset="-128"/>
-                <a:cs typeface="Courier New" panose="02070309020205020404" pitchFamily="49" charset="0"/>
-              </a:rPr>
-              <a:t>　・</a:t>
-            </a:r>
-            <a:r>
-              <a:rPr lang="ja-JP" altLang="en-US" sz="1100" dirty="0" smtClean="0">
-                <a:latin typeface="Courier New" panose="02070309020205020404" pitchFamily="49" charset="0"/>
-                <a:ea typeface="ＭＳ Ｐゴシック" charset="-128"/>
-                <a:cs typeface="Courier New" panose="02070309020205020404" pitchFamily="49" charset="0"/>
-              </a:rPr>
-              <a:t>・・</a:t>
+              <a:t>　　 　・・・</a:t>
             </a:r>
             <a:endParaRPr lang="en-US" altLang="ja-JP" sz="1100" dirty="0" smtClean="0">
               <a:latin typeface="Courier New" panose="02070309020205020404" pitchFamily="49" charset="0"/>
@@ -29767,15 +29553,7 @@
                 <a:ea typeface="ＭＳ Ｐゴシック" charset="-128"/>
                 <a:cs typeface="Courier New" panose="02070309020205020404" pitchFamily="49" charset="0"/>
               </a:rPr>
-              <a:t>　  </a:t>
-            </a:r>
-            <a:r>
-              <a:rPr lang="ja-JP" altLang="en-US" sz="1100" dirty="0" smtClean="0">
-                <a:latin typeface="Courier New" panose="02070309020205020404" pitchFamily="49" charset="0"/>
-                <a:ea typeface="ＭＳ Ｐゴシック" charset="-128"/>
-                <a:cs typeface="Courier New" panose="02070309020205020404" pitchFamily="49" charset="0"/>
-              </a:rPr>
-              <a:t>　</a:t>
+              <a:t>　  　</a:t>
             </a:r>
             <a:r>
               <a:rPr lang="en-US" altLang="ja-JP" sz="1100" dirty="0" smtClean="0">
@@ -29783,15 +29561,7 @@
                 <a:ea typeface="ＭＳ Ｐゴシック" charset="-128"/>
                 <a:cs typeface="Courier New" panose="02070309020205020404" pitchFamily="49" charset="0"/>
               </a:rPr>
-              <a:t>@</a:t>
-            </a:r>
-            <a:r>
-              <a:rPr lang="en-US" altLang="ja-JP" sz="1100" dirty="0" smtClean="0">
-                <a:latin typeface="Courier New" panose="02070309020205020404" pitchFamily="49" charset="0"/>
-                <a:ea typeface="ＭＳ Ｐゴシック" charset="-128"/>
-                <a:cs typeface="Courier New" panose="02070309020205020404" pitchFamily="49" charset="0"/>
-              </a:rPr>
-              <a:t>Inject</a:t>
+              <a:t>@Inject</a:t>
             </a:r>
           </a:p>
           <a:p>
@@ -29958,15 +29728,7 @@
                 <a:ea typeface="ＭＳ Ｐゴシック" charset="-128"/>
                 <a:cs typeface="Courier New" panose="02070309020205020404" pitchFamily="49" charset="0"/>
               </a:rPr>
-              <a:t>&gt; collector </a:t>
-            </a:r>
-            <a:r>
-              <a:rPr lang="en-US" altLang="ja-JP" sz="1100" dirty="0" smtClean="0">
-                <a:latin typeface="Courier New" panose="02070309020205020404" pitchFamily="49" charset="0"/>
-                <a:ea typeface="ＭＳ Ｐゴシック" charset="-128"/>
-                <a:cs typeface="Courier New" panose="02070309020205020404" pitchFamily="49" charset="0"/>
-              </a:rPr>
-              <a:t>= </a:t>
+              <a:t>&gt; collector = </a:t>
             </a:r>
             <a:r>
               <a:rPr lang="en-US" altLang="ja-JP" sz="1100" dirty="0" smtClean="0">
@@ -30198,15 +29960,7 @@
                 <a:ea typeface="ＭＳ Ｐゴシック" charset="-128"/>
                 <a:cs typeface="Courier New" panose="02070309020205020404" pitchFamily="49" charset="0"/>
               </a:rPr>
-              <a:t>                </a:t>
-            </a:r>
-            <a:r>
-              <a:rPr lang="en-US" altLang="ja-JP" sz="1100" dirty="0" smtClean="0">
-                <a:latin typeface="Courier New" panose="02070309020205020404" pitchFamily="49" charset="0"/>
-                <a:ea typeface="ＭＳ Ｐゴシック" charset="-128"/>
-                <a:cs typeface="Courier New" panose="02070309020205020404" pitchFamily="49" charset="0"/>
-              </a:rPr>
-              <a:t>//</a:t>
+              <a:t>                //</a:t>
             </a:r>
             <a:r>
               <a:rPr lang="ja-JP" altLang="en-US" sz="1100" dirty="0">
@@ -30266,11 +30020,6 @@
               </a:rPr>
               <a:t>            </a:t>
             </a:r>
-            <a:endParaRPr lang="en-US" altLang="ja-JP" sz="1100" dirty="0" smtClean="0">
-              <a:latin typeface="Courier New" panose="02070309020205020404" pitchFamily="49" charset="0"/>
-              <a:ea typeface="ＭＳ Ｐゴシック" charset="-128"/>
-              <a:cs typeface="Courier New" panose="02070309020205020404" pitchFamily="49" charset="0"/>
-            </a:endParaRPr>
           </a:p>
           <a:p>
             <a:r>
@@ -30409,15 +30158,7 @@
                 <a:ea typeface="ＭＳ Ｐゴシック" charset="-128"/>
                 <a:cs typeface="Courier New" panose="02070309020205020404" pitchFamily="49" charset="0"/>
               </a:rPr>
-              <a:t>            </a:t>
-            </a:r>
-            <a:r>
-              <a:rPr lang="en-US" altLang="ja-JP" sz="1100" dirty="0" smtClean="0">
-                <a:latin typeface="Courier New" panose="02070309020205020404" pitchFamily="49" charset="0"/>
-                <a:ea typeface="ＭＳ Ｐゴシック" charset="-128"/>
-                <a:cs typeface="Courier New" panose="02070309020205020404" pitchFamily="49" charset="0"/>
-              </a:rPr>
-              <a:t>// </a:t>
+              <a:t>            // </a:t>
             </a:r>
             <a:r>
               <a:rPr lang="ja-JP" altLang="en-US" sz="1100" dirty="0" smtClean="0">

</xml_diff>

<commit_message>
modified copyright and trademark #71
</commit_message>
<xml_diff>
--- a/architecture/TERASOLUNA Batch Framework for Java Version 3.x 説明資料.pptx
+++ b/architecture/TERASOLUNA Batch Framework for Java Version 3.x 説明資料.pptx
@@ -32,24 +32,24 @@
   <p:notesSz cx="6794500" cy="9931400"/>
   <p:embeddedFontLst>
     <p:embeddedFont>
-      <p:font typeface="HGPｺﾞｼｯｸE" panose="020B0900000000000000" pitchFamily="50" charset="-128"/>
+      <p:font typeface="Calibri" panose="020F0502020204030204" pitchFamily="34" charset="0"/>
       <p:regular r:id="rId20"/>
-    </p:embeddedFont>
-    <p:embeddedFont>
-      <p:font typeface="Calibri" panose="020F0502020204030204" pitchFamily="34" charset="0"/>
-      <p:regular r:id="rId21"/>
-      <p:bold r:id="rId22"/>
-      <p:italic r:id="rId23"/>
-      <p:boldItalic r:id="rId24"/>
+      <p:bold r:id="rId21"/>
+      <p:italic r:id="rId22"/>
+      <p:boldItalic r:id="rId23"/>
     </p:embeddedFont>
     <p:embeddedFont>
       <p:font typeface="HGP創英角ｺﾞｼｯｸUB" panose="020B0900000000000000" pitchFamily="50" charset="-128"/>
-      <p:regular r:id="rId25"/>
+      <p:regular r:id="rId24"/>
     </p:embeddedFont>
     <p:embeddedFont>
       <p:font typeface="Tahoma" panose="020B0604030504040204" pitchFamily="34" charset="0"/>
-      <p:regular r:id="rId26"/>
-      <p:bold r:id="rId27"/>
+      <p:regular r:id="rId25"/>
+      <p:bold r:id="rId26"/>
+    </p:embeddedFont>
+    <p:embeddedFont>
+      <p:font typeface="HGPｺﾞｼｯｸE" panose="020B0900000000000000" pitchFamily="50" charset="-128"/>
+      <p:regular r:id="rId27"/>
     </p:embeddedFont>
   </p:embeddedFontLst>
   <p:defaultTextStyle>
@@ -233,7 +233,7 @@
             <a:fld id="{BB253DA6-D017-4D4C-A6F0-8D6175E3AD1A}" type="datetime1">
               <a:rPr lang="ja-JP" altLang="en-US" smtClean="0"/>
               <a:pPr/>
-              <a:t>2014/11/28</a:t>
+              <a:t>2015/3/9</a:t>
             </a:fld>
             <a:endParaRPr lang="en-US"/>
           </a:p>
@@ -401,7 +401,7 @@
             <a:fld id="{971E307F-04E7-4216-B3F9-BBF58478B729}" type="datetime1">
               <a:rPr lang="ja-JP" altLang="en-US" smtClean="0"/>
               <a:pPr/>
-              <a:t>2014/11/28</a:t>
+              <a:t>2015/3/9</a:t>
             </a:fld>
             <a:endParaRPr lang="en-US"/>
           </a:p>
@@ -759,7 +759,7 @@
             <a:fld id="{BB7B7D7C-7587-458D-9F40-96275B4E0BF8}" type="datetime1">
               <a:rPr lang="ja-JP" altLang="en-US" smtClean="0"/>
               <a:pPr/>
-              <a:t>2014/11/28</a:t>
+              <a:t>2015/3/9</a:t>
             </a:fld>
             <a:endParaRPr lang="en-US"/>
           </a:p>
@@ -977,7 +977,7 @@
             <a:fld id="{79DDA3DF-8EBA-4683-A96B-9C379AE68A32}" type="datetime1">
               <a:rPr lang="ja-JP" altLang="en-US" smtClean="0"/>
               <a:pPr/>
-              <a:t>2014/11/28</a:t>
+              <a:t>2015/3/9</a:t>
             </a:fld>
             <a:endParaRPr lang="en-US"/>
           </a:p>
@@ -1210,34 +1210,20 @@
           <a:lstStyle/>
           <a:p>
             <a:r>
-              <a:rPr lang="en-US" sz="600" dirty="0" smtClean="0">
+              <a:rPr lang="en-US" altLang="ja-JP" sz="600" dirty="0" smtClean="0">
                 <a:latin typeface="Arial"/>
                 <a:cs typeface="Arial"/>
               </a:rPr>
-              <a:t>Copyright © </a:t>
-            </a:r>
-            <a:r>
-              <a:rPr lang="en-US" sz="600" dirty="0" smtClean="0">
+              <a:t>Copyright © 2014-2015 NTT DATA </a:t>
+            </a:r>
+            <a:r>
+              <a:rPr lang="en-US" altLang="ja-JP" sz="600" baseline="0" dirty="0" smtClean="0">
                 <a:latin typeface="Arial"/>
                 <a:cs typeface="Arial"/>
               </a:rPr>
-              <a:t>2014 </a:t>
-            </a:r>
-            <a:r>
-              <a:rPr lang="en-US" sz="600" dirty="0" smtClean="0">
-                <a:latin typeface="Arial"/>
-                <a:cs typeface="Arial"/>
-              </a:rPr>
-              <a:t>NTT DATA </a:t>
-            </a:r>
-            <a:r>
-              <a:rPr lang="en-US" sz="600" baseline="0" dirty="0" smtClean="0">
-                <a:latin typeface="Arial"/>
-                <a:cs typeface="Arial"/>
-              </a:rPr>
               <a:t>Corporation</a:t>
             </a:r>
-            <a:endParaRPr lang="en-US" sz="600" dirty="0">
+            <a:endParaRPr lang="en-US" altLang="ja-JP" sz="600" dirty="0">
               <a:latin typeface="Arial"/>
               <a:cs typeface="Arial"/>
             </a:endParaRPr>
@@ -2072,6 +2058,13 @@
   <p:clrMapOvr>
     <a:masterClrMapping/>
   </p:clrMapOvr>
+  <p:timing>
+    <p:tnLst>
+      <p:par>
+        <p:cTn id="1" dur="indefinite" restart="never" nodeType="tmRoot"/>
+      </p:par>
+    </p:tnLst>
+  </p:timing>
 </p:sldLayout>
 </file>
 
@@ -2125,6 +2118,13 @@
   <p:clrMapOvr>
     <a:masterClrMapping/>
   </p:clrMapOvr>
+  <p:timing>
+    <p:tnLst>
+      <p:par>
+        <p:cTn id="1" dur="indefinite" restart="never" nodeType="tmRoot"/>
+      </p:par>
+    </p:tnLst>
+  </p:timing>
 </p:sldLayout>
 </file>
 
@@ -2317,34 +2317,20 @@
           <a:lstStyle/>
           <a:p>
             <a:r>
-              <a:rPr lang="en-US" sz="600" dirty="0" smtClean="0">
+              <a:rPr lang="en-US" altLang="ja-JP" sz="600" dirty="0" smtClean="0">
                 <a:latin typeface="Arial"/>
                 <a:cs typeface="Arial"/>
               </a:rPr>
-              <a:t>Copyright © </a:t>
-            </a:r>
-            <a:r>
-              <a:rPr lang="en-US" sz="600" dirty="0" smtClean="0">
+              <a:t>Copyright © 2014-2015 NTT DATA </a:t>
+            </a:r>
+            <a:r>
+              <a:rPr lang="en-US" altLang="ja-JP" sz="600" baseline="0" dirty="0" smtClean="0">
                 <a:latin typeface="Arial"/>
                 <a:cs typeface="Arial"/>
               </a:rPr>
-              <a:t>2014 </a:t>
-            </a:r>
-            <a:r>
-              <a:rPr lang="en-US" sz="600" dirty="0" smtClean="0">
-                <a:latin typeface="Arial"/>
-                <a:cs typeface="Arial"/>
-              </a:rPr>
-              <a:t>NTT DATA </a:t>
-            </a:r>
-            <a:r>
-              <a:rPr lang="en-US" sz="600" baseline="0" dirty="0" smtClean="0">
-                <a:latin typeface="Arial"/>
-                <a:cs typeface="Arial"/>
-              </a:rPr>
               <a:t>Corporation</a:t>
             </a:r>
-            <a:endParaRPr lang="en-US" sz="600" dirty="0">
+            <a:endParaRPr lang="en-US" altLang="ja-JP" sz="600" dirty="0">
               <a:latin typeface="Arial"/>
               <a:cs typeface="Arial"/>
             </a:endParaRPr>
@@ -2389,8 +2375,8 @@
         </p:nvSpPr>
         <p:spPr>
           <a:xfrm>
-            <a:off x="2349816" y="6156024"/>
-            <a:ext cx="7513320" cy="461665"/>
+            <a:off x="2281473" y="6156024"/>
+            <a:ext cx="7581663" cy="461665"/>
           </a:xfrm>
           <a:prstGeom prst="rect">
             <a:avLst/>
@@ -2409,8 +2395,8 @@
               <a:t>「テラソルナ＼</a:t>
             </a:r>
             <a:r>
-              <a:rPr lang="en-US" altLang="ja-JP" sz="1200" dirty="0" err="1" smtClean="0"/>
-              <a:t>Terasoluna</a:t>
+              <a:rPr lang="en-US" altLang="ja-JP" sz="1200" dirty="0" smtClean="0"/>
+              <a:t>TERASOLUNA</a:t>
             </a:r>
             <a:r>
               <a:rPr lang="ja-JP" altLang="ja-JP" sz="1200" dirty="0" smtClean="0"/>
@@ -2650,34 +2636,20 @@
           <a:lstStyle/>
           <a:p>
             <a:r>
-              <a:rPr lang="en-US" sz="600" dirty="0" smtClean="0">
+              <a:rPr lang="en-US" altLang="ja-JP" sz="600" dirty="0" smtClean="0">
                 <a:latin typeface="Arial"/>
                 <a:cs typeface="Arial"/>
               </a:rPr>
-              <a:t>Copyright © </a:t>
-            </a:r>
-            <a:r>
-              <a:rPr lang="en-US" sz="600" dirty="0" smtClean="0">
+              <a:t>Copyright © 2014-2015 NTT DATA </a:t>
+            </a:r>
+            <a:r>
+              <a:rPr lang="en-US" altLang="ja-JP" sz="600" baseline="0" dirty="0" smtClean="0">
                 <a:latin typeface="Arial"/>
                 <a:cs typeface="Arial"/>
               </a:rPr>
-              <a:t>2014 </a:t>
-            </a:r>
-            <a:r>
-              <a:rPr lang="en-US" sz="600" dirty="0" smtClean="0">
-                <a:latin typeface="Arial"/>
-                <a:cs typeface="Arial"/>
-              </a:rPr>
-              <a:t>NTT DATA </a:t>
-            </a:r>
-            <a:r>
-              <a:rPr lang="en-US" sz="600" baseline="0" dirty="0" smtClean="0">
-                <a:latin typeface="Arial"/>
-                <a:cs typeface="Arial"/>
-              </a:rPr>
               <a:t>Corporation</a:t>
             </a:r>
-            <a:endParaRPr lang="en-US" sz="600" dirty="0">
+            <a:endParaRPr lang="en-US" altLang="ja-JP" sz="600" dirty="0">
               <a:latin typeface="Arial"/>
               <a:cs typeface="Arial"/>
             </a:endParaRPr>
@@ -3304,34 +3276,20 @@
           <a:lstStyle/>
           <a:p>
             <a:r>
-              <a:rPr lang="en-US" sz="600" dirty="0" smtClean="0">
+              <a:rPr lang="en-US" altLang="ja-JP" sz="600" dirty="0" smtClean="0">
                 <a:latin typeface="Arial"/>
                 <a:cs typeface="Arial"/>
               </a:rPr>
-              <a:t>Copyright © </a:t>
-            </a:r>
-            <a:r>
-              <a:rPr lang="en-US" sz="600" dirty="0" smtClean="0">
+              <a:t>Copyright © 2014-2015 NTT DATA </a:t>
+            </a:r>
+            <a:r>
+              <a:rPr lang="en-US" altLang="ja-JP" sz="600" baseline="0" dirty="0" smtClean="0">
                 <a:latin typeface="Arial"/>
                 <a:cs typeface="Arial"/>
               </a:rPr>
-              <a:t>2014 </a:t>
-            </a:r>
-            <a:r>
-              <a:rPr lang="en-US" sz="600" dirty="0" smtClean="0">
-                <a:latin typeface="Arial"/>
-                <a:cs typeface="Arial"/>
-              </a:rPr>
-              <a:t>NTT DATA </a:t>
-            </a:r>
-            <a:r>
-              <a:rPr lang="en-US" sz="600" baseline="0" dirty="0" smtClean="0">
-                <a:latin typeface="Arial"/>
-                <a:cs typeface="Arial"/>
-              </a:rPr>
               <a:t>Corporation</a:t>
             </a:r>
-            <a:endParaRPr lang="en-US" sz="600" dirty="0">
+            <a:endParaRPr lang="en-US" altLang="ja-JP" sz="600" dirty="0">
               <a:latin typeface="Arial"/>
               <a:cs typeface="Arial"/>
             </a:endParaRPr>
@@ -3958,34 +3916,20 @@
           <a:lstStyle/>
           <a:p>
             <a:r>
-              <a:rPr lang="en-US" sz="600" dirty="0" smtClean="0">
+              <a:rPr lang="en-US" altLang="ja-JP" sz="600" dirty="0" smtClean="0">
                 <a:latin typeface="Arial"/>
                 <a:cs typeface="Arial"/>
               </a:rPr>
-              <a:t>Copyright © </a:t>
-            </a:r>
-            <a:r>
-              <a:rPr lang="en-US" sz="600" dirty="0" smtClean="0">
+              <a:t>Copyright © 2014-2015 NTT DATA </a:t>
+            </a:r>
+            <a:r>
+              <a:rPr lang="en-US" altLang="ja-JP" sz="600" baseline="0" dirty="0" smtClean="0">
                 <a:latin typeface="Arial"/>
                 <a:cs typeface="Arial"/>
               </a:rPr>
-              <a:t>2014 </a:t>
-            </a:r>
-            <a:r>
-              <a:rPr lang="en-US" sz="600" dirty="0" smtClean="0">
-                <a:latin typeface="Arial"/>
-                <a:cs typeface="Arial"/>
-              </a:rPr>
-              <a:t>NTT DATA </a:t>
-            </a:r>
-            <a:r>
-              <a:rPr lang="en-US" sz="600" baseline="0" dirty="0" smtClean="0">
-                <a:latin typeface="Arial"/>
-                <a:cs typeface="Arial"/>
-              </a:rPr>
               <a:t>Corporation</a:t>
             </a:r>
-            <a:endParaRPr lang="en-US" sz="600" dirty="0">
+            <a:endParaRPr lang="en-US" altLang="ja-JP" sz="600" dirty="0">
               <a:latin typeface="Arial"/>
               <a:cs typeface="Arial"/>
             </a:endParaRPr>
@@ -4606,34 +4550,20 @@
           <a:lstStyle/>
           <a:p>
             <a:r>
-              <a:rPr lang="en-US" sz="600" dirty="0" smtClean="0">
+              <a:rPr lang="en-US" altLang="ja-JP" sz="600" dirty="0" smtClean="0">
                 <a:latin typeface="Arial"/>
                 <a:cs typeface="Arial"/>
               </a:rPr>
-              <a:t>Copyright © </a:t>
-            </a:r>
-            <a:r>
-              <a:rPr lang="en-US" sz="600" dirty="0" smtClean="0">
+              <a:t>Copyright © 2014-2015 NTT DATA </a:t>
+            </a:r>
+            <a:r>
+              <a:rPr lang="en-US" altLang="ja-JP" sz="600" baseline="0" dirty="0" smtClean="0">
                 <a:latin typeface="Arial"/>
                 <a:cs typeface="Arial"/>
               </a:rPr>
-              <a:t>2014 </a:t>
-            </a:r>
-            <a:r>
-              <a:rPr lang="en-US" sz="600" dirty="0" smtClean="0">
-                <a:latin typeface="Arial"/>
-                <a:cs typeface="Arial"/>
-              </a:rPr>
-              <a:t>NTT DATA </a:t>
-            </a:r>
-            <a:r>
-              <a:rPr lang="en-US" sz="600" baseline="0" dirty="0" smtClean="0">
-                <a:latin typeface="Arial"/>
-                <a:cs typeface="Arial"/>
-              </a:rPr>
               <a:t>Corporation</a:t>
             </a:r>
-            <a:endParaRPr lang="en-US" sz="600" dirty="0">
+            <a:endParaRPr lang="en-US" altLang="ja-JP" sz="600" dirty="0">
               <a:latin typeface="Arial"/>
               <a:cs typeface="Arial"/>
             </a:endParaRPr>
@@ -5254,34 +5184,20 @@
           <a:lstStyle/>
           <a:p>
             <a:r>
-              <a:rPr lang="en-US" sz="600" dirty="0" smtClean="0">
+              <a:rPr lang="en-US" altLang="ja-JP" sz="600" dirty="0" smtClean="0">
                 <a:latin typeface="Arial"/>
                 <a:cs typeface="Arial"/>
               </a:rPr>
-              <a:t>Copyright © </a:t>
-            </a:r>
-            <a:r>
-              <a:rPr lang="en-US" sz="600" dirty="0" smtClean="0">
+              <a:t>Copyright © 2014-2015 NTT DATA </a:t>
+            </a:r>
+            <a:r>
+              <a:rPr lang="en-US" altLang="ja-JP" sz="600" baseline="0" dirty="0" smtClean="0">
                 <a:latin typeface="Arial"/>
                 <a:cs typeface="Arial"/>
               </a:rPr>
-              <a:t>2014 </a:t>
-            </a:r>
-            <a:r>
-              <a:rPr lang="en-US" sz="600" dirty="0" smtClean="0">
-                <a:latin typeface="Arial"/>
-                <a:cs typeface="Arial"/>
-              </a:rPr>
-              <a:t>NTT DATA </a:t>
-            </a:r>
-            <a:r>
-              <a:rPr lang="en-US" sz="600" baseline="0" dirty="0" smtClean="0">
-                <a:latin typeface="Arial"/>
-                <a:cs typeface="Arial"/>
-              </a:rPr>
               <a:t>Corporation</a:t>
             </a:r>
-            <a:endParaRPr lang="en-US" sz="600" dirty="0">
+            <a:endParaRPr lang="en-US" altLang="ja-JP" sz="600" dirty="0">
               <a:latin typeface="Arial"/>
               <a:cs typeface="Arial"/>
             </a:endParaRPr>
@@ -5816,34 +5732,20 @@
           <a:lstStyle/>
           <a:p>
             <a:r>
-              <a:rPr lang="en-US" sz="600" dirty="0" smtClean="0">
+              <a:rPr lang="en-US" altLang="ja-JP" sz="600" dirty="0" smtClean="0">
                 <a:latin typeface="Arial"/>
                 <a:cs typeface="Arial"/>
               </a:rPr>
-              <a:t>Copyright © </a:t>
-            </a:r>
-            <a:r>
-              <a:rPr lang="en-US" sz="600" dirty="0" smtClean="0">
+              <a:t>Copyright © 2014-2015 NTT DATA </a:t>
+            </a:r>
+            <a:r>
+              <a:rPr lang="en-US" altLang="ja-JP" sz="600" baseline="0" dirty="0" smtClean="0">
                 <a:latin typeface="Arial"/>
                 <a:cs typeface="Arial"/>
               </a:rPr>
-              <a:t>2014 </a:t>
-            </a:r>
-            <a:r>
-              <a:rPr lang="en-US" sz="600" dirty="0" smtClean="0">
-                <a:latin typeface="Arial"/>
-                <a:cs typeface="Arial"/>
-              </a:rPr>
-              <a:t>NTT DATA </a:t>
-            </a:r>
-            <a:r>
-              <a:rPr lang="en-US" sz="600" baseline="0" dirty="0" smtClean="0">
-                <a:latin typeface="Arial"/>
-                <a:cs typeface="Arial"/>
-              </a:rPr>
               <a:t>Corporation</a:t>
             </a:r>
-            <a:endParaRPr lang="en-US" sz="600" dirty="0">
+            <a:endParaRPr lang="en-US" altLang="ja-JP" sz="600" dirty="0">
               <a:latin typeface="Arial"/>
               <a:cs typeface="Arial"/>
             </a:endParaRPr>
@@ -6655,34 +6557,20 @@
           <a:lstStyle/>
           <a:p>
             <a:r>
-              <a:rPr lang="en-US" sz="600" dirty="0" smtClean="0">
+              <a:rPr lang="en-US" altLang="ja-JP" sz="600" dirty="0" smtClean="0">
                 <a:latin typeface="Arial"/>
                 <a:cs typeface="Arial"/>
               </a:rPr>
-              <a:t>Copyright © </a:t>
-            </a:r>
-            <a:r>
-              <a:rPr lang="en-US" sz="600" dirty="0" smtClean="0">
+              <a:t>Copyright © 2014-2015 NTT DATA </a:t>
+            </a:r>
+            <a:r>
+              <a:rPr lang="en-US" altLang="ja-JP" sz="600" baseline="0" dirty="0" smtClean="0">
                 <a:latin typeface="Arial"/>
                 <a:cs typeface="Arial"/>
               </a:rPr>
-              <a:t>201</a:t>
-            </a:r>
-            <a:r>
-              <a:rPr lang="en-US" sz="600" baseline="0" dirty="0" smtClean="0">
-                <a:latin typeface="Arial"/>
-                <a:cs typeface="Arial"/>
-              </a:rPr>
-              <a:t>4 NTT </a:t>
-            </a:r>
-            <a:r>
-              <a:rPr lang="en-US" sz="600" baseline="0" dirty="0" smtClean="0">
-                <a:latin typeface="Arial"/>
-                <a:cs typeface="Arial"/>
-              </a:rPr>
-              <a:t>DATA Corporation</a:t>
-            </a:r>
-            <a:endParaRPr lang="en-US" sz="600" dirty="0">
+              <a:t>Corporation</a:t>
+            </a:r>
+            <a:endParaRPr lang="en-US" altLang="ja-JP" sz="600" dirty="0">
               <a:latin typeface="Arial"/>
               <a:cs typeface="Arial"/>
             </a:endParaRPr>
@@ -7615,14 +7503,28 @@
                 <a:latin typeface="Arial"/>
                 <a:cs typeface="Arial"/>
               </a:rPr>
-              <a:t>Copyright © </a:t>
+              <a:t>Copyright </a:t>
             </a:r>
             <a:r>
               <a:rPr lang="en-US" sz="600" dirty="0" smtClean="0">
                 <a:latin typeface="Arial"/>
                 <a:cs typeface="Arial"/>
               </a:rPr>
-              <a:t>2014 </a:t>
+              <a:t>©</a:t>
+            </a:r>
+            <a:r>
+              <a:rPr lang="en-US" altLang="ja-JP" sz="600" dirty="0" smtClean="0">
+                <a:latin typeface="Arial"/>
+                <a:cs typeface="Arial"/>
+              </a:rPr>
+              <a:t> </a:t>
+            </a:r>
+            <a:r>
+              <a:rPr lang="en-US" sz="600" dirty="0" smtClean="0">
+                <a:latin typeface="Arial"/>
+                <a:cs typeface="Arial"/>
+              </a:rPr>
+              <a:t>2014-2015 </a:t>
             </a:r>
             <a:r>
               <a:rPr lang="en-US" sz="600" dirty="0" smtClean="0">
@@ -20957,7 +20859,7 @@
             <a:graphicData uri="http://schemas.openxmlformats.org/presentationml/2006/ole">
               <mc:AlternateContent xmlns:mc="http://schemas.openxmlformats.org/markup-compatibility/2006">
                 <mc:Choice xmlns:v="urn:schemas-microsoft-com:vml" Requires="v">
-                  <p:oleObj spid="_x0000_s2051" name="Visio" r:id="rId4" imgW="1046607" imgH="1232154" progId="">
+                  <p:oleObj spid="_x0000_s2055" name="Visio" r:id="rId4" imgW="1046607" imgH="1232154" progId="">
                     <p:embed/>
                   </p:oleObj>
                 </mc:Choice>
@@ -24865,7 +24767,7 @@
             <a:graphicData uri="http://schemas.openxmlformats.org/presentationml/2006/ole">
               <mc:AlternateContent xmlns:mc="http://schemas.openxmlformats.org/markup-compatibility/2006">
                 <mc:Choice xmlns:v="urn:schemas-microsoft-com:vml" Requires="v">
-                  <p:oleObj spid="_x0000_s3075" name="Visio" r:id="rId3" imgW="1046765" imgH="1232170" progId="">
+                  <p:oleObj spid="_x0000_s3079" name="Visio" r:id="rId3" imgW="1046765" imgH="1232170" progId="">
                     <p:embed/>
                   </p:oleObj>
                 </mc:Choice>

</xml_diff>

<commit_message>
updated 3.5.1, removed javax.el-api dependency from oss library list #83
</commit_message>
<xml_diff>
--- a/architecture/TERASOLUNA Batch Framework for Java Version 3.x 説明資料.pptx
+++ b/architecture/TERASOLUNA Batch Framework for Java Version 3.x 説明資料.pptx
@@ -33,24 +33,24 @@
   <p:notesSz cx="6794500" cy="9931400"/>
   <p:embeddedFontLst>
     <p:embeddedFont>
+      <p:font typeface="HGPｺﾞｼｯｸE" panose="020B0900000000000000" pitchFamily="50" charset="-128"/>
+      <p:regular r:id="rId21"/>
+    </p:embeddedFont>
+    <p:embeddedFont>
       <p:font typeface="Tahoma" panose="020B0604030504040204" pitchFamily="34" charset="0"/>
-      <p:regular r:id="rId21"/>
-      <p:bold r:id="rId22"/>
+      <p:regular r:id="rId22"/>
+      <p:bold r:id="rId23"/>
+    </p:embeddedFont>
+    <p:embeddedFont>
+      <p:font typeface="Calibri" panose="020F0502020204030204" pitchFamily="34" charset="0"/>
+      <p:regular r:id="rId24"/>
+      <p:bold r:id="rId25"/>
+      <p:italic r:id="rId26"/>
+      <p:boldItalic r:id="rId27"/>
     </p:embeddedFont>
     <p:embeddedFont>
       <p:font typeface="HGP創英角ｺﾞｼｯｸUB" panose="020B0900000000000000" pitchFamily="50" charset="-128"/>
-      <p:regular r:id="rId23"/>
-    </p:embeddedFont>
-    <p:embeddedFont>
-      <p:font typeface="HGPｺﾞｼｯｸE" panose="020B0900000000000000" pitchFamily="50" charset="-128"/>
-      <p:regular r:id="rId24"/>
-    </p:embeddedFont>
-    <p:embeddedFont>
-      <p:font typeface="Calibri" panose="020F0502020204030204" pitchFamily="34" charset="0"/>
-      <p:regular r:id="rId25"/>
-      <p:bold r:id="rId26"/>
-      <p:italic r:id="rId27"/>
-      <p:boldItalic r:id="rId28"/>
+      <p:regular r:id="rId28"/>
     </p:embeddedFont>
   </p:embeddedFontLst>
   <p:defaultTextStyle>
@@ -234,7 +234,7 @@
             <a:fld id="{BB253DA6-D017-4D4C-A6F0-8D6175E3AD1A}" type="datetime1">
               <a:rPr lang="ja-JP" altLang="en-US" smtClean="0"/>
               <a:pPr/>
-              <a:t>2015/2/9</a:t>
+              <a:t>2015/5/11</a:t>
             </a:fld>
             <a:endParaRPr lang="en-US"/>
           </a:p>
@@ -402,7 +402,7 @@
             <a:fld id="{971E307F-04E7-4216-B3F9-BBF58478B729}" type="datetime1">
               <a:rPr lang="ja-JP" altLang="en-US" smtClean="0"/>
               <a:pPr/>
-              <a:t>2015/2/9</a:t>
+              <a:t>2015/5/11</a:t>
             </a:fld>
             <a:endParaRPr lang="en-US"/>
           </a:p>
@@ -760,7 +760,7 @@
             <a:fld id="{BB7B7D7C-7587-458D-9F40-96275B4E0BF8}" type="datetime1">
               <a:rPr lang="ja-JP" altLang="en-US" smtClean="0"/>
               <a:pPr/>
-              <a:t>2015/2/9</a:t>
+              <a:t>2015/5/11</a:t>
             </a:fld>
             <a:endParaRPr lang="en-US"/>
           </a:p>
@@ -978,7 +978,7 @@
             <a:fld id="{79DDA3DF-8EBA-4683-A96B-9C379AE68A32}" type="datetime1">
               <a:rPr lang="ja-JP" altLang="en-US" smtClean="0"/>
               <a:pPr/>
-              <a:t>2015/2/9</a:t>
+              <a:t>2015/5/11</a:t>
             </a:fld>
             <a:endParaRPr lang="en-US"/>
           </a:p>
@@ -7915,12 +7915,16 @@
               <a:t> </a:t>
             </a:r>
             <a:r>
-              <a:rPr lang="en-US" altLang="ja-JP" dirty="0" smtClean="0"/>
-              <a:t>3.5.0</a:t>
+              <a:rPr lang="en-US" altLang="ja-JP" smtClean="0"/>
+              <a:t>3.5.1</a:t>
+            </a:r>
+            <a:r>
+              <a:rPr lang="ja-JP" altLang="en-US" smtClean="0"/>
+              <a:t> </a:t>
             </a:r>
             <a:r>
               <a:rPr lang="ja-JP" altLang="en-US" dirty="0" smtClean="0"/>
-              <a:t> 説明資料</a:t>
+              <a:t>説明資料</a:t>
             </a:r>
           </a:p>
         </p:txBody>
@@ -8738,21 +8742,8 @@
                 <a:ea typeface="ＭＳ Ｐゴシック" charset="-128"/>
                 <a:cs typeface="Courier New" panose="02070309020205020404" pitchFamily="49" charset="0"/>
               </a:rPr>
-              <a:t>           USER_ID = #{id</a:t>
-            </a:r>
-            <a:r>
-              <a:rPr kumimoji="1" lang="en-US" altLang="ja-JP" sz="1100" dirty="0" smtClean="0">
-                <a:latin typeface="Courier New" panose="02070309020205020404" pitchFamily="49" charset="0"/>
-                <a:ea typeface="ＭＳ Ｐゴシック" charset="-128"/>
-                <a:cs typeface="Courier New" panose="02070309020205020404" pitchFamily="49" charset="0"/>
-              </a:rPr>
-              <a:t>}</a:t>
-            </a:r>
-            <a:endParaRPr kumimoji="1" lang="en-US" altLang="ja-JP" sz="1100" dirty="0" smtClean="0">
-              <a:latin typeface="Courier New" panose="02070309020205020404" pitchFamily="49" charset="0"/>
-              <a:ea typeface="ＭＳ Ｐゴシック" charset="-128"/>
-              <a:cs typeface="Courier New" panose="02070309020205020404" pitchFamily="49" charset="0"/>
-            </a:endParaRPr>
+              <a:t>           USER_ID = #{id}</a:t>
+            </a:r>
           </a:p>
           <a:p>
             <a:r>
@@ -22902,7 +22893,7 @@
             <a:graphicData uri="http://schemas.openxmlformats.org/presentationml/2006/ole">
               <mc:AlternateContent xmlns:mc="http://schemas.openxmlformats.org/markup-compatibility/2006">
                 <mc:Choice xmlns:v="urn:schemas-microsoft-com:vml" Requires="v">
-                  <p:oleObj spid="_x0000_s2076" name="Visio" r:id="rId4" imgW="1046607" imgH="1232154" progId="">
+                  <p:oleObj spid="_x0000_s2077" name="Visio" r:id="rId4" imgW="1046607" imgH="1232154" progId="">
                     <p:embed/>
                   </p:oleObj>
                 </mc:Choice>
@@ -26810,7 +26801,7 @@
             <a:graphicData uri="http://schemas.openxmlformats.org/presentationml/2006/ole">
               <mc:AlternateContent xmlns:mc="http://schemas.openxmlformats.org/markup-compatibility/2006">
                 <mc:Choice xmlns:v="urn:schemas-microsoft-com:vml" Requires="v">
-                  <p:oleObj spid="_x0000_s3100" name="Visio" r:id="rId3" imgW="1046765" imgH="1232170" progId="">
+                  <p:oleObj spid="_x0000_s3101" name="Visio" r:id="rId3" imgW="1046765" imgH="1232170" progId="">
                     <p:embed/>
                   </p:oleObj>
                 </mc:Choice>

</xml_diff>

<commit_message>
up to 3.5.2 #88
</commit_message>
<xml_diff>
--- a/architecture/TERASOLUNA Batch Framework for Java Version 3.x 説明資料.pptx
+++ b/architecture/TERASOLUNA Batch Framework for Java Version 3.x 説明資料.pptx
@@ -33,24 +33,24 @@
   <p:notesSz cx="6794500" cy="9931400"/>
   <p:embeddedFontLst>
     <p:embeddedFont>
-      <p:font typeface="HGPｺﾞｼｯｸE" panose="020B0900000000000000" pitchFamily="50" charset="-128"/>
+      <p:font typeface="Tahoma" panose="020B0604030504040204" pitchFamily="34" charset="0"/>
       <p:regular r:id="rId21"/>
+      <p:bold r:id="rId22"/>
     </p:embeddedFont>
     <p:embeddedFont>
-      <p:font typeface="Tahoma" panose="020B0604030504040204" pitchFamily="34" charset="0"/>
-      <p:regular r:id="rId22"/>
-      <p:bold r:id="rId23"/>
+      <p:font typeface="HGPｺﾞｼｯｸE" panose="020B0900000000000000" pitchFamily="50" charset="-128"/>
+      <p:regular r:id="rId23"/>
+    </p:embeddedFont>
+    <p:embeddedFont>
+      <p:font typeface="HGP創英角ｺﾞｼｯｸUB" panose="020B0900000000000000" pitchFamily="50" charset="-128"/>
+      <p:regular r:id="rId24"/>
     </p:embeddedFont>
     <p:embeddedFont>
       <p:font typeface="Calibri" panose="020F0502020204030204" pitchFamily="34" charset="0"/>
-      <p:regular r:id="rId24"/>
-      <p:bold r:id="rId25"/>
-      <p:italic r:id="rId26"/>
-      <p:boldItalic r:id="rId27"/>
-    </p:embeddedFont>
-    <p:embeddedFont>
-      <p:font typeface="HGP創英角ｺﾞｼｯｸUB" panose="020B0900000000000000" pitchFamily="50" charset="-128"/>
-      <p:regular r:id="rId28"/>
+      <p:regular r:id="rId25"/>
+      <p:bold r:id="rId26"/>
+      <p:italic r:id="rId27"/>
+      <p:boldItalic r:id="rId28"/>
     </p:embeddedFont>
   </p:embeddedFontLst>
   <p:defaultTextStyle>
@@ -234,7 +234,7 @@
             <a:fld id="{BB253DA6-D017-4D4C-A6F0-8D6175E3AD1A}" type="datetime1">
               <a:rPr lang="ja-JP" altLang="en-US" smtClean="0"/>
               <a:pPr/>
-              <a:t>2015/5/11</a:t>
+              <a:t>2015/7/23</a:t>
             </a:fld>
             <a:endParaRPr lang="en-US"/>
           </a:p>
@@ -402,7 +402,7 @@
             <a:fld id="{971E307F-04E7-4216-B3F9-BBF58478B729}" type="datetime1">
               <a:rPr lang="ja-JP" altLang="en-US" smtClean="0"/>
               <a:pPr/>
-              <a:t>2015/5/11</a:t>
+              <a:t>2015/7/23</a:t>
             </a:fld>
             <a:endParaRPr lang="en-US"/>
           </a:p>
@@ -760,7 +760,7 @@
             <a:fld id="{BB7B7D7C-7587-458D-9F40-96275B4E0BF8}" type="datetime1">
               <a:rPr lang="ja-JP" altLang="en-US" smtClean="0"/>
               <a:pPr/>
-              <a:t>2015/5/11</a:t>
+              <a:t>2015/7/23</a:t>
             </a:fld>
             <a:endParaRPr lang="en-US"/>
           </a:p>
@@ -978,7 +978,7 @@
             <a:fld id="{79DDA3DF-8EBA-4683-A96B-9C379AE68A32}" type="datetime1">
               <a:rPr lang="ja-JP" altLang="en-US" smtClean="0"/>
               <a:pPr/>
-              <a:t>2015/5/11</a:t>
+              <a:t>2015/7/23</a:t>
             </a:fld>
             <a:endParaRPr lang="en-US"/>
           </a:p>
@@ -7915,11 +7915,11 @@
               <a:t> </a:t>
             </a:r>
             <a:r>
-              <a:rPr lang="en-US" altLang="ja-JP" smtClean="0"/>
-              <a:t>3.5.1</a:t>
-            </a:r>
-            <a:r>
-              <a:rPr lang="ja-JP" altLang="en-US" smtClean="0"/>
+              <a:rPr lang="en-US" altLang="ja-JP" dirty="0" smtClean="0"/>
+              <a:t>3.5.2</a:t>
+            </a:r>
+            <a:r>
+              <a:rPr lang="ja-JP" altLang="en-US" dirty="0" smtClean="0"/>
               <a:t> </a:t>
             </a:r>
             <a:r>
@@ -19892,11 +19892,15 @@
             </a:r>
             <a:r>
               <a:rPr kumimoji="1" lang="en-US" altLang="ja-JP" dirty="0" smtClean="0"/>
-              <a:t>3.5.0</a:t>
+              <a:t>3.5.x</a:t>
             </a:r>
             <a:r>
               <a:rPr kumimoji="1" lang="ja-JP" altLang="en-US" dirty="0" smtClean="0"/>
-              <a:t>アーキテクチャのコンセプト</a:t>
+              <a:t>アーキテクチャ</a:t>
+            </a:r>
+            <a:r>
+              <a:rPr kumimoji="1" lang="ja-JP" altLang="en-US" dirty="0" smtClean="0"/>
+              <a:t>のコンセプト</a:t>
             </a:r>
             <a:endParaRPr kumimoji="1" lang="ja-JP" altLang="en-US" dirty="0"/>
           </a:p>
@@ -22893,7 +22897,7 @@
             <a:graphicData uri="http://schemas.openxmlformats.org/presentationml/2006/ole">
               <mc:AlternateContent xmlns:mc="http://schemas.openxmlformats.org/markup-compatibility/2006">
                 <mc:Choice xmlns:v="urn:schemas-microsoft-com:vml" Requires="v">
-                  <p:oleObj spid="_x0000_s2077" name="Visio" r:id="rId4" imgW="1046607" imgH="1232154" progId="">
+                  <p:oleObj spid="_x0000_s2078" name="Visio" r:id="rId4" imgW="1046607" imgH="1232154" progId="">
                     <p:embed/>
                   </p:oleObj>
                 </mc:Choice>
@@ -26801,7 +26805,7 @@
             <a:graphicData uri="http://schemas.openxmlformats.org/presentationml/2006/ole">
               <mc:AlternateContent xmlns:mc="http://schemas.openxmlformats.org/markup-compatibility/2006">
                 <mc:Choice xmlns:v="urn:schemas-microsoft-com:vml" Requires="v">
-                  <p:oleObj spid="_x0000_s3101" name="Visio" r:id="rId3" imgW="1046765" imgH="1232170" progId="">
+                  <p:oleObj spid="_x0000_s3102" name="Visio" r:id="rId3" imgW="1046765" imgH="1232170" progId="">
                     <p:embed/>
                   </p:oleObj>
                 </mc:Choice>

</xml_diff>

<commit_message>
updated brand message #79
</commit_message>
<xml_diff>
--- a/architecture/TERASOLUNA Batch Framework for Java Version 3.x 説明資料.pptx
+++ b/architecture/TERASOLUNA Batch Framework for Java Version 3.x 説明資料.pptx
@@ -33,24 +33,24 @@
   <p:notesSz cx="6794500" cy="9931400"/>
   <p:embeddedFontLst>
     <p:embeddedFont>
-      <p:font typeface="HGPｺﾞｼｯｸE" panose="020B0900000000000000" pitchFamily="50" charset="-128"/>
+      <p:font typeface="Tahoma" panose="020B0604030504040204" pitchFamily="34" charset="0"/>
       <p:regular r:id="rId21"/>
+      <p:bold r:id="rId22"/>
     </p:embeddedFont>
     <p:embeddedFont>
-      <p:font typeface="Tahoma" panose="020B0604030504040204" pitchFamily="34" charset="0"/>
-      <p:regular r:id="rId22"/>
-      <p:bold r:id="rId23"/>
+      <p:font typeface="HGPｺﾞｼｯｸE" panose="020B0900000000000000" pitchFamily="50" charset="-128"/>
+      <p:regular r:id="rId23"/>
+    </p:embeddedFont>
+    <p:embeddedFont>
+      <p:font typeface="HGP創英角ｺﾞｼｯｸUB" panose="020B0900000000000000" pitchFamily="50" charset="-128"/>
+      <p:regular r:id="rId24"/>
     </p:embeddedFont>
     <p:embeddedFont>
       <p:font typeface="Calibri" panose="020F0502020204030204" pitchFamily="34" charset="0"/>
-      <p:regular r:id="rId24"/>
-      <p:bold r:id="rId25"/>
-      <p:italic r:id="rId26"/>
-      <p:boldItalic r:id="rId27"/>
-    </p:embeddedFont>
-    <p:embeddedFont>
-      <p:font typeface="HGP創英角ｺﾞｼｯｸUB" panose="020B0900000000000000" pitchFamily="50" charset="-128"/>
-      <p:regular r:id="rId28"/>
+      <p:regular r:id="rId25"/>
+      <p:bold r:id="rId26"/>
+      <p:italic r:id="rId27"/>
+      <p:boldItalic r:id="rId28"/>
     </p:embeddedFont>
   </p:embeddedFontLst>
   <p:defaultTextStyle>
@@ -234,7 +234,7 @@
             <a:fld id="{BB253DA6-D017-4D4C-A6F0-8D6175E3AD1A}" type="datetime1">
               <a:rPr lang="ja-JP" altLang="en-US" smtClean="0"/>
               <a:pPr/>
-              <a:t>2015/5/11</a:t>
+              <a:t>2015/11/6</a:t>
             </a:fld>
             <a:endParaRPr lang="en-US"/>
           </a:p>
@@ -402,7 +402,7 @@
             <a:fld id="{971E307F-04E7-4216-B3F9-BBF58478B729}" type="datetime1">
               <a:rPr lang="ja-JP" altLang="en-US" smtClean="0"/>
               <a:pPr/>
-              <a:t>2015/5/11</a:t>
+              <a:t>2015/11/6</a:t>
             </a:fld>
             <a:endParaRPr lang="en-US"/>
           </a:p>
@@ -760,7 +760,7 @@
             <a:fld id="{BB7B7D7C-7587-458D-9F40-96275B4E0BF8}" type="datetime1">
               <a:rPr lang="ja-JP" altLang="en-US" smtClean="0"/>
               <a:pPr/>
-              <a:t>2015/5/11</a:t>
+              <a:t>2015/11/6</a:t>
             </a:fld>
             <a:endParaRPr lang="en-US"/>
           </a:p>
@@ -978,7 +978,7 @@
             <a:fld id="{79DDA3DF-8EBA-4683-A96B-9C379AE68A32}" type="datetime1">
               <a:rPr lang="ja-JP" altLang="en-US" smtClean="0"/>
               <a:pPr/>
-              <a:t>2015/5/11</a:t>
+              <a:t>2015/11/6</a:t>
             </a:fld>
             <a:endParaRPr lang="en-US"/>
           </a:p>
@@ -2059,6 +2059,13 @@
   <p:clrMapOvr>
     <a:masterClrMapping/>
   </p:clrMapOvr>
+  <p:timing>
+    <p:tnLst>
+      <p:par>
+        <p:cTn id="1" dur="indefinite" restart="never" nodeType="tmRoot"/>
+      </p:par>
+    </p:tnLst>
+  </p:timing>
 </p:sldLayout>
 </file>
 
@@ -2112,6 +2119,13 @@
   <p:clrMapOvr>
     <a:masterClrMapping/>
   </p:clrMapOvr>
+  <p:timing>
+    <p:tnLst>
+      <p:par>
+        <p:cTn id="1" dur="indefinite" restart="never" nodeType="tmRoot"/>
+      </p:par>
+    </p:tnLst>
+  </p:timing>
 </p:sldLayout>
 </file>
 
@@ -2169,6 +2183,36 @@
           <a:chExt cx="0" cy="0"/>
         </a:xfrm>
       </p:grpSpPr>
+      <p:pic>
+        <p:nvPicPr>
+          <p:cNvPr id="12" name="Picture 10"/>
+          <p:cNvPicPr>
+            <a:picLocks noChangeAspect="1"/>
+          </p:cNvPicPr>
+          <p:nvPr userDrawn="1"/>
+        </p:nvPicPr>
+        <p:blipFill>
+          <a:blip r:embed="rId2">
+            <a:extLst>
+              <a:ext uri="{28A0092B-C50C-407E-A947-70E740481C1C}">
+                <a14:useLocalDpi xmlns:a14="http://schemas.microsoft.com/office/drawing/2010/main" val="0"/>
+              </a:ext>
+            </a:extLst>
+          </a:blip>
+          <a:stretch>
+            <a:fillRect/>
+          </a:stretch>
+        </p:blipFill>
+        <p:spPr>
+          <a:xfrm>
+            <a:off x="3956297" y="2842015"/>
+            <a:ext cx="4350919" cy="1119379"/>
+          </a:xfrm>
+          <a:prstGeom prst="rect">
+            <a:avLst/>
+          </a:prstGeom>
+        </p:spPr>
+      </p:pic>
       <p:sp>
         <p:nvSpPr>
           <p:cNvPr id="7" name="TextBox 6"/>
@@ -2266,7 +2310,7 @@
           <p:nvPr userDrawn="1"/>
         </p:nvPicPr>
         <p:blipFill>
-          <a:blip r:embed="rId2"/>
+          <a:blip r:embed="rId3"/>
           <a:stretch>
             <a:fillRect/>
           </a:stretch>
@@ -2324,36 +2368,6 @@
           </a:p>
         </p:txBody>
       </p:sp>
-      <p:pic>
-        <p:nvPicPr>
-          <p:cNvPr id="10" name="Picture 10"/>
-          <p:cNvPicPr>
-            <a:picLocks noChangeAspect="1"/>
-          </p:cNvPicPr>
-          <p:nvPr userDrawn="1"/>
-        </p:nvPicPr>
-        <p:blipFill>
-          <a:blip r:embed="rId3">
-            <a:extLst>
-              <a:ext uri="{28A0092B-C50C-407E-A947-70E740481C1C}">
-                <a14:useLocalDpi xmlns:a14="http://schemas.microsoft.com/office/drawing/2010/main" val="0"/>
-              </a:ext>
-            </a:extLst>
-          </a:blip>
-          <a:stretch>
-            <a:fillRect/>
-          </a:stretch>
-        </p:blipFill>
-        <p:spPr>
-          <a:xfrm>
-            <a:off x="3881090" y="2842015"/>
-            <a:ext cx="4501333" cy="1119379"/>
-          </a:xfrm>
-          <a:prstGeom prst="rect">
-            <a:avLst/>
-          </a:prstGeom>
-        </p:spPr>
-      </p:pic>
       <p:sp>
         <p:nvSpPr>
           <p:cNvPr id="11" name="テキスト ボックス 10"/>
@@ -22893,7 +22907,7 @@
             <a:graphicData uri="http://schemas.openxmlformats.org/presentationml/2006/ole">
               <mc:AlternateContent xmlns:mc="http://schemas.openxmlformats.org/markup-compatibility/2006">
                 <mc:Choice xmlns:v="urn:schemas-microsoft-com:vml" Requires="v">
-                  <p:oleObj spid="_x0000_s2077" name="Visio" r:id="rId4" imgW="1046607" imgH="1232154" progId="">
+                  <p:oleObj spid="_x0000_s2079" name="Visio" r:id="rId4" imgW="1046607" imgH="1232154" progId="">
                     <p:embed/>
                   </p:oleObj>
                 </mc:Choice>
@@ -26801,7 +26815,7 @@
             <a:graphicData uri="http://schemas.openxmlformats.org/presentationml/2006/ole">
               <mc:AlternateContent xmlns:mc="http://schemas.openxmlformats.org/markup-compatibility/2006">
                 <mc:Choice xmlns:v="urn:schemas-microsoft-com:vml" Requires="v">
-                  <p:oleObj spid="_x0000_s3101" name="Visio" r:id="rId3" imgW="1046765" imgH="1232170" progId="">
+                  <p:oleObj spid="_x0000_s3103" name="Visio" r:id="rId3" imgW="1046765" imgH="1232170" progId="">
                     <p:embed/>
                   </p:oleObj>
                 </mc:Choice>

</xml_diff>

<commit_message>
modified AsyncBatchExecutor setting #94
</commit_message>
<xml_diff>
--- a/architecture/TERASOLUNA Batch Framework for Java Version 3.x 説明資料.pptx
+++ b/architecture/TERASOLUNA Batch Framework for Java Version 3.x 説明資料.pptx
@@ -33,24 +33,24 @@
   <p:notesSz cx="6794500" cy="9931400"/>
   <p:embeddedFontLst>
     <p:embeddedFont>
-      <p:font typeface="Tahoma" panose="020B0604030504040204" pitchFamily="34" charset="0"/>
+      <p:font typeface="HGP創英角ｺﾞｼｯｸUB" panose="020B0900000000000000" pitchFamily="50" charset="-128"/>
       <p:regular r:id="rId21"/>
-      <p:bold r:id="rId22"/>
+    </p:embeddedFont>
+    <p:embeddedFont>
+      <p:font typeface="Calibri" panose="020F0502020204030204" pitchFamily="34" charset="0"/>
+      <p:regular r:id="rId22"/>
+      <p:bold r:id="rId23"/>
+      <p:italic r:id="rId24"/>
+      <p:boldItalic r:id="rId25"/>
     </p:embeddedFont>
     <p:embeddedFont>
       <p:font typeface="HGPｺﾞｼｯｸE" panose="020B0900000000000000" pitchFamily="50" charset="-128"/>
-      <p:regular r:id="rId23"/>
+      <p:regular r:id="rId26"/>
     </p:embeddedFont>
     <p:embeddedFont>
-      <p:font typeface="HGP創英角ｺﾞｼｯｸUB" panose="020B0900000000000000" pitchFamily="50" charset="-128"/>
-      <p:regular r:id="rId24"/>
-    </p:embeddedFont>
-    <p:embeddedFont>
-      <p:font typeface="Calibri" panose="020F0502020204030204" pitchFamily="34" charset="0"/>
-      <p:regular r:id="rId25"/>
-      <p:bold r:id="rId26"/>
-      <p:italic r:id="rId27"/>
-      <p:boldItalic r:id="rId28"/>
+      <p:font typeface="Tahoma" panose="020B0604030504040204" pitchFamily="34" charset="0"/>
+      <p:regular r:id="rId27"/>
+      <p:bold r:id="rId28"/>
     </p:embeddedFont>
   </p:embeddedFontLst>
   <p:defaultTextStyle>
@@ -234,7 +234,7 @@
             <a:fld id="{BB253DA6-D017-4D4C-A6F0-8D6175E3AD1A}" type="datetime1">
               <a:rPr lang="ja-JP" altLang="en-US" smtClean="0"/>
               <a:pPr/>
-              <a:t>2015/11/6</a:t>
+              <a:t>2015/11/9</a:t>
             </a:fld>
             <a:endParaRPr lang="en-US"/>
           </a:p>
@@ -402,7 +402,7 @@
             <a:fld id="{971E307F-04E7-4216-B3F9-BBF58478B729}" type="datetime1">
               <a:rPr lang="ja-JP" altLang="en-US" smtClean="0"/>
               <a:pPr/>
-              <a:t>2015/11/6</a:t>
+              <a:t>2015/11/9</a:t>
             </a:fld>
             <a:endParaRPr lang="en-US"/>
           </a:p>
@@ -760,7 +760,7 @@
             <a:fld id="{BB7B7D7C-7587-458D-9F40-96275B4E0BF8}" type="datetime1">
               <a:rPr lang="ja-JP" altLang="en-US" smtClean="0"/>
               <a:pPr/>
-              <a:t>2015/11/6</a:t>
+              <a:t>2015/11/9</a:t>
             </a:fld>
             <a:endParaRPr lang="en-US"/>
           </a:p>
@@ -978,7 +978,7 @@
             <a:fld id="{79DDA3DF-8EBA-4683-A96B-9C379AE68A32}" type="datetime1">
               <a:rPr lang="ja-JP" altLang="en-US" smtClean="0"/>
               <a:pPr/>
-              <a:t>2015/11/6</a:t>
+              <a:t>2015/11/9</a:t>
             </a:fld>
             <a:endParaRPr lang="en-US"/>
           </a:p>
@@ -22723,6 +22723,130 @@
           <a:chExt cx="0" cy="0"/>
         </a:xfrm>
       </p:grpSpPr>
+      <p:sp>
+        <p:nvSpPr>
+          <p:cNvPr id="50" name="コンテンツ プレースホルダ 2"/>
+          <p:cNvSpPr txBox="1">
+            <a:spLocks/>
+          </p:cNvSpPr>
+          <p:nvPr/>
+        </p:nvSpPr>
+        <p:spPr bwMode="auto">
+          <a:xfrm>
+            <a:off x="280988" y="836712"/>
+            <a:ext cx="9479238" cy="5795963"/>
+          </a:xfrm>
+          <a:prstGeom prst="rect">
+            <a:avLst/>
+          </a:prstGeom>
+          <a:noFill/>
+          <a:ln w="9525">
+            <a:noFill/>
+            <a:miter lim="800000"/>
+            <a:headEnd/>
+            <a:tailEnd/>
+          </a:ln>
+          <a:effectLst/>
+        </p:spPr>
+        <p:txBody>
+          <a:bodyPr vert="horz" wrap="square" lIns="91440" tIns="45720" rIns="91440" bIns="45720" numCol="1" anchor="t" anchorCtr="0" compatLnSpc="1">
+            <a:prstTxWarp prst="textNoShape">
+              <a:avLst/>
+            </a:prstTxWarp>
+          </a:bodyPr>
+          <a:lstStyle/>
+          <a:p>
+            <a:pPr marL="342900" marR="0" lvl="0" indent="-342900" algn="l" defTabSz="914400" rtl="0" eaLnBrk="1" fontAlgn="base" latinLnBrk="0" hangingPunct="1">
+              <a:lnSpc>
+                <a:spcPct val="100000"/>
+              </a:lnSpc>
+              <a:spcBef>
+                <a:spcPct val="20000"/>
+              </a:spcBef>
+              <a:spcAft>
+                <a:spcPct val="0"/>
+              </a:spcAft>
+              <a:buClrTx/>
+              <a:buSzTx/>
+              <a:buFont typeface="Wingdings" pitchFamily="2" charset="2"/>
+              <a:buNone/>
+              <a:tabLst/>
+              <a:defRPr/>
+            </a:pPr>
+            <a:r>
+              <a:rPr kumimoji="1" lang="ja-JP" altLang="en-US" sz="2000" b="0" i="0" u="none" strike="noStrike" kern="0" cap="none" spc="0" normalizeH="0" baseline="0" noProof="0" dirty="0" smtClean="0">
+                <a:ln>
+                  <a:noFill/>
+                </a:ln>
+                <a:solidFill>
+                  <a:schemeClr val="tx1"/>
+                </a:solidFill>
+                <a:effectLst/>
+                <a:uLnTx/>
+                <a:uFillTx/>
+                <a:latin typeface="+mn-lt"/>
+                <a:ea typeface="+mn-ea"/>
+                <a:cs typeface="+mn-cs"/>
+              </a:rPr>
+              <a:t>非同期型実行機能では、「ジョブ管理テーブル」に登録された情報を元にして、</a:t>
+            </a:r>
+            <a:endParaRPr kumimoji="1" lang="en-US" altLang="ja-JP" sz="2000" b="0" i="0" u="none" strike="noStrike" kern="0" cap="none" spc="0" normalizeH="0" baseline="0" noProof="0" dirty="0" smtClean="0">
+              <a:ln>
+                <a:noFill/>
+              </a:ln>
+              <a:solidFill>
+                <a:schemeClr val="tx1"/>
+              </a:solidFill>
+              <a:effectLst/>
+              <a:uLnTx/>
+              <a:uFillTx/>
+              <a:latin typeface="+mn-lt"/>
+              <a:ea typeface="+mn-ea"/>
+              <a:cs typeface="+mn-cs"/>
+            </a:endParaRPr>
+          </a:p>
+          <a:p>
+            <a:pPr marL="342900" marR="0" lvl="0" indent="-342900" algn="l" defTabSz="914400" rtl="0" eaLnBrk="1" fontAlgn="base" latinLnBrk="0" hangingPunct="1">
+              <a:lnSpc>
+                <a:spcPct val="100000"/>
+              </a:lnSpc>
+              <a:spcBef>
+                <a:spcPct val="20000"/>
+              </a:spcBef>
+              <a:spcAft>
+                <a:spcPct val="0"/>
+              </a:spcAft>
+              <a:buClrTx/>
+              <a:buSzTx/>
+              <a:buFont typeface="Wingdings" pitchFamily="2" charset="2"/>
+              <a:buNone/>
+              <a:tabLst/>
+              <a:defRPr/>
+            </a:pPr>
+            <a:r>
+              <a:rPr lang="ja-JP" altLang="en-US" sz="2000" kern="0" dirty="0" smtClean="0">
+                <a:latin typeface="+mn-lt"/>
+                <a:ea typeface="+mn-ea"/>
+              </a:rPr>
+              <a:t>スレッドとしてジョブを起動します。</a:t>
+            </a:r>
+            <a:endParaRPr kumimoji="1" lang="en-US" altLang="ja-JP" sz="2000" b="0" i="0" u="none" strike="noStrike" kern="0" cap="none" spc="0" normalizeH="0" baseline="0" noProof="0" dirty="0" smtClean="0">
+              <a:ln>
+                <a:noFill/>
+              </a:ln>
+              <a:solidFill>
+                <a:schemeClr val="tx1"/>
+              </a:solidFill>
+              <a:effectLst/>
+              <a:uLnTx/>
+              <a:uFillTx/>
+              <a:latin typeface="+mn-lt"/>
+              <a:ea typeface="+mn-ea"/>
+              <a:cs typeface="+mn-cs"/>
+            </a:endParaRPr>
+          </a:p>
+        </p:txBody>
+      </p:sp>
       <p:pic>
         <p:nvPicPr>
           <p:cNvPr id="1027" name="Picture 3"/>
@@ -22907,7 +23031,7 @@
             <a:graphicData uri="http://schemas.openxmlformats.org/presentationml/2006/ole">
               <mc:AlternateContent xmlns:mc="http://schemas.openxmlformats.org/markup-compatibility/2006">
                 <mc:Choice xmlns:v="urn:schemas-microsoft-com:vml" Requires="v">
-                  <p:oleObj spid="_x0000_s2079" name="Visio" r:id="rId4" imgW="1046607" imgH="1232154" progId="">
+                  <p:oleObj spid="_x0000_s2082" name="Visio" r:id="rId4" imgW="1046607" imgH="1232154" progId="">
                     <p:embed/>
                   </p:oleObj>
                 </mc:Choice>
@@ -23602,13 +23726,10 @@
           <a:bodyPr wrap="none" anchor="ctr" anchorCtr="1"/>
           <a:lstStyle/>
           <a:p>
-            <a:r>
-              <a:rPr kumimoji="1" lang="en-US" altLang="ja-JP" sz="1000">
-                <a:latin typeface="Arial" charset="0"/>
-                <a:ea typeface="ＭＳ Ｐゴシック" charset="-128"/>
-              </a:rPr>
-              <a:t>BatchServant</a:t>
-            </a:r>
+            <a:endParaRPr kumimoji="1" lang="en-US" altLang="ja-JP" sz="1000" dirty="0">
+              <a:latin typeface="Arial" charset="0"/>
+              <a:ea typeface="ＭＳ Ｐゴシック" charset="-128"/>
+            </a:endParaRPr>
           </a:p>
         </p:txBody>
       </p:sp>
@@ -23621,7 +23742,7 @@
           <p:nvPr/>
         </p:nvSpPr>
         <p:spPr bwMode="auto">
-          <a:xfrm rot="-2164809">
+          <a:xfrm rot="19435191">
             <a:off x="3522804" y="4835350"/>
             <a:ext cx="780785" cy="804862"/>
           </a:xfrm>
@@ -23898,13 +24019,10 @@
           <a:bodyPr wrap="none" anchor="ctr" anchorCtr="1"/>
           <a:lstStyle/>
           <a:p>
-            <a:r>
-              <a:rPr kumimoji="1" lang="en-US" altLang="ja-JP" sz="1000">
-                <a:latin typeface="Arial" charset="0"/>
-                <a:ea typeface="ＭＳ Ｐゴシック" charset="-128"/>
-              </a:rPr>
-              <a:t>BatchServant</a:t>
-            </a:r>
+            <a:endParaRPr kumimoji="1" lang="en-US" altLang="ja-JP" sz="1000" dirty="0">
+              <a:latin typeface="Arial" charset="0"/>
+              <a:ea typeface="ＭＳ Ｐゴシック" charset="-128"/>
+            </a:endParaRPr>
           </a:p>
         </p:txBody>
       </p:sp>
@@ -24109,12 +24227,16 @@
           <a:lstStyle/>
           <a:p>
             <a:r>
-              <a:rPr kumimoji="1" lang="en-US" altLang="ja-JP" sz="1000">
+              <a:rPr kumimoji="1" lang="en-US" altLang="ja-JP" sz="1000" dirty="0" err="1" smtClean="0">
                 <a:latin typeface="Arial" charset="0"/>
                 <a:ea typeface="ＭＳ Ｐゴシック" charset="-128"/>
               </a:rPr>
-              <a:t>BatchServant</a:t>
-            </a:r>
+              <a:t>JobExecutorTemplate</a:t>
+            </a:r>
+            <a:endParaRPr kumimoji="1" lang="en-US" altLang="ja-JP" sz="1000" dirty="0">
+              <a:latin typeface="Arial" charset="0"/>
+              <a:ea typeface="ＭＳ Ｐゴシック" charset="-128"/>
+            </a:endParaRPr>
           </a:p>
         </p:txBody>
       </p:sp>
@@ -24256,7 +24378,7 @@
           <p:nvPr/>
         </p:nvSpPr>
         <p:spPr bwMode="auto">
-          <a:xfrm rot="-2054942">
+          <a:xfrm rot="19545058">
             <a:off x="3486688" y="6175201"/>
             <a:ext cx="227013" cy="357187"/>
           </a:xfrm>
@@ -24665,130 +24787,6 @@
           <a:lstStyle/>
           <a:p>
             <a:endParaRPr lang="ja-JP" altLang="en-US"/>
-          </a:p>
-        </p:txBody>
-      </p:sp>
-      <p:sp>
-        <p:nvSpPr>
-          <p:cNvPr id="50" name="コンテンツ プレースホルダ 2"/>
-          <p:cNvSpPr txBox="1">
-            <a:spLocks/>
-          </p:cNvSpPr>
-          <p:nvPr/>
-        </p:nvSpPr>
-        <p:spPr bwMode="auto">
-          <a:xfrm>
-            <a:off x="280988" y="836712"/>
-            <a:ext cx="9479238" cy="5795963"/>
-          </a:xfrm>
-          <a:prstGeom prst="rect">
-            <a:avLst/>
-          </a:prstGeom>
-          <a:noFill/>
-          <a:ln w="9525">
-            <a:noFill/>
-            <a:miter lim="800000"/>
-            <a:headEnd/>
-            <a:tailEnd/>
-          </a:ln>
-          <a:effectLst/>
-        </p:spPr>
-        <p:txBody>
-          <a:bodyPr vert="horz" wrap="square" lIns="91440" tIns="45720" rIns="91440" bIns="45720" numCol="1" anchor="t" anchorCtr="0" compatLnSpc="1">
-            <a:prstTxWarp prst="textNoShape">
-              <a:avLst/>
-            </a:prstTxWarp>
-          </a:bodyPr>
-          <a:lstStyle/>
-          <a:p>
-            <a:pPr marL="342900" marR="0" lvl="0" indent="-342900" algn="l" defTabSz="914400" rtl="0" eaLnBrk="1" fontAlgn="base" latinLnBrk="0" hangingPunct="1">
-              <a:lnSpc>
-                <a:spcPct val="100000"/>
-              </a:lnSpc>
-              <a:spcBef>
-                <a:spcPct val="20000"/>
-              </a:spcBef>
-              <a:spcAft>
-                <a:spcPct val="0"/>
-              </a:spcAft>
-              <a:buClrTx/>
-              <a:buSzTx/>
-              <a:buFont typeface="Wingdings" pitchFamily="2" charset="2"/>
-              <a:buNone/>
-              <a:tabLst/>
-              <a:defRPr/>
-            </a:pPr>
-            <a:r>
-              <a:rPr kumimoji="1" lang="ja-JP" altLang="en-US" sz="2000" b="0" i="0" u="none" strike="noStrike" kern="0" cap="none" spc="0" normalizeH="0" baseline="0" noProof="0" dirty="0" smtClean="0">
-                <a:ln>
-                  <a:noFill/>
-                </a:ln>
-                <a:solidFill>
-                  <a:schemeClr val="tx1"/>
-                </a:solidFill>
-                <a:effectLst/>
-                <a:uLnTx/>
-                <a:uFillTx/>
-                <a:latin typeface="+mn-lt"/>
-                <a:ea typeface="+mn-ea"/>
-                <a:cs typeface="+mn-cs"/>
-              </a:rPr>
-              <a:t>非同期型実行機能では、「ジョブ管理テーブル」に登録された情報を元にして、</a:t>
-            </a:r>
-            <a:endParaRPr kumimoji="1" lang="en-US" altLang="ja-JP" sz="2000" b="0" i="0" u="none" strike="noStrike" kern="0" cap="none" spc="0" normalizeH="0" baseline="0" noProof="0" dirty="0" smtClean="0">
-              <a:ln>
-                <a:noFill/>
-              </a:ln>
-              <a:solidFill>
-                <a:schemeClr val="tx1"/>
-              </a:solidFill>
-              <a:effectLst/>
-              <a:uLnTx/>
-              <a:uFillTx/>
-              <a:latin typeface="+mn-lt"/>
-              <a:ea typeface="+mn-ea"/>
-              <a:cs typeface="+mn-cs"/>
-            </a:endParaRPr>
-          </a:p>
-          <a:p>
-            <a:pPr marL="342900" marR="0" lvl="0" indent="-342900" algn="l" defTabSz="914400" rtl="0" eaLnBrk="1" fontAlgn="base" latinLnBrk="0" hangingPunct="1">
-              <a:lnSpc>
-                <a:spcPct val="100000"/>
-              </a:lnSpc>
-              <a:spcBef>
-                <a:spcPct val="20000"/>
-              </a:spcBef>
-              <a:spcAft>
-                <a:spcPct val="0"/>
-              </a:spcAft>
-              <a:buClrTx/>
-              <a:buSzTx/>
-              <a:buFont typeface="Wingdings" pitchFamily="2" charset="2"/>
-              <a:buNone/>
-              <a:tabLst/>
-              <a:defRPr/>
-            </a:pPr>
-            <a:r>
-              <a:rPr lang="ja-JP" altLang="en-US" sz="2000" kern="0" dirty="0" smtClean="0">
-                <a:latin typeface="+mn-lt"/>
-                <a:ea typeface="+mn-ea"/>
-              </a:rPr>
-              <a:t>スレッドとしてジョブを起動します。</a:t>
-            </a:r>
-            <a:endParaRPr kumimoji="1" lang="en-US" altLang="ja-JP" sz="2000" b="0" i="0" u="none" strike="noStrike" kern="0" cap="none" spc="0" normalizeH="0" baseline="0" noProof="0" dirty="0" smtClean="0">
-              <a:ln>
-                <a:noFill/>
-              </a:ln>
-              <a:solidFill>
-                <a:schemeClr val="tx1"/>
-              </a:solidFill>
-              <a:effectLst/>
-              <a:uLnTx/>
-              <a:uFillTx/>
-              <a:latin typeface="+mn-lt"/>
-              <a:ea typeface="+mn-ea"/>
-              <a:cs typeface="+mn-cs"/>
-            </a:endParaRPr>
           </a:p>
         </p:txBody>
       </p:sp>
@@ -26815,7 +26813,7 @@
             <a:graphicData uri="http://schemas.openxmlformats.org/presentationml/2006/ole">
               <mc:AlternateContent xmlns:mc="http://schemas.openxmlformats.org/markup-compatibility/2006">
                 <mc:Choice xmlns:v="urn:schemas-microsoft-com:vml" Requires="v">
-                  <p:oleObj spid="_x0000_s3103" name="Visio" r:id="rId3" imgW="1046765" imgH="1232170" progId="">
+                  <p:oleObj spid="_x0000_s3105" name="Visio" r:id="rId3" imgW="1046765" imgH="1232170" progId="">
                     <p:embed/>
                   </p:oleObj>
                 </mc:Choice>
@@ -27066,13 +27064,10 @@
           <a:bodyPr wrap="none" anchor="ctr" anchorCtr="1"/>
           <a:lstStyle/>
           <a:p>
-            <a:r>
-              <a:rPr kumimoji="1" lang="en-US" altLang="ja-JP" sz="1000">
-                <a:latin typeface="Arial" charset="0"/>
-                <a:ea typeface="ＭＳ Ｐゴシック" charset="-128"/>
-              </a:rPr>
-              <a:t>BatchServant</a:t>
-            </a:r>
+            <a:endParaRPr kumimoji="1" lang="en-US" altLang="ja-JP" sz="1000" dirty="0">
+              <a:latin typeface="Arial" charset="0"/>
+              <a:ea typeface="ＭＳ Ｐゴシック" charset="-128"/>
+            </a:endParaRPr>
           </a:p>
         </p:txBody>
       </p:sp>
@@ -27117,13 +27112,10 @@
           <a:bodyPr wrap="none" anchor="ctr" anchorCtr="1"/>
           <a:lstStyle/>
           <a:p>
-            <a:r>
-              <a:rPr kumimoji="1" lang="en-US" altLang="ja-JP" sz="1000">
-                <a:latin typeface="Arial" charset="0"/>
-                <a:ea typeface="ＭＳ Ｐゴシック" charset="-128"/>
-              </a:rPr>
-              <a:t>BatchServant</a:t>
-            </a:r>
+            <a:endParaRPr kumimoji="1" lang="en-US" altLang="ja-JP" sz="1000" dirty="0">
+              <a:latin typeface="Arial" charset="0"/>
+              <a:ea typeface="ＭＳ Ｐゴシック" charset="-128"/>
+            </a:endParaRPr>
           </a:p>
         </p:txBody>
       </p:sp>
@@ -27169,13 +27161,13 @@
           <a:lstStyle/>
           <a:p>
             <a:r>
-              <a:rPr kumimoji="1" lang="en-US" altLang="ja-JP" sz="1000" dirty="0" err="1">
+              <a:rPr kumimoji="1" lang="en-US" altLang="ja-JP" sz="900" dirty="0" err="1">
                 <a:latin typeface="Arial" charset="0"/>
                 <a:ea typeface="ＭＳ Ｐゴシック" charset="-128"/>
               </a:rPr>
-              <a:t>BatchServant</a:t>
-            </a:r>
-            <a:endParaRPr kumimoji="1" lang="en-US" altLang="ja-JP" sz="1000" dirty="0">
+              <a:t>JobExecutorTemplate</a:t>
+            </a:r>
+            <a:endParaRPr kumimoji="1" lang="en-US" altLang="ja-JP" sz="900" dirty="0">
               <a:latin typeface="Arial" charset="0"/>
               <a:ea typeface="ＭＳ Ｐゴシック" charset="-128"/>
             </a:endParaRPr>

</xml_diff>

<commit_message>
fixed @Inject field visibility #142
</commit_message>
<xml_diff>
--- a/architecture/TERASOLUNA Batch Framework for Java Version 3.x 説明資料.pptx
+++ b/architecture/TERASOLUNA Batch Framework for Java Version 3.x 説明資料.pptx
@@ -37,15 +37,15 @@
       <p:regular r:id="rId21"/>
     </p:embeddedFont>
     <p:embeddedFont>
-      <p:font typeface="Calibri" panose="020F0502020204030204" pitchFamily="34" charset="0"/>
+      <p:font typeface="HGPｺﾞｼｯｸE" panose="020B0900000000000000" pitchFamily="50" charset="-128"/>
       <p:regular r:id="rId22"/>
-      <p:bold r:id="rId23"/>
-      <p:italic r:id="rId24"/>
-      <p:boldItalic r:id="rId25"/>
     </p:embeddedFont>
     <p:embeddedFont>
-      <p:font typeface="HGPｺﾞｼｯｸE" panose="020B0900000000000000" pitchFamily="50" charset="-128"/>
-      <p:regular r:id="rId26"/>
+      <p:font typeface="Calibri" panose="020F0502020204030204" pitchFamily="34" charset="0"/>
+      <p:regular r:id="rId23"/>
+      <p:bold r:id="rId24"/>
+      <p:italic r:id="rId25"/>
+      <p:boldItalic r:id="rId26"/>
     </p:embeddedFont>
     <p:embeddedFont>
       <p:font typeface="Tahoma" panose="020B0604030504040204" pitchFamily="34" charset="0"/>
@@ -148,6 +148,41 @@
       </a:defRPr>
     </a:lvl9pPr>
   </p:defaultTextStyle>
+  <p:extLst>
+    <p:ext uri="{EFAFB233-063F-42B5-8137-9DF3F51BA10A}">
+      <p15:sldGuideLst xmlns:p15="http://schemas.microsoft.com/office/powerpoint/2012/main">
+        <p15:guide id="1" orient="horz" pos="2375">
+          <p15:clr>
+            <a:srgbClr val="A4A3A4"/>
+          </p15:clr>
+        </p15:guide>
+        <p15:guide id="2" pos="6081">
+          <p15:clr>
+            <a:srgbClr val="A4A3A4"/>
+          </p15:clr>
+        </p15:guide>
+        <p15:guide id="3" pos="3116">
+          <p15:clr>
+            <a:srgbClr val="A4A3A4"/>
+          </p15:clr>
+        </p15:guide>
+      </p15:sldGuideLst>
+    </p:ext>
+    <p:ext uri="{2D200454-40CA-4A62-9FC3-DE9A4176ACB9}">
+      <p15:notesGuideLst xmlns:p15="http://schemas.microsoft.com/office/powerpoint/2012/main">
+        <p15:guide id="1" orient="horz" pos="3128">
+          <p15:clr>
+            <a:srgbClr val="A4A3A4"/>
+          </p15:clr>
+        </p15:guide>
+        <p15:guide id="2" pos="2140">
+          <p15:clr>
+            <a:srgbClr val="A4A3A4"/>
+          </p15:clr>
+        </p15:guide>
+      </p15:notesGuideLst>
+    </p:ext>
+  </p:extLst>
 </p:presentation>
 </file>
 
@@ -234,7 +269,7 @@
             <a:fld id="{BB253DA6-D017-4D4C-A6F0-8D6175E3AD1A}" type="datetime1">
               <a:rPr lang="ja-JP" altLang="en-US" smtClean="0"/>
               <a:pPr/>
-              <a:t>2015/11/9</a:t>
+              <a:t>2015/12/16</a:t>
             </a:fld>
             <a:endParaRPr lang="en-US"/>
           </a:p>
@@ -402,7 +437,7 @@
             <a:fld id="{971E307F-04E7-4216-B3F9-BBF58478B729}" type="datetime1">
               <a:rPr lang="ja-JP" altLang="en-US" smtClean="0"/>
               <a:pPr/>
-              <a:t>2015/11/9</a:t>
+              <a:t>2015/12/16</a:t>
             </a:fld>
             <a:endParaRPr lang="en-US"/>
           </a:p>
@@ -760,7 +795,7 @@
             <a:fld id="{BB7B7D7C-7587-458D-9F40-96275B4E0BF8}" type="datetime1">
               <a:rPr lang="ja-JP" altLang="en-US" smtClean="0"/>
               <a:pPr/>
-              <a:t>2015/11/9</a:t>
+              <a:t>2015/12/16</a:t>
             </a:fld>
             <a:endParaRPr lang="en-US"/>
           </a:p>
@@ -854,6 +889,11 @@
         </p:txBody>
       </p:sp>
     </p:spTree>
+    <p:extLst>
+      <p:ext uri="{BB962C8B-B14F-4D97-AF65-F5344CB8AC3E}">
+        <p14:creationId xmlns:p14="http://schemas.microsoft.com/office/powerpoint/2010/main" val="2227854766"/>
+      </p:ext>
+    </p:extLst>
   </p:cSld>
   <p:clrMapOvr>
     <a:masterClrMapping/>
@@ -978,7 +1018,7 @@
             <a:fld id="{79DDA3DF-8EBA-4683-A96B-9C379AE68A32}" type="datetime1">
               <a:rPr lang="ja-JP" altLang="en-US" smtClean="0"/>
               <a:pPr/>
-              <a:t>2015/11/9</a:t>
+              <a:t>2015/12/16</a:t>
             </a:fld>
             <a:endParaRPr lang="en-US"/>
           </a:p>
@@ -9463,7 +9503,7 @@
                 <a:latin typeface="Courier New" pitchFamily="49" charset="0"/>
                 <a:cs typeface="Courier New" pitchFamily="49" charset="0"/>
               </a:rPr>
-              <a:t>    protected </a:t>
+              <a:t>    </a:t>
             </a:r>
             <a:r>
               <a:rPr lang="en-US" altLang="ja-JP" sz="1200" b="1" dirty="0" err="1" smtClean="0">
@@ -12602,7 +12642,7 @@
           <a:p>
             <a:pPr algn="l"/>
             <a:r>
-              <a:rPr kumimoji="1" lang="ja-JP" altLang="ja-JP" sz="1000" b="0" dirty="0">
+              <a:rPr kumimoji="1" lang="en-US" altLang="ja-JP" sz="1000" b="0" smtClean="0">
                 <a:latin typeface="Courier New" panose="02070309020205020404" pitchFamily="49" charset="0"/>
                 <a:ea typeface="ＭＳ Ｐゴシック" charset="-128"/>
                 <a:cs typeface="Courier New" panose="02070309020205020404" pitchFamily="49" charset="0"/>
@@ -12610,15 +12650,7 @@
               <a:t>  </a:t>
             </a:r>
             <a:r>
-              <a:rPr kumimoji="1" lang="ja-JP" altLang="ja-JP" sz="1000" b="0" dirty="0" smtClean="0">
-                <a:latin typeface="Courier New" panose="02070309020205020404" pitchFamily="49" charset="0"/>
-                <a:ea typeface="ＭＳ Ｐゴシック" charset="-128"/>
-                <a:cs typeface="Courier New" panose="02070309020205020404" pitchFamily="49" charset="0"/>
-              </a:rPr>
-              <a:t>private </a:t>
-            </a:r>
-            <a:r>
-              <a:rPr kumimoji="1" lang="ja-JP" altLang="ja-JP" sz="1000" b="0" dirty="0">
+              <a:rPr kumimoji="1" lang="ja-JP" altLang="ja-JP" sz="1000" b="0" smtClean="0">
                 <a:latin typeface="Courier New" panose="02070309020205020404" pitchFamily="49" charset="0"/>
                 <a:ea typeface="ＭＳ Ｐゴシック" charset="-128"/>
                 <a:cs typeface="Courier New" panose="02070309020205020404" pitchFamily="49" charset="0"/>
@@ -15017,15 +15049,15 @@
                 <a:ea typeface="ＭＳ ゴシック" pitchFamily="49" charset="-128"/>
                 <a:cs typeface="Courier New" panose="02070309020205020404" pitchFamily="49" charset="0"/>
               </a:rPr>
-              <a:t>    private Validator </a:t>
-            </a:r>
-            <a:r>
-              <a:rPr lang="en-US" altLang="ja-JP" sz="1200" dirty="0" err="1" smtClean="0">
+              <a:t>    </a:t>
+            </a:r>
+            <a:r>
+              <a:rPr lang="en-US" altLang="ja-JP" sz="1200" dirty="0" smtClean="0">
                 <a:latin typeface="Courier New" panose="02070309020205020404" pitchFamily="49" charset="0"/>
                 <a:ea typeface="ＭＳ ゴシック" pitchFamily="49" charset="-128"/>
                 <a:cs typeface="Courier New" panose="02070309020205020404" pitchFamily="49" charset="0"/>
               </a:rPr>
-              <a:t>validator</a:t>
+              <a:t>Validator </a:t>
             </a:r>
             <a:r>
               <a:rPr lang="en-US" altLang="ja-JP" sz="1200" dirty="0" smtClean="0">
@@ -15033,7 +15065,7 @@
                 <a:ea typeface="ＭＳ ゴシック" pitchFamily="49" charset="-128"/>
                 <a:cs typeface="Courier New" panose="02070309020205020404" pitchFamily="49" charset="0"/>
               </a:rPr>
-              <a:t>;</a:t>
+              <a:t>validator;</a:t>
             </a:r>
           </a:p>
           <a:p>
@@ -23031,7 +23063,7 @@
             <a:graphicData uri="http://schemas.openxmlformats.org/presentationml/2006/ole">
               <mc:AlternateContent xmlns:mc="http://schemas.openxmlformats.org/markup-compatibility/2006">
                 <mc:Choice xmlns:v="urn:schemas-microsoft-com:vml" Requires="v">
-                  <p:oleObj spid="_x0000_s2082" name="Visio" r:id="rId4" imgW="1046607" imgH="1232154" progId="">
+                  <p:oleObj spid="_x0000_s2088" name="Visio" r:id="rId4" imgW="1046607" imgH="1232154" progId="">
                     <p:embed/>
                   </p:oleObj>
                 </mc:Choice>
@@ -26813,7 +26845,7 @@
             <a:graphicData uri="http://schemas.openxmlformats.org/presentationml/2006/ole">
               <mc:AlternateContent xmlns:mc="http://schemas.openxmlformats.org/markup-compatibility/2006">
                 <mc:Choice xmlns:v="urn:schemas-microsoft-com:vml" Requires="v">
-                  <p:oleObj spid="_x0000_s3105" name="Visio" r:id="rId3" imgW="1046765" imgH="1232170" progId="">
+                  <p:oleObj spid="_x0000_s3111" name="Visio" r:id="rId3" imgW="1046765" imgH="1232170" progId="">
                     <p:embed/>
                   </p:oleObj>
                 </mc:Choice>
@@ -28931,7 +28963,7 @@
                 <a:ea typeface="ＭＳ Ｐゴシック" charset="-128"/>
                 <a:cs typeface="Courier New" panose="02070309020205020404" pitchFamily="49" charset="0"/>
               </a:rPr>
-              <a:t>protected B000002Dao </a:t>
+              <a:t>B000002Dao </a:t>
             </a:r>
             <a:r>
               <a:rPr kumimoji="1" lang="en-US" altLang="ja-JP" sz="1200" dirty="0" err="1" smtClean="0">
@@ -29568,23 +29600,7 @@
                 <a:ea typeface="ＭＳ Ｐゴシック" charset="-128"/>
                 <a:cs typeface="Courier New" panose="02070309020205020404" pitchFamily="49" charset="0"/>
               </a:rPr>
-              <a:t>    protected </a:t>
-            </a:r>
-            <a:r>
-              <a:rPr lang="ja-JP" altLang="en-US" sz="1100" dirty="0" smtClean="0">
-                <a:latin typeface="Courier New" panose="02070309020205020404" pitchFamily="49" charset="0"/>
-                <a:ea typeface="ＭＳ Ｐゴシック" charset="-128"/>
-                <a:cs typeface="Courier New" panose="02070309020205020404" pitchFamily="49" charset="0"/>
-              </a:rPr>
-              <a:t> </a:t>
-            </a:r>
-            <a:r>
-              <a:rPr lang="en-US" altLang="ja-JP" sz="1100" dirty="0" err="1" smtClean="0">
-                <a:latin typeface="Courier New" panose="02070309020205020404" pitchFamily="49" charset="0"/>
-                <a:ea typeface="ＭＳ Ｐゴシック" charset="-128"/>
-                <a:cs typeface="Courier New" panose="02070309020205020404" pitchFamily="49" charset="0"/>
-              </a:rPr>
-              <a:t>PlatformTransactionManager</a:t>
+              <a:t>    </a:t>
             </a:r>
             <a:r>
               <a:rPr lang="en-US" altLang="ja-JP" sz="1100" dirty="0" smtClean="0">
@@ -29592,15 +29608,7 @@
                 <a:ea typeface="ＭＳ Ｐゴシック" charset="-128"/>
                 <a:cs typeface="Courier New" panose="02070309020205020404" pitchFamily="49" charset="0"/>
               </a:rPr>
-              <a:t> </a:t>
-            </a:r>
-            <a:r>
-              <a:rPr lang="en-US" altLang="ja-JP" sz="1100" dirty="0" err="1" smtClean="0">
-                <a:latin typeface="Courier New" panose="02070309020205020404" pitchFamily="49" charset="0"/>
-                <a:ea typeface="ＭＳ Ｐゴシック" charset="-128"/>
-                <a:cs typeface="Courier New" panose="02070309020205020404" pitchFamily="49" charset="0"/>
-              </a:rPr>
-              <a:t>transactionManager</a:t>
+              <a:t>PlatformTransactionManager </a:t>
             </a:r>
             <a:r>
               <a:rPr lang="en-US" altLang="ja-JP" sz="1100" dirty="0" smtClean="0">
@@ -29608,7 +29616,7 @@
                 <a:ea typeface="ＭＳ Ｐゴシック" charset="-128"/>
                 <a:cs typeface="Courier New" panose="02070309020205020404" pitchFamily="49" charset="0"/>
               </a:rPr>
-              <a:t> ;</a:t>
+              <a:t>transactionManager ;</a:t>
             </a:r>
           </a:p>
           <a:p>

</xml_diff>

<commit_message>
fixed wording before modification #146
</commit_message>
<xml_diff>
--- a/architecture/TERASOLUNA Batch Framework for Java Version 3.x 説明資料.pptx
+++ b/architecture/TERASOLUNA Batch Framework for Java Version 3.x 説明資料.pptx
@@ -33,24 +33,24 @@
   <p:notesSz cx="6794500" cy="9931400"/>
   <p:embeddedFontLst>
     <p:embeddedFont>
-      <p:font typeface="HGP創英角ｺﾞｼｯｸUB" panose="020B0900000000000000" pitchFamily="50" charset="-128"/>
+      <p:font typeface="Tahoma" panose="020B0604030504040204" pitchFamily="34" charset="0"/>
       <p:regular r:id="rId21"/>
+      <p:bold r:id="rId22"/>
     </p:embeddedFont>
     <p:embeddedFont>
       <p:font typeface="HGPｺﾞｼｯｸE" panose="020B0900000000000000" pitchFamily="50" charset="-128"/>
-      <p:regular r:id="rId22"/>
+      <p:regular r:id="rId23"/>
+    </p:embeddedFont>
+    <p:embeddedFont>
+      <p:font typeface="HGP創英角ｺﾞｼｯｸUB" panose="020B0900000000000000" pitchFamily="50" charset="-128"/>
+      <p:regular r:id="rId24"/>
     </p:embeddedFont>
     <p:embeddedFont>
       <p:font typeface="Calibri" panose="020F0502020204030204" pitchFamily="34" charset="0"/>
-      <p:regular r:id="rId23"/>
-      <p:bold r:id="rId24"/>
-      <p:italic r:id="rId25"/>
-      <p:boldItalic r:id="rId26"/>
-    </p:embeddedFont>
-    <p:embeddedFont>
-      <p:font typeface="Tahoma" panose="020B0604030504040204" pitchFamily="34" charset="0"/>
-      <p:regular r:id="rId27"/>
-      <p:bold r:id="rId28"/>
+      <p:regular r:id="rId25"/>
+      <p:bold r:id="rId26"/>
+      <p:italic r:id="rId27"/>
+      <p:boldItalic r:id="rId28"/>
     </p:embeddedFont>
   </p:embeddedFontLst>
   <p:defaultTextStyle>
@@ -269,7 +269,7 @@
             <a:fld id="{BB253DA6-D017-4D4C-A6F0-8D6175E3AD1A}" type="datetime1">
               <a:rPr lang="ja-JP" altLang="en-US" smtClean="0"/>
               <a:pPr/>
-              <a:t>2015/12/16</a:t>
+              <a:t>2015/12/18</a:t>
             </a:fld>
             <a:endParaRPr lang="en-US"/>
           </a:p>
@@ -437,7 +437,7 @@
             <a:fld id="{971E307F-04E7-4216-B3F9-BBF58478B729}" type="datetime1">
               <a:rPr lang="ja-JP" altLang="en-US" smtClean="0"/>
               <a:pPr/>
-              <a:t>2015/12/16</a:t>
+              <a:t>2015/12/18</a:t>
             </a:fld>
             <a:endParaRPr lang="en-US"/>
           </a:p>
@@ -795,7 +795,7 @@
             <a:fld id="{BB7B7D7C-7587-458D-9F40-96275B4E0BF8}" type="datetime1">
               <a:rPr lang="ja-JP" altLang="en-US" smtClean="0"/>
               <a:pPr/>
-              <a:t>2015/12/16</a:t>
+              <a:t>2015/12/18</a:t>
             </a:fld>
             <a:endParaRPr lang="en-US"/>
           </a:p>
@@ -1018,7 +1018,7 @@
             <a:fld id="{79DDA3DF-8EBA-4683-A96B-9C379AE68A32}" type="datetime1">
               <a:rPr lang="ja-JP" altLang="en-US" smtClean="0"/>
               <a:pPr/>
-              <a:t>2015/12/16</a:t>
+              <a:t>2015/12/18</a:t>
             </a:fld>
             <a:endParaRPr lang="en-US"/>
           </a:p>
@@ -14892,16 +14892,24 @@
               <a:rPr lang="ja-JP" altLang="en-US" sz="1600" dirty="0" smtClean="0"/>
               <a:t>の</a:t>
             </a:r>
-            <a:endParaRPr lang="en-US" altLang="ja-JP" sz="1600" dirty="0" smtClean="0"/>
-          </a:p>
-          <a:p>
+            <a:r>
+              <a:rPr lang="en-US" altLang="ja-JP" sz="1600" dirty="0"/>
+              <a:t/>
+            </a:r>
+            <a:br>
+              <a:rPr lang="en-US" altLang="ja-JP" sz="1600" dirty="0"/>
+            </a:br>
             <a:r>
               <a:rPr lang="ja-JP" altLang="en-US" sz="1600" dirty="0" smtClean="0"/>
               <a:t>バリデータを</a:t>
             </a:r>
-            <a:endParaRPr lang="en-US" altLang="ja-JP" sz="1600" dirty="0" smtClean="0"/>
-          </a:p>
-          <a:p>
+            <a:r>
+              <a:rPr lang="en-US" altLang="ja-JP" sz="1600" dirty="0"/>
+              <a:t/>
+            </a:r>
+            <a:br>
+              <a:rPr lang="en-US" altLang="ja-JP" sz="1600" dirty="0"/>
+            </a:br>
             <a:r>
               <a:rPr lang="ja-JP" altLang="en-US" sz="1600" dirty="0" smtClean="0"/>
               <a:t>利用します。</a:t>
@@ -14916,16 +14924,24 @@
               <a:rPr lang="ja-JP" altLang="en-US" sz="1600" dirty="0" smtClean="0"/>
               <a:t>入力チェックは</a:t>
             </a:r>
-            <a:endParaRPr lang="en-US" altLang="ja-JP" sz="1600" dirty="0" smtClean="0"/>
-          </a:p>
-          <a:p>
+            <a:r>
+              <a:rPr lang="en-US" altLang="ja-JP" sz="1600" dirty="0"/>
+              <a:t/>
+            </a:r>
+            <a:br>
+              <a:rPr lang="en-US" altLang="ja-JP" sz="1600" dirty="0"/>
+            </a:br>
             <a:r>
               <a:rPr lang="ja-JP" altLang="en-US" sz="1600" dirty="0" smtClean="0"/>
               <a:t>コレクタ内で</a:t>
             </a:r>
-            <a:endParaRPr lang="en-US" altLang="ja-JP" sz="1600" dirty="0" smtClean="0"/>
-          </a:p>
-          <a:p>
+            <a:r>
+              <a:rPr lang="en-US" altLang="ja-JP" sz="1600" dirty="0"/>
+              <a:t/>
+            </a:r>
+            <a:br>
+              <a:rPr lang="en-US" altLang="ja-JP" sz="1600" dirty="0"/>
+            </a:br>
             <a:r>
               <a:rPr lang="ja-JP" altLang="en-US" sz="1600" dirty="0" smtClean="0"/>
               <a:t>行われます。</a:t>
@@ -15049,23 +15065,7 @@
                 <a:ea typeface="ＭＳ ゴシック" pitchFamily="49" charset="-128"/>
                 <a:cs typeface="Courier New" panose="02070309020205020404" pitchFamily="49" charset="0"/>
               </a:rPr>
-              <a:t>    </a:t>
-            </a:r>
-            <a:r>
-              <a:rPr lang="en-US" altLang="ja-JP" sz="1200" dirty="0" smtClean="0">
-                <a:latin typeface="Courier New" panose="02070309020205020404" pitchFamily="49" charset="0"/>
-                <a:ea typeface="ＭＳ ゴシック" pitchFamily="49" charset="-128"/>
-                <a:cs typeface="Courier New" panose="02070309020205020404" pitchFamily="49" charset="0"/>
-              </a:rPr>
-              <a:t>Validator </a:t>
-            </a:r>
-            <a:r>
-              <a:rPr lang="en-US" altLang="ja-JP" sz="1200" dirty="0" smtClean="0">
-                <a:latin typeface="Courier New" panose="02070309020205020404" pitchFamily="49" charset="0"/>
-                <a:ea typeface="ＭＳ ゴシック" pitchFamily="49" charset="-128"/>
-                <a:cs typeface="Courier New" panose="02070309020205020404" pitchFamily="49" charset="0"/>
-              </a:rPr>
-              <a:t>validator;</a:t>
+              <a:t>    Validator validator;</a:t>
             </a:r>
           </a:p>
           <a:p>
@@ -23013,20 +23013,20 @@
           <a:lstStyle/>
           <a:p>
             <a:r>
-              <a:rPr kumimoji="1" lang="en-US" altLang="ja-JP" sz="1000">
+              <a:rPr kumimoji="1" lang="en-US" altLang="ja-JP" sz="1000" dirty="0">
                 <a:latin typeface="Arial" charset="0"/>
                 <a:ea typeface="ＭＳ Ｐゴシック" charset="-128"/>
               </a:rPr>
               <a:t>Async</a:t>
             </a:r>
             <a:r>
-              <a:rPr kumimoji="1" lang="en-US" altLang="en-US" sz="1000">
+              <a:rPr kumimoji="1" lang="en-US" altLang="en-US" sz="1000" dirty="0">
                 <a:latin typeface="Arial" charset="0"/>
                 <a:ea typeface="ＭＳ Ｐゴシック" charset="-128"/>
               </a:rPr>
               <a:t>BatchExecutor</a:t>
             </a:r>
-            <a:endParaRPr kumimoji="1" lang="en-US" altLang="ja-JP" sz="1000">
+            <a:endParaRPr kumimoji="1" lang="en-US" altLang="ja-JP" sz="1000" dirty="0">
               <a:latin typeface="Arial" charset="0"/>
               <a:ea typeface="ＭＳ Ｐゴシック" charset="-128"/>
             </a:endParaRPr>
@@ -23063,7 +23063,7 @@
             <a:graphicData uri="http://schemas.openxmlformats.org/presentationml/2006/ole">
               <mc:AlternateContent xmlns:mc="http://schemas.openxmlformats.org/markup-compatibility/2006">
                 <mc:Choice xmlns:v="urn:schemas-microsoft-com:vml" Requires="v">
-                  <p:oleObj spid="_x0000_s2088" name="Visio" r:id="rId4" imgW="1046607" imgH="1232154" progId="">
+                  <p:oleObj spid="_x0000_s2098" name="Visio" r:id="rId4" imgW="1046607" imgH="1232154" progId="">
                     <p:embed/>
                   </p:oleObj>
                 </mc:Choice>
@@ -24712,8 +24712,8 @@
         </p:nvSpPr>
         <p:spPr bwMode="gray">
           <a:xfrm>
-            <a:off x="5817006" y="3265444"/>
-            <a:ext cx="1379273" cy="472813"/>
+            <a:off x="5817006" y="3311610"/>
+            <a:ext cx="1379273" cy="380480"/>
           </a:xfrm>
           <a:prstGeom prst="rect">
             <a:avLst/>
@@ -24767,22 +24767,32 @@
               <a:t>『</a:t>
             </a:r>
             <a:r>
+              <a:rPr kumimoji="1" lang="ja-JP" altLang="en-US" sz="1000" dirty="0" smtClean="0">
+                <a:latin typeface="Arial" charset="0"/>
+                <a:ea typeface="ＭＳ Ｐゴシック" charset="-128"/>
+              </a:rPr>
+              <a:t>実行中</a:t>
+            </a:r>
+            <a:r>
+              <a:rPr kumimoji="1" lang="en-US" altLang="ja-JP" sz="1000" dirty="0">
+                <a:latin typeface="ＭＳ Ｐゴシック" panose="020B0600070205080204" pitchFamily="50" charset="-128"/>
+                <a:ea typeface="ＭＳ Ｐゴシック" panose="020B0600070205080204" pitchFamily="50" charset="-128"/>
+              </a:rPr>
+              <a:t>』</a:t>
+            </a:r>
+            <a:r>
+              <a:rPr kumimoji="1" lang="ja-JP" altLang="en-US" sz="1000" dirty="0" smtClean="0">
+                <a:latin typeface="Arial" charset="0"/>
+                <a:ea typeface="ＭＳ Ｐゴシック" charset="-128"/>
+              </a:rPr>
+              <a:t>に</a:t>
+            </a:r>
+            <a:r>
               <a:rPr kumimoji="1" lang="ja-JP" altLang="en-US" sz="1000" dirty="0">
                 <a:latin typeface="Arial" charset="0"/>
                 <a:ea typeface="ＭＳ Ｐゴシック" charset="-128"/>
               </a:rPr>
-              <a:t>実行中</a:t>
-            </a:r>
-            <a:r>
-              <a:rPr kumimoji="1" lang="en-US" altLang="ja-JP" dirty="0"/>
-              <a:t>』</a:t>
-            </a:r>
-            <a:r>
-              <a:rPr kumimoji="1" lang="ja-JP" altLang="en-US" sz="1000" dirty="0">
-                <a:latin typeface="Arial" charset="0"/>
-                <a:ea typeface="ＭＳ Ｐゴシック" charset="-128"/>
-              </a:rPr>
-              <a:t>に更新</a:t>
+              <a:t>更新</a:t>
             </a:r>
           </a:p>
         </p:txBody>
@@ -26845,7 +26855,7 @@
             <a:graphicData uri="http://schemas.openxmlformats.org/presentationml/2006/ole">
               <mc:AlternateContent xmlns:mc="http://schemas.openxmlformats.org/markup-compatibility/2006">
                 <mc:Choice xmlns:v="urn:schemas-microsoft-com:vml" Requires="v">
-                  <p:oleObj spid="_x0000_s3111" name="Visio" r:id="rId3" imgW="1046765" imgH="1232170" progId="">
+                  <p:oleObj spid="_x0000_s3121" name="Visio" r:id="rId3" imgW="1046765" imgH="1232170" progId="">
                     <p:embed/>
                   </p:oleObj>
                 </mc:Choice>
@@ -27193,7 +27203,7 @@
           <a:lstStyle/>
           <a:p>
             <a:r>
-              <a:rPr kumimoji="1" lang="en-US" altLang="ja-JP" sz="900" dirty="0" err="1">
+              <a:rPr kumimoji="1" lang="en-US" altLang="ja-JP" sz="900" smtClean="0">
                 <a:latin typeface="Arial" charset="0"/>
                 <a:ea typeface="ＭＳ Ｐゴシック" charset="-128"/>
               </a:rPr>
@@ -28167,8 +28177,8 @@
         </p:nvSpPr>
         <p:spPr bwMode="gray">
           <a:xfrm>
-            <a:off x="7473280" y="3504107"/>
-            <a:ext cx="1379273" cy="472813"/>
+            <a:off x="7473280" y="3550273"/>
+            <a:ext cx="1379273" cy="380480"/>
           </a:xfrm>
           <a:prstGeom prst="rect">
             <a:avLst/>
@@ -28229,7 +28239,10 @@
               <a:t>実行中</a:t>
             </a:r>
             <a:r>
-              <a:rPr kumimoji="1" lang="en-US" altLang="ja-JP" dirty="0"/>
+              <a:rPr kumimoji="1" lang="en-US" altLang="ja-JP" sz="1000" dirty="0">
+                <a:latin typeface="ＭＳ Ｐゴシック" panose="020B0600070205080204" pitchFamily="50" charset="-128"/>
+                <a:ea typeface="ＭＳ Ｐゴシック" panose="020B0600070205080204" pitchFamily="50" charset="-128"/>
+              </a:rPr>
               <a:t>』</a:t>
             </a:r>
             <a:r>
@@ -28253,8 +28266,8 @@
         </p:nvCxnSpPr>
         <p:spPr bwMode="auto">
           <a:xfrm flipH="1">
-            <a:off x="6814762" y="3740514"/>
-            <a:ext cx="658518" cy="169302"/>
+            <a:off x="6814762" y="3740513"/>
+            <a:ext cx="658518" cy="169303"/>
           </a:xfrm>
           <a:prstGeom prst="line">
             <a:avLst/>
@@ -29600,23 +29613,7 @@
                 <a:ea typeface="ＭＳ Ｐゴシック" charset="-128"/>
                 <a:cs typeface="Courier New" panose="02070309020205020404" pitchFamily="49" charset="0"/>
               </a:rPr>
-              <a:t>    </a:t>
-            </a:r>
-            <a:r>
-              <a:rPr lang="en-US" altLang="ja-JP" sz="1100" dirty="0" smtClean="0">
-                <a:latin typeface="Courier New" panose="02070309020205020404" pitchFamily="49" charset="0"/>
-                <a:ea typeface="ＭＳ Ｐゴシック" charset="-128"/>
-                <a:cs typeface="Courier New" panose="02070309020205020404" pitchFamily="49" charset="0"/>
-              </a:rPr>
-              <a:t>PlatformTransactionManager </a:t>
-            </a:r>
-            <a:r>
-              <a:rPr lang="en-US" altLang="ja-JP" sz="1100" dirty="0" smtClean="0">
-                <a:latin typeface="Courier New" panose="02070309020205020404" pitchFamily="49" charset="0"/>
-                <a:ea typeface="ＭＳ Ｐゴシック" charset="-128"/>
-                <a:cs typeface="Courier New" panose="02070309020205020404" pitchFamily="49" charset="0"/>
-              </a:rPr>
-              <a:t>transactionManager ;</a:t>
+              <a:t>    PlatformTransactionManager transactionManager ;</a:t>
             </a:r>
           </a:p>
           <a:p>

</xml_diff>

<commit_message>
fixed description due to Java class name change (JobExecutorTemplate -> AsyncJobWorker) #148
</commit_message>
<xml_diff>
--- a/architecture/TERASOLUNA Batch Framework for Java Version 3.x 説明資料.pptx
+++ b/architecture/TERASOLUNA Batch Framework for Java Version 3.x 説明資料.pptx
@@ -14912,7 +14912,11 @@
             </a:br>
             <a:r>
               <a:rPr lang="ja-JP" altLang="en-US" sz="1600" dirty="0" smtClean="0"/>
-              <a:t>利用します。</a:t>
+              <a:t>利用</a:t>
+            </a:r>
+            <a:r>
+              <a:rPr lang="ja-JP" altLang="en-US" sz="1600" dirty="0" smtClean="0"/>
+              <a:t>します。</a:t>
             </a:r>
             <a:endParaRPr lang="en-US" altLang="ja-JP" sz="1600" dirty="0" smtClean="0"/>
           </a:p>
@@ -14922,7 +14926,11 @@
           <a:p>
             <a:r>
               <a:rPr lang="ja-JP" altLang="en-US" sz="1600" dirty="0" smtClean="0"/>
-              <a:t>入力チェックは</a:t>
+              <a:t>入力チェック</a:t>
+            </a:r>
+            <a:r>
+              <a:rPr lang="ja-JP" altLang="en-US" sz="1600" dirty="0" smtClean="0"/>
+              <a:t>は</a:t>
             </a:r>
             <a:r>
               <a:rPr lang="en-US" altLang="ja-JP" sz="1600" dirty="0"/>
@@ -14944,7 +14952,11 @@
             </a:br>
             <a:r>
               <a:rPr lang="ja-JP" altLang="en-US" sz="1600" dirty="0" smtClean="0"/>
-              <a:t>行われます。</a:t>
+              <a:t>行われます</a:t>
+            </a:r>
+            <a:r>
+              <a:rPr lang="ja-JP" altLang="en-US" sz="1600" dirty="0" smtClean="0"/>
+              <a:t>。</a:t>
             </a:r>
             <a:endParaRPr lang="en-US" altLang="ja-JP" sz="1600" dirty="0" smtClean="0"/>
           </a:p>
@@ -23013,20 +23025,20 @@
           <a:lstStyle/>
           <a:p>
             <a:r>
-              <a:rPr kumimoji="1" lang="en-US" altLang="ja-JP" sz="1000" dirty="0">
+              <a:rPr kumimoji="1" lang="en-US" altLang="ja-JP" sz="1000">
                 <a:latin typeface="Arial" charset="0"/>
                 <a:ea typeface="ＭＳ Ｐゴシック" charset="-128"/>
               </a:rPr>
               <a:t>Async</a:t>
             </a:r>
             <a:r>
-              <a:rPr kumimoji="1" lang="en-US" altLang="en-US" sz="1000" dirty="0">
+              <a:rPr kumimoji="1" lang="en-US" altLang="en-US" sz="1000">
                 <a:latin typeface="Arial" charset="0"/>
                 <a:ea typeface="ＭＳ Ｐゴシック" charset="-128"/>
               </a:rPr>
               <a:t>BatchExecutor</a:t>
             </a:r>
-            <a:endParaRPr kumimoji="1" lang="en-US" altLang="ja-JP" sz="1000" dirty="0">
+            <a:endParaRPr kumimoji="1" lang="en-US" altLang="ja-JP" sz="1000">
               <a:latin typeface="Arial" charset="0"/>
               <a:ea typeface="ＭＳ Ｐゴシック" charset="-128"/>
             </a:endParaRPr>
@@ -23063,7 +23075,7 @@
             <a:graphicData uri="http://schemas.openxmlformats.org/presentationml/2006/ole">
               <mc:AlternateContent xmlns:mc="http://schemas.openxmlformats.org/markup-compatibility/2006">
                 <mc:Choice xmlns:v="urn:schemas-microsoft-com:vml" Requires="v">
-                  <p:oleObj spid="_x0000_s2098" name="Visio" r:id="rId4" imgW="1046607" imgH="1232154" progId="">
+                  <p:oleObj spid="_x0000_s2094" name="Visio" r:id="rId4" imgW="1046607" imgH="1232154" progId="">
                     <p:embed/>
                   </p:oleObj>
                 </mc:Choice>
@@ -24263,7 +24275,7 @@
                 <a:latin typeface="Arial" charset="0"/>
                 <a:ea typeface="ＭＳ Ｐゴシック" charset="-128"/>
               </a:rPr>
-              <a:t>JobExecutorTemplate</a:t>
+              <a:t>AsyncJobWorker</a:t>
             </a:r>
             <a:endParaRPr kumimoji="1" lang="en-US" altLang="ja-JP" sz="1000" dirty="0">
               <a:latin typeface="Arial" charset="0"/>
@@ -26855,7 +26867,7 @@
             <a:graphicData uri="http://schemas.openxmlformats.org/presentationml/2006/ole">
               <mc:AlternateContent xmlns:mc="http://schemas.openxmlformats.org/markup-compatibility/2006">
                 <mc:Choice xmlns:v="urn:schemas-microsoft-com:vml" Requires="v">
-                  <p:oleObj spid="_x0000_s3121" name="Visio" r:id="rId3" imgW="1046765" imgH="1232170" progId="">
+                  <p:oleObj spid="_x0000_s3117" name="Visio" r:id="rId3" imgW="1046765" imgH="1232170" progId="">
                     <p:embed/>
                   </p:oleObj>
                 </mc:Choice>
@@ -27203,11 +27215,11 @@
           <a:lstStyle/>
           <a:p>
             <a:r>
-              <a:rPr kumimoji="1" lang="en-US" altLang="ja-JP" sz="900" smtClean="0">
+              <a:rPr kumimoji="1" lang="en-US" altLang="ja-JP" sz="900" dirty="0" err="1" smtClean="0">
                 <a:latin typeface="Arial" charset="0"/>
                 <a:ea typeface="ＭＳ Ｐゴシック" charset="-128"/>
               </a:rPr>
-              <a:t>JobExecutorTemplate</a:t>
+              <a:t>AsyncJobWorker</a:t>
             </a:r>
             <a:endParaRPr kumimoji="1" lang="en-US" altLang="ja-JP" sz="900" dirty="0">
               <a:latin typeface="Arial" charset="0"/>

</xml_diff>

<commit_message>
updated version (from 3.5.1 to 3.6.0), copyright (from 2011-2015 to 2011-2016) #101 #158
</commit_message>
<xml_diff>
--- a/architecture/TERASOLUNA Batch Framework for Java Version 3.x 説明資料.pptx
+++ b/architecture/TERASOLUNA Batch Framework for Java Version 3.x 説明資料.pptx
@@ -33,16 +33,16 @@
   <p:notesSz cx="6794500" cy="9931400"/>
   <p:embeddedFontLst>
     <p:embeddedFont>
+      <p:font typeface="HGP創英角ｺﾞｼｯｸUB" panose="020B0900000000000000" pitchFamily="50" charset="-128"/>
+      <p:regular r:id="rId21"/>
+    </p:embeddedFont>
+    <p:embeddedFont>
       <p:font typeface="Tahoma" panose="020B0604030504040204" pitchFamily="34" charset="0"/>
-      <p:regular r:id="rId21"/>
-      <p:bold r:id="rId22"/>
+      <p:regular r:id="rId22"/>
+      <p:bold r:id="rId23"/>
     </p:embeddedFont>
     <p:embeddedFont>
       <p:font typeface="HGPｺﾞｼｯｸE" panose="020B0900000000000000" pitchFamily="50" charset="-128"/>
-      <p:regular r:id="rId23"/>
-    </p:embeddedFont>
-    <p:embeddedFont>
-      <p:font typeface="HGP創英角ｺﾞｼｯｸUB" panose="020B0900000000000000" pitchFamily="50" charset="-128"/>
       <p:regular r:id="rId24"/>
     </p:embeddedFont>
     <p:embeddedFont>
@@ -269,7 +269,7 @@
             <a:fld id="{BB253DA6-D017-4D4C-A6F0-8D6175E3AD1A}" type="datetime1">
               <a:rPr lang="ja-JP" altLang="en-US" smtClean="0"/>
               <a:pPr/>
-              <a:t>2015/12/18</a:t>
+              <a:t>2015/12/24</a:t>
             </a:fld>
             <a:endParaRPr lang="en-US"/>
           </a:p>
@@ -437,7 +437,7 @@
             <a:fld id="{971E307F-04E7-4216-B3F9-BBF58478B729}" type="datetime1">
               <a:rPr lang="ja-JP" altLang="en-US" smtClean="0"/>
               <a:pPr/>
-              <a:t>2015/12/18</a:t>
+              <a:t>2015/12/24</a:t>
             </a:fld>
             <a:endParaRPr lang="en-US"/>
           </a:p>
@@ -795,7 +795,7 @@
             <a:fld id="{BB7B7D7C-7587-458D-9F40-96275B4E0BF8}" type="datetime1">
               <a:rPr lang="ja-JP" altLang="en-US" smtClean="0"/>
               <a:pPr/>
-              <a:t>2015/12/18</a:t>
+              <a:t>2015/12/24</a:t>
             </a:fld>
             <a:endParaRPr lang="en-US"/>
           </a:p>
@@ -1018,7 +1018,7 @@
             <a:fld id="{79DDA3DF-8EBA-4683-A96B-9C379AE68A32}" type="datetime1">
               <a:rPr lang="ja-JP" altLang="en-US" smtClean="0"/>
               <a:pPr/>
-              <a:t>2015/12/18</a:t>
+              <a:t>2015/12/24</a:t>
             </a:fld>
             <a:endParaRPr lang="en-US"/>
           </a:p>
@@ -1255,7 +1255,21 @@
                 <a:latin typeface="Arial"/>
                 <a:cs typeface="Arial"/>
               </a:rPr>
-              <a:t>Copyright © 2015 NTT DATA </a:t>
+              <a:t>Copyright © </a:t>
+            </a:r>
+            <a:r>
+              <a:rPr lang="en-US" sz="600" dirty="0" smtClean="0">
+                <a:latin typeface="Arial"/>
+                <a:cs typeface="Arial"/>
+              </a:rPr>
+              <a:t>2015-2016 </a:t>
+            </a:r>
+            <a:r>
+              <a:rPr lang="en-US" sz="600" dirty="0" smtClean="0">
+                <a:latin typeface="Arial"/>
+                <a:cs typeface="Arial"/>
+              </a:rPr>
+              <a:t>NTT DATA </a:t>
             </a:r>
             <a:r>
               <a:rPr lang="en-US" sz="600" baseline="0" dirty="0" smtClean="0">
@@ -2392,14 +2406,7 @@
                 <a:latin typeface="Arial"/>
                 <a:cs typeface="Arial"/>
               </a:rPr>
-              <a:t>Copyright © 2015 NTT DATA </a:t>
-            </a:r>
-            <a:r>
-              <a:rPr lang="en-US" sz="600" baseline="0" dirty="0" smtClean="0">
-                <a:latin typeface="Arial"/>
-                <a:cs typeface="Arial"/>
-              </a:rPr>
-              <a:t>Corporation</a:t>
+              <a:t>Copyright © 2015-2016 NTT DATA Corporation</a:t>
             </a:r>
             <a:endParaRPr lang="en-US" sz="600" dirty="0">
               <a:latin typeface="Arial"/>
@@ -2681,7 +2688,21 @@
                 <a:latin typeface="Arial"/>
                 <a:cs typeface="Arial"/>
               </a:rPr>
-              <a:t>Copyright © 2015 NTT DATA </a:t>
+              <a:t>Copyright © </a:t>
+            </a:r>
+            <a:r>
+              <a:rPr lang="en-US" sz="600" dirty="0" smtClean="0">
+                <a:latin typeface="Arial"/>
+                <a:cs typeface="Arial"/>
+              </a:rPr>
+              <a:t>2015-2016 </a:t>
+            </a:r>
+            <a:r>
+              <a:rPr lang="en-US" sz="600" dirty="0" smtClean="0">
+                <a:latin typeface="Arial"/>
+                <a:cs typeface="Arial"/>
+              </a:rPr>
+              <a:t>NTT DATA </a:t>
             </a:r>
             <a:r>
               <a:rPr lang="en-US" sz="600" baseline="0" dirty="0" smtClean="0">
@@ -3321,7 +3342,21 @@
                 <a:latin typeface="Arial"/>
                 <a:cs typeface="Arial"/>
               </a:rPr>
-              <a:t>Copyright © 2015 NTT DATA </a:t>
+              <a:t>Copyright © </a:t>
+            </a:r>
+            <a:r>
+              <a:rPr lang="en-US" sz="600" dirty="0" smtClean="0">
+                <a:latin typeface="Arial"/>
+                <a:cs typeface="Arial"/>
+              </a:rPr>
+              <a:t>2015-2016 </a:t>
+            </a:r>
+            <a:r>
+              <a:rPr lang="en-US" sz="600" dirty="0" smtClean="0">
+                <a:latin typeface="Arial"/>
+                <a:cs typeface="Arial"/>
+              </a:rPr>
+              <a:t>NTT DATA </a:t>
             </a:r>
             <a:r>
               <a:rPr lang="en-US" sz="600" baseline="0" dirty="0" smtClean="0">
@@ -3961,7 +3996,21 @@
                 <a:latin typeface="Arial"/>
                 <a:cs typeface="Arial"/>
               </a:rPr>
-              <a:t>Copyright © 2015 NTT DATA </a:t>
+              <a:t>Copyright © </a:t>
+            </a:r>
+            <a:r>
+              <a:rPr lang="en-US" sz="600" dirty="0" smtClean="0">
+                <a:latin typeface="Arial"/>
+                <a:cs typeface="Arial"/>
+              </a:rPr>
+              <a:t>2015-2016 </a:t>
+            </a:r>
+            <a:r>
+              <a:rPr lang="en-US" sz="600" dirty="0" smtClean="0">
+                <a:latin typeface="Arial"/>
+                <a:cs typeface="Arial"/>
+              </a:rPr>
+              <a:t>NTT DATA </a:t>
             </a:r>
             <a:r>
               <a:rPr lang="en-US" sz="600" baseline="0" dirty="0" smtClean="0">
@@ -4595,7 +4644,21 @@
                 <a:latin typeface="Arial"/>
                 <a:cs typeface="Arial"/>
               </a:rPr>
-              <a:t>Copyright © 2015 NTT DATA </a:t>
+              <a:t>Copyright © </a:t>
+            </a:r>
+            <a:r>
+              <a:rPr lang="en-US" sz="600" dirty="0" smtClean="0">
+                <a:latin typeface="Arial"/>
+                <a:cs typeface="Arial"/>
+              </a:rPr>
+              <a:t>2015-2016 </a:t>
+            </a:r>
+            <a:r>
+              <a:rPr lang="en-US" sz="600" dirty="0" smtClean="0">
+                <a:latin typeface="Arial"/>
+                <a:cs typeface="Arial"/>
+              </a:rPr>
+              <a:t>NTT DATA </a:t>
             </a:r>
             <a:r>
               <a:rPr lang="en-US" sz="600" baseline="0" dirty="0" smtClean="0">
@@ -5229,7 +5292,21 @@
                 <a:latin typeface="Arial"/>
                 <a:cs typeface="Arial"/>
               </a:rPr>
-              <a:t>Copyright © 2015 NTT DATA </a:t>
+              <a:t>Copyright © </a:t>
+            </a:r>
+            <a:r>
+              <a:rPr lang="en-US" sz="600" dirty="0" smtClean="0">
+                <a:latin typeface="Arial"/>
+                <a:cs typeface="Arial"/>
+              </a:rPr>
+              <a:t>2015-2016 </a:t>
+            </a:r>
+            <a:r>
+              <a:rPr lang="en-US" sz="600" dirty="0" smtClean="0">
+                <a:latin typeface="Arial"/>
+                <a:cs typeface="Arial"/>
+              </a:rPr>
+              <a:t>NTT DATA </a:t>
             </a:r>
             <a:r>
               <a:rPr lang="en-US" sz="600" baseline="0" dirty="0" smtClean="0">
@@ -5777,14 +5854,7 @@
                 <a:latin typeface="Arial"/>
                 <a:cs typeface="Arial"/>
               </a:rPr>
-              <a:t>Copyright © 2015 NTT DATA </a:t>
-            </a:r>
-            <a:r>
-              <a:rPr lang="en-US" sz="600" baseline="0" dirty="0" smtClean="0">
-                <a:latin typeface="Arial"/>
-                <a:cs typeface="Arial"/>
-              </a:rPr>
-              <a:t>Corporation</a:t>
+              <a:t>Copyright © 2015-2016 NTT DATA Corporation</a:t>
             </a:r>
             <a:endParaRPr lang="en-US" sz="600" dirty="0">
               <a:latin typeface="Arial"/>
@@ -6602,14 +6672,7 @@
                 <a:latin typeface="Arial"/>
                 <a:cs typeface="Arial"/>
               </a:rPr>
-              <a:t>Copyright © 2015</a:t>
-            </a:r>
-            <a:r>
-              <a:rPr lang="en-US" sz="600" baseline="0" dirty="0" smtClean="0">
-                <a:latin typeface="Arial"/>
-                <a:cs typeface="Arial"/>
-              </a:rPr>
-              <a:t> NTT DATA Corporation</a:t>
+              <a:t>Copyright © 2015-2016 NTT DATA Corporation</a:t>
             </a:r>
             <a:endParaRPr lang="en-US" sz="600" dirty="0">
               <a:latin typeface="Arial"/>
@@ -7544,7 +7607,21 @@
                 <a:latin typeface="Arial"/>
                 <a:cs typeface="Arial"/>
               </a:rPr>
-              <a:t>Copyright © 2015 NTT DATA </a:t>
+              <a:t>Copyright © </a:t>
+            </a:r>
+            <a:r>
+              <a:rPr lang="en-US" sz="600" dirty="0" smtClean="0">
+                <a:latin typeface="Arial"/>
+                <a:cs typeface="Arial"/>
+              </a:rPr>
+              <a:t>2015-2016 </a:t>
+            </a:r>
+            <a:r>
+              <a:rPr lang="en-US" sz="600" dirty="0" smtClean="0">
+                <a:latin typeface="Arial"/>
+                <a:cs typeface="Arial"/>
+              </a:rPr>
+              <a:t>NTT DATA </a:t>
             </a:r>
             <a:r>
               <a:rPr lang="en-US" sz="600" baseline="0" dirty="0" smtClean="0">
@@ -7969,11 +8046,11 @@
               <a:t> </a:t>
             </a:r>
             <a:r>
-              <a:rPr lang="en-US" altLang="ja-JP" smtClean="0"/>
-              <a:t>3.5.1</a:t>
-            </a:r>
-            <a:r>
-              <a:rPr lang="ja-JP" altLang="en-US" smtClean="0"/>
+              <a:rPr lang="en-US" altLang="ja-JP" dirty="0" smtClean="0"/>
+              <a:t>3.6.0</a:t>
+            </a:r>
+            <a:r>
+              <a:rPr lang="ja-JP" altLang="en-US" dirty="0" smtClean="0"/>
               <a:t> </a:t>
             </a:r>
             <a:r>
@@ -14912,25 +14989,17 @@
             </a:br>
             <a:r>
               <a:rPr lang="ja-JP" altLang="en-US" sz="1600" dirty="0" smtClean="0"/>
-              <a:t>利用</a:t>
-            </a:r>
+              <a:t>利用します。</a:t>
+            </a:r>
+            <a:endParaRPr lang="en-US" altLang="ja-JP" sz="1600" dirty="0" smtClean="0"/>
+          </a:p>
+          <a:p>
+            <a:endParaRPr lang="en-US" altLang="ja-JP" sz="1600" dirty="0" smtClean="0"/>
+          </a:p>
+          <a:p>
             <a:r>
               <a:rPr lang="ja-JP" altLang="en-US" sz="1600" dirty="0" smtClean="0"/>
-              <a:t>します。</a:t>
-            </a:r>
-            <a:endParaRPr lang="en-US" altLang="ja-JP" sz="1600" dirty="0" smtClean="0"/>
-          </a:p>
-          <a:p>
-            <a:endParaRPr lang="en-US" altLang="ja-JP" sz="1600" dirty="0" smtClean="0"/>
-          </a:p>
-          <a:p>
-            <a:r>
-              <a:rPr lang="ja-JP" altLang="en-US" sz="1600" dirty="0" smtClean="0"/>
-              <a:t>入力チェック</a:t>
-            </a:r>
-            <a:r>
-              <a:rPr lang="ja-JP" altLang="en-US" sz="1600" dirty="0" smtClean="0"/>
-              <a:t>は</a:t>
+              <a:t>入力チェックは</a:t>
             </a:r>
             <a:r>
               <a:rPr lang="en-US" altLang="ja-JP" sz="1600" dirty="0"/>
@@ -14952,11 +15021,7 @@
             </a:br>
             <a:r>
               <a:rPr lang="ja-JP" altLang="en-US" sz="1600" dirty="0" smtClean="0"/>
-              <a:t>行われます</a:t>
-            </a:r>
-            <a:r>
-              <a:rPr lang="ja-JP" altLang="en-US" sz="1600" dirty="0" smtClean="0"/>
-              <a:t>。</a:t>
+              <a:t>行われます。</a:t>
             </a:r>
             <a:endParaRPr lang="en-US" altLang="ja-JP" sz="1600" dirty="0" smtClean="0"/>
           </a:p>
@@ -19950,7 +20015,7 @@
             </a:r>
             <a:r>
               <a:rPr kumimoji="1" lang="en-US" altLang="ja-JP" dirty="0" smtClean="0"/>
-              <a:t>3.5.0</a:t>
+              <a:t>3.6.0</a:t>
             </a:r>
             <a:r>
               <a:rPr kumimoji="1" lang="ja-JP" altLang="en-US" dirty="0" smtClean="0"/>
@@ -23075,7 +23140,7 @@
             <a:graphicData uri="http://schemas.openxmlformats.org/presentationml/2006/ole">
               <mc:AlternateContent xmlns:mc="http://schemas.openxmlformats.org/markup-compatibility/2006">
                 <mc:Choice xmlns:v="urn:schemas-microsoft-com:vml" Requires="v">
-                  <p:oleObj spid="_x0000_s2094" name="Visio" r:id="rId4" imgW="1046607" imgH="1232154" progId="">
+                  <p:oleObj spid="_x0000_s2099" name="Visio" r:id="rId4" imgW="1046607" imgH="1232154" progId="">
                     <p:embed/>
                   </p:oleObj>
                 </mc:Choice>
@@ -26867,7 +26932,7 @@
             <a:graphicData uri="http://schemas.openxmlformats.org/presentationml/2006/ole">
               <mc:AlternateContent xmlns:mc="http://schemas.openxmlformats.org/markup-compatibility/2006">
                 <mc:Choice xmlns:v="urn:schemas-microsoft-com:vml" Requires="v">
-                  <p:oleObj spid="_x0000_s3117" name="Visio" r:id="rId3" imgW="1046765" imgH="1232170" progId="">
+                  <p:oleObj spid="_x0000_s3122" name="Visio" r:id="rId3" imgW="1046765" imgH="1232170" progId="">
                     <p:embed/>
                   </p:oleObj>
                 </mc:Choice>

</xml_diff>

<commit_message>
fixed some layout #161
</commit_message>
<xml_diff>
--- a/architecture/TERASOLUNA Batch Framework for Java Version 3.x 説明資料.pptx
+++ b/architecture/TERASOLUNA Batch Framework for Java Version 3.x 説明資料.pptx
@@ -150,7 +150,7 @@
   </p:defaultTextStyle>
   <p:extLst>
     <p:ext uri="{EFAFB233-063F-42B5-8137-9DF3F51BA10A}">
-      <p15:sldGuideLst xmlns:p15="http://schemas.microsoft.com/office/powerpoint/2012/main" xmlns="">
+      <p15:sldGuideLst xmlns="" xmlns:p15="http://schemas.microsoft.com/office/powerpoint/2012/main">
         <p15:guide id="1" orient="horz" pos="2375">
           <p15:clr>
             <a:srgbClr val="A4A3A4"/>
@@ -169,7 +169,7 @@
       </p15:sldGuideLst>
     </p:ext>
     <p:ext uri="{2D200454-40CA-4A62-9FC3-DE9A4176ACB9}">
-      <p15:notesGuideLst xmlns:p15="http://schemas.microsoft.com/office/powerpoint/2012/main" xmlns="">
+      <p15:notesGuideLst xmlns="" xmlns:p15="http://schemas.microsoft.com/office/powerpoint/2012/main">
         <p15:guide id="1" orient="horz" pos="3128">
           <p15:clr>
             <a:srgbClr val="A4A3A4"/>
@@ -8172,7 +8172,21 @@
                 <a:latin typeface="Courier New" panose="02070309020205020404" pitchFamily="49" charset="0"/>
                 <a:cs typeface="Courier New" panose="02070309020205020404" pitchFamily="49" charset="0"/>
               </a:rPr>
-              <a:t>        &lt;property name=“</a:t>
+              <a:t>     </a:t>
+            </a:r>
+            <a:r>
+              <a:rPr kumimoji="1" lang="en-US" altLang="ja-JP" sz="1100" dirty="0" smtClean="0">
+                <a:latin typeface="Courier New" panose="02070309020205020404" pitchFamily="49" charset="0"/>
+                <a:cs typeface="Courier New" panose="02070309020205020404" pitchFamily="49" charset="0"/>
+              </a:rPr>
+              <a:t>&lt;</a:t>
+            </a:r>
+            <a:r>
+              <a:rPr kumimoji="1" lang="en-US" altLang="ja-JP" sz="1100" dirty="0" smtClean="0">
+                <a:latin typeface="Courier New" panose="02070309020205020404" pitchFamily="49" charset="0"/>
+                <a:cs typeface="Courier New" panose="02070309020205020404" pitchFamily="49" charset="0"/>
+              </a:rPr>
+              <a:t>property name=“</a:t>
             </a:r>
             <a:r>
               <a:rPr kumimoji="1" lang="en-US" altLang="ja-JP" sz="1100" dirty="0" err="1" smtClean="0">
@@ -8217,6 +8231,80 @@
           </a:p>
           <a:p>
             <a:r>
+              <a:rPr kumimoji="1" lang="en-US" altLang="ja-JP" sz="1100">
+                <a:latin typeface="Courier New" panose="02070309020205020404" pitchFamily="49" charset="0"/>
+                <a:ea typeface="ＭＳ Ｐゴシック" charset="-128"/>
+                <a:cs typeface="Courier New" panose="02070309020205020404" pitchFamily="49" charset="0"/>
+              </a:rPr>
+              <a:t> </a:t>
+            </a:r>
+            <a:r>
+              <a:rPr kumimoji="1" lang="en-US" altLang="ja-JP" sz="1100" smtClean="0">
+                <a:latin typeface="Courier New" panose="02070309020205020404" pitchFamily="49" charset="0"/>
+                <a:ea typeface="ＭＳ Ｐゴシック" charset="-128"/>
+                <a:cs typeface="Courier New" panose="02070309020205020404" pitchFamily="49" charset="0"/>
+              </a:rPr>
+              <a:t>     </a:t>
+            </a:r>
+            <a:r>
+              <a:rPr kumimoji="1" lang="en-US" altLang="ja-JP" sz="1100" smtClean="0">
+                <a:latin typeface="Courier New" panose="02070309020205020404" pitchFamily="49" charset="0"/>
+                <a:ea typeface="ＭＳ Ｐゴシック" charset="-128"/>
+                <a:cs typeface="Courier New" panose="02070309020205020404" pitchFamily="49" charset="0"/>
+              </a:rPr>
+              <a:t>&lt;</a:t>
+            </a:r>
+            <a:r>
+              <a:rPr kumimoji="1" lang="en-US" altLang="ja-JP" sz="1100" dirty="0" smtClean="0">
+                <a:latin typeface="Courier New" panose="02070309020205020404" pitchFamily="49" charset="0"/>
+                <a:ea typeface="ＭＳ Ｐゴシック" charset="-128"/>
+                <a:cs typeface="Courier New" panose="02070309020205020404" pitchFamily="49" charset="0"/>
+              </a:rPr>
+              <a:t>property name=“</a:t>
+            </a:r>
+            <a:r>
+              <a:rPr kumimoji="1" lang="en-US" altLang="ja-JP" sz="1100" dirty="0" err="1" smtClean="0">
+                <a:latin typeface="Courier New" panose="02070309020205020404" pitchFamily="49" charset="0"/>
+                <a:ea typeface="ＭＳ Ｐゴシック" charset="-128"/>
+                <a:cs typeface="Courier New" panose="02070309020205020404" pitchFamily="49" charset="0"/>
+              </a:rPr>
+              <a:t>sqlSessionTemplate</a:t>
+            </a:r>
+            <a:r>
+              <a:rPr kumimoji="1" lang="en-US" altLang="ja-JP" sz="1100" dirty="0" smtClean="0">
+                <a:latin typeface="Courier New" panose="02070309020205020404" pitchFamily="49" charset="0"/>
+                <a:ea typeface="ＭＳ Ｐゴシック" charset="-128"/>
+                <a:cs typeface="Courier New" panose="02070309020205020404" pitchFamily="49" charset="0"/>
+              </a:rPr>
+              <a:t>” ref=“</a:t>
+            </a:r>
+            <a:r>
+              <a:rPr kumimoji="1" lang="en-US" altLang="ja-JP" sz="1100" dirty="0" err="1">
+                <a:latin typeface="Courier New" panose="02070309020205020404" pitchFamily="49" charset="0"/>
+                <a:ea typeface="ＭＳ Ｐゴシック" charset="-128"/>
+                <a:cs typeface="Courier New" panose="02070309020205020404" pitchFamily="49" charset="0"/>
+              </a:rPr>
+              <a:t>s</a:t>
+            </a:r>
+            <a:r>
+              <a:rPr kumimoji="1" lang="en-US" altLang="ja-JP" sz="1100" dirty="0" err="1" smtClean="0">
+                <a:latin typeface="Courier New" panose="02070309020205020404" pitchFamily="49" charset="0"/>
+                <a:ea typeface="ＭＳ Ｐゴシック" charset="-128"/>
+                <a:cs typeface="Courier New" panose="02070309020205020404" pitchFamily="49" charset="0"/>
+              </a:rPr>
+              <a:t>qlSessionTemplate</a:t>
+            </a:r>
+            <a:r>
+              <a:rPr kumimoji="1" lang="en-US" altLang="ja-JP" sz="1100" dirty="0" smtClean="0">
+                <a:latin typeface="Courier New" panose="02070309020205020404" pitchFamily="49" charset="0"/>
+                <a:ea typeface="ＭＳ Ｐゴシック" charset="-128"/>
+                <a:cs typeface="Courier New" panose="02070309020205020404" pitchFamily="49" charset="0"/>
+              </a:rPr>
+              <a:t>” /&gt;</a:t>
+            </a:r>
+          </a:p>
+          <a:p>
+            <a:r>
               <a:rPr kumimoji="1" lang="en-US" altLang="ja-JP" sz="1100" dirty="0">
                 <a:latin typeface="Courier New" panose="02070309020205020404" pitchFamily="49" charset="0"/>
                 <a:ea typeface="ＭＳ Ｐゴシック" charset="-128"/>
@@ -8230,15 +8318,7 @@
                 <a:ea typeface="ＭＳ Ｐゴシック" charset="-128"/>
                 <a:cs typeface="Courier New" panose="02070309020205020404" pitchFamily="49" charset="0"/>
               </a:rPr>
-              <a:t>        &lt;property name=“</a:t>
-            </a:r>
-            <a:r>
-              <a:rPr kumimoji="1" lang="en-US" altLang="ja-JP" sz="1100" dirty="0" err="1" smtClean="0">
-                <a:latin typeface="Courier New" panose="02070309020205020404" pitchFamily="49" charset="0"/>
-                <a:ea typeface="ＭＳ Ｐゴシック" charset="-128"/>
-                <a:cs typeface="Courier New" panose="02070309020205020404" pitchFamily="49" charset="0"/>
-              </a:rPr>
-              <a:t>sqlSessionTemplate</a:t>
+              <a:t> </a:t>
             </a:r>
             <a:r>
               <a:rPr kumimoji="1" lang="en-US" altLang="ja-JP" sz="1100" dirty="0" smtClean="0">
@@ -8246,23 +8326,7 @@
                 <a:ea typeface="ＭＳ Ｐゴシック" charset="-128"/>
                 <a:cs typeface="Courier New" panose="02070309020205020404" pitchFamily="49" charset="0"/>
               </a:rPr>
-              <a:t>” ref=“</a:t>
-            </a:r>
-            <a:r>
-              <a:rPr kumimoji="1" lang="en-US" altLang="ja-JP" sz="1100" dirty="0" err="1">
-                <a:latin typeface="Courier New" panose="02070309020205020404" pitchFamily="49" charset="0"/>
-                <a:ea typeface="ＭＳ Ｐゴシック" charset="-128"/>
-                <a:cs typeface="Courier New" panose="02070309020205020404" pitchFamily="49" charset="0"/>
-              </a:rPr>
-              <a:t>s</a:t>
-            </a:r>
-            <a:r>
-              <a:rPr kumimoji="1" lang="en-US" altLang="ja-JP" sz="1100" dirty="0" err="1" smtClean="0">
-                <a:latin typeface="Courier New" panose="02070309020205020404" pitchFamily="49" charset="0"/>
-                <a:ea typeface="ＭＳ Ｐゴシック" charset="-128"/>
-                <a:cs typeface="Courier New" panose="02070309020205020404" pitchFamily="49" charset="0"/>
-              </a:rPr>
-              <a:t>qlSessionTemplate</a:t>
+              <a:t>&lt;/</a:t>
             </a:r>
             <a:r>
               <a:rPr kumimoji="1" lang="en-US" altLang="ja-JP" sz="1100" dirty="0" smtClean="0">
@@ -8270,25 +8334,7 @@
                 <a:ea typeface="ＭＳ Ｐゴシック" charset="-128"/>
                 <a:cs typeface="Courier New" panose="02070309020205020404" pitchFamily="49" charset="0"/>
               </a:rPr>
-              <a:t>” /&gt;</a:t>
-            </a:r>
-          </a:p>
-          <a:p>
-            <a:r>
-              <a:rPr kumimoji="1" lang="en-US" altLang="ja-JP" sz="1100" dirty="0">
-                <a:latin typeface="Courier New" panose="02070309020205020404" pitchFamily="49" charset="0"/>
-                <a:ea typeface="ＭＳ Ｐゴシック" charset="-128"/>
-                <a:cs typeface="Courier New" panose="02070309020205020404" pitchFamily="49" charset="0"/>
-              </a:rPr>
-              <a:t> </a:t>
-            </a:r>
-            <a:r>
-              <a:rPr kumimoji="1" lang="en-US" altLang="ja-JP" sz="1100" dirty="0" smtClean="0">
-                <a:latin typeface="Courier New" panose="02070309020205020404" pitchFamily="49" charset="0"/>
-                <a:ea typeface="ＭＳ Ｐゴシック" charset="-128"/>
-                <a:cs typeface="Courier New" panose="02070309020205020404" pitchFamily="49" charset="0"/>
-              </a:rPr>
-              <a:t>   &lt;/bean&gt;</a:t>
+              <a:t>bean&gt;</a:t>
             </a:r>
           </a:p>
         </p:txBody>
@@ -8748,6 +8794,14 @@
               <a:t>　　　</a:t>
             </a:r>
             <a:r>
+              <a:rPr kumimoji="1" lang="ja-JP" altLang="en-US" sz="1100" dirty="0" smtClean="0">
+                <a:latin typeface="Courier New" panose="02070309020205020404" pitchFamily="49" charset="0"/>
+                <a:ea typeface="ＭＳ Ｐゴシック" charset="-128"/>
+                <a:cs typeface="Courier New" panose="02070309020205020404" pitchFamily="49" charset="0"/>
+              </a:rPr>
+              <a:t>    </a:t>
+            </a:r>
+            <a:r>
               <a:rPr kumimoji="1" lang="en-US" altLang="ja-JP" sz="1100" dirty="0" smtClean="0">
                 <a:latin typeface="Courier New" panose="02070309020205020404" pitchFamily="49" charset="0"/>
                 <a:ea typeface="ＭＳ Ｐゴシック" charset="-128"/>
@@ -8755,6 +8809,11 @@
               </a:rPr>
               <a:t>WHERE</a:t>
             </a:r>
+            <a:endParaRPr kumimoji="1" lang="en-US" altLang="ja-JP" sz="1100" dirty="0" smtClean="0">
+              <a:latin typeface="Courier New" panose="02070309020205020404" pitchFamily="49" charset="0"/>
+              <a:ea typeface="ＭＳ Ｐゴシック" charset="-128"/>
+              <a:cs typeface="Courier New" panose="02070309020205020404" pitchFamily="49" charset="0"/>
+            </a:endParaRPr>
           </a:p>
           <a:p>
             <a:r>
@@ -12053,8 +12112,8 @@
         </p:nvSpPr>
         <p:spPr bwMode="auto">
           <a:xfrm>
-            <a:off x="200472" y="3789040"/>
-            <a:ext cx="5400600" cy="2952328"/>
+            <a:off x="200472" y="3440745"/>
+            <a:ext cx="4170643" cy="3300624"/>
           </a:xfrm>
           <a:prstGeom prst="rect">
             <a:avLst/>
@@ -12081,65 +12140,481 @@
           <a:p>
             <a:r>
               <a:rPr lang="en-US" altLang="ja-JP" sz="1050" dirty="0" smtClean="0">
-                <a:latin typeface="Courier New" pitchFamily="49" charset="0"/>
-                <a:cs typeface="Courier New" pitchFamily="49" charset="0"/>
+                <a:latin typeface="Courier New" panose="02070309020205020404" pitchFamily="49" charset="0"/>
+                <a:ea typeface="ＭＳ Ｐゴシック" panose="020B0600070205080204" pitchFamily="50" charset="-128"/>
+                <a:cs typeface="Courier New" panose="02070309020205020404" pitchFamily="49" charset="0"/>
               </a:rPr>
               <a:t>@</a:t>
             </a:r>
             <a:r>
               <a:rPr lang="en-US" altLang="ja-JP" sz="1050" dirty="0" err="1" smtClean="0">
-                <a:latin typeface="Courier New" pitchFamily="49" charset="0"/>
-                <a:cs typeface="Courier New" pitchFamily="49" charset="0"/>
+                <a:latin typeface="Courier New" panose="02070309020205020404" pitchFamily="49" charset="0"/>
+                <a:ea typeface="ＭＳ Ｐゴシック" panose="020B0600070205080204" pitchFamily="50" charset="-128"/>
+                <a:cs typeface="Courier New" panose="02070309020205020404" pitchFamily="49" charset="0"/>
               </a:rPr>
               <a:t>FileFormat</a:t>
             </a:r>
             <a:endParaRPr lang="en-US" altLang="ja-JP" sz="1050" dirty="0" smtClean="0">
-              <a:latin typeface="Courier New" pitchFamily="49" charset="0"/>
-              <a:cs typeface="Courier New" pitchFamily="49" charset="0"/>
+              <a:latin typeface="Courier New" panose="02070309020205020404" pitchFamily="49" charset="0"/>
+              <a:ea typeface="ＭＳ Ｐゴシック" panose="020B0600070205080204" pitchFamily="50" charset="-128"/>
+              <a:cs typeface="Courier New" panose="02070309020205020404" pitchFamily="49" charset="0"/>
             </a:endParaRPr>
           </a:p>
           <a:p>
             <a:r>
               <a:rPr lang="en-US" altLang="ja-JP" sz="1050" dirty="0" smtClean="0">
-                <a:latin typeface="Courier New" pitchFamily="49" charset="0"/>
-                <a:cs typeface="Courier New" pitchFamily="49" charset="0"/>
+                <a:latin typeface="Courier New" panose="02070309020205020404" pitchFamily="49" charset="0"/>
+                <a:ea typeface="ＭＳ Ｐゴシック" panose="020B0600070205080204" pitchFamily="50" charset="-128"/>
+                <a:cs typeface="Courier New" panose="02070309020205020404" pitchFamily="49" charset="0"/>
               </a:rPr>
               <a:t>public class </a:t>
             </a:r>
             <a:r>
               <a:rPr lang="en-US" altLang="ja-JP" sz="1050" dirty="0" err="1" smtClean="0">
-                <a:latin typeface="Courier New" pitchFamily="49" charset="0"/>
-                <a:cs typeface="Courier New" pitchFamily="49" charset="0"/>
+                <a:latin typeface="Courier New" panose="02070309020205020404" pitchFamily="49" charset="0"/>
+                <a:ea typeface="ＭＳ Ｐゴシック" panose="020B0600070205080204" pitchFamily="50" charset="-128"/>
+                <a:cs typeface="Courier New" panose="02070309020205020404" pitchFamily="49" charset="0"/>
               </a:rPr>
               <a:t>SampleFileLineObject</a:t>
             </a:r>
             <a:r>
               <a:rPr lang="en-US" altLang="ja-JP" sz="1050" dirty="0" smtClean="0">
-                <a:latin typeface="Courier New" pitchFamily="49" charset="0"/>
-                <a:cs typeface="Courier New" pitchFamily="49" charset="0"/>
+                <a:latin typeface="Courier New" panose="02070309020205020404" pitchFamily="49" charset="0"/>
+                <a:ea typeface="ＭＳ Ｐゴシック" panose="020B0600070205080204" pitchFamily="50" charset="-128"/>
+                <a:cs typeface="Courier New" panose="02070309020205020404" pitchFamily="49" charset="0"/>
               </a:rPr>
               <a:t> {</a:t>
             </a:r>
           </a:p>
           <a:p>
+            <a:endParaRPr lang="en-US" altLang="ja-JP" sz="1050" dirty="0" smtClean="0">
+              <a:latin typeface="Courier New" panose="02070309020205020404" pitchFamily="49" charset="0"/>
+              <a:ea typeface="ＭＳ Ｐゴシック" panose="020B0600070205080204" pitchFamily="50" charset="-128"/>
+              <a:cs typeface="Courier New" panose="02070309020205020404" pitchFamily="49" charset="0"/>
+            </a:endParaRPr>
+          </a:p>
+          <a:p>
             <a:r>
               <a:rPr lang="en-US" altLang="ja-JP" sz="1050" dirty="0" smtClean="0">
-                <a:latin typeface="Courier New" pitchFamily="49" charset="0"/>
-                <a:cs typeface="Courier New" pitchFamily="49" charset="0"/>
+                <a:latin typeface="Courier New" panose="02070309020205020404" pitchFamily="49" charset="0"/>
+                <a:ea typeface="ＭＳ Ｐゴシック" panose="020B0600070205080204" pitchFamily="50" charset="-128"/>
+                <a:cs typeface="Courier New" panose="02070309020205020404" pitchFamily="49" charset="0"/>
               </a:rPr>
               <a:t>    </a:t>
             </a:r>
             <a:r>
+              <a:rPr lang="en-US" altLang="ja-JP" sz="1050" dirty="0" smtClean="0">
+                <a:latin typeface="Courier New" panose="02070309020205020404" pitchFamily="49" charset="0"/>
+                <a:ea typeface="ＭＳ Ｐゴシック" panose="020B0600070205080204" pitchFamily="50" charset="-128"/>
+                <a:cs typeface="Courier New" panose="02070309020205020404" pitchFamily="49" charset="0"/>
+              </a:rPr>
+              <a:t>@InputFileColumn(</a:t>
+            </a:r>
+          </a:p>
+          <a:p>
+            <a:r>
+              <a:rPr lang="en-US" altLang="ja-JP" sz="1050" dirty="0" smtClean="0">
+                <a:latin typeface="Courier New" panose="02070309020205020404" pitchFamily="49" charset="0"/>
+                <a:ea typeface="ＭＳ Ｐゴシック" panose="020B0600070205080204" pitchFamily="50" charset="-128"/>
+                <a:cs typeface="Courier New" panose="02070309020205020404" pitchFamily="49" charset="0"/>
+              </a:rPr>
+              <a:t>         </a:t>
+            </a:r>
+            <a:r>
+              <a:rPr lang="en-US" altLang="ja-JP" sz="1050" dirty="0" smtClean="0">
+                <a:latin typeface="Courier New" panose="02070309020205020404" pitchFamily="49" charset="0"/>
+                <a:ea typeface="ＭＳ Ｐゴシック" panose="020B0600070205080204" pitchFamily="50" charset="-128"/>
+                <a:cs typeface="Courier New" panose="02070309020205020404" pitchFamily="49" charset="0"/>
+              </a:rPr>
+              <a:t>columnIndex </a:t>
+            </a:r>
+            <a:r>
+              <a:rPr lang="en-US" altLang="ja-JP" sz="1050" dirty="0" smtClean="0">
+                <a:latin typeface="Courier New" panose="02070309020205020404" pitchFamily="49" charset="0"/>
+                <a:ea typeface="ＭＳ Ｐゴシック" panose="020B0600070205080204" pitchFamily="50" charset="-128"/>
+                <a:cs typeface="Courier New" panose="02070309020205020404" pitchFamily="49" charset="0"/>
+              </a:rPr>
+              <a:t>= 0,</a:t>
+            </a:r>
+          </a:p>
+          <a:p>
+            <a:r>
+              <a:rPr lang="en-US" altLang="ja-JP" sz="1050" dirty="0" smtClean="0">
+                <a:latin typeface="Courier New" panose="02070309020205020404" pitchFamily="49" charset="0"/>
+                <a:ea typeface="ＭＳ Ｐゴシック" panose="020B0600070205080204" pitchFamily="50" charset="-128"/>
+                <a:cs typeface="Courier New" panose="02070309020205020404" pitchFamily="49" charset="0"/>
+              </a:rPr>
+              <a:t>        </a:t>
+            </a:r>
+            <a:r>
+              <a:rPr lang="en-US" altLang="ja-JP" sz="1050" dirty="0" smtClean="0">
+                <a:latin typeface="Courier New" panose="02070309020205020404" pitchFamily="49" charset="0"/>
+                <a:ea typeface="ＭＳ Ｐゴシック" panose="020B0600070205080204" pitchFamily="50" charset="-128"/>
+                <a:cs typeface="Courier New" panose="02070309020205020404" pitchFamily="49" charset="0"/>
+              </a:rPr>
+              <a:t> </a:t>
+            </a:r>
+            <a:r>
+              <a:rPr lang="en-US" altLang="ja-JP" sz="1050" dirty="0" err="1" smtClean="0">
+                <a:latin typeface="Courier New" panose="02070309020205020404" pitchFamily="49" charset="0"/>
+                <a:ea typeface="ＭＳ Ｐゴシック" panose="020B0600070205080204" pitchFamily="50" charset="-128"/>
+                <a:cs typeface="Courier New" panose="02070309020205020404" pitchFamily="49" charset="0"/>
+              </a:rPr>
+              <a:t>columnFormat</a:t>
+            </a:r>
+            <a:r>
+              <a:rPr lang="en-US" altLang="ja-JP" sz="1050" dirty="0" smtClean="0">
+                <a:latin typeface="Courier New" panose="02070309020205020404" pitchFamily="49" charset="0"/>
+                <a:ea typeface="ＭＳ Ｐゴシック" panose="020B0600070205080204" pitchFamily="50" charset="-128"/>
+                <a:cs typeface="Courier New" panose="02070309020205020404" pitchFamily="49" charset="0"/>
+              </a:rPr>
+              <a:t>=”yyyy/MM/dd</a:t>
+            </a:r>
+            <a:r>
+              <a:rPr lang="en-US" altLang="ja-JP" sz="1050" dirty="0" smtClean="0">
+                <a:latin typeface="Courier New" panose="02070309020205020404" pitchFamily="49" charset="0"/>
+                <a:ea typeface="ＭＳ Ｐゴシック" panose="020B0600070205080204" pitchFamily="50" charset="-128"/>
+                <a:cs typeface="Courier New" panose="02070309020205020404" pitchFamily="49" charset="0"/>
+              </a:rPr>
+              <a:t>”)</a:t>
+            </a:r>
+          </a:p>
+          <a:p>
+            <a:r>
               <a:rPr lang="ja-JP" altLang="en-US" sz="1050" dirty="0" smtClean="0">
-                <a:latin typeface="Courier New" pitchFamily="49" charset="0"/>
-                <a:cs typeface="Courier New" pitchFamily="49" charset="0"/>
+                <a:latin typeface="Courier New" panose="02070309020205020404" pitchFamily="49" charset="0"/>
+                <a:ea typeface="ＭＳ Ｐゴシック" panose="020B0600070205080204" pitchFamily="50" charset="-128"/>
+                <a:cs typeface="Courier New" panose="02070309020205020404" pitchFamily="49" charset="0"/>
+              </a:rPr>
+              <a:t>　 </a:t>
+            </a:r>
+            <a:r>
+              <a:rPr lang="ja-JP" altLang="en-US" sz="1050" dirty="0" smtClean="0">
+                <a:latin typeface="Courier New" panose="02070309020205020404" pitchFamily="49" charset="0"/>
+                <a:ea typeface="ＭＳ Ｐゴシック" panose="020B0600070205080204" pitchFamily="50" charset="-128"/>
+                <a:cs typeface="Courier New" panose="02070309020205020404" pitchFamily="49" charset="0"/>
+              </a:rPr>
+              <a:t>  </a:t>
+            </a:r>
+            <a:r>
+              <a:rPr lang="en-US" altLang="ja-JP" sz="1050" dirty="0" smtClean="0">
+                <a:latin typeface="Courier New" panose="02070309020205020404" pitchFamily="49" charset="0"/>
+                <a:ea typeface="ＭＳ Ｐゴシック" panose="020B0600070205080204" pitchFamily="50" charset="-128"/>
+                <a:cs typeface="Courier New" panose="02070309020205020404" pitchFamily="49" charset="0"/>
+              </a:rPr>
+              <a:t>private </a:t>
+            </a:r>
+            <a:r>
+              <a:rPr lang="en-US" altLang="ja-JP" sz="1050" dirty="0" smtClean="0">
+                <a:latin typeface="Courier New" panose="02070309020205020404" pitchFamily="49" charset="0"/>
+                <a:ea typeface="ＭＳ Ｐゴシック" panose="020B0600070205080204" pitchFamily="50" charset="-128"/>
+                <a:cs typeface="Courier New" panose="02070309020205020404" pitchFamily="49" charset="0"/>
+              </a:rPr>
+              <a:t>Date </a:t>
+            </a:r>
+            <a:r>
+              <a:rPr lang="en-US" altLang="ja-JP" sz="1050" dirty="0" err="1" smtClean="0">
+                <a:latin typeface="Courier New" panose="02070309020205020404" pitchFamily="49" charset="0"/>
+                <a:ea typeface="ＭＳ Ｐゴシック" panose="020B0600070205080204" pitchFamily="50" charset="-128"/>
+                <a:cs typeface="Courier New" panose="02070309020205020404" pitchFamily="49" charset="0"/>
+              </a:rPr>
+              <a:t>hiduke</a:t>
+            </a:r>
+            <a:r>
+              <a:rPr lang="en-US" altLang="ja-JP" sz="1050" dirty="0" smtClean="0">
+                <a:latin typeface="Courier New" panose="02070309020205020404" pitchFamily="49" charset="0"/>
+                <a:ea typeface="ＭＳ Ｐゴシック" panose="020B0600070205080204" pitchFamily="50" charset="-128"/>
+                <a:cs typeface="Courier New" panose="02070309020205020404" pitchFamily="49" charset="0"/>
+              </a:rPr>
+              <a:t> = null;</a:t>
+            </a:r>
+          </a:p>
+          <a:p>
+            <a:endParaRPr lang="en-US" altLang="ja-JP" sz="1050" dirty="0" smtClean="0">
+              <a:latin typeface="Courier New" panose="02070309020205020404" pitchFamily="49" charset="0"/>
+              <a:ea typeface="ＭＳ Ｐゴシック" panose="020B0600070205080204" pitchFamily="50" charset="-128"/>
+              <a:cs typeface="Courier New" panose="02070309020205020404" pitchFamily="49" charset="0"/>
+            </a:endParaRPr>
+          </a:p>
+          <a:p>
+            <a:r>
+              <a:rPr lang="en-US" altLang="ja-JP" sz="1050" dirty="0" smtClean="0">
+                <a:latin typeface="Courier New" panose="02070309020205020404" pitchFamily="49" charset="0"/>
+                <a:ea typeface="ＭＳ Ｐゴシック" panose="020B0600070205080204" pitchFamily="50" charset="-128"/>
+                <a:cs typeface="Courier New" panose="02070309020205020404" pitchFamily="49" charset="0"/>
+              </a:rPr>
+              <a:t>    </a:t>
+            </a:r>
+            <a:r>
+              <a:rPr lang="en-US" altLang="ja-JP" sz="1050" dirty="0" smtClean="0">
+                <a:latin typeface="Courier New" panose="02070309020205020404" pitchFamily="49" charset="0"/>
+                <a:ea typeface="ＭＳ Ｐゴシック" panose="020B0600070205080204" pitchFamily="50" charset="-128"/>
+                <a:cs typeface="Courier New" panose="02070309020205020404" pitchFamily="49" charset="0"/>
+              </a:rPr>
+              <a:t>@InputFileColumn(</a:t>
+            </a:r>
+          </a:p>
+          <a:p>
+            <a:r>
+              <a:rPr lang="en-US" altLang="ja-JP" sz="1050" dirty="0" smtClean="0">
+                <a:latin typeface="Courier New" panose="02070309020205020404" pitchFamily="49" charset="0"/>
+                <a:ea typeface="ＭＳ Ｐゴシック" panose="020B0600070205080204" pitchFamily="50" charset="-128"/>
+                <a:cs typeface="Courier New" panose="02070309020205020404" pitchFamily="49" charset="0"/>
+              </a:rPr>
+              <a:t>            </a:t>
+            </a:r>
+            <a:r>
+              <a:rPr lang="en-US" altLang="ja-JP" sz="1050" dirty="0" err="1" smtClean="0">
+                <a:latin typeface="Courier New" panose="02070309020205020404" pitchFamily="49" charset="0"/>
+                <a:ea typeface="ＭＳ Ｐゴシック" panose="020B0600070205080204" pitchFamily="50" charset="-128"/>
+                <a:cs typeface="Courier New" panose="02070309020205020404" pitchFamily="49" charset="0"/>
+              </a:rPr>
+              <a:t>columnIndex</a:t>
+            </a:r>
+            <a:r>
+              <a:rPr lang="en-US" altLang="ja-JP" sz="1050" dirty="0" smtClean="0">
+                <a:latin typeface="Courier New" panose="02070309020205020404" pitchFamily="49" charset="0"/>
+                <a:ea typeface="ＭＳ Ｐゴシック" panose="020B0600070205080204" pitchFamily="50" charset="-128"/>
+                <a:cs typeface="Courier New" panose="02070309020205020404" pitchFamily="49" charset="0"/>
+              </a:rPr>
+              <a:t> = 1,</a:t>
+            </a:r>
+          </a:p>
+          <a:p>
+            <a:r>
+              <a:rPr lang="en-US" altLang="ja-JP" sz="1050" dirty="0" smtClean="0">
+                <a:latin typeface="Courier New" panose="02070309020205020404" pitchFamily="49" charset="0"/>
+                <a:ea typeface="ＭＳ Ｐゴシック" panose="020B0600070205080204" pitchFamily="50" charset="-128"/>
+                <a:cs typeface="Courier New" panose="02070309020205020404" pitchFamily="49" charset="0"/>
+              </a:rPr>
+              <a:t>            </a:t>
+            </a:r>
+            <a:r>
+              <a:rPr lang="en-US" altLang="ja-JP" sz="1050" dirty="0" err="1" smtClean="0">
+                <a:latin typeface="Courier New" panose="02070309020205020404" pitchFamily="49" charset="0"/>
+                <a:ea typeface="ＭＳ Ｐゴシック" panose="020B0600070205080204" pitchFamily="50" charset="-128"/>
+                <a:cs typeface="Courier New" panose="02070309020205020404" pitchFamily="49" charset="0"/>
+              </a:rPr>
+              <a:t>stringConverter</a:t>
+            </a:r>
+            <a:r>
+              <a:rPr lang="en-US" altLang="ja-JP" sz="1050" dirty="0" smtClean="0">
+                <a:latin typeface="Courier New" panose="02070309020205020404" pitchFamily="49" charset="0"/>
+                <a:ea typeface="ＭＳ Ｐゴシック" panose="020B0600070205080204" pitchFamily="50" charset="-128"/>
+                <a:cs typeface="Courier New" panose="02070309020205020404" pitchFamily="49" charset="0"/>
+              </a:rPr>
+              <a:t> =</a:t>
+            </a:r>
+          </a:p>
+          <a:p>
+            <a:r>
+              <a:rPr lang="en-US" altLang="ja-JP" sz="1050" dirty="0">
+                <a:latin typeface="Courier New" panose="02070309020205020404" pitchFamily="49" charset="0"/>
+                <a:ea typeface="ＭＳ Ｐゴシック" panose="020B0600070205080204" pitchFamily="50" charset="-128"/>
+                <a:cs typeface="Courier New" panose="02070309020205020404" pitchFamily="49" charset="0"/>
+              </a:rPr>
+              <a:t> </a:t>
+            </a:r>
+            <a:r>
+              <a:rPr lang="en-US" altLang="ja-JP" sz="1050" dirty="0" smtClean="0">
+                <a:latin typeface="Courier New" panose="02070309020205020404" pitchFamily="49" charset="0"/>
+                <a:ea typeface="ＭＳ Ｐゴシック" panose="020B0600070205080204" pitchFamily="50" charset="-128"/>
+                <a:cs typeface="Courier New" panose="02070309020205020404" pitchFamily="49" charset="0"/>
+              </a:rPr>
+              <a:t>             </a:t>
+            </a:r>
+            <a:r>
+              <a:rPr lang="en-US" altLang="ja-JP" sz="1050" dirty="0" smtClean="0">
+                <a:latin typeface="Courier New" panose="02070309020205020404" pitchFamily="49" charset="0"/>
+                <a:ea typeface="ＭＳ Ｐゴシック" panose="020B0600070205080204" pitchFamily="50" charset="-128"/>
+                <a:cs typeface="Courier New" panose="02070309020205020404" pitchFamily="49" charset="0"/>
+              </a:rPr>
+              <a:t>  </a:t>
+            </a:r>
+            <a:r>
+              <a:rPr lang="en-US" altLang="ja-JP" sz="1050" dirty="0" err="1" smtClean="0">
+                <a:latin typeface="Courier New" panose="02070309020205020404" pitchFamily="49" charset="0"/>
+                <a:ea typeface="ＭＳ Ｐゴシック" panose="020B0600070205080204" pitchFamily="50" charset="-128"/>
+                <a:cs typeface="Courier New" panose="02070309020205020404" pitchFamily="49" charset="0"/>
+              </a:rPr>
+              <a:t>StringConverterToUpperCase.class</a:t>
+            </a:r>
+            <a:r>
+              <a:rPr lang="en-US" altLang="ja-JP" sz="1050" dirty="0" smtClean="0">
+                <a:latin typeface="Courier New" panose="02070309020205020404" pitchFamily="49" charset="0"/>
+                <a:ea typeface="ＭＳ Ｐゴシック" panose="020B0600070205080204" pitchFamily="50" charset="-128"/>
+                <a:cs typeface="Courier New" panose="02070309020205020404" pitchFamily="49" charset="0"/>
+              </a:rPr>
+              <a:t>)</a:t>
+            </a:r>
+          </a:p>
+          <a:p>
+            <a:r>
+              <a:rPr lang="en-US" altLang="ja-JP" sz="1050" dirty="0" smtClean="0">
+                <a:latin typeface="Courier New" panose="02070309020205020404" pitchFamily="49" charset="0"/>
+                <a:ea typeface="ＭＳ Ｐゴシック" panose="020B0600070205080204" pitchFamily="50" charset="-128"/>
+                <a:cs typeface="Courier New" panose="02070309020205020404" pitchFamily="49" charset="0"/>
+              </a:rPr>
+              <a:t>    private String </a:t>
+            </a:r>
+            <a:r>
+              <a:rPr lang="en-US" altLang="ja-JP" sz="1050" dirty="0" err="1" smtClean="0">
+                <a:latin typeface="Courier New" panose="02070309020205020404" pitchFamily="49" charset="0"/>
+                <a:ea typeface="ＭＳ Ｐゴシック" panose="020B0600070205080204" pitchFamily="50" charset="-128"/>
+                <a:cs typeface="Courier New" panose="02070309020205020404" pitchFamily="49" charset="0"/>
+              </a:rPr>
+              <a:t>shopId</a:t>
+            </a:r>
+            <a:r>
+              <a:rPr lang="en-US" altLang="ja-JP" sz="1050" dirty="0" smtClean="0">
+                <a:latin typeface="Courier New" panose="02070309020205020404" pitchFamily="49" charset="0"/>
+                <a:ea typeface="ＭＳ Ｐゴシック" panose="020B0600070205080204" pitchFamily="50" charset="-128"/>
+                <a:cs typeface="Courier New" panose="02070309020205020404" pitchFamily="49" charset="0"/>
+              </a:rPr>
+              <a:t> = null;</a:t>
+            </a:r>
+          </a:p>
+          <a:p>
+            <a:endParaRPr lang="en-US" altLang="ja-JP" sz="1050" dirty="0" smtClean="0">
+              <a:latin typeface="Courier New" panose="02070309020205020404" pitchFamily="49" charset="0"/>
+              <a:ea typeface="ＭＳ Ｐゴシック" panose="020B0600070205080204" pitchFamily="50" charset="-128"/>
+              <a:cs typeface="Courier New" panose="02070309020205020404" pitchFamily="49" charset="0"/>
+            </a:endParaRPr>
+          </a:p>
+          <a:p>
+            <a:r>
+              <a:rPr lang="en-US" altLang="ja-JP" sz="1050" dirty="0" smtClean="0">
+                <a:latin typeface="Courier New" panose="02070309020205020404" pitchFamily="49" charset="0"/>
+                <a:ea typeface="ＭＳ Ｐゴシック" panose="020B0600070205080204" pitchFamily="50" charset="-128"/>
+                <a:cs typeface="Courier New" panose="02070309020205020404" pitchFamily="49" charset="0"/>
+              </a:rPr>
+              <a:t>    </a:t>
+            </a:r>
+            <a:r>
+              <a:rPr lang="en-US" altLang="ja-JP" sz="1050" dirty="0" smtClean="0">
+                <a:latin typeface="Courier New" panose="02070309020205020404" pitchFamily="49" charset="0"/>
+                <a:ea typeface="ＭＳ Ｐゴシック" panose="020B0600070205080204" pitchFamily="50" charset="-128"/>
+                <a:cs typeface="Courier New" panose="02070309020205020404" pitchFamily="49" charset="0"/>
+              </a:rPr>
+              <a:t>@InputFileColumn(</a:t>
+            </a:r>
+          </a:p>
+          <a:p>
+            <a:r>
+              <a:rPr lang="en-US" altLang="ja-JP" sz="1050" dirty="0" smtClean="0">
+                <a:latin typeface="Courier New" panose="02070309020205020404" pitchFamily="49" charset="0"/>
+                <a:ea typeface="ＭＳ Ｐゴシック" panose="020B0600070205080204" pitchFamily="50" charset="-128"/>
+                <a:cs typeface="Courier New" panose="02070309020205020404" pitchFamily="49" charset="0"/>
+              </a:rPr>
+              <a:t>            </a:t>
+            </a:r>
+            <a:r>
+              <a:rPr lang="en-US" altLang="ja-JP" sz="1050" dirty="0" err="1" smtClean="0">
+                <a:latin typeface="Courier New" panose="02070309020205020404" pitchFamily="49" charset="0"/>
+                <a:ea typeface="ＭＳ Ｐゴシック" panose="020B0600070205080204" pitchFamily="50" charset="-128"/>
+                <a:cs typeface="Courier New" panose="02070309020205020404" pitchFamily="49" charset="0"/>
+              </a:rPr>
+              <a:t>columnIndex</a:t>
+            </a:r>
+            <a:r>
+              <a:rPr lang="en-US" altLang="ja-JP" sz="1050" dirty="0" smtClean="0">
+                <a:latin typeface="Courier New" panose="02070309020205020404" pitchFamily="49" charset="0"/>
+                <a:ea typeface="ＭＳ Ｐゴシック" panose="020B0600070205080204" pitchFamily="50" charset="-128"/>
+                <a:cs typeface="Courier New" panose="02070309020205020404" pitchFamily="49" charset="0"/>
+              </a:rPr>
+              <a:t> = 2,</a:t>
+            </a:r>
+          </a:p>
+          <a:p>
+            <a:r>
+              <a:rPr lang="en-US" altLang="ja-JP" sz="1050" dirty="0" smtClean="0">
+                <a:latin typeface="Courier New" panose="02070309020205020404" pitchFamily="49" charset="0"/>
+                <a:ea typeface="ＭＳ Ｐゴシック" panose="020B0600070205080204" pitchFamily="50" charset="-128"/>
+                <a:cs typeface="Courier New" panose="02070309020205020404" pitchFamily="49" charset="0"/>
+              </a:rPr>
+              <a:t>            </a:t>
+            </a:r>
+            <a:r>
+              <a:rPr lang="en-US" altLang="ja-JP" sz="1050" dirty="0" err="1" smtClean="0">
+                <a:latin typeface="Courier New" panose="02070309020205020404" pitchFamily="49" charset="0"/>
+                <a:ea typeface="ＭＳ Ｐゴシック" panose="020B0600070205080204" pitchFamily="50" charset="-128"/>
+                <a:cs typeface="Courier New" panose="02070309020205020404" pitchFamily="49" charset="0"/>
+              </a:rPr>
+              <a:t>columnFormat</a:t>
+            </a:r>
+            <a:r>
+              <a:rPr lang="en-US" altLang="ja-JP" sz="1050" dirty="0" smtClean="0">
+                <a:latin typeface="Courier New" panose="02070309020205020404" pitchFamily="49" charset="0"/>
+                <a:ea typeface="ＭＳ Ｐゴシック" panose="020B0600070205080204" pitchFamily="50" charset="-128"/>
+                <a:cs typeface="Courier New" panose="02070309020205020404" pitchFamily="49" charset="0"/>
+              </a:rPr>
+              <a:t>=”###,###,###”)</a:t>
+            </a:r>
+          </a:p>
+          <a:p>
+            <a:r>
+              <a:rPr lang="en-US" altLang="ja-JP" sz="1050" dirty="0" smtClean="0">
+                <a:latin typeface="Courier New" panose="02070309020205020404" pitchFamily="49" charset="0"/>
+                <a:ea typeface="ＭＳ Ｐゴシック" panose="020B0600070205080204" pitchFamily="50" charset="-128"/>
+                <a:cs typeface="Courier New" panose="02070309020205020404" pitchFamily="49" charset="0"/>
+              </a:rPr>
+              <a:t>    private </a:t>
+            </a:r>
+            <a:r>
+              <a:rPr lang="en-US" altLang="ja-JP" sz="1050" dirty="0" err="1" smtClean="0">
+                <a:latin typeface="Courier New" panose="02070309020205020404" pitchFamily="49" charset="0"/>
+                <a:ea typeface="ＭＳ Ｐゴシック" panose="020B0600070205080204" pitchFamily="50" charset="-128"/>
+                <a:cs typeface="Courier New" panose="02070309020205020404" pitchFamily="49" charset="0"/>
+              </a:rPr>
+              <a:t>BigDecimal</a:t>
+            </a:r>
+            <a:r>
+              <a:rPr lang="en-US" altLang="ja-JP" sz="1050" dirty="0" smtClean="0">
+                <a:latin typeface="Courier New" panose="02070309020205020404" pitchFamily="49" charset="0"/>
+                <a:ea typeface="ＭＳ Ｐゴシック" panose="020B0600070205080204" pitchFamily="50" charset="-128"/>
+                <a:cs typeface="Courier New" panose="02070309020205020404" pitchFamily="49" charset="0"/>
+              </a:rPr>
+              <a:t> </a:t>
+            </a:r>
+            <a:r>
+              <a:rPr lang="en-US" altLang="ja-JP" sz="1050" dirty="0" err="1" smtClean="0">
+                <a:latin typeface="Courier New" panose="02070309020205020404" pitchFamily="49" charset="0"/>
+                <a:ea typeface="ＭＳ Ｐゴシック" panose="020B0600070205080204" pitchFamily="50" charset="-128"/>
+                <a:cs typeface="Courier New" panose="02070309020205020404" pitchFamily="49" charset="0"/>
+              </a:rPr>
+              <a:t>uriage</a:t>
+            </a:r>
+            <a:r>
+              <a:rPr lang="en-US" altLang="ja-JP" sz="1050" dirty="0" smtClean="0">
+                <a:latin typeface="Courier New" panose="02070309020205020404" pitchFamily="49" charset="0"/>
+                <a:ea typeface="ＭＳ Ｐゴシック" panose="020B0600070205080204" pitchFamily="50" charset="-128"/>
+                <a:cs typeface="Courier New" panose="02070309020205020404" pitchFamily="49" charset="0"/>
+              </a:rPr>
+              <a:t> = null;</a:t>
+            </a:r>
+          </a:p>
+          <a:p>
+            <a:r>
+              <a:rPr lang="en-US" altLang="ja-JP" sz="1050" dirty="0" smtClean="0">
+                <a:latin typeface="Courier New" panose="02070309020205020404" pitchFamily="49" charset="0"/>
+                <a:ea typeface="ＭＳ Ｐゴシック" panose="020B0600070205080204" pitchFamily="50" charset="-128"/>
+                <a:cs typeface="Courier New" panose="02070309020205020404" pitchFamily="49" charset="0"/>
+              </a:rPr>
+              <a:t>    </a:t>
+            </a:r>
+            <a:r>
+              <a:rPr lang="ja-JP" altLang="en-US" sz="1050" dirty="0" smtClean="0">
+                <a:latin typeface="Courier New" panose="02070309020205020404" pitchFamily="49" charset="0"/>
+                <a:ea typeface="ＭＳ Ｐゴシック" panose="020B0600070205080204" pitchFamily="50" charset="-128"/>
+                <a:cs typeface="Courier New" panose="02070309020205020404" pitchFamily="49" charset="0"/>
               </a:rPr>
               <a:t>　</a:t>
             </a:r>
             <a:r>
               <a:rPr lang="en-US" altLang="ja-JP" sz="1050" dirty="0" smtClean="0">
-                <a:latin typeface="Courier New" pitchFamily="49" charset="0"/>
-                <a:cs typeface="Courier New" pitchFamily="49" charset="0"/>
+                <a:latin typeface="Courier New" panose="02070309020205020404" pitchFamily="49" charset="0"/>
+                <a:ea typeface="ＭＳ Ｐゴシック" panose="020B0600070205080204" pitchFamily="50" charset="-128"/>
+                <a:cs typeface="Courier New" panose="02070309020205020404" pitchFamily="49" charset="0"/>
               </a:rPr>
               <a:t>……</a:t>
             </a:r>
@@ -12147,370 +12622,9 @@
           <a:p>
             <a:r>
               <a:rPr lang="en-US" altLang="ja-JP" sz="1050" dirty="0" smtClean="0">
-                <a:latin typeface="Courier New" pitchFamily="49" charset="0"/>
-                <a:cs typeface="Courier New" pitchFamily="49" charset="0"/>
-              </a:rPr>
-              <a:t>    @</a:t>
-            </a:r>
-            <a:r>
-              <a:rPr lang="en-US" altLang="ja-JP" sz="1050" dirty="0" err="1" smtClean="0">
-                <a:latin typeface="Courier New" pitchFamily="49" charset="0"/>
-                <a:cs typeface="Courier New" pitchFamily="49" charset="0"/>
-              </a:rPr>
-              <a:t>InputFileColumn</a:t>
-            </a:r>
-            <a:r>
-              <a:rPr lang="en-US" altLang="ja-JP" sz="1050" dirty="0" smtClean="0">
-                <a:latin typeface="Courier New" pitchFamily="49" charset="0"/>
-                <a:cs typeface="Courier New" pitchFamily="49" charset="0"/>
-              </a:rPr>
-              <a:t>(</a:t>
-            </a:r>
-          </a:p>
-          <a:p>
-            <a:r>
-              <a:rPr lang="ja-JP" altLang="en-US" sz="1050" dirty="0" smtClean="0">
-                <a:latin typeface="Courier New" pitchFamily="49" charset="0"/>
-                <a:cs typeface="Courier New" pitchFamily="49" charset="0"/>
-              </a:rPr>
-              <a:t>　　　　</a:t>
-            </a:r>
-            <a:r>
-              <a:rPr lang="en-US" altLang="ja-JP" sz="1050" dirty="0" err="1" smtClean="0">
-                <a:latin typeface="Courier New" pitchFamily="49" charset="0"/>
-                <a:cs typeface="Courier New" pitchFamily="49" charset="0"/>
-              </a:rPr>
-              <a:t>columnIndex</a:t>
-            </a:r>
-            <a:r>
-              <a:rPr lang="en-US" altLang="ja-JP" sz="1050" dirty="0" smtClean="0">
-                <a:latin typeface="Courier New" pitchFamily="49" charset="0"/>
-                <a:cs typeface="Courier New" pitchFamily="49" charset="0"/>
-              </a:rPr>
-              <a:t> = 0,</a:t>
-            </a:r>
-          </a:p>
-          <a:p>
-            <a:r>
-              <a:rPr lang="en-US" altLang="ja-JP" sz="1050" dirty="0" smtClean="0">
-                <a:latin typeface="Courier New" pitchFamily="49" charset="0"/>
-                <a:cs typeface="Courier New" pitchFamily="49" charset="0"/>
-              </a:rPr>
-              <a:t>            </a:t>
-            </a:r>
-            <a:r>
-              <a:rPr lang="en-US" altLang="ja-JP" sz="1050" dirty="0" err="1" smtClean="0">
-                <a:latin typeface="Courier New" pitchFamily="49" charset="0"/>
-                <a:cs typeface="Courier New" pitchFamily="49" charset="0"/>
-              </a:rPr>
-              <a:t>columnFormat</a:t>
-            </a:r>
-            <a:r>
-              <a:rPr lang="en-US" altLang="ja-JP" sz="1050" dirty="0" smtClean="0">
-                <a:latin typeface="Courier New" pitchFamily="49" charset="0"/>
-                <a:cs typeface="Courier New" pitchFamily="49" charset="0"/>
-              </a:rPr>
-              <a:t>=”</a:t>
-            </a:r>
-            <a:r>
-              <a:rPr lang="en-US" altLang="ja-JP" sz="1050" dirty="0" err="1" smtClean="0">
-                <a:latin typeface="Courier New" pitchFamily="49" charset="0"/>
-                <a:cs typeface="Courier New" pitchFamily="49" charset="0"/>
-              </a:rPr>
-              <a:t>yyyy</a:t>
-            </a:r>
-            <a:r>
-              <a:rPr lang="en-US" altLang="ja-JP" sz="1050" dirty="0" smtClean="0">
-                <a:latin typeface="Courier New" pitchFamily="49" charset="0"/>
-                <a:cs typeface="Courier New" pitchFamily="49" charset="0"/>
-              </a:rPr>
-              <a:t>/MM/</a:t>
-            </a:r>
-            <a:r>
-              <a:rPr lang="en-US" altLang="ja-JP" sz="1050" dirty="0" err="1" smtClean="0">
-                <a:latin typeface="Courier New" pitchFamily="49" charset="0"/>
-                <a:cs typeface="Courier New" pitchFamily="49" charset="0"/>
-              </a:rPr>
-              <a:t>dd</a:t>
-            </a:r>
-            <a:r>
-              <a:rPr lang="en-US" altLang="ja-JP" sz="1050" dirty="0" smtClean="0">
-                <a:latin typeface="Courier New" pitchFamily="49" charset="0"/>
-                <a:cs typeface="Courier New" pitchFamily="49" charset="0"/>
-              </a:rPr>
-              <a:t>”)</a:t>
-            </a:r>
-          </a:p>
-          <a:p>
-            <a:r>
-              <a:rPr lang="ja-JP" altLang="en-US" sz="1050" dirty="0" smtClean="0">
-                <a:latin typeface="Courier New" pitchFamily="49" charset="0"/>
-                <a:cs typeface="Courier New" pitchFamily="49" charset="0"/>
-              </a:rPr>
-              <a:t>　 </a:t>
-            </a:r>
-            <a:r>
-              <a:rPr lang="en-US" altLang="ja-JP" sz="1050" dirty="0" smtClean="0">
-                <a:latin typeface="Courier New" pitchFamily="49" charset="0"/>
-                <a:cs typeface="Courier New" pitchFamily="49" charset="0"/>
-              </a:rPr>
-              <a:t>private Date </a:t>
-            </a:r>
-            <a:r>
-              <a:rPr lang="en-US" altLang="ja-JP" sz="1050" dirty="0" err="1" smtClean="0">
-                <a:latin typeface="Courier New" pitchFamily="49" charset="0"/>
-                <a:cs typeface="Courier New" pitchFamily="49" charset="0"/>
-              </a:rPr>
-              <a:t>hiduke</a:t>
-            </a:r>
-            <a:r>
-              <a:rPr lang="en-US" altLang="ja-JP" sz="1050" dirty="0" smtClean="0">
-                <a:latin typeface="Courier New" pitchFamily="49" charset="0"/>
-                <a:cs typeface="Courier New" pitchFamily="49" charset="0"/>
-              </a:rPr>
-              <a:t> = null;</a:t>
-            </a:r>
-          </a:p>
-          <a:p>
-            <a:r>
-              <a:rPr lang="en-US" altLang="ja-JP" sz="1050" dirty="0" smtClean="0">
-                <a:latin typeface="Courier New" pitchFamily="49" charset="0"/>
-                <a:cs typeface="Courier New" pitchFamily="49" charset="0"/>
-              </a:rPr>
-              <a:t>    @</a:t>
-            </a:r>
-            <a:r>
-              <a:rPr lang="en-US" altLang="ja-JP" sz="1050" dirty="0" err="1" smtClean="0">
-                <a:latin typeface="Courier New" pitchFamily="49" charset="0"/>
-                <a:cs typeface="Courier New" pitchFamily="49" charset="0"/>
-              </a:rPr>
-              <a:t>InputFileColumn</a:t>
-            </a:r>
-            <a:r>
-              <a:rPr lang="en-US" altLang="ja-JP" sz="1050" dirty="0" smtClean="0">
-                <a:latin typeface="Courier New" pitchFamily="49" charset="0"/>
-                <a:cs typeface="Courier New" pitchFamily="49" charset="0"/>
-              </a:rPr>
-              <a:t>(</a:t>
-            </a:r>
-          </a:p>
-          <a:p>
-            <a:r>
-              <a:rPr lang="en-US" altLang="ja-JP" sz="1050" dirty="0" smtClean="0">
-                <a:latin typeface="Courier New" pitchFamily="49" charset="0"/>
-                <a:cs typeface="Courier New" pitchFamily="49" charset="0"/>
-              </a:rPr>
-              <a:t>            </a:t>
-            </a:r>
-            <a:r>
-              <a:rPr lang="en-US" altLang="ja-JP" sz="1050" dirty="0" err="1" smtClean="0">
-                <a:latin typeface="Courier New" pitchFamily="49" charset="0"/>
-                <a:cs typeface="Courier New" pitchFamily="49" charset="0"/>
-              </a:rPr>
-              <a:t>columnIndex</a:t>
-            </a:r>
-            <a:r>
-              <a:rPr lang="en-US" altLang="ja-JP" sz="1050" dirty="0" smtClean="0">
-                <a:latin typeface="Courier New" pitchFamily="49" charset="0"/>
-                <a:cs typeface="Courier New" pitchFamily="49" charset="0"/>
-              </a:rPr>
-              <a:t> = 1,</a:t>
-            </a:r>
-          </a:p>
-          <a:p>
-            <a:r>
-              <a:rPr lang="en-US" altLang="ja-JP" sz="1050" dirty="0" smtClean="0">
-                <a:latin typeface="Courier New" pitchFamily="49" charset="0"/>
-                <a:cs typeface="Courier New" pitchFamily="49" charset="0"/>
-              </a:rPr>
-              <a:t>            </a:t>
-            </a:r>
-            <a:r>
-              <a:rPr lang="en-US" altLang="ja-JP" sz="1050" dirty="0" err="1" smtClean="0">
-                <a:latin typeface="Courier New" pitchFamily="49" charset="0"/>
-                <a:cs typeface="Courier New" pitchFamily="49" charset="0"/>
-              </a:rPr>
-              <a:t>stringConverter</a:t>
-            </a:r>
-            <a:r>
-              <a:rPr lang="en-US" altLang="ja-JP" sz="1050" dirty="0" smtClean="0">
-                <a:latin typeface="Courier New" pitchFamily="49" charset="0"/>
-                <a:cs typeface="Courier New" pitchFamily="49" charset="0"/>
-              </a:rPr>
-              <a:t>= </a:t>
-            </a:r>
-            <a:r>
-              <a:rPr lang="en-US" altLang="ja-JP" sz="1050" dirty="0" err="1" smtClean="0">
-                <a:latin typeface="Courier New" pitchFamily="49" charset="0"/>
-                <a:cs typeface="Courier New" pitchFamily="49" charset="0"/>
-              </a:rPr>
-              <a:t>StringConverterToUpperCase.class</a:t>
-            </a:r>
-            <a:r>
-              <a:rPr lang="en-US" altLang="ja-JP" sz="1050" dirty="0" smtClean="0">
-                <a:latin typeface="Courier New" pitchFamily="49" charset="0"/>
-                <a:cs typeface="Courier New" pitchFamily="49" charset="0"/>
-              </a:rPr>
-              <a:t>)</a:t>
-            </a:r>
-          </a:p>
-          <a:p>
-            <a:r>
-              <a:rPr lang="en-US" altLang="ja-JP" sz="1050" dirty="0" smtClean="0">
-                <a:latin typeface="Courier New" pitchFamily="49" charset="0"/>
-                <a:cs typeface="Courier New" pitchFamily="49" charset="0"/>
-              </a:rPr>
-              <a:t>    private String </a:t>
-            </a:r>
-            <a:r>
-              <a:rPr lang="en-US" altLang="ja-JP" sz="1050" dirty="0" err="1" smtClean="0">
-                <a:latin typeface="Courier New" pitchFamily="49" charset="0"/>
-                <a:cs typeface="Courier New" pitchFamily="49" charset="0"/>
-              </a:rPr>
-              <a:t>shopId</a:t>
-            </a:r>
-            <a:r>
-              <a:rPr lang="en-US" altLang="ja-JP" sz="1050" dirty="0" smtClean="0">
-                <a:latin typeface="Courier New" pitchFamily="49" charset="0"/>
-                <a:cs typeface="Courier New" pitchFamily="49" charset="0"/>
-              </a:rPr>
-              <a:t> = null;</a:t>
-            </a:r>
-          </a:p>
-          <a:p>
-            <a:r>
-              <a:rPr lang="en-US" altLang="ja-JP" sz="1050" dirty="0" smtClean="0">
-                <a:latin typeface="Courier New" pitchFamily="49" charset="0"/>
-                <a:cs typeface="Courier New" pitchFamily="49" charset="0"/>
-              </a:rPr>
-              <a:t>    @</a:t>
-            </a:r>
-            <a:r>
-              <a:rPr lang="en-US" altLang="ja-JP" sz="1050" dirty="0" err="1" smtClean="0">
-                <a:latin typeface="Courier New" pitchFamily="49" charset="0"/>
-                <a:cs typeface="Courier New" pitchFamily="49" charset="0"/>
-              </a:rPr>
-              <a:t>InputFileColumn</a:t>
-            </a:r>
-            <a:r>
-              <a:rPr lang="en-US" altLang="ja-JP" sz="1050" dirty="0" smtClean="0">
-                <a:latin typeface="Courier New" pitchFamily="49" charset="0"/>
-                <a:cs typeface="Courier New" pitchFamily="49" charset="0"/>
-              </a:rPr>
-              <a:t>(</a:t>
-            </a:r>
-          </a:p>
-          <a:p>
-            <a:r>
-              <a:rPr lang="en-US" altLang="ja-JP" sz="1050" dirty="0" smtClean="0">
-                <a:latin typeface="Courier New" pitchFamily="49" charset="0"/>
-                <a:cs typeface="Courier New" pitchFamily="49" charset="0"/>
-              </a:rPr>
-              <a:t>            </a:t>
-            </a:r>
-            <a:r>
-              <a:rPr lang="en-US" altLang="ja-JP" sz="1050" dirty="0" err="1" smtClean="0">
-                <a:latin typeface="Courier New" pitchFamily="49" charset="0"/>
-                <a:cs typeface="Courier New" pitchFamily="49" charset="0"/>
-              </a:rPr>
-              <a:t>columnIndex</a:t>
-            </a:r>
-            <a:r>
-              <a:rPr lang="en-US" altLang="ja-JP" sz="1050" dirty="0" smtClean="0">
-                <a:latin typeface="Courier New" pitchFamily="49" charset="0"/>
-                <a:cs typeface="Courier New" pitchFamily="49" charset="0"/>
-              </a:rPr>
-              <a:t> = 2,</a:t>
-            </a:r>
-          </a:p>
-          <a:p>
-            <a:r>
-              <a:rPr lang="en-US" altLang="ja-JP" sz="1050" dirty="0" smtClean="0">
-                <a:latin typeface="Courier New" pitchFamily="49" charset="0"/>
-                <a:cs typeface="Courier New" pitchFamily="49" charset="0"/>
-              </a:rPr>
-              <a:t>            </a:t>
-            </a:r>
-            <a:r>
-              <a:rPr lang="en-US" altLang="ja-JP" sz="1050" dirty="0" err="1" smtClean="0">
-                <a:latin typeface="Courier New" pitchFamily="49" charset="0"/>
-                <a:cs typeface="Courier New" pitchFamily="49" charset="0"/>
-              </a:rPr>
-              <a:t>columnFormat</a:t>
-            </a:r>
-            <a:r>
-              <a:rPr lang="en-US" altLang="ja-JP" sz="1050" dirty="0" smtClean="0">
-                <a:latin typeface="Courier New" pitchFamily="49" charset="0"/>
-                <a:cs typeface="Courier New" pitchFamily="49" charset="0"/>
-              </a:rPr>
-              <a:t>=”###,###,###”)</a:t>
-            </a:r>
-          </a:p>
-          <a:p>
-            <a:r>
-              <a:rPr lang="en-US" altLang="ja-JP" sz="1050" dirty="0" smtClean="0">
-                <a:latin typeface="Courier New" pitchFamily="49" charset="0"/>
-                <a:cs typeface="Courier New" pitchFamily="49" charset="0"/>
-              </a:rPr>
-              <a:t>    private </a:t>
-            </a:r>
-            <a:r>
-              <a:rPr lang="en-US" altLang="ja-JP" sz="1050" dirty="0" err="1" smtClean="0">
-                <a:latin typeface="Courier New" pitchFamily="49" charset="0"/>
-                <a:cs typeface="Courier New" pitchFamily="49" charset="0"/>
-              </a:rPr>
-              <a:t>BigDecimal</a:t>
-            </a:r>
-            <a:r>
-              <a:rPr lang="en-US" altLang="ja-JP" sz="1050" dirty="0" smtClean="0">
-                <a:latin typeface="Courier New" pitchFamily="49" charset="0"/>
-                <a:cs typeface="Courier New" pitchFamily="49" charset="0"/>
-              </a:rPr>
-              <a:t> </a:t>
-            </a:r>
-            <a:r>
-              <a:rPr lang="en-US" altLang="ja-JP" sz="1050" dirty="0" err="1" smtClean="0">
-                <a:latin typeface="Courier New" pitchFamily="49" charset="0"/>
-                <a:cs typeface="Courier New" pitchFamily="49" charset="0"/>
-              </a:rPr>
-              <a:t>uriage</a:t>
-            </a:r>
-            <a:r>
-              <a:rPr lang="en-US" altLang="ja-JP" sz="1050" dirty="0" smtClean="0">
-                <a:latin typeface="Courier New" pitchFamily="49" charset="0"/>
-                <a:cs typeface="Courier New" pitchFamily="49" charset="0"/>
-              </a:rPr>
-              <a:t> = null;</a:t>
-            </a:r>
-          </a:p>
-          <a:p>
-            <a:r>
-              <a:rPr lang="en-US" altLang="ja-JP" sz="1050" dirty="0" smtClean="0">
-                <a:latin typeface="Courier New" pitchFamily="49" charset="0"/>
-                <a:cs typeface="Courier New" pitchFamily="49" charset="0"/>
-              </a:rPr>
-              <a:t>    </a:t>
-            </a:r>
-            <a:r>
-              <a:rPr lang="ja-JP" altLang="en-US" sz="1050" dirty="0" smtClean="0">
-                <a:latin typeface="Courier New" pitchFamily="49" charset="0"/>
-                <a:cs typeface="Courier New" pitchFamily="49" charset="0"/>
-              </a:rPr>
-              <a:t>　</a:t>
-            </a:r>
-            <a:r>
-              <a:rPr lang="en-US" altLang="ja-JP" sz="1050" dirty="0" smtClean="0">
-                <a:latin typeface="Courier New" pitchFamily="49" charset="0"/>
-                <a:cs typeface="Courier New" pitchFamily="49" charset="0"/>
-              </a:rPr>
-              <a:t>……</a:t>
-            </a:r>
-          </a:p>
-          <a:p>
-            <a:r>
-              <a:rPr lang="en-US" altLang="ja-JP" sz="1050" dirty="0" smtClean="0">
-                <a:latin typeface="Courier New" pitchFamily="49" charset="0"/>
-                <a:cs typeface="Courier New" pitchFamily="49" charset="0"/>
+                <a:latin typeface="Courier New" panose="02070309020205020404" pitchFamily="49" charset="0"/>
+                <a:ea typeface="ＭＳ Ｐゴシック" panose="020B0600070205080204" pitchFamily="50" charset="-128"/>
+                <a:cs typeface="Courier New" panose="02070309020205020404" pitchFamily="49" charset="0"/>
               </a:rPr>
               <a:t>} </a:t>
             </a:r>
@@ -12528,7 +12642,7 @@
         <p:spPr bwMode="auto">
           <a:xfrm>
             <a:off x="4808984" y="630212"/>
-            <a:ext cx="4966122" cy="4646637"/>
+            <a:ext cx="4966122" cy="5053612"/>
           </a:xfrm>
           <a:prstGeom prst="rect">
             <a:avLst/>
@@ -12617,7 +12731,7 @@
           <a:p>
             <a:pPr algn="l"/>
             <a:r>
-              <a:rPr kumimoji="1" lang="en-US" altLang="ja-JP" sz="1000" b="0" smtClean="0">
+              <a:rPr kumimoji="1" lang="en-US" altLang="ja-JP" sz="1000" b="0" dirty="0" smtClean="0">
                 <a:latin typeface="Courier New" panose="02070309020205020404" pitchFamily="49" charset="0"/>
                 <a:ea typeface="ＭＳ Ｐゴシック" charset="-128"/>
                 <a:cs typeface="Courier New" panose="02070309020205020404" pitchFamily="49" charset="0"/>
@@ -12625,20 +12739,12 @@
               <a:t>  </a:t>
             </a:r>
             <a:r>
-              <a:rPr kumimoji="1" lang="ja-JP" altLang="ja-JP" sz="1000" b="0" smtClean="0">
-                <a:latin typeface="Courier New" panose="02070309020205020404" pitchFamily="49" charset="0"/>
-                <a:ea typeface="ＭＳ Ｐゴシック" charset="-128"/>
-                <a:cs typeface="Courier New" panose="02070309020205020404" pitchFamily="49" charset="0"/>
-              </a:rPr>
-              <a:t>FileQueryDAO </a:t>
-            </a:r>
-            <a:r>
               <a:rPr kumimoji="1" lang="ja-JP" altLang="ja-JP" sz="1000" b="0" dirty="0" smtClean="0">
                 <a:latin typeface="Courier New" panose="02070309020205020404" pitchFamily="49" charset="0"/>
                 <a:ea typeface="ＭＳ Ｐゴシック" charset="-128"/>
                 <a:cs typeface="Courier New" panose="02070309020205020404" pitchFamily="49" charset="0"/>
               </a:rPr>
-              <a:t>csvFileQuery</a:t>
+              <a:t>FileQueryDAO csvFileQuery</a:t>
             </a:r>
             <a:r>
               <a:rPr kumimoji="1" lang="en-US" altLang="ja-JP" sz="1000" b="0" dirty="0" smtClean="0">
@@ -12666,10 +12772,72 @@
             </a:r>
           </a:p>
           <a:p>
-            <a:r>
-              <a:rPr lang="ja-JP" altLang="en-US" sz="1000" dirty="0">
+            <a:endParaRPr lang="en-US" altLang="ja-JP" sz="1000" dirty="0">
+              <a:latin typeface="Courier New" pitchFamily="49" charset="0"/>
+              <a:cs typeface="Courier New" pitchFamily="49" charset="0"/>
+            </a:endParaRPr>
+          </a:p>
+          <a:p>
+            <a:r>
+              <a:rPr kumimoji="1" lang="en-US" altLang="ja-JP" sz="1000" dirty="0">
                 <a:latin typeface="Courier New" pitchFamily="49" charset="0"/>
+                <a:ea typeface="ＭＳ Ｐゴシック" charset="-128"/>
                 <a:cs typeface="Courier New" pitchFamily="49" charset="0"/>
+              </a:rPr>
+              <a:t> </a:t>
+            </a:r>
+            <a:r>
+              <a:rPr kumimoji="1" lang="en-US" altLang="ja-JP" sz="1000" dirty="0" smtClean="0">
+                <a:latin typeface="Courier New" pitchFamily="49" charset="0"/>
+                <a:ea typeface="ＭＳ Ｐゴシック" charset="-128"/>
+                <a:cs typeface="Courier New" pitchFamily="49" charset="0"/>
+              </a:rPr>
+              <a:t> </a:t>
+            </a:r>
+            <a:r>
+              <a:rPr kumimoji="1" lang="en-US" altLang="ja-JP" sz="1000" b="0" dirty="0" smtClean="0">
+                <a:latin typeface="Courier New" pitchFamily="49" charset="0"/>
+                <a:ea typeface="ＭＳ Ｐゴシック" charset="-128"/>
+                <a:cs typeface="Courier New" pitchFamily="49" charset="0"/>
+              </a:rPr>
+              <a:t>public int execute(BLogicParam </a:t>
+            </a:r>
+            <a:r>
+              <a:rPr kumimoji="1" lang="en-US" altLang="ja-JP" sz="1000" b="0" dirty="0" err="1" smtClean="0">
+                <a:latin typeface="Courier New" pitchFamily="49" charset="0"/>
+                <a:ea typeface="ＭＳ Ｐゴシック" charset="-128"/>
+                <a:cs typeface="Courier New" pitchFamily="49" charset="0"/>
+              </a:rPr>
+              <a:t>param</a:t>
+            </a:r>
+            <a:r>
+              <a:rPr kumimoji="1" lang="en-US" altLang="ja-JP" sz="1000" b="0" dirty="0" smtClean="0">
+                <a:latin typeface="Courier New" pitchFamily="49" charset="0"/>
+                <a:ea typeface="ＭＳ Ｐゴシック" charset="-128"/>
+                <a:cs typeface="Courier New" pitchFamily="49" charset="0"/>
+              </a:rPr>
+              <a:t>) {</a:t>
+            </a:r>
+          </a:p>
+          <a:p>
+            <a:r>
+              <a:rPr kumimoji="1" lang="en-US" altLang="ja-JP" sz="1000" dirty="0">
+                <a:latin typeface="Tahoma" pitchFamily="34" charset="0"/>
+                <a:ea typeface="ＭＳ Ｐゴシック" charset="-128"/>
+              </a:rPr>
+              <a:t> </a:t>
+            </a:r>
+            <a:r>
+              <a:rPr kumimoji="1" lang="en-US" altLang="ja-JP" sz="1000" dirty="0" smtClean="0">
+                <a:latin typeface="Tahoma" pitchFamily="34" charset="0"/>
+                <a:ea typeface="ＭＳ Ｐゴシック" charset="-128"/>
+              </a:rPr>
+              <a:t>       </a:t>
+            </a:r>
+            <a:r>
+              <a:rPr kumimoji="1" lang="ja-JP" altLang="en-US" sz="1000" dirty="0" smtClean="0">
+                <a:latin typeface="Tahoma" pitchFamily="34" charset="0"/>
+                <a:ea typeface="ＭＳ Ｐゴシック" charset="-128"/>
               </a:rPr>
               <a:t>・・・</a:t>
             </a:r>
@@ -12687,7 +12855,14 @@
               <a:t>    </a:t>
             </a:r>
             <a:r>
-              <a:rPr kumimoji="1" lang="ja-JP" altLang="ja-JP" sz="1000" b="0" dirty="0">
+              <a:rPr kumimoji="1" lang="ja-JP" altLang="en-US" sz="1000" b="0" dirty="0" smtClean="0">
+                <a:latin typeface="Tahoma" pitchFamily="34" charset="0"/>
+                <a:ea typeface="ＭＳ Ｐゴシック" charset="-128"/>
+              </a:rPr>
+              <a:t>    </a:t>
+            </a:r>
+            <a:r>
+              <a:rPr kumimoji="1" lang="ja-JP" altLang="ja-JP" sz="1000" b="0" dirty="0" smtClean="0">
                 <a:latin typeface="Tahoma" pitchFamily="34" charset="0"/>
                 <a:ea typeface="ＭＳ Ｐゴシック" charset="-128"/>
               </a:rPr>
@@ -12727,7 +12902,31 @@
                 <a:ea typeface="ＭＳ Ｐゴシック" charset="-128"/>
                 <a:cs typeface="Courier New" panose="02070309020205020404" pitchFamily="49" charset="0"/>
               </a:rPr>
-              <a:t>    FileLineIterator&lt;SampleFileLineObject&gt; fileLineIterator </a:t>
+              <a:t>  </a:t>
+            </a:r>
+            <a:r>
+              <a:rPr kumimoji="1" lang="en-US" altLang="ja-JP" sz="1000" b="0" dirty="0" smtClean="0">
+                <a:latin typeface="Courier New" panose="02070309020205020404" pitchFamily="49" charset="0"/>
+                <a:ea typeface="ＭＳ Ｐゴシック" charset="-128"/>
+                <a:cs typeface="Courier New" panose="02070309020205020404" pitchFamily="49" charset="0"/>
+              </a:rPr>
+              <a:t>  </a:t>
+            </a:r>
+            <a:r>
+              <a:rPr kumimoji="1" lang="ja-JP" altLang="ja-JP" sz="1000" b="0" dirty="0" smtClean="0">
+                <a:latin typeface="Courier New" panose="02070309020205020404" pitchFamily="49" charset="0"/>
+                <a:ea typeface="ＭＳ Ｐゴシック" charset="-128"/>
+                <a:cs typeface="Courier New" panose="02070309020205020404" pitchFamily="49" charset="0"/>
+              </a:rPr>
+              <a:t>FileLineIterator</a:t>
+            </a:r>
+            <a:r>
+              <a:rPr kumimoji="1" lang="ja-JP" altLang="ja-JP" sz="1000" b="0" dirty="0">
+                <a:latin typeface="Courier New" panose="02070309020205020404" pitchFamily="49" charset="0"/>
+                <a:ea typeface="ＭＳ Ｐゴシック" charset="-128"/>
+                <a:cs typeface="Courier New" panose="02070309020205020404" pitchFamily="49" charset="0"/>
+              </a:rPr>
+              <a:t>&lt;SampleFileLineObject&gt; fileLineIterator </a:t>
             </a:r>
           </a:p>
           <a:p>
@@ -12741,12 +12940,28 @@
               <a:t>　　　　</a:t>
             </a:r>
             <a:r>
+              <a:rPr kumimoji="1" lang="ja-JP" altLang="en-US" sz="1000" b="0" dirty="0" smtClean="0">
+                <a:latin typeface="Courier New" panose="02070309020205020404" pitchFamily="49" charset="0"/>
+                <a:ea typeface="ＭＳ Ｐゴシック" charset="-128"/>
+                <a:cs typeface="Courier New" panose="02070309020205020404" pitchFamily="49" charset="0"/>
+              </a:rPr>
+              <a:t> </a:t>
+            </a:r>
+            <a:r>
               <a:rPr kumimoji="1" lang="ja-JP" altLang="ja-JP" sz="1000" b="0" dirty="0" smtClean="0">
                 <a:latin typeface="Courier New" panose="02070309020205020404" pitchFamily="49" charset="0"/>
                 <a:ea typeface="ＭＳ Ｐゴシック" charset="-128"/>
                 <a:cs typeface="Courier New" panose="02070309020205020404" pitchFamily="49" charset="0"/>
               </a:rPr>
-              <a:t>= csvFileQuery</a:t>
+              <a:t>= </a:t>
+            </a:r>
+            <a:r>
+              <a:rPr kumimoji="1" lang="ja-JP" altLang="ja-JP" sz="1000" b="0" dirty="0" smtClean="0">
+                <a:latin typeface="Courier New" panose="02070309020205020404" pitchFamily="49" charset="0"/>
+                <a:ea typeface="ＭＳ Ｐゴシック" charset="-128"/>
+                <a:cs typeface="Courier New" panose="02070309020205020404" pitchFamily="49" charset="0"/>
+              </a:rPr>
+              <a:t>csvFileQuery</a:t>
             </a:r>
             <a:r>
               <a:rPr kumimoji="1" lang="en-US" altLang="ja-JP" sz="1000" b="0" dirty="0" smtClean="0">
@@ -12786,7 +13001,15 @@
                 <a:ea typeface="ＭＳ Ｐゴシック" charset="-128"/>
                 <a:cs typeface="Courier New" panose="02070309020205020404" pitchFamily="49" charset="0"/>
               </a:rPr>
-              <a:t>　　　　　　　　</a:t>
+              <a:t>　　　　　　　</a:t>
+            </a:r>
+            <a:r>
+              <a:rPr kumimoji="1" lang="en-US" altLang="ja-JP" sz="1000" dirty="0" smtClean="0">
+                <a:latin typeface="Courier New" panose="02070309020205020404" pitchFamily="49" charset="0"/>
+                <a:ea typeface="ＭＳ Ｐゴシック" charset="-128"/>
+                <a:cs typeface="Courier New" panose="02070309020205020404" pitchFamily="49" charset="0"/>
+              </a:rPr>
+              <a:t>"</a:t>
             </a:r>
             <a:r>
               <a:rPr kumimoji="1" lang="ja-JP" altLang="ja-JP" sz="1000" b="0" dirty="0" smtClean="0">
@@ -12794,7 +13017,7 @@
                 <a:ea typeface="ＭＳ Ｐゴシック" charset="-128"/>
                 <a:cs typeface="Courier New" panose="02070309020205020404" pitchFamily="49" charset="0"/>
               </a:rPr>
-              <a:t>“/</a:t>
+              <a:t>/</a:t>
             </a:r>
             <a:r>
               <a:rPr kumimoji="1" lang="ja-JP" altLang="ja-JP" sz="1000" b="0" dirty="0">
@@ -12802,7 +13025,7 @@
                 <a:ea typeface="ＭＳ Ｐゴシック" charset="-128"/>
                 <a:cs typeface="Courier New" panose="02070309020205020404" pitchFamily="49" charset="0"/>
               </a:rPr>
-              <a:t>some_file_path/uriage.csv”</a:t>
+              <a:t>some_file_path/uriage.</a:t>
             </a:r>
             <a:r>
               <a:rPr kumimoji="1" lang="ja-JP" altLang="ja-JP" sz="1000" b="0" dirty="0" smtClean="0">
@@ -12810,6 +13033,22 @@
                 <a:ea typeface="ＭＳ Ｐゴシック" charset="-128"/>
                 <a:cs typeface="Courier New" panose="02070309020205020404" pitchFamily="49" charset="0"/>
               </a:rPr>
+              <a:t>csv</a:t>
+            </a:r>
+            <a:r>
+              <a:rPr kumimoji="1" lang="en-US" altLang="ja-JP" sz="1000" b="0" dirty="0" smtClean="0">
+                <a:latin typeface="Courier New" panose="02070309020205020404" pitchFamily="49" charset="0"/>
+                <a:ea typeface="ＭＳ Ｐゴシック" charset="-128"/>
+                <a:cs typeface="Courier New" panose="02070309020205020404" pitchFamily="49" charset="0"/>
+              </a:rPr>
+              <a:t>"</a:t>
+            </a:r>
+            <a:r>
+              <a:rPr kumimoji="1" lang="ja-JP" altLang="ja-JP" sz="1000" b="0" dirty="0" err="1" smtClean="0">
+                <a:latin typeface="Courier New" panose="02070309020205020404" pitchFamily="49" charset="0"/>
+                <a:ea typeface="ＭＳ Ｐゴシック" charset="-128"/>
+                <a:cs typeface="Courier New" panose="02070309020205020404" pitchFamily="49" charset="0"/>
+              </a:rPr>
               <a:t>,</a:t>
             </a:r>
             <a:r>
@@ -12834,41 +13073,86 @@
                 <a:ea typeface="ＭＳ Ｐゴシック" charset="-128"/>
                 <a:cs typeface="Courier New" panose="02070309020205020404" pitchFamily="49" charset="0"/>
               </a:rPr>
-              <a:t>.class);</a:t>
+              <a:t>.class)</a:t>
+            </a:r>
+            <a:r>
+              <a:rPr kumimoji="1" lang="ja-JP" altLang="ja-JP" sz="1000" b="0" dirty="0" smtClean="0">
+                <a:latin typeface="Courier New" panose="02070309020205020404" pitchFamily="49" charset="0"/>
+                <a:ea typeface="ＭＳ Ｐゴシック" charset="-128"/>
+                <a:cs typeface="Courier New" panose="02070309020205020404" pitchFamily="49" charset="0"/>
+              </a:rPr>
+              <a:t>;</a:t>
             </a:r>
           </a:p>
           <a:p>
             <a:pPr algn="l"/>
             <a:r>
-              <a:rPr kumimoji="1" lang="ja-JP" altLang="ja-JP" sz="1000" b="0" dirty="0">
-                <a:latin typeface="Courier New" panose="02070309020205020404" pitchFamily="49" charset="0"/>
-                <a:ea typeface="ＭＳ Ｐゴシック" charset="-128"/>
-                <a:cs typeface="Courier New" panose="02070309020205020404" pitchFamily="49" charset="0"/>
-              </a:rPr>
-              <a:t>    try {</a:t>
-            </a:r>
-          </a:p>
-          <a:p>
+              <a:rPr kumimoji="1" lang="en-US" altLang="ja-JP" sz="1000" dirty="0">
+                <a:latin typeface="Courier New" panose="02070309020205020404" pitchFamily="49" charset="0"/>
+                <a:ea typeface="ＭＳ Ｐゴシック" charset="-128"/>
+                <a:cs typeface="Courier New" panose="02070309020205020404" pitchFamily="49" charset="0"/>
+              </a:rPr>
+              <a:t> </a:t>
+            </a:r>
+            <a:r>
+              <a:rPr kumimoji="1" lang="en-US" altLang="ja-JP" sz="1000" dirty="0" smtClean="0">
+                <a:latin typeface="Courier New" panose="02070309020205020404" pitchFamily="49" charset="0"/>
+                <a:ea typeface="ＭＳ Ｐゴシック" charset="-128"/>
+                <a:cs typeface="Courier New" panose="02070309020205020404" pitchFamily="49" charset="0"/>
+              </a:rPr>
+              <a:t>   </a:t>
+            </a:r>
+            <a:r>
+              <a:rPr kumimoji="1" lang="ja-JP" altLang="ja-JP" sz="1000" b="0" dirty="0" smtClean="0">
+                <a:latin typeface="Courier New" panose="02070309020205020404" pitchFamily="49" charset="0"/>
+                <a:ea typeface="ＭＳ Ｐゴシック" charset="-128"/>
+                <a:cs typeface="Courier New" panose="02070309020205020404" pitchFamily="49" charset="0"/>
+              </a:rPr>
+              <a:t>try {</a:t>
+            </a:r>
+          </a:p>
+          <a:p>
+            <a:r>
+              <a:rPr kumimoji="1" lang="ja-JP" altLang="ja-JP" sz="1000" b="0" dirty="0" smtClean="0">
+                <a:latin typeface="Tahoma" pitchFamily="34" charset="0"/>
+                <a:ea typeface="ＭＳ Ｐゴシック" charset="-128"/>
+              </a:rPr>
+              <a:t>  </a:t>
+            </a:r>
             <a:r>
               <a:rPr kumimoji="1" lang="ja-JP" altLang="ja-JP" sz="1000" b="0" dirty="0">
                 <a:latin typeface="Tahoma" pitchFamily="34" charset="0"/>
                 <a:ea typeface="ＭＳ Ｐゴシック" charset="-128"/>
               </a:rPr>
-              <a:t>  　　</a:t>
+              <a:t>　　</a:t>
             </a:r>
             <a:r>
               <a:rPr kumimoji="1" lang="ja-JP" altLang="en-US" sz="1000" b="0" dirty="0" smtClean="0">
                 <a:latin typeface="Tahoma" pitchFamily="34" charset="0"/>
                 <a:ea typeface="ＭＳ Ｐゴシック" charset="-128"/>
               </a:rPr>
-              <a:t>　　　　</a:t>
+              <a:t>　　　</a:t>
+            </a:r>
+            <a:r>
+              <a:rPr kumimoji="1" lang="ja-JP" altLang="en-US" sz="1000" b="0" dirty="0" smtClean="0">
+                <a:latin typeface="Tahoma" pitchFamily="34" charset="0"/>
+                <a:ea typeface="ＭＳ Ｐゴシック" charset="-128"/>
+              </a:rPr>
+              <a:t> </a:t>
             </a:r>
             <a:r>
               <a:rPr kumimoji="1" lang="ja-JP" altLang="ja-JP" sz="1000" b="0" dirty="0" smtClean="0">
                 <a:latin typeface="Tahoma" pitchFamily="34" charset="0"/>
                 <a:ea typeface="ＭＳ Ｐゴシック" charset="-128"/>
               </a:rPr>
-              <a:t>//</a:t>
+              <a:t>/</a:t>
+            </a:r>
+            <a:r>
+              <a:rPr kumimoji="1" lang="ja-JP" altLang="ja-JP" sz="1000" b="0" dirty="0" smtClean="0">
+                <a:latin typeface="Tahoma" pitchFamily="34" charset="0"/>
+                <a:ea typeface="ＭＳ Ｐゴシック" charset="-128"/>
+              </a:rPr>
+              <a:t>/</a:t>
             </a:r>
             <a:r>
               <a:rPr kumimoji="1" lang="en-US" altLang="ja-JP" sz="1000" b="0" dirty="0" smtClean="0">
@@ -12913,7 +13197,15 @@
                 <a:ea typeface="ＭＳ Ｐゴシック" charset="-128"/>
                 <a:cs typeface="Courier New" panose="02070309020205020404" pitchFamily="49" charset="0"/>
               </a:rPr>
-              <a:t>  List</a:t>
+              <a:t> </a:t>
+            </a:r>
+            <a:r>
+              <a:rPr kumimoji="1" lang="ja-JP" altLang="ja-JP" sz="1000" b="0" dirty="0" smtClean="0">
+                <a:latin typeface="Courier New" panose="02070309020205020404" pitchFamily="49" charset="0"/>
+                <a:ea typeface="ＭＳ Ｐゴシック" charset="-128"/>
+                <a:cs typeface="Courier New" panose="02070309020205020404" pitchFamily="49" charset="0"/>
+              </a:rPr>
+              <a:t>List</a:t>
             </a:r>
             <a:r>
               <a:rPr kumimoji="1" lang="ja-JP" altLang="ja-JP" sz="1000" b="0" dirty="0">
@@ -12985,50 +13277,94 @@
                 <a:latin typeface="Tahoma" pitchFamily="34" charset="0"/>
                 <a:ea typeface="ＭＳ Ｐゴシック" charset="-128"/>
               </a:rPr>
-              <a:t>　　　　</a:t>
-            </a:r>
-            <a:r>
-              <a:rPr kumimoji="1" lang="ja-JP" altLang="ja-JP" sz="1000" b="0" dirty="0" smtClean="0">
+              <a:t>　　</a:t>
+            </a:r>
+            <a:r>
+              <a:rPr kumimoji="1" lang="ja-JP" altLang="en-US" sz="1000" b="0" dirty="0" smtClean="0">
                 <a:latin typeface="Tahoma" pitchFamily="34" charset="0"/>
                 <a:ea typeface="ＭＳ Ｐゴシック" charset="-128"/>
               </a:rPr>
-              <a:t>//</a:t>
-            </a:r>
-            <a:r>
-              <a:rPr kumimoji="1" lang="en-US" altLang="ja-JP" sz="1000" b="0" dirty="0" smtClean="0">
-                <a:latin typeface="Tahoma" pitchFamily="34" charset="0"/>
-                <a:ea typeface="ＭＳ Ｐゴシック" charset="-128"/>
-              </a:rPr>
-              <a:t> </a:t>
+              <a:t> 　</a:t>
             </a:r>
             <a:r>
               <a:rPr lang="ja-JP" altLang="en-US" sz="1000" dirty="0" smtClean="0">
                 <a:latin typeface="Courier New" pitchFamily="49" charset="0"/>
                 <a:cs typeface="Courier New" pitchFamily="49" charset="0"/>
               </a:rPr>
-              <a:t>読み込んだヘッダ部に対する処理</a:t>
-            </a:r>
-            <a:endParaRPr kumimoji="1" lang="ja-JP" altLang="ja-JP" sz="1000" b="0" dirty="0">
+              <a:t>・</a:t>
+            </a:r>
+            <a:r>
+              <a:rPr lang="ja-JP" altLang="en-US" sz="1000" dirty="0">
+                <a:latin typeface="Courier New" pitchFamily="49" charset="0"/>
+                <a:cs typeface="Courier New" pitchFamily="49" charset="0"/>
+              </a:rPr>
+              <a:t>・・</a:t>
+            </a:r>
+            <a:r>
+              <a:rPr kumimoji="1" lang="ja-JP" altLang="ja-JP" sz="1000" dirty="0">
+                <a:latin typeface="Tahoma" pitchFamily="34" charset="0"/>
+                <a:ea typeface="ＭＳ Ｐゴシック" charset="-128"/>
+              </a:rPr>
+              <a:t> /</a:t>
+            </a:r>
+            <a:r>
+              <a:rPr kumimoji="1" lang="ja-JP" altLang="ja-JP" sz="1000" b="0" dirty="0" smtClean="0">
+                <a:latin typeface="Tahoma" pitchFamily="34" charset="0"/>
+                <a:ea typeface="ＭＳ Ｐゴシック" charset="-128"/>
+              </a:rPr>
+              <a:t>/</a:t>
+            </a:r>
+            <a:r>
+              <a:rPr kumimoji="1" lang="en-US" altLang="ja-JP" sz="1000" b="0" dirty="0" smtClean="0">
+                <a:latin typeface="Tahoma" pitchFamily="34" charset="0"/>
+                <a:ea typeface="ＭＳ Ｐゴシック" charset="-128"/>
+              </a:rPr>
+              <a:t> </a:t>
+            </a:r>
+            <a:r>
+              <a:rPr lang="ja-JP" altLang="en-US" sz="1000" dirty="0" smtClean="0">
+                <a:latin typeface="Courier New" pitchFamily="49" charset="0"/>
+                <a:cs typeface="Courier New" pitchFamily="49" charset="0"/>
+              </a:rPr>
+              <a:t>読み込んだヘッダ部に対する</a:t>
+            </a:r>
+            <a:r>
+              <a:rPr lang="ja-JP" altLang="en-US" sz="1000" dirty="0" smtClean="0">
+                <a:latin typeface="Courier New" pitchFamily="49" charset="0"/>
+                <a:cs typeface="Courier New" pitchFamily="49" charset="0"/>
+              </a:rPr>
+              <a:t>処理</a:t>
+            </a:r>
+            <a:endParaRPr kumimoji="1" lang="ja-JP" altLang="ja-JP" sz="1000" b="0" dirty="0" smtClean="0">
               <a:latin typeface="Tahoma" pitchFamily="34" charset="0"/>
               <a:ea typeface="ＭＳ Ｐゴシック" charset="-128"/>
             </a:endParaRPr>
           </a:p>
           <a:p>
             <a:pPr algn="l"/>
-            <a:endParaRPr kumimoji="1" lang="ja-JP" altLang="ja-JP" sz="1000" b="0" dirty="0">
-              <a:latin typeface="Tahoma" pitchFamily="34" charset="0"/>
-              <a:ea typeface="ＭＳ Ｐゴシック" charset="-128"/>
-            </a:endParaRPr>
-          </a:p>
-          <a:p>
-            <a:pPr algn="l"/>
+            <a:r>
+              <a:rPr kumimoji="1" lang="ja-JP" altLang="en-US" sz="1000" b="0" dirty="0" smtClean="0">
+                <a:latin typeface="Courier New" panose="02070309020205020404" pitchFamily="49" charset="0"/>
+                <a:ea typeface="ＭＳ Ｐゴシック" charset="-128"/>
+                <a:cs typeface="Courier New" panose="02070309020205020404" pitchFamily="49" charset="0"/>
+              </a:rPr>
+              <a:t>　　　　　　</a:t>
+            </a:r>
+            <a:r>
+              <a:rPr kumimoji="1" lang="ja-JP" altLang="ja-JP" sz="1000" b="0" dirty="0" smtClean="0">
+                <a:latin typeface="Courier New" panose="02070309020205020404" pitchFamily="49" charset="0"/>
+                <a:ea typeface="ＭＳ Ｐゴシック" charset="-128"/>
+                <a:cs typeface="Courier New" panose="02070309020205020404" pitchFamily="49" charset="0"/>
+              </a:rPr>
+              <a:t>while</a:t>
+            </a:r>
             <a:r>
               <a:rPr kumimoji="1" lang="ja-JP" altLang="ja-JP" sz="1000" b="0" dirty="0">
                 <a:latin typeface="Courier New" panose="02070309020205020404" pitchFamily="49" charset="0"/>
                 <a:ea typeface="ＭＳ Ｐゴシック" charset="-128"/>
                 <a:cs typeface="Courier New" panose="02070309020205020404" pitchFamily="49" charset="0"/>
               </a:rPr>
-              <a:t>        while(fileLineIterator.hasNext()){</a:t>
+              <a:t>(fileLineIterator.hasNext()){</a:t>
             </a:r>
           </a:p>
           <a:p>
@@ -13248,6 +13584,14 @@
               <a:t>　</a:t>
             </a:r>
             <a:r>
+              <a:rPr kumimoji="1" lang="en-US" altLang="ja-JP" sz="1000" b="0" dirty="0" smtClean="0">
+                <a:latin typeface="Courier New" panose="02070309020205020404" pitchFamily="49" charset="0"/>
+                <a:ea typeface="ＭＳ Ｐゴシック" charset="-128"/>
+                <a:cs typeface="Courier New" panose="02070309020205020404" pitchFamily="49" charset="0"/>
+              </a:rPr>
+              <a:t>    </a:t>
+            </a:r>
+            <a:r>
               <a:rPr kumimoji="1" lang="ja-JP" altLang="ja-JP" sz="1000" b="0" dirty="0" smtClean="0">
                 <a:latin typeface="Courier New" panose="02070309020205020404" pitchFamily="49" charset="0"/>
                 <a:ea typeface="ＭＳ Ｐゴシック" charset="-128"/>
@@ -13269,11 +13613,32 @@
               <a:t>    </a:t>
             </a:r>
             <a:r>
+              <a:rPr kumimoji="1" lang="en-US" altLang="ja-JP" sz="1000" dirty="0">
+                <a:latin typeface="Tahoma" pitchFamily="34" charset="0"/>
+                <a:ea typeface="ＭＳ Ｐゴシック" charset="-128"/>
+              </a:rPr>
+              <a:t> </a:t>
+            </a:r>
+            <a:r>
+              <a:rPr kumimoji="1" lang="en-US" altLang="ja-JP" sz="1000" dirty="0" smtClean="0">
+                <a:latin typeface="Tahoma" pitchFamily="34" charset="0"/>
+                <a:ea typeface="ＭＳ Ｐゴシック" charset="-128"/>
+              </a:rPr>
+              <a:t>       </a:t>
+            </a:r>
+            <a:r>
               <a:rPr kumimoji="1" lang="ja-JP" altLang="ja-JP" sz="1000" b="0" dirty="0" smtClean="0">
                 <a:latin typeface="Tahoma" pitchFamily="34" charset="0"/>
                 <a:ea typeface="ＭＳ Ｐゴシック" charset="-128"/>
               </a:rPr>
-              <a:t>//</a:t>
+              <a:t>/</a:t>
+            </a:r>
+            <a:r>
+              <a:rPr kumimoji="1" lang="ja-JP" altLang="ja-JP" sz="1000" b="0" dirty="0" smtClean="0">
+                <a:latin typeface="Tahoma" pitchFamily="34" charset="0"/>
+                <a:ea typeface="ＭＳ Ｐゴシック" charset="-128"/>
+              </a:rPr>
+              <a:t>/</a:t>
             </a:r>
             <a:r>
               <a:rPr lang="ja-JP" altLang="en-US" sz="1000" dirty="0">
@@ -13301,7 +13666,21 @@
                 <a:latin typeface="Tahoma" pitchFamily="34" charset="0"/>
                 <a:ea typeface="ＭＳ Ｐゴシック" charset="-128"/>
               </a:rPr>
-              <a:t>　　</a:t>
+              <a:t>　</a:t>
+            </a:r>
+            <a:r>
+              <a:rPr kumimoji="1" lang="en-US" altLang="ja-JP" sz="1000" b="0" dirty="0" smtClean="0">
+                <a:latin typeface="Tahoma" pitchFamily="34" charset="0"/>
+                <a:ea typeface="ＭＳ Ｐゴシック" charset="-128"/>
+              </a:rPr>
+              <a:t>       </a:t>
+            </a:r>
+            <a:r>
+              <a:rPr kumimoji="1" lang="ja-JP" altLang="ja-JP" sz="1000" b="0" dirty="0">
+                <a:latin typeface="Tahoma" pitchFamily="34" charset="0"/>
+                <a:ea typeface="ＭＳ Ｐゴシック" charset="-128"/>
+              </a:rPr>
+              <a:t>　</a:t>
             </a:r>
             <a:r>
               <a:rPr kumimoji="1" lang="ja-JP" altLang="ja-JP" sz="1000" b="0" dirty="0" smtClean="0">
@@ -13317,7 +13696,55 @@
                 <a:ea typeface="ＭＳ Ｐゴシック" charset="-128"/>
                 <a:cs typeface="Courier New" panose="02070309020205020404" pitchFamily="49" charset="0"/>
               </a:rPr>
-              <a:t>&lt;String&gt; trailerData = fileLineIterator.getTrailer();</a:t>
+              <a:t>&lt;String&gt; trailerData </a:t>
+            </a:r>
+            <a:r>
+              <a:rPr kumimoji="1" lang="ja-JP" altLang="ja-JP" sz="1000" b="0" dirty="0" smtClean="0">
+                <a:latin typeface="Courier New" panose="02070309020205020404" pitchFamily="49" charset="0"/>
+                <a:ea typeface="ＭＳ Ｐゴシック" charset="-128"/>
+                <a:cs typeface="Courier New" panose="02070309020205020404" pitchFamily="49" charset="0"/>
+              </a:rPr>
+              <a:t>=</a:t>
+            </a:r>
+            <a:endParaRPr kumimoji="1" lang="en-US" altLang="ja-JP" sz="1000" b="0" dirty="0" smtClean="0">
+              <a:latin typeface="Courier New" panose="02070309020205020404" pitchFamily="49" charset="0"/>
+              <a:ea typeface="ＭＳ Ｐゴシック" charset="-128"/>
+              <a:cs typeface="Courier New" panose="02070309020205020404" pitchFamily="49" charset="0"/>
+            </a:endParaRPr>
+          </a:p>
+          <a:p>
+            <a:pPr algn="l"/>
+            <a:r>
+              <a:rPr kumimoji="1" lang="en-US" altLang="ja-JP" sz="1000" dirty="0">
+                <a:latin typeface="Courier New" panose="02070309020205020404" pitchFamily="49" charset="0"/>
+                <a:ea typeface="ＭＳ Ｐゴシック" charset="-128"/>
+                <a:cs typeface="Courier New" panose="02070309020205020404" pitchFamily="49" charset="0"/>
+              </a:rPr>
+              <a:t> </a:t>
+            </a:r>
+            <a:r>
+              <a:rPr kumimoji="1" lang="en-US" altLang="ja-JP" sz="1000" dirty="0" smtClean="0">
+                <a:latin typeface="Courier New" panose="02070309020205020404" pitchFamily="49" charset="0"/>
+                <a:ea typeface="ＭＳ Ｐゴシック" charset="-128"/>
+                <a:cs typeface="Courier New" panose="02070309020205020404" pitchFamily="49" charset="0"/>
+              </a:rPr>
+              <a:t>                     </a:t>
+            </a:r>
+            <a:r>
+              <a:rPr kumimoji="1" lang="ja-JP" altLang="ja-JP" sz="1000" b="0" dirty="0" smtClean="0">
+                <a:latin typeface="Courier New" panose="02070309020205020404" pitchFamily="49" charset="0"/>
+                <a:ea typeface="ＭＳ Ｐゴシック" charset="-128"/>
+                <a:cs typeface="Courier New" panose="02070309020205020404" pitchFamily="49" charset="0"/>
+              </a:rPr>
+              <a:t> </a:t>
+            </a:r>
+            <a:r>
+              <a:rPr kumimoji="1" lang="ja-JP" altLang="ja-JP" sz="1000" b="0" dirty="0">
+                <a:latin typeface="Courier New" panose="02070309020205020404" pitchFamily="49" charset="0"/>
+                <a:ea typeface="ＭＳ Ｐゴシック" charset="-128"/>
+                <a:cs typeface="Courier New" panose="02070309020205020404" pitchFamily="49" charset="0"/>
+              </a:rPr>
+              <a:t>fileLineIterator.getTrailer();</a:t>
             </a:r>
           </a:p>
           <a:p>
@@ -13326,7 +13753,14 @@
                 <a:latin typeface="Courier New" pitchFamily="49" charset="0"/>
                 <a:cs typeface="Courier New" pitchFamily="49" charset="0"/>
               </a:rPr>
-              <a:t>  ・</a:t>
+              <a:t>  </a:t>
+            </a:r>
+            <a:r>
+              <a:rPr lang="ja-JP" altLang="en-US" sz="1000" dirty="0" smtClean="0">
+                <a:latin typeface="Courier New" pitchFamily="49" charset="0"/>
+                <a:cs typeface="Courier New" pitchFamily="49" charset="0"/>
+              </a:rPr>
+              <a:t>    ・</a:t>
             </a:r>
             <a:r>
               <a:rPr lang="ja-JP" altLang="en-US" sz="1000" dirty="0">
@@ -13368,7 +13802,96 @@
                 <a:latin typeface="Courier New" pitchFamily="49" charset="0"/>
                 <a:cs typeface="Courier New" pitchFamily="49" charset="0"/>
               </a:rPr>
-              <a:t>読み込んだトレイラ部に対する処理</a:t>
+              <a:t>読み込んだトレイラ部に対する</a:t>
+            </a:r>
+            <a:r>
+              <a:rPr lang="ja-JP" altLang="en-US" sz="1000" dirty="0" smtClean="0">
+                <a:latin typeface="Courier New" pitchFamily="49" charset="0"/>
+                <a:cs typeface="Courier New" pitchFamily="49" charset="0"/>
+              </a:rPr>
+              <a:t>処理</a:t>
+            </a:r>
+            <a:endParaRPr kumimoji="1" lang="en-US" altLang="ja-JP" sz="1000" dirty="0">
+              <a:latin typeface="Tahoma" pitchFamily="34" charset="0"/>
+              <a:ea typeface="ＭＳ Ｐゴシック" charset="-128"/>
+            </a:endParaRPr>
+          </a:p>
+          <a:p>
+            <a:r>
+              <a:rPr kumimoji="1" lang="en-US" altLang="ja-JP" sz="1000" b="0" dirty="0">
+                <a:latin typeface="Tahoma" pitchFamily="34" charset="0"/>
+                <a:ea typeface="ＭＳ Ｐゴシック" charset="-128"/>
+                <a:cs typeface="Courier New" panose="02070309020205020404" pitchFamily="49" charset="0"/>
+              </a:rPr>
+              <a:t> </a:t>
+            </a:r>
+            <a:r>
+              <a:rPr kumimoji="1" lang="en-US" altLang="ja-JP" sz="1000" b="0" dirty="0" smtClean="0">
+                <a:latin typeface="Tahoma" pitchFamily="34" charset="0"/>
+                <a:ea typeface="ＭＳ Ｐゴシック" charset="-128"/>
+                <a:cs typeface="Courier New" panose="02070309020205020404" pitchFamily="49" charset="0"/>
+              </a:rPr>
+              <a:t>       </a:t>
+            </a:r>
+            <a:r>
+              <a:rPr kumimoji="1" lang="ja-JP" altLang="ja-JP" sz="1000" b="0" dirty="0" smtClean="0">
+                <a:latin typeface="Courier New" panose="02070309020205020404" pitchFamily="49" charset="0"/>
+                <a:ea typeface="ＭＳ Ｐゴシック" charset="-128"/>
+                <a:cs typeface="Courier New" panose="02070309020205020404" pitchFamily="49" charset="0"/>
+              </a:rPr>
+              <a:t>} </a:t>
+            </a:r>
+            <a:r>
+              <a:rPr kumimoji="1" lang="ja-JP" altLang="ja-JP" sz="1000" b="0" dirty="0">
+                <a:latin typeface="Courier New" panose="02070309020205020404" pitchFamily="49" charset="0"/>
+                <a:ea typeface="ＭＳ Ｐゴシック" charset="-128"/>
+                <a:cs typeface="Courier New" panose="02070309020205020404" pitchFamily="49" charset="0"/>
+              </a:rPr>
+              <a:t>finally {</a:t>
+            </a:r>
+          </a:p>
+          <a:p>
+            <a:r>
+              <a:rPr kumimoji="1" lang="ja-JP" altLang="ja-JP" sz="1000" b="0" dirty="0">
+                <a:latin typeface="Tahoma" pitchFamily="34" charset="0"/>
+                <a:ea typeface="ＭＳ Ｐゴシック" charset="-128"/>
+              </a:rPr>
+              <a:t>     </a:t>
+            </a:r>
+            <a:r>
+              <a:rPr kumimoji="1" lang="en-US" altLang="ja-JP" sz="1000" b="0" dirty="0" smtClean="0">
+                <a:latin typeface="Tahoma" pitchFamily="34" charset="0"/>
+                <a:ea typeface="ＭＳ Ｐゴシック" charset="-128"/>
+              </a:rPr>
+              <a:t>     </a:t>
+            </a:r>
+            <a:r>
+              <a:rPr kumimoji="1" lang="ja-JP" altLang="ja-JP" sz="1000" b="0" dirty="0" smtClean="0">
+                <a:latin typeface="Tahoma" pitchFamily="34" charset="0"/>
+                <a:ea typeface="ＭＳ Ｐゴシック" charset="-128"/>
+              </a:rPr>
+              <a:t>/</a:t>
+            </a:r>
+            <a:r>
+              <a:rPr kumimoji="1" lang="ja-JP" altLang="ja-JP" sz="1000" b="0" dirty="0" smtClean="0">
+                <a:latin typeface="Tahoma" pitchFamily="34" charset="0"/>
+                <a:ea typeface="ＭＳ Ｐゴシック" charset="-128"/>
+              </a:rPr>
+              <a:t>/</a:t>
+            </a:r>
+            <a:r>
+              <a:rPr lang="ja-JP" altLang="en-US" sz="1000" dirty="0">
+                <a:latin typeface="Courier New" pitchFamily="49" charset="0"/>
+                <a:cs typeface="Courier New" pitchFamily="49" charset="0"/>
+              </a:rPr>
+              <a:t> </a:t>
+            </a:r>
+            <a:r>
+              <a:rPr lang="ja-JP" altLang="en-US" sz="1000" dirty="0" smtClean="0">
+                <a:latin typeface="Courier New" pitchFamily="49" charset="0"/>
+                <a:cs typeface="Courier New" pitchFamily="49" charset="0"/>
+              </a:rPr>
+              <a:t>ファイルのクローズ</a:t>
             </a:r>
             <a:endParaRPr kumimoji="1" lang="ja-JP" altLang="ja-JP" sz="1000" b="0" dirty="0">
               <a:latin typeface="Tahoma" pitchFamily="34" charset="0"/>
@@ -13376,124 +13899,119 @@
             </a:endParaRPr>
           </a:p>
           <a:p>
+            <a:r>
+              <a:rPr kumimoji="1" lang="ja-JP" altLang="en-US" sz="1000" dirty="0">
+                <a:latin typeface="Courier New" panose="02070309020205020404" pitchFamily="49" charset="0"/>
+                <a:ea typeface="ＭＳ Ｐゴシック" charset="-128"/>
+                <a:cs typeface="Courier New" panose="02070309020205020404" pitchFamily="49" charset="0"/>
+              </a:rPr>
+              <a:t> </a:t>
+            </a:r>
+            <a:r>
+              <a:rPr kumimoji="1" lang="ja-JP" altLang="en-US" sz="1000" dirty="0" smtClean="0">
+                <a:latin typeface="Courier New" panose="02070309020205020404" pitchFamily="49" charset="0"/>
+                <a:ea typeface="ＭＳ Ｐゴシック" charset="-128"/>
+                <a:cs typeface="Courier New" panose="02070309020205020404" pitchFamily="49" charset="0"/>
+              </a:rPr>
+              <a:t>    </a:t>
+            </a:r>
+            <a:r>
+              <a:rPr kumimoji="1" lang="ja-JP" altLang="ja-JP" sz="1000" b="0" dirty="0" smtClean="0">
+                <a:latin typeface="Courier New" panose="02070309020205020404" pitchFamily="49" charset="0"/>
+                <a:ea typeface="ＭＳ Ｐゴシック" charset="-128"/>
+                <a:cs typeface="Courier New" panose="02070309020205020404" pitchFamily="49" charset="0"/>
+              </a:rPr>
+              <a:t>fileLineIterator</a:t>
+            </a:r>
+            <a:r>
+              <a:rPr kumimoji="1" lang="ja-JP" altLang="ja-JP" sz="1000" b="0" dirty="0">
+                <a:latin typeface="Courier New" panose="02070309020205020404" pitchFamily="49" charset="0"/>
+                <a:ea typeface="ＭＳ Ｐゴシック" charset="-128"/>
+                <a:cs typeface="Courier New" panose="02070309020205020404" pitchFamily="49" charset="0"/>
+              </a:rPr>
+              <a:t>.closeFile();</a:t>
+            </a:r>
+          </a:p>
+          <a:p>
+            <a:r>
+              <a:rPr kumimoji="1" lang="en-US" altLang="ja-JP" sz="1000" dirty="0" smtClean="0">
+                <a:latin typeface="Tahoma" pitchFamily="34" charset="0"/>
+                <a:ea typeface="ＭＳ Ｐゴシック" charset="-128"/>
+                <a:cs typeface="Courier New" panose="02070309020205020404" pitchFamily="49" charset="0"/>
+              </a:rPr>
+              <a:t>        </a:t>
+            </a:r>
+            <a:r>
+              <a:rPr kumimoji="1" lang="en-US" altLang="ja-JP" sz="1000" dirty="0" smtClean="0">
+                <a:latin typeface="Courier New" panose="02070309020205020404" pitchFamily="49" charset="0"/>
+                <a:ea typeface="ＭＳ Ｐゴシック" charset="-128"/>
+                <a:cs typeface="Courier New" panose="02070309020205020404" pitchFamily="49" charset="0"/>
+              </a:rPr>
+              <a:t>}</a:t>
+            </a:r>
+            <a:endParaRPr kumimoji="1" lang="ja-JP" altLang="ja-JP" sz="1000" b="0" dirty="0">
+              <a:latin typeface="Courier New" panose="02070309020205020404" pitchFamily="49" charset="0"/>
+              <a:ea typeface="ＭＳ Ｐゴシック" charset="-128"/>
+              <a:cs typeface="Courier New" panose="02070309020205020404" pitchFamily="49" charset="0"/>
+            </a:endParaRPr>
+          </a:p>
+          <a:p>
             <a:pPr algn="l"/>
+            <a:r>
+              <a:rPr kumimoji="1" lang="en-US" altLang="ja-JP" sz="1000" b="0" dirty="0" smtClean="0">
+                <a:latin typeface="Tahoma" pitchFamily="34" charset="0"/>
+                <a:ea typeface="ＭＳ Ｐゴシック" charset="-128"/>
+              </a:rPr>
+              <a:t>         </a:t>
+            </a:r>
+            <a:r>
+              <a:rPr kumimoji="1" lang="ja-JP" altLang="ja-JP" sz="1000" b="0" dirty="0" err="1" smtClean="0">
+                <a:latin typeface="Tahoma" pitchFamily="34" charset="0"/>
+                <a:ea typeface="ＭＳ Ｐゴシック" charset="-128"/>
+              </a:rPr>
+              <a:t>.</a:t>
+            </a:r>
+            <a:r>
+              <a:rPr kumimoji="1" lang="ja-JP" altLang="ja-JP" sz="1000" b="0" dirty="0" err="1">
+                <a:latin typeface="Tahoma" pitchFamily="34" charset="0"/>
+                <a:ea typeface="ＭＳ Ｐゴシック" charset="-128"/>
+              </a:rPr>
+              <a:t>..</a:t>
+            </a:r>
             <a:r>
               <a:rPr kumimoji="1" lang="ja-JP" altLang="ja-JP" sz="1000" b="0" dirty="0">
                 <a:latin typeface="Tahoma" pitchFamily="34" charset="0"/>
                 <a:ea typeface="ＭＳ Ｐゴシック" charset="-128"/>
               </a:rPr>
-              <a:t/>
-            </a:r>
-            <a:br>
-              <a:rPr kumimoji="1" lang="ja-JP" altLang="ja-JP" sz="1000" b="0" dirty="0">
-                <a:latin typeface="Tahoma" pitchFamily="34" charset="0"/>
-                <a:ea typeface="ＭＳ Ｐゴシック" charset="-128"/>
-              </a:rPr>
-            </a:br>
-            <a:r>
-              <a:rPr kumimoji="1" lang="ja-JP" altLang="ja-JP" sz="1000" b="0" dirty="0">
-                <a:latin typeface="Tahoma" pitchFamily="34" charset="0"/>
-                <a:ea typeface="ＭＳ Ｐゴシック" charset="-128"/>
-              </a:rPr>
-              <a:t>   </a:t>
-            </a:r>
-            <a:r>
-              <a:rPr kumimoji="1" lang="ja-JP" altLang="ja-JP" sz="1000" b="0" dirty="0">
-                <a:latin typeface="Courier New" panose="02070309020205020404" pitchFamily="49" charset="0"/>
-                <a:ea typeface="ＭＳ Ｐゴシック" charset="-128"/>
-                <a:cs typeface="Courier New" panose="02070309020205020404" pitchFamily="49" charset="0"/>
-              </a:rPr>
-              <a:t> } finally {</a:t>
-            </a:r>
-          </a:p>
-          <a:p>
-            <a:r>
-              <a:rPr kumimoji="1" lang="ja-JP" altLang="ja-JP" sz="1000" b="0" dirty="0">
-                <a:latin typeface="Tahoma" pitchFamily="34" charset="0"/>
-                <a:ea typeface="ＭＳ Ｐゴシック" charset="-128"/>
-              </a:rPr>
-              <a:t>        </a:t>
-            </a:r>
-            <a:r>
-              <a:rPr kumimoji="1" lang="ja-JP" altLang="ja-JP" sz="1000" b="0" dirty="0" smtClean="0">
-                <a:latin typeface="Tahoma" pitchFamily="34" charset="0"/>
-                <a:ea typeface="ＭＳ Ｐゴシック" charset="-128"/>
-              </a:rPr>
-              <a:t>//</a:t>
-            </a:r>
-            <a:r>
-              <a:rPr lang="ja-JP" altLang="en-US" sz="1000" dirty="0">
-                <a:latin typeface="Courier New" pitchFamily="49" charset="0"/>
-                <a:cs typeface="Courier New" pitchFamily="49" charset="0"/>
-              </a:rPr>
               <a:t> </a:t>
             </a:r>
-            <a:r>
-              <a:rPr lang="ja-JP" altLang="en-US" sz="1000" dirty="0" smtClean="0">
-                <a:latin typeface="Courier New" pitchFamily="49" charset="0"/>
-                <a:cs typeface="Courier New" pitchFamily="49" charset="0"/>
-              </a:rPr>
-              <a:t>ファイルのクローズ</a:t>
-            </a:r>
-            <a:endParaRPr kumimoji="1" lang="ja-JP" altLang="ja-JP" sz="1000" b="0" dirty="0">
+            <a:endParaRPr kumimoji="1" lang="en-US" altLang="ja-JP" sz="1000" b="0" dirty="0" smtClean="0">
               <a:latin typeface="Tahoma" pitchFamily="34" charset="0"/>
               <a:ea typeface="ＭＳ Ｐゴシック" charset="-128"/>
             </a:endParaRPr>
           </a:p>
           <a:p>
-            <a:pPr algn="l"/>
-            <a:r>
-              <a:rPr kumimoji="1" lang="ja-JP" altLang="ja-JP" sz="1000" b="0" dirty="0">
-                <a:latin typeface="Courier New" panose="02070309020205020404" pitchFamily="49" charset="0"/>
-                <a:ea typeface="ＭＳ Ｐゴシック" charset="-128"/>
-                <a:cs typeface="Courier New" panose="02070309020205020404" pitchFamily="49" charset="0"/>
-              </a:rPr>
-              <a:t>    </a:t>
-            </a:r>
-            <a:r>
-              <a:rPr kumimoji="1" lang="ja-JP" altLang="ja-JP" sz="1000" b="0" dirty="0" smtClean="0">
-                <a:latin typeface="Courier New" panose="02070309020205020404" pitchFamily="49" charset="0"/>
-                <a:ea typeface="ＭＳ Ｐゴシック" charset="-128"/>
-                <a:cs typeface="Courier New" panose="02070309020205020404" pitchFamily="49" charset="0"/>
-              </a:rPr>
-              <a:t>fileLineIterator</a:t>
-            </a:r>
-            <a:r>
-              <a:rPr kumimoji="1" lang="ja-JP" altLang="ja-JP" sz="1000" b="0" dirty="0">
-                <a:latin typeface="Courier New" panose="02070309020205020404" pitchFamily="49" charset="0"/>
-                <a:ea typeface="ＭＳ Ｐゴシック" charset="-128"/>
-                <a:cs typeface="Courier New" panose="02070309020205020404" pitchFamily="49" charset="0"/>
-              </a:rPr>
-              <a:t>.closeFile();</a:t>
-            </a:r>
-          </a:p>
-          <a:p>
-            <a:pPr algn="l"/>
-            <a:r>
-              <a:rPr kumimoji="1" lang="ja-JP" altLang="ja-JP" sz="1000" b="0" dirty="0">
-                <a:latin typeface="Courier New" panose="02070309020205020404" pitchFamily="49" charset="0"/>
-                <a:ea typeface="ＭＳ Ｐゴシック" charset="-128"/>
-                <a:cs typeface="Courier New" panose="02070309020205020404" pitchFamily="49" charset="0"/>
-              </a:rPr>
-              <a:t>    }</a:t>
-            </a:r>
-          </a:p>
-          <a:p>
-            <a:pPr algn="l"/>
-            <a:r>
-              <a:rPr kumimoji="1" lang="ja-JP" altLang="ja-JP" sz="1000" b="0" dirty="0" err="1">
+            <a:r>
+              <a:rPr kumimoji="1" lang="en-US" altLang="ja-JP" sz="1000" dirty="0" smtClean="0">
                 <a:latin typeface="Tahoma" pitchFamily="34" charset="0"/>
                 <a:ea typeface="ＭＳ Ｐゴシック" charset="-128"/>
-              </a:rPr>
-              <a:t>...</a:t>
-            </a:r>
-            <a:r>
-              <a:rPr kumimoji="1" lang="ja-JP" altLang="ja-JP" sz="1000" b="0" dirty="0">
-                <a:latin typeface="Tahoma" pitchFamily="34" charset="0"/>
-                <a:ea typeface="ＭＳ Ｐゴシック" charset="-128"/>
-              </a:rPr>
-              <a:t> </a:t>
-            </a:r>
+                <a:cs typeface="Courier New" panose="02070309020205020404" pitchFamily="49" charset="0"/>
+              </a:rPr>
+              <a:t>  </a:t>
+            </a:r>
+            <a:r>
+              <a:rPr kumimoji="1" lang="en-US" altLang="ja-JP" sz="1000" dirty="0" smtClean="0">
+                <a:latin typeface="Courier New" panose="02070309020205020404" pitchFamily="49" charset="0"/>
+                <a:ea typeface="ＭＳ Ｐゴシック" charset="-128"/>
+                <a:cs typeface="Courier New" panose="02070309020205020404" pitchFamily="49" charset="0"/>
+              </a:rPr>
+              <a:t>}</a:t>
+            </a:r>
+            <a:endParaRPr kumimoji="1" lang="ja-JP" altLang="ja-JP" sz="1000" dirty="0">
+              <a:latin typeface="Courier New" panose="02070309020205020404" pitchFamily="49" charset="0"/>
+              <a:ea typeface="ＭＳ Ｐゴシック" charset="-128"/>
+              <a:cs typeface="Courier New" panose="02070309020205020404" pitchFamily="49" charset="0"/>
+            </a:endParaRPr>
           </a:p>
         </p:txBody>
       </p:sp>
@@ -13507,7 +14025,7 @@
         </p:nvSpPr>
         <p:spPr bwMode="auto">
           <a:xfrm>
-            <a:off x="4739406" y="6309320"/>
+            <a:off x="4005320" y="6309320"/>
             <a:ext cx="4678090" cy="360040"/>
           </a:xfrm>
           <a:prstGeom prst="rect">
@@ -13532,89 +14050,86 @@
           <a:p>
             <a:pPr algn="l"/>
             <a:r>
-              <a:rPr kumimoji="1" lang="ja-JP" altLang="en-US" sz="1000" b="0">
+              <a:rPr kumimoji="1" lang="en-US" altLang="ja-JP" sz="1000" dirty="0" smtClean="0">
                 <a:latin typeface="ＭＳ Ｐゴシック"/>
                 <a:ea typeface="ＭＳ Ｐゴシック" charset="-128"/>
               </a:rPr>
-              <a:t>“</a:t>
-            </a:r>
-            <a:r>
-              <a:rPr kumimoji="1" lang="en-US" altLang="ja-JP" sz="1000" b="0">
+              <a:t>"</a:t>
+            </a:r>
+            <a:r>
+              <a:rPr kumimoji="1" lang="en-US" altLang="ja-JP" sz="1000" b="0" dirty="0" smtClean="0">
                 <a:latin typeface="Tahoma" pitchFamily="34" charset="0"/>
                 <a:ea typeface="ＭＳ Ｐゴシック" charset="-128"/>
               </a:rPr>
               <a:t>2006/07/01</a:t>
             </a:r>
             <a:r>
-              <a:rPr kumimoji="1" lang="en-US" altLang="ja-JP" sz="1000" b="0">
+              <a:rPr kumimoji="1" lang="en-US" altLang="ja-JP" sz="1000" dirty="0" smtClean="0">
                 <a:latin typeface="ＭＳ Ｐゴシック"/>
                 <a:ea typeface="ＭＳ Ｐゴシック" charset="-128"/>
               </a:rPr>
-              <a:t>”</a:t>
-            </a:r>
-            <a:r>
-              <a:rPr kumimoji="1" lang="en-US" altLang="ja-JP" sz="1000" b="0">
+              <a:t>"</a:t>
+            </a:r>
+            <a:r>
+              <a:rPr kumimoji="1" lang="en-US" altLang="ja-JP" sz="1000" b="0" dirty="0" smtClean="0">
                 <a:latin typeface="Tahoma" pitchFamily="34" charset="0"/>
                 <a:ea typeface="ＭＳ Ｐゴシック" charset="-128"/>
               </a:rPr>
               <a:t>,</a:t>
             </a:r>
             <a:r>
-              <a:rPr kumimoji="1" lang="en-US" altLang="ja-JP" sz="1000" b="0">
+              <a:rPr kumimoji="1" lang="en-US" altLang="ja-JP" sz="1000" dirty="0" smtClean="0">
                 <a:latin typeface="ＭＳ Ｐゴシック"/>
                 <a:ea typeface="ＭＳ Ｐゴシック" charset="-128"/>
               </a:rPr>
-              <a:t>”</a:t>
-            </a:r>
-            <a:r>
-              <a:rPr kumimoji="1" lang="en-US" altLang="ja-JP" sz="1000" b="0">
+              <a:t>"</a:t>
+            </a:r>
+            <a:r>
+              <a:rPr kumimoji="1" lang="en-US" altLang="ja-JP" sz="1000" b="0" dirty="0" smtClean="0">
                 <a:latin typeface="Tahoma" pitchFamily="34" charset="0"/>
                 <a:ea typeface="ＭＳ Ｐゴシック" charset="-128"/>
               </a:rPr>
               <a:t>shop01</a:t>
             </a:r>
             <a:r>
-              <a:rPr kumimoji="1" lang="en-US" altLang="ja-JP" sz="1000" b="0">
+              <a:rPr kumimoji="1" lang="en-US" altLang="ja-JP" sz="1000" dirty="0" smtClean="0">
                 <a:latin typeface="ＭＳ Ｐゴシック"/>
                 <a:ea typeface="ＭＳ Ｐゴシック" charset="-128"/>
               </a:rPr>
-              <a:t>”</a:t>
-            </a:r>
-            <a:r>
-              <a:rPr kumimoji="1" lang="en-US" altLang="ja-JP" sz="1000" b="0">
+              <a:t>"</a:t>
+            </a:r>
+            <a:r>
+              <a:rPr kumimoji="1" lang="en-US" altLang="ja-JP" sz="1000" b="0" dirty="0" smtClean="0">
                 <a:latin typeface="Tahoma" pitchFamily="34" charset="0"/>
                 <a:ea typeface="ＭＳ Ｐゴシック" charset="-128"/>
               </a:rPr>
               <a:t>,</a:t>
             </a:r>
             <a:r>
-              <a:rPr kumimoji="1" lang="en-US" altLang="ja-JP" sz="1000" b="0">
+              <a:rPr kumimoji="1" lang="en-US" altLang="ja-JP" sz="1000" dirty="0" smtClean="0">
                 <a:latin typeface="ＭＳ Ｐゴシック"/>
                 <a:ea typeface="ＭＳ Ｐゴシック" charset="-128"/>
               </a:rPr>
-              <a:t>”</a:t>
-            </a:r>
-            <a:r>
-              <a:rPr kumimoji="1" lang="en-US" altLang="ja-JP" sz="1000" b="0">
+              <a:t>"</a:t>
+            </a:r>
+            <a:r>
+              <a:rPr kumimoji="1" lang="en-US" altLang="ja-JP" sz="1000" b="0" dirty="0" smtClean="0">
                 <a:latin typeface="Tahoma" pitchFamily="34" charset="0"/>
                 <a:ea typeface="ＭＳ Ｐゴシック" charset="-128"/>
               </a:rPr>
               <a:t>1,000,000</a:t>
             </a:r>
             <a:r>
-              <a:rPr kumimoji="1" lang="en-US" altLang="ja-JP" sz="1000" b="0">
-                <a:latin typeface="ＭＳ Ｐゴシック"/>
-                <a:ea typeface="ＭＳ Ｐゴシック" charset="-128"/>
-              </a:rPr>
-              <a:t>”</a:t>
-            </a:r>
-            <a:r>
-              <a:rPr kumimoji="1" lang="en-US" altLang="ja-JP" sz="1000" b="0">
+              <a:rPr kumimoji="1" lang="en-US" altLang="ja-JP" sz="1000" dirty="0" smtClean="0">
                 <a:latin typeface="Tahoma" pitchFamily="34" charset="0"/>
                 <a:ea typeface="ＭＳ Ｐゴシック" charset="-128"/>
               </a:rPr>
-              <a:t> </a:t>
-            </a:r>
+              <a:t>"</a:t>
+            </a:r>
+            <a:endParaRPr kumimoji="1" lang="en-US" altLang="ja-JP" sz="1000" b="0" dirty="0">
+              <a:latin typeface="Tahoma" pitchFamily="34" charset="0"/>
+              <a:ea typeface="ＭＳ Ｐゴシック" charset="-128"/>
+            </a:endParaRPr>
           </a:p>
         </p:txBody>
       </p:sp>
@@ -13628,7 +14143,7 @@
         </p:nvSpPr>
         <p:spPr bwMode="auto">
           <a:xfrm>
-            <a:off x="131079" y="3628034"/>
+            <a:off x="200472" y="3255282"/>
             <a:ext cx="1797585" cy="233014"/>
           </a:xfrm>
           <a:prstGeom prst="rect">
@@ -13671,7 +14186,7 @@
         </p:nvSpPr>
         <p:spPr bwMode="auto">
           <a:xfrm>
-            <a:off x="4371115" y="566886"/>
+            <a:off x="4701625" y="544852"/>
             <a:ext cx="1523471" cy="233014"/>
           </a:xfrm>
           <a:prstGeom prst="rect">
@@ -13714,7 +14229,7 @@
         </p:nvSpPr>
         <p:spPr bwMode="auto">
           <a:xfrm>
-            <a:off x="4304928" y="6093296"/>
+            <a:off x="3901101" y="6093296"/>
             <a:ext cx="1127530" cy="233014"/>
           </a:xfrm>
           <a:prstGeom prst="rect">
@@ -13762,13 +14277,13 @@
         </p:nvSpPr>
         <p:spPr bwMode="auto">
           <a:xfrm>
-            <a:off x="2432720" y="1124744"/>
+            <a:off x="2605144" y="1388269"/>
             <a:ext cx="2134262" cy="527050"/>
           </a:xfrm>
           <a:prstGeom prst="wedgeRoundRectCallout">
             <a:avLst>
-              <a:gd name="adj1" fmla="val 63397"/>
-              <a:gd name="adj2" fmla="val 50604"/>
+              <a:gd name="adj1" fmla="val 72172"/>
+              <a:gd name="adj2" fmla="val 56875"/>
               <a:gd name="adj3" fmla="val 16667"/>
             </a:avLst>
           </a:prstGeom>
@@ -13815,13 +14330,13 @@
         </p:nvSpPr>
         <p:spPr bwMode="auto">
           <a:xfrm>
-            <a:off x="2432720" y="1700808"/>
+            <a:off x="2605144" y="2108432"/>
             <a:ext cx="2134262" cy="527050"/>
           </a:xfrm>
           <a:prstGeom prst="wedgeRoundRectCallout">
             <a:avLst>
-              <a:gd name="adj1" fmla="val 68752"/>
-              <a:gd name="adj2" fmla="val 75905"/>
+              <a:gd name="adj1" fmla="val 79592"/>
+              <a:gd name="adj2" fmla="val 67544"/>
               <a:gd name="adj3" fmla="val 16667"/>
             </a:avLst>
           </a:prstGeom>
@@ -13896,13 +14411,13 @@
         </p:nvSpPr>
         <p:spPr bwMode="auto">
           <a:xfrm>
-            <a:off x="2432720" y="2276872"/>
+            <a:off x="2605144" y="2858610"/>
             <a:ext cx="2134262" cy="527050"/>
           </a:xfrm>
           <a:prstGeom prst="wedgeRoundRectCallout">
             <a:avLst>
-              <a:gd name="adj1" fmla="val 71877"/>
-              <a:gd name="adj2" fmla="val 84941"/>
+              <a:gd name="adj1" fmla="val 95106"/>
+              <a:gd name="adj2" fmla="val 53587"/>
               <a:gd name="adj3" fmla="val 16667"/>
             </a:avLst>
           </a:prstGeom>
@@ -13963,13 +14478,13 @@
         </p:nvSpPr>
         <p:spPr bwMode="auto">
           <a:xfrm>
-            <a:off x="2432720" y="2901950"/>
-            <a:ext cx="2134262" cy="527050"/>
+            <a:off x="7640844" y="5156773"/>
+            <a:ext cx="2134262" cy="616065"/>
           </a:xfrm>
           <a:prstGeom prst="wedgeRoundRectCallout">
             <a:avLst>
-              <a:gd name="adj1" fmla="val 67414"/>
-              <a:gd name="adj2" fmla="val 137351"/>
+              <a:gd name="adj1" fmla="val -42452"/>
+              <a:gd name="adj2" fmla="val -155006"/>
               <a:gd name="adj3" fmla="val 16667"/>
             </a:avLst>
           </a:prstGeom>
@@ -14241,8 +14756,8 @@
         </p:nvSpPr>
         <p:spPr bwMode="auto">
           <a:xfrm>
-            <a:off x="200472" y="2628275"/>
-            <a:ext cx="8928992" cy="3528392"/>
+            <a:off x="200472" y="2628274"/>
+            <a:ext cx="8928992" cy="3904727"/>
           </a:xfrm>
           <a:prstGeom prst="rect">
             <a:avLst/>
@@ -14326,18 +14841,18 @@
               <a:t>    </a:t>
             </a:r>
             <a:r>
-              <a:rPr lang="en-US" altLang="ja-JP" sz="1200" dirty="0" smtClean="0">
-                <a:latin typeface="Courier New" pitchFamily="49" charset="0"/>
-                <a:cs typeface="Courier New" pitchFamily="49" charset="0"/>
-              </a:rPr>
-              <a:t> </a:t>
-            </a:r>
-            <a:r>
               <a:rPr lang="ja-JP" altLang="en-US" sz="1200" dirty="0" smtClean="0">
                 <a:latin typeface="Courier New" pitchFamily="49" charset="0"/>
                 <a:cs typeface="Courier New" pitchFamily="49" charset="0"/>
               </a:rPr>
-              <a:t>・・・省略</a:t>
+              <a:t>・</a:t>
+            </a:r>
+            <a:r>
+              <a:rPr lang="ja-JP" altLang="en-US" sz="1200" dirty="0" smtClean="0">
+                <a:latin typeface="Courier New" pitchFamily="49" charset="0"/>
+                <a:cs typeface="Courier New" pitchFamily="49" charset="0"/>
+              </a:rPr>
+              <a:t>・・省略</a:t>
             </a:r>
             <a:endParaRPr lang="en-US" altLang="ja-JP" sz="1200" b="1" dirty="0" smtClean="0">
               <a:solidFill>
@@ -14788,14 +15303,98 @@
                 <a:latin typeface="Courier New" pitchFamily="49" charset="0"/>
                 <a:cs typeface="Courier New" pitchFamily="49" charset="0"/>
               </a:rPr>
-              <a:t> </a:t>
+              <a:t>        </a:t>
             </a:r>
             <a:r>
               <a:rPr lang="ja-JP" altLang="en-US" sz="1200" dirty="0" smtClean="0">
                 <a:latin typeface="Courier New" pitchFamily="49" charset="0"/>
                 <a:cs typeface="Courier New" pitchFamily="49" charset="0"/>
               </a:rPr>
-              <a:t>・・・省略</a:t>
+              <a:t>・</a:t>
+            </a:r>
+            <a:r>
+              <a:rPr lang="ja-JP" altLang="en-US" sz="1200" dirty="0" smtClean="0">
+                <a:latin typeface="Courier New" pitchFamily="49" charset="0"/>
+                <a:cs typeface="Courier New" pitchFamily="49" charset="0"/>
+              </a:rPr>
+              <a:t>・・</a:t>
+            </a:r>
+            <a:r>
+              <a:rPr lang="ja-JP" altLang="en-US" sz="1200" dirty="0" smtClean="0">
+                <a:latin typeface="Courier New" pitchFamily="49" charset="0"/>
+                <a:cs typeface="Courier New" pitchFamily="49" charset="0"/>
+              </a:rPr>
+              <a:t>省略</a:t>
+            </a:r>
+            <a:endParaRPr lang="en-US" altLang="ja-JP" sz="1200" dirty="0" smtClean="0">
+              <a:latin typeface="Courier New" pitchFamily="49" charset="0"/>
+              <a:cs typeface="Courier New" pitchFamily="49" charset="0"/>
+            </a:endParaRPr>
+          </a:p>
+          <a:p>
+            <a:r>
+              <a:rPr lang="en-US" altLang="ja-JP" sz="1200" dirty="0">
+                <a:latin typeface="Courier New" pitchFamily="49" charset="0"/>
+                <a:cs typeface="Courier New" pitchFamily="49" charset="0"/>
+              </a:rPr>
+              <a:t> </a:t>
+            </a:r>
+            <a:r>
+              <a:rPr lang="en-US" altLang="ja-JP" sz="1200" dirty="0" smtClean="0">
+                <a:latin typeface="Courier New" pitchFamily="49" charset="0"/>
+                <a:cs typeface="Courier New" pitchFamily="49" charset="0"/>
+              </a:rPr>
+              <a:t>   }</a:t>
+            </a:r>
+          </a:p>
+          <a:p>
+            <a:r>
+              <a:rPr lang="en-US" altLang="ja-JP" sz="1200" dirty="0">
+                <a:latin typeface="Courier New" pitchFamily="49" charset="0"/>
+                <a:cs typeface="Courier New" pitchFamily="49" charset="0"/>
+              </a:rPr>
+              <a:t> </a:t>
+            </a:r>
+            <a:r>
+              <a:rPr lang="en-US" altLang="ja-JP" sz="1200" dirty="0" smtClean="0">
+                <a:latin typeface="Courier New" pitchFamily="49" charset="0"/>
+                <a:cs typeface="Courier New" pitchFamily="49" charset="0"/>
+              </a:rPr>
+              <a:t>   </a:t>
+            </a:r>
+            <a:r>
+              <a:rPr lang="ja-JP" altLang="en-US" sz="1200" dirty="0" smtClean="0">
+                <a:latin typeface="Courier New" pitchFamily="49" charset="0"/>
+                <a:cs typeface="Courier New" pitchFamily="49" charset="0"/>
+              </a:rPr>
+              <a:t>・</a:t>
+            </a:r>
+            <a:r>
+              <a:rPr lang="ja-JP" altLang="en-US" sz="1200" dirty="0">
+                <a:latin typeface="Courier New" pitchFamily="49" charset="0"/>
+                <a:cs typeface="Courier New" pitchFamily="49" charset="0"/>
+              </a:rPr>
+              <a:t>・・</a:t>
+            </a:r>
+            <a:r>
+              <a:rPr lang="ja-JP" altLang="en-US" sz="1200" dirty="0" smtClean="0">
+                <a:latin typeface="Courier New" pitchFamily="49" charset="0"/>
+                <a:cs typeface="Courier New" pitchFamily="49" charset="0"/>
+              </a:rPr>
+              <a:t>省略</a:t>
+            </a:r>
+            <a:endParaRPr lang="en-US" altLang="ja-JP" sz="1200" dirty="0" smtClean="0">
+              <a:latin typeface="Courier New" pitchFamily="49" charset="0"/>
+              <a:cs typeface="Courier New" pitchFamily="49" charset="0"/>
+            </a:endParaRPr>
+          </a:p>
+          <a:p>
+            <a:r>
+              <a:rPr lang="en-US" altLang="ja-JP" sz="1200" dirty="0" smtClean="0">
+                <a:latin typeface="Courier New" pitchFamily="49" charset="0"/>
+                <a:cs typeface="Courier New" pitchFamily="49" charset="0"/>
+              </a:rPr>
+              <a:t>}</a:t>
             </a:r>
             <a:endParaRPr lang="en-US" altLang="ja-JP" sz="1200" dirty="0" smtClean="0">
               <a:latin typeface="Courier New" pitchFamily="49" charset="0"/>
@@ -15149,7 +15748,7 @@
                 <a:ea typeface="ＭＳ ゴシック" pitchFamily="49" charset="-128"/>
                 <a:cs typeface="Courier New" panose="02070309020205020404" pitchFamily="49" charset="0"/>
               </a:rPr>
-              <a:t>            </a:t>
+              <a:t>        </a:t>
             </a:r>
             <a:r>
               <a:rPr kumimoji="1" lang="en-US" altLang="ja-JP" sz="1200" dirty="0" smtClean="0">
@@ -15187,7 +15786,7 @@
                 <a:ea typeface="ＭＳ ゴシック" pitchFamily="49" charset="-128"/>
                 <a:cs typeface="Courier New" panose="02070309020205020404" pitchFamily="49" charset="0"/>
               </a:rPr>
-              <a:t>           </a:t>
+              <a:t>       </a:t>
             </a:r>
             <a:r>
               <a:rPr kumimoji="1" lang="en-US" altLang="ja-JP" sz="1200" dirty="0" smtClean="0">
@@ -15237,7 +15836,23 @@
                 <a:ea typeface="ＭＳ ゴシック" pitchFamily="49" charset="-128"/>
                 <a:cs typeface="Courier New" panose="02070309020205020404" pitchFamily="49" charset="0"/>
               </a:rPr>
-              <a:t>               new </a:t>
+              <a:t>       </a:t>
+            </a:r>
+            <a:r>
+              <a:rPr lang="en-US" altLang="ja-JP" sz="1200" dirty="0" smtClean="0">
+                <a:latin typeface="Courier New" panose="02070309020205020404" pitchFamily="49" charset="0"/>
+                <a:ea typeface="ＭＳ ゴシック" pitchFamily="49" charset="-128"/>
+                <a:cs typeface="Courier New" panose="02070309020205020404" pitchFamily="49" charset="0"/>
+              </a:rPr>
+              <a:t>    </a:t>
+            </a:r>
+            <a:r>
+              <a:rPr lang="en-US" altLang="ja-JP" sz="1200" dirty="0" smtClean="0">
+                <a:latin typeface="Courier New" panose="02070309020205020404" pitchFamily="49" charset="0"/>
+                <a:ea typeface="ＭＳ ゴシック" pitchFamily="49" charset="-128"/>
+                <a:cs typeface="Courier New" panose="02070309020205020404" pitchFamily="49" charset="0"/>
+              </a:rPr>
+              <a:t>new </a:t>
             </a:r>
             <a:r>
               <a:rPr lang="en-US" altLang="ja-JP" sz="1200" dirty="0" err="1" smtClean="0">
@@ -15279,7 +15894,15 @@
                 <a:ea typeface="ＭＳ ゴシック" pitchFamily="49" charset="-128"/>
                 <a:cs typeface="Courier New" panose="02070309020205020404" pitchFamily="49" charset="0"/>
               </a:rPr>
-              <a:t>                    </a:t>
+              <a:t>        </a:t>
+            </a:r>
+            <a:r>
+              <a:rPr lang="en-US" altLang="ja-JP" sz="1200" dirty="0" smtClean="0">
+                <a:latin typeface="Courier New" panose="02070309020205020404" pitchFamily="49" charset="0"/>
+                <a:ea typeface="ＭＳ ゴシック" pitchFamily="49" charset="-128"/>
+                <a:cs typeface="Courier New" panose="02070309020205020404" pitchFamily="49" charset="0"/>
+              </a:rPr>
+              <a:t>        </a:t>
             </a:r>
             <a:r>
               <a:rPr lang="en-US" altLang="ja-JP" sz="1200" dirty="0" err="1" smtClean="0">
@@ -15305,7 +15928,23 @@
                 <a:ea typeface="ＭＳ ゴシック" pitchFamily="49" charset="-128"/>
                 <a:cs typeface="Courier New" panose="02070309020205020404" pitchFamily="49" charset="0"/>
               </a:rPr>
-              <a:t>                    null, </a:t>
+              <a:t>        </a:t>
+            </a:r>
+            <a:r>
+              <a:rPr lang="en-US" altLang="ja-JP" sz="1200" dirty="0" smtClean="0">
+                <a:latin typeface="Courier New" panose="02070309020205020404" pitchFamily="49" charset="0"/>
+                <a:ea typeface="ＭＳ ゴシック" pitchFamily="49" charset="-128"/>
+                <a:cs typeface="Courier New" panose="02070309020205020404" pitchFamily="49" charset="0"/>
+              </a:rPr>
+              <a:t>        </a:t>
+            </a:r>
+            <a:r>
+              <a:rPr lang="en-US" altLang="ja-JP" sz="1200" dirty="0" smtClean="0">
+                <a:latin typeface="Courier New" panose="02070309020205020404" pitchFamily="49" charset="0"/>
+                <a:ea typeface="ＭＳ ゴシック" pitchFamily="49" charset="-128"/>
+                <a:cs typeface="Courier New" panose="02070309020205020404" pitchFamily="49" charset="0"/>
+              </a:rPr>
+              <a:t>null, </a:t>
             </a:r>
             <a:r>
               <a:rPr lang="en-US" altLang="ja-JP" sz="1200" dirty="0" smtClean="0">
@@ -15344,7 +15983,7 @@
                 <a:ea typeface="ＭＳ ゴシック" pitchFamily="49" charset="-128"/>
                 <a:cs typeface="Courier New" panose="02070309020205020404" pitchFamily="49" charset="0"/>
               </a:rPr>
-              <a:t>            </a:t>
+              <a:t>        </a:t>
             </a:r>
             <a:r>
               <a:rPr lang="en-US" altLang="ja-JP" sz="1200" dirty="0" smtClean="0">
@@ -15352,17 +15991,33 @@
                 <a:ea typeface="ＭＳ ゴシック" pitchFamily="49" charset="-128"/>
                 <a:cs typeface="Courier New" panose="02070309020205020404" pitchFamily="49" charset="0"/>
               </a:rPr>
-              <a:t>try {</a:t>
-            </a:r>
-          </a:p>
-          <a:p>
+              <a:t>try </a:t>
+            </a:r>
             <a:r>
               <a:rPr lang="en-US" altLang="ja-JP" sz="1200" dirty="0" smtClean="0">
                 <a:latin typeface="Courier New" panose="02070309020205020404" pitchFamily="49" charset="0"/>
                 <a:ea typeface="ＭＳ ゴシック" pitchFamily="49" charset="-128"/>
                 <a:cs typeface="Courier New" panose="02070309020205020404" pitchFamily="49" charset="0"/>
               </a:rPr>
-              <a:t>                </a:t>
+              <a:t>{</a:t>
+            </a:r>
+          </a:p>
+          <a:p>
+            <a:r>
+              <a:rPr lang="en-US" altLang="ja-JP" sz="1200" dirty="0" smtClean="0">
+                <a:latin typeface="Courier New" panose="02070309020205020404" pitchFamily="49" charset="0"/>
+                <a:ea typeface="ＭＳ ゴシック" pitchFamily="49" charset="-128"/>
+                <a:cs typeface="Courier New" panose="02070309020205020404" pitchFamily="49" charset="0"/>
+              </a:rPr>
+              <a:t>        </a:t>
+            </a:r>
+            <a:r>
+              <a:rPr lang="en-US" altLang="ja-JP" sz="1200" dirty="0" smtClean="0">
+                <a:latin typeface="Courier New" panose="02070309020205020404" pitchFamily="49" charset="0"/>
+                <a:ea typeface="ＭＳ ゴシック" pitchFamily="49" charset="-128"/>
+                <a:cs typeface="Courier New" panose="02070309020205020404" pitchFamily="49" charset="0"/>
+              </a:rPr>
+              <a:t>    </a:t>
             </a:r>
             <a:r>
               <a:rPr lang="en-US" altLang="ja-JP" sz="1200" dirty="0" err="1" smtClean="0">
@@ -15388,7 +16043,23 @@
                 <a:ea typeface="ＭＳ ゴシック" pitchFamily="49" charset="-128"/>
                 <a:cs typeface="Courier New" panose="02070309020205020404" pitchFamily="49" charset="0"/>
               </a:rPr>
-              <a:t>                while (</a:t>
+              <a:t>        </a:t>
+            </a:r>
+            <a:r>
+              <a:rPr lang="en-US" altLang="ja-JP" sz="1200" dirty="0" smtClean="0">
+                <a:latin typeface="Courier New" panose="02070309020205020404" pitchFamily="49" charset="0"/>
+                <a:ea typeface="ＭＳ ゴシック" pitchFamily="49" charset="-128"/>
+                <a:cs typeface="Courier New" panose="02070309020205020404" pitchFamily="49" charset="0"/>
+              </a:rPr>
+              <a:t>    </a:t>
+            </a:r>
+            <a:r>
+              <a:rPr lang="en-US" altLang="ja-JP" sz="1200" dirty="0" smtClean="0">
+                <a:latin typeface="Courier New" panose="02070309020205020404" pitchFamily="49" charset="0"/>
+                <a:ea typeface="ＭＳ ゴシック" pitchFamily="49" charset="-128"/>
+                <a:cs typeface="Courier New" panose="02070309020205020404" pitchFamily="49" charset="0"/>
+              </a:rPr>
+              <a:t>while (</a:t>
             </a:r>
             <a:r>
               <a:rPr lang="en-US" altLang="ja-JP" sz="1200" dirty="0" err="1" smtClean="0">
@@ -15414,7 +16085,23 @@
                 <a:ea typeface="ＭＳ ゴシック" pitchFamily="49" charset="-128"/>
                 <a:cs typeface="Courier New" panose="02070309020205020404" pitchFamily="49" charset="0"/>
               </a:rPr>
-              <a:t>                // </a:t>
+              <a:t>        </a:t>
+            </a:r>
+            <a:r>
+              <a:rPr lang="en-US" altLang="ja-JP" sz="1200" dirty="0" smtClean="0">
+                <a:latin typeface="Courier New" panose="02070309020205020404" pitchFamily="49" charset="0"/>
+                <a:ea typeface="ＭＳ ゴシック" pitchFamily="49" charset="-128"/>
+                <a:cs typeface="Courier New" panose="02070309020205020404" pitchFamily="49" charset="0"/>
+              </a:rPr>
+              <a:t>    </a:t>
+            </a:r>
+            <a:r>
+              <a:rPr lang="en-US" altLang="ja-JP" sz="1200" dirty="0" smtClean="0">
+                <a:latin typeface="Courier New" panose="02070309020205020404" pitchFamily="49" charset="0"/>
+                <a:ea typeface="ＭＳ ゴシック" pitchFamily="49" charset="-128"/>
+                <a:cs typeface="Courier New" panose="02070309020205020404" pitchFamily="49" charset="0"/>
+              </a:rPr>
+              <a:t>// </a:t>
             </a:r>
             <a:r>
               <a:rPr lang="ja-JP" altLang="en-US" sz="1200" dirty="0" smtClean="0">
@@ -15436,7 +16123,15 @@
                 <a:ea typeface="ＭＳ ゴシック" pitchFamily="49" charset="-128"/>
                 <a:cs typeface="Courier New" panose="02070309020205020404" pitchFamily="49" charset="0"/>
               </a:rPr>
-              <a:t>                </a:t>
+              <a:t>        </a:t>
+            </a:r>
+            <a:r>
+              <a:rPr lang="ja-JP" altLang="en-US" sz="1200" dirty="0" smtClean="0">
+                <a:latin typeface="Courier New" panose="02070309020205020404" pitchFamily="49" charset="0"/>
+                <a:ea typeface="ＭＳ ゴシック" pitchFamily="49" charset="-128"/>
+                <a:cs typeface="Courier New" panose="02070309020205020404" pitchFamily="49" charset="0"/>
+              </a:rPr>
+              <a:t>    </a:t>
             </a:r>
             <a:r>
               <a:rPr lang="en-US" altLang="ja-JP" sz="1200" dirty="0" smtClean="0">
@@ -15483,7 +16178,21 @@
                 <a:latin typeface="Courier New" pitchFamily="49" charset="0"/>
                 <a:cs typeface="Courier New" pitchFamily="49" charset="0"/>
               </a:rPr>
-              <a:t>                ・・・省略</a:t>
+              <a:t>        </a:t>
+            </a:r>
+            <a:r>
+              <a:rPr lang="ja-JP" altLang="en-US" sz="1200" dirty="0" smtClean="0">
+                <a:latin typeface="Courier New" pitchFamily="49" charset="0"/>
+                <a:cs typeface="Courier New" pitchFamily="49" charset="0"/>
+              </a:rPr>
+              <a:t>    </a:t>
+            </a:r>
+            <a:r>
+              <a:rPr lang="ja-JP" altLang="en-US" sz="1200" dirty="0" smtClean="0">
+                <a:latin typeface="Courier New" pitchFamily="49" charset="0"/>
+                <a:cs typeface="Courier New" pitchFamily="49" charset="0"/>
+              </a:rPr>
+              <a:t>・・・省略</a:t>
             </a:r>
             <a:endParaRPr lang="en-US" altLang="ja-JP" sz="1200" dirty="0" smtClean="0">
               <a:latin typeface="Courier New" panose="02070309020205020404" pitchFamily="49" charset="0"/>
@@ -15498,7 +16207,15 @@
                 <a:ea typeface="ＭＳ Ｐゴシック" charset="-128"/>
                 <a:cs typeface="Courier New" panose="02070309020205020404" pitchFamily="49" charset="0"/>
               </a:rPr>
-              <a:t>            }</a:t>
+              <a:t>        </a:t>
+            </a:r>
+            <a:r>
+              <a:rPr lang="en-US" altLang="ja-JP" sz="1200" dirty="0" smtClean="0">
+                <a:latin typeface="Courier New" panose="02070309020205020404" pitchFamily="49" charset="0"/>
+                <a:ea typeface="ＭＳ Ｐゴシック" charset="-128"/>
+                <a:cs typeface="Courier New" panose="02070309020205020404" pitchFamily="49" charset="0"/>
+              </a:rPr>
+              <a:t>}</a:t>
             </a:r>
             <a:endParaRPr kumimoji="1" lang="en-US" altLang="ja-JP" sz="1200" b="0" dirty="0" smtClean="0">
               <a:latin typeface="Courier New" panose="02070309020205020404" pitchFamily="49" charset="0"/>
@@ -23011,7 +23728,7 @@
           <a:graphicData uri="http://schemas.openxmlformats.org/presentationml/2006/ole">
             <mc:AlternateContent xmlns:mc="http://schemas.openxmlformats.org/markup-compatibility/2006">
               <mc:Choice xmlns:v="urn:schemas-microsoft-com:vml" Requires="v">
-                <p:oleObj spid="_x0000_s5150" name="Visio" r:id="rId3" imgW="1028666" imgH="1219320" progId="Visio.Drawing.11">
+                <p:oleObj spid="_x0000_s5172" name="Visio" r:id="rId3" imgW="1028666" imgH="1219320" progId="Visio.Drawing.11">
                   <p:embed/>
                 </p:oleObj>
               </mc:Choice>
@@ -31718,7 +32435,7 @@
             <a:graphicData uri="http://schemas.openxmlformats.org/presentationml/2006/ole">
               <mc:AlternateContent xmlns:mc="http://schemas.openxmlformats.org/markup-compatibility/2006">
                 <mc:Choice xmlns:v="urn:schemas-microsoft-com:vml" Requires="v">
-                  <p:oleObj spid="_x0000_s3154" name="Visio" r:id="rId3" imgW="1046765" imgH="1232170" progId="">
+                  <p:oleObj spid="_x0000_s3176" name="Visio" r:id="rId3" imgW="1046765" imgH="1232170" progId="">
                     <p:embed/>
                   </p:oleObj>
                 </mc:Choice>
@@ -31938,14 +32655,7 @@
                 <a:latin typeface="ＭＳ Ｐゴシック" pitchFamily="50" charset="-128"/>
                 <a:ea typeface="ＭＳ Ｐゴシック" pitchFamily="50" charset="-128"/>
               </a:rPr>
-              <a:t>⑦</a:t>
-            </a:r>
-            <a:r>
-              <a:rPr lang="ja-JP" altLang="en-US" sz="1000" dirty="0" smtClean="0">
-                <a:latin typeface="ＭＳ Ｐゴシック" pitchFamily="50" charset="-128"/>
-                <a:ea typeface="ＭＳ Ｐゴシック" pitchFamily="50" charset="-128"/>
-              </a:rPr>
-              <a:t>処理完了を確認したら次の処理を実施</a:t>
+              <a:t>⑦処理完了を確認したら次の処理を実施</a:t>
             </a:r>
             <a:endParaRPr lang="ja-JP" altLang="en-US" sz="1000" dirty="0">
               <a:latin typeface="ＭＳ Ｐゴシック" pitchFamily="50" charset="-128"/>
@@ -34004,35 +34714,7 @@
                 <a:latin typeface="Arial" charset="0"/>
                 <a:ea typeface="ＭＳ Ｐゴシック" charset="-128"/>
               </a:rPr>
-              <a:t>①非同期バッチデーモン</a:t>
-            </a:r>
-            <a:r>
-              <a:rPr lang="ja-JP" altLang="en-US" sz="1000" dirty="0" smtClean="0">
-                <a:latin typeface="Arial" charset="0"/>
-                <a:ea typeface="ＭＳ Ｐゴシック" charset="-128"/>
-              </a:rPr>
-              <a:t>はシステム</a:t>
-            </a:r>
-            <a:r>
-              <a:rPr lang="ja-JP" altLang="en-US" sz="1000" dirty="0" smtClean="0">
-                <a:latin typeface="Arial" charset="0"/>
-                <a:ea typeface="ＭＳ Ｐゴシック" charset="-128"/>
-              </a:rPr>
-              <a:t>起動時</a:t>
-            </a:r>
-            <a:r>
-              <a:rPr lang="ja-JP" altLang="en-US" sz="1000" dirty="0" smtClean="0">
-                <a:latin typeface="Arial" charset="0"/>
-                <a:ea typeface="ＭＳ Ｐゴシック" charset="-128"/>
-              </a:rPr>
-              <a:t>にプロセス</a:t>
-            </a:r>
-            <a:r>
-              <a:rPr lang="ja-JP" altLang="en-US" sz="1000" dirty="0" smtClean="0">
-                <a:latin typeface="Arial" charset="0"/>
-                <a:ea typeface="ＭＳ Ｐゴシック" charset="-128"/>
-              </a:rPr>
-              <a:t>を立ち上げておく</a:t>
+              <a:t>①非同期バッチデーモンはシステム起動時にプロセスを立ち上げておく</a:t>
             </a:r>
             <a:endParaRPr kumimoji="1" lang="ja-JP" altLang="en-US" sz="1000" dirty="0">
               <a:latin typeface="Arial" charset="0"/>
@@ -34836,10 +35518,6 @@
               </a:rPr>
               <a:t>し、実行する</a:t>
             </a:r>
-            <a:endParaRPr kumimoji="1" lang="ja-JP" altLang="en-US" sz="1000" dirty="0">
-              <a:latin typeface="Arial" charset="0"/>
-              <a:ea typeface="ＭＳ Ｐゴシック" charset="-128"/>
-            </a:endParaRPr>
           </a:p>
         </p:txBody>
       </p:sp>
@@ -36235,20 +36913,20 @@
           </a:p>
           <a:p>
             <a:r>
-              <a:rPr lang="ja-JP" altLang="en-US" sz="1100" dirty="0" smtClean="0">
-                <a:latin typeface="Courier New" panose="02070309020205020404" pitchFamily="49" charset="0"/>
-                <a:ea typeface="ＭＳ Ｐゴシック" charset="-128"/>
-                <a:cs typeface="Courier New" panose="02070309020205020404" pitchFamily="49" charset="0"/>
-              </a:rPr>
-              <a:t>　　　　</a:t>
-            </a:r>
-            <a:r>
               <a:rPr lang="en-US" altLang="ja-JP" sz="1100" dirty="0" smtClean="0">
                 <a:latin typeface="Courier New" panose="02070309020205020404" pitchFamily="49" charset="0"/>
                 <a:ea typeface="ＭＳ Ｐゴシック" charset="-128"/>
                 <a:cs typeface="Courier New" panose="02070309020205020404" pitchFamily="49" charset="0"/>
               </a:rPr>
-              <a:t>try {</a:t>
+              <a:t>        try </a:t>
+            </a:r>
+            <a:r>
+              <a:rPr lang="en-US" altLang="ja-JP" sz="1100" dirty="0" smtClean="0">
+                <a:latin typeface="Courier New" panose="02070309020205020404" pitchFamily="49" charset="0"/>
+                <a:ea typeface="ＭＳ Ｐゴシック" charset="-128"/>
+                <a:cs typeface="Courier New" panose="02070309020205020404" pitchFamily="49" charset="0"/>
+              </a:rPr>
+              <a:t>{</a:t>
             </a:r>
           </a:p>
           <a:p>
@@ -36486,7 +37164,21 @@
                 <a:latin typeface="Courier New" pitchFamily="49" charset="0"/>
                 <a:cs typeface="Courier New" pitchFamily="49" charset="0"/>
               </a:rPr>
-              <a:t>    ・・・省略</a:t>
+              <a:t>    </a:t>
+            </a:r>
+            <a:r>
+              <a:rPr lang="ja-JP" altLang="en-US" sz="1100" dirty="0" smtClean="0">
+                <a:latin typeface="Courier New" pitchFamily="49" charset="0"/>
+                <a:cs typeface="Courier New" pitchFamily="49" charset="0"/>
+              </a:rPr>
+              <a:t>    ・</a:t>
+            </a:r>
+            <a:r>
+              <a:rPr lang="ja-JP" altLang="en-US" sz="1100" dirty="0" smtClean="0">
+                <a:latin typeface="Courier New" pitchFamily="49" charset="0"/>
+                <a:cs typeface="Courier New" pitchFamily="49" charset="0"/>
+              </a:rPr>
+              <a:t>・・省略</a:t>
             </a:r>
             <a:r>
               <a:rPr lang="en-US" altLang="ja-JP" sz="1100" dirty="0" smtClean="0">
@@ -36533,6 +37225,14 @@
               <a:t>                   </a:t>
             </a:r>
             <a:r>
+              <a:rPr lang="en-US" altLang="ja-JP" sz="1100" dirty="0" smtClean="0">
+                <a:latin typeface="Courier New" panose="02070309020205020404" pitchFamily="49" charset="0"/>
+                <a:ea typeface="ＭＳ Ｐゴシック" charset="-128"/>
+                <a:cs typeface="Courier New" panose="02070309020205020404" pitchFamily="49" charset="0"/>
+              </a:rPr>
+              <a:t> </a:t>
+            </a:r>
+            <a:r>
               <a:rPr lang="en-US" altLang="ja-JP" sz="1100" dirty="0" err="1" smtClean="0">
                 <a:latin typeface="Courier New" panose="02070309020205020404" pitchFamily="49" charset="0"/>
                 <a:ea typeface="ＭＳ Ｐゴシック" charset="-128"/>
@@ -36546,7 +37246,41 @@
                 <a:ea typeface="ＭＳ Ｐゴシック" charset="-128"/>
                 <a:cs typeface="Courier New" panose="02070309020205020404" pitchFamily="49" charset="0"/>
               </a:rPr>
-              <a:t>(</a:t>
+              <a:t>(transactionManager</a:t>
+            </a:r>
+            <a:r>
+              <a:rPr lang="en-US" altLang="ja-JP" sz="1100" dirty="0" smtClean="0">
+                <a:latin typeface="Courier New" panose="02070309020205020404" pitchFamily="49" charset="0"/>
+                <a:ea typeface="ＭＳ Ｐゴシック" charset="-128"/>
+                <a:cs typeface="Courier New" panose="02070309020205020404" pitchFamily="49" charset="0"/>
+              </a:rPr>
+              <a:t>, stat);</a:t>
+            </a:r>
+          </a:p>
+          <a:p>
+            <a:r>
+              <a:rPr lang="en-US" altLang="ja-JP" sz="1100" dirty="0" smtClean="0">
+                <a:latin typeface="Courier New" panose="02070309020205020404" pitchFamily="49" charset="0"/>
+                <a:ea typeface="ＭＳ Ｐゴシック" charset="-128"/>
+                <a:cs typeface="Courier New" panose="02070309020205020404" pitchFamily="49" charset="0"/>
+              </a:rPr>
+              <a:t>                   </a:t>
+            </a:r>
+            <a:r>
+              <a:rPr lang="en-US" altLang="ja-JP" sz="1100" dirty="0" smtClean="0">
+                <a:latin typeface="Courier New" panose="02070309020205020404" pitchFamily="49" charset="0"/>
+                <a:ea typeface="ＭＳ Ｐゴシック" charset="-128"/>
+                <a:cs typeface="Courier New" panose="02070309020205020404" pitchFamily="49" charset="0"/>
+              </a:rPr>
+              <a:t> stat </a:t>
+            </a:r>
+            <a:r>
+              <a:rPr lang="en-US" altLang="ja-JP" sz="1100" dirty="0" smtClean="0">
+                <a:latin typeface="Courier New" panose="02070309020205020404" pitchFamily="49" charset="0"/>
+                <a:ea typeface="ＭＳ Ｐゴシック" charset="-128"/>
+                <a:cs typeface="Courier New" panose="02070309020205020404" pitchFamily="49" charset="0"/>
+              </a:rPr>
+              <a:t>= </a:t>
             </a:r>
             <a:r>
               <a:rPr lang="en-US" altLang="ja-JP" sz="1100" dirty="0" err="1" smtClean="0">
@@ -36554,7 +37288,7 @@
                 <a:ea typeface="ＭＳ Ｐゴシック" charset="-128"/>
                 <a:cs typeface="Courier New" panose="02070309020205020404" pitchFamily="49" charset="0"/>
               </a:rPr>
-              <a:t>transactionManager</a:t>
+              <a:t>BatchUtil.startTransaction</a:t>
             </a:r>
             <a:r>
               <a:rPr lang="en-US" altLang="ja-JP" sz="1100" dirty="0" smtClean="0">
@@ -36562,49 +37296,7 @@
                 <a:ea typeface="ＭＳ Ｐゴシック" charset="-128"/>
                 <a:cs typeface="Courier New" panose="02070309020205020404" pitchFamily="49" charset="0"/>
               </a:rPr>
-              <a:t>, stat);</a:t>
-            </a:r>
-          </a:p>
-          <a:p>
-            <a:r>
-              <a:rPr lang="en-US" altLang="ja-JP" sz="1100" dirty="0" smtClean="0">
-                <a:latin typeface="Courier New" panose="02070309020205020404" pitchFamily="49" charset="0"/>
-                <a:ea typeface="ＭＳ Ｐゴシック" charset="-128"/>
-                <a:cs typeface="Courier New" panose="02070309020205020404" pitchFamily="49" charset="0"/>
-              </a:rPr>
-              <a:t>                   stat = </a:t>
-            </a:r>
-            <a:r>
-              <a:rPr lang="en-US" altLang="ja-JP" sz="1100" dirty="0" err="1" smtClean="0">
-                <a:latin typeface="Courier New" panose="02070309020205020404" pitchFamily="49" charset="0"/>
-                <a:ea typeface="ＭＳ Ｐゴシック" charset="-128"/>
-                <a:cs typeface="Courier New" panose="02070309020205020404" pitchFamily="49" charset="0"/>
-              </a:rPr>
-              <a:t>BatchUtil.startTransaction</a:t>
-            </a:r>
-            <a:r>
-              <a:rPr lang="en-US" altLang="ja-JP" sz="1100" dirty="0" smtClean="0">
-                <a:latin typeface="Courier New" panose="02070309020205020404" pitchFamily="49" charset="0"/>
-                <a:ea typeface="ＭＳ Ｐゴシック" charset="-128"/>
-                <a:cs typeface="Courier New" panose="02070309020205020404" pitchFamily="49" charset="0"/>
-              </a:rPr>
-              <a:t>(</a:t>
-            </a:r>
-            <a:r>
-              <a:rPr lang="en-US" altLang="ja-JP" sz="1100" dirty="0" err="1" smtClean="0">
-                <a:latin typeface="Courier New" panose="02070309020205020404" pitchFamily="49" charset="0"/>
-                <a:ea typeface="ＭＳ Ｐゴシック" charset="-128"/>
-                <a:cs typeface="Courier New" panose="02070309020205020404" pitchFamily="49" charset="0"/>
-              </a:rPr>
-              <a:t>transactionManager</a:t>
-            </a:r>
-            <a:r>
-              <a:rPr lang="en-US" altLang="ja-JP" sz="1100" dirty="0" smtClean="0">
-                <a:latin typeface="Courier New" panose="02070309020205020404" pitchFamily="49" charset="0"/>
-                <a:ea typeface="ＭＳ Ｐゴシック" charset="-128"/>
-                <a:cs typeface="Courier New" panose="02070309020205020404" pitchFamily="49" charset="0"/>
-              </a:rPr>
-              <a:t>);</a:t>
+              <a:t>(transactionManager);</a:t>
             </a:r>
           </a:p>
           <a:p>
@@ -36799,7 +37491,15 @@
                 <a:ea typeface="ＭＳ Ｐゴシック" charset="-128"/>
                 <a:cs typeface="Courier New" panose="02070309020205020404" pitchFamily="49" charset="0"/>
               </a:rPr>
-              <a:t>・・・</a:t>
+              <a:t>・・</a:t>
+            </a:r>
+            <a:r>
+              <a:rPr lang="ja-JP" altLang="en-US" sz="1100" dirty="0" smtClean="0">
+                <a:latin typeface="Courier New" panose="02070309020205020404" pitchFamily="49" charset="0"/>
+                <a:ea typeface="ＭＳ Ｐゴシック" charset="-128"/>
+                <a:cs typeface="Courier New" panose="02070309020205020404" pitchFamily="49" charset="0"/>
+              </a:rPr>
+              <a:t>・</a:t>
             </a:r>
             <a:endParaRPr lang="en-US" altLang="ja-JP" sz="1100" dirty="0" smtClean="0">
               <a:latin typeface="Courier New" panose="02070309020205020404" pitchFamily="49" charset="0"/>

</xml_diff>

<commit_message>
modified the update timing of job status #175
</commit_message>
<xml_diff>
--- a/architecture/TERASOLUNA Batch Framework for Java Version 3.x 説明資料.pptx
+++ b/architecture/TERASOLUNA Batch Framework for Java Version 3.x 説明資料.pptx
@@ -38,19 +38,19 @@
       <p:bold r:id="rId22"/>
     </p:embeddedFont>
     <p:embeddedFont>
-      <p:font typeface="HGP創英角ｺﾞｼｯｸUB" panose="020B0900000000000000" pitchFamily="50" charset="-128"/>
+      <p:font typeface="HGPｺﾞｼｯｸE" panose="020B0900000000000000" pitchFamily="50" charset="-128"/>
       <p:regular r:id="rId23"/>
     </p:embeddedFont>
     <p:embeddedFont>
-      <p:font typeface="Calibri" panose="020F0502020204030204" pitchFamily="34" charset="0"/>
+      <p:font typeface="HGP創英角ｺﾞｼｯｸUB" panose="020B0900000000000000" pitchFamily="50" charset="-128"/>
       <p:regular r:id="rId24"/>
-      <p:bold r:id="rId25"/>
-      <p:italic r:id="rId26"/>
-      <p:boldItalic r:id="rId27"/>
     </p:embeddedFont>
     <p:embeddedFont>
-      <p:font typeface="HGPｺﾞｼｯｸE" panose="020B0900000000000000" pitchFamily="50" charset="-128"/>
-      <p:regular r:id="rId28"/>
+      <p:font typeface="Calibri" panose="020F0502020204030204" pitchFamily="34" charset="0"/>
+      <p:regular r:id="rId25"/>
+      <p:bold r:id="rId26"/>
+      <p:italic r:id="rId27"/>
+      <p:boldItalic r:id="rId28"/>
     </p:embeddedFont>
   </p:embeddedFontLst>
   <p:defaultTextStyle>
@@ -150,7 +150,7 @@
   </p:defaultTextStyle>
   <p:extLst>
     <p:ext uri="{EFAFB233-063F-42B5-8137-9DF3F51BA10A}">
-      <p15:sldGuideLst xmlns="" xmlns:p15="http://schemas.microsoft.com/office/powerpoint/2012/main">
+      <p15:sldGuideLst xmlns:p15="http://schemas.microsoft.com/office/powerpoint/2012/main">
         <p15:guide id="1" orient="horz" pos="2375">
           <p15:clr>
             <a:srgbClr val="A4A3A4"/>
@@ -169,7 +169,7 @@
       </p15:sldGuideLst>
     </p:ext>
     <p:ext uri="{2D200454-40CA-4A62-9FC3-DE9A4176ACB9}">
-      <p15:notesGuideLst xmlns="" xmlns:p15="http://schemas.microsoft.com/office/powerpoint/2012/main">
+      <p15:notesGuideLst xmlns:p15="http://schemas.microsoft.com/office/powerpoint/2012/main">
         <p15:guide id="1" orient="horz" pos="3128">
           <p15:clr>
             <a:srgbClr val="A4A3A4"/>
@@ -269,7 +269,7 @@
             <a:fld id="{BB253DA6-D017-4D4C-A6F0-8D6175E3AD1A}" type="datetime1">
               <a:rPr lang="ja-JP" altLang="en-US" smtClean="0"/>
               <a:pPr/>
-              <a:t>2016/1/5</a:t>
+              <a:t>2016/2/23</a:t>
             </a:fld>
             <a:endParaRPr lang="en-US"/>
           </a:p>
@@ -437,7 +437,7 @@
             <a:fld id="{971E307F-04E7-4216-B3F9-BBF58478B729}" type="datetime1">
               <a:rPr lang="ja-JP" altLang="en-US" smtClean="0"/>
               <a:pPr/>
-              <a:t>2016/1/5</a:t>
+              <a:t>2016/2/23</a:t>
             </a:fld>
             <a:endParaRPr lang="en-US"/>
           </a:p>
@@ -795,7 +795,7 @@
             <a:fld id="{BB7B7D7C-7587-458D-9F40-96275B4E0BF8}" type="datetime1">
               <a:rPr lang="ja-JP" altLang="en-US" smtClean="0"/>
               <a:pPr/>
-              <a:t>2016/1/5</a:t>
+              <a:t>2016/2/23</a:t>
             </a:fld>
             <a:endParaRPr lang="en-US"/>
           </a:p>
@@ -1018,7 +1018,7 @@
             <a:fld id="{79DDA3DF-8EBA-4683-A96B-9C379AE68A32}" type="datetime1">
               <a:rPr lang="ja-JP" altLang="en-US" smtClean="0"/>
               <a:pPr/>
-              <a:t>2016/1/5</a:t>
+              <a:t>2016/2/23</a:t>
             </a:fld>
             <a:endParaRPr lang="en-US"/>
           </a:p>
@@ -8172,18 +8172,70 @@
                 <a:latin typeface="Courier New" panose="02070309020205020404" pitchFamily="49" charset="0"/>
                 <a:cs typeface="Courier New" panose="02070309020205020404" pitchFamily="49" charset="0"/>
               </a:rPr>
-              <a:t>     </a:t>
+              <a:t>     &lt;property name=“</a:t>
+            </a:r>
+            <a:r>
+              <a:rPr kumimoji="1" lang="en-US" altLang="ja-JP" sz="1100" dirty="0" err="1" smtClean="0">
+                <a:latin typeface="Courier New" panose="02070309020205020404" pitchFamily="49" charset="0"/>
+                <a:cs typeface="Courier New" panose="02070309020205020404" pitchFamily="49" charset="0"/>
+              </a:rPr>
+              <a:t>mapperInterface</a:t>
             </a:r>
             <a:r>
               <a:rPr kumimoji="1" lang="en-US" altLang="ja-JP" sz="1100" dirty="0" smtClean="0">
                 <a:latin typeface="Courier New" panose="02070309020205020404" pitchFamily="49" charset="0"/>
                 <a:cs typeface="Courier New" panose="02070309020205020404" pitchFamily="49" charset="0"/>
               </a:rPr>
-              <a:t>&lt;</a:t>
+              <a:t>” value=“</a:t>
+            </a:r>
+            <a:r>
+              <a:rPr kumimoji="1" lang="en-US" altLang="ja-JP" sz="1100" dirty="0" smtClean="0">
+                <a:solidFill>
+                  <a:srgbClr val="FF0000"/>
+                </a:solidFill>
+                <a:latin typeface="Courier New" panose="02070309020205020404" pitchFamily="49" charset="0"/>
+                <a:ea typeface="ＭＳ Ｐゴシック" charset="-128"/>
+                <a:cs typeface="Courier New" panose="02070309020205020404" pitchFamily="49" charset="0"/>
+              </a:rPr>
+              <a:t>jp.terasoluna.batch.sample.b000001.SampleDao</a:t>
             </a:r>
             <a:r>
               <a:rPr kumimoji="1" lang="en-US" altLang="ja-JP" sz="1100" dirty="0" smtClean="0">
                 <a:latin typeface="Courier New" panose="02070309020205020404" pitchFamily="49" charset="0"/>
+                <a:ea typeface="ＭＳ Ｐゴシック" charset="-128"/>
+                <a:cs typeface="Courier New" panose="02070309020205020404" pitchFamily="49" charset="0"/>
+              </a:rPr>
+              <a:t>” /</a:t>
+            </a:r>
+            <a:r>
+              <a:rPr kumimoji="1" lang="en-US" altLang="ja-JP" sz="1100" dirty="0" smtClean="0">
+                <a:latin typeface="Courier New" panose="02070309020205020404" pitchFamily="49" charset="0"/>
+                <a:cs typeface="Courier New" panose="02070309020205020404" pitchFamily="49" charset="0"/>
+              </a:rPr>
+              <a:t>&gt;</a:t>
+            </a:r>
+          </a:p>
+          <a:p>
+            <a:r>
+              <a:rPr kumimoji="1" lang="en-US" altLang="ja-JP" sz="1100">
+                <a:latin typeface="Courier New" panose="02070309020205020404" pitchFamily="49" charset="0"/>
+                <a:ea typeface="ＭＳ Ｐゴシック" charset="-128"/>
+                <a:cs typeface="Courier New" panose="02070309020205020404" pitchFamily="49" charset="0"/>
+              </a:rPr>
+              <a:t> </a:t>
+            </a:r>
+            <a:r>
+              <a:rPr kumimoji="1" lang="en-US" altLang="ja-JP" sz="1100" smtClean="0">
+                <a:latin typeface="Courier New" panose="02070309020205020404" pitchFamily="49" charset="0"/>
+                <a:ea typeface="ＭＳ Ｐゴシック" charset="-128"/>
+                <a:cs typeface="Courier New" panose="02070309020205020404" pitchFamily="49" charset="0"/>
+              </a:rPr>
+              <a:t>     &lt;</a:t>
+            </a:r>
+            <a:r>
+              <a:rPr kumimoji="1" lang="en-US" altLang="ja-JP" sz="1100" dirty="0" smtClean="0">
+                <a:latin typeface="Courier New" panose="02070309020205020404" pitchFamily="49" charset="0"/>
+                <a:ea typeface="ＭＳ Ｐゴシック" charset="-128"/>
                 <a:cs typeface="Courier New" panose="02070309020205020404" pitchFamily="49" charset="0"/>
               </a:rPr>
               <a:t>property name=“</a:t>
@@ -8191,27 +8243,34 @@
             <a:r>
               <a:rPr kumimoji="1" lang="en-US" altLang="ja-JP" sz="1100" dirty="0" err="1" smtClean="0">
                 <a:latin typeface="Courier New" panose="02070309020205020404" pitchFamily="49" charset="0"/>
-                <a:cs typeface="Courier New" panose="02070309020205020404" pitchFamily="49" charset="0"/>
-              </a:rPr>
-              <a:t>mapperInterface</a:t>
+                <a:ea typeface="ＭＳ Ｐゴシック" charset="-128"/>
+                <a:cs typeface="Courier New" panose="02070309020205020404" pitchFamily="49" charset="0"/>
+              </a:rPr>
+              <a:t>sqlSessionTemplate</a:t>
             </a:r>
             <a:r>
               <a:rPr kumimoji="1" lang="en-US" altLang="ja-JP" sz="1100" dirty="0" smtClean="0">
                 <a:latin typeface="Courier New" panose="02070309020205020404" pitchFamily="49" charset="0"/>
-                <a:cs typeface="Courier New" panose="02070309020205020404" pitchFamily="49" charset="0"/>
-              </a:rPr>
-              <a:t>” value=“</a:t>
-            </a:r>
-            <a:r>
-              <a:rPr kumimoji="1" lang="en-US" altLang="ja-JP" sz="1100" dirty="0" smtClean="0">
-                <a:solidFill>
-                  <a:srgbClr val="FF0000"/>
-                </a:solidFill>
+                <a:ea typeface="ＭＳ Ｐゴシック" charset="-128"/>
+                <a:cs typeface="Courier New" panose="02070309020205020404" pitchFamily="49" charset="0"/>
+              </a:rPr>
+              <a:t>” ref=“</a:t>
+            </a:r>
+            <a:r>
+              <a:rPr kumimoji="1" lang="en-US" altLang="ja-JP" sz="1100" dirty="0" err="1">
                 <a:latin typeface="Courier New" panose="02070309020205020404" pitchFamily="49" charset="0"/>
                 <a:ea typeface="ＭＳ Ｐゴシック" charset="-128"/>
                 <a:cs typeface="Courier New" panose="02070309020205020404" pitchFamily="49" charset="0"/>
               </a:rPr>
-              <a:t>jp.terasoluna.batch.sample.b000001.SampleDao</a:t>
+              <a:t>s</a:t>
+            </a:r>
+            <a:r>
+              <a:rPr kumimoji="1" lang="en-US" altLang="ja-JP" sz="1100" dirty="0" err="1" smtClean="0">
+                <a:latin typeface="Courier New" panose="02070309020205020404" pitchFamily="49" charset="0"/>
+                <a:ea typeface="ＭＳ Ｐゴシック" charset="-128"/>
+                <a:cs typeface="Courier New" panose="02070309020205020404" pitchFamily="49" charset="0"/>
+              </a:rPr>
+              <a:t>qlSessionTemplate</a:t>
             </a:r>
             <a:r>
               <a:rPr kumimoji="1" lang="en-US" altLang="ja-JP" sz="1100" dirty="0" smtClean="0">
@@ -8219,122 +8278,25 @@
                 <a:ea typeface="ＭＳ Ｐゴシック" charset="-128"/>
                 <a:cs typeface="Courier New" panose="02070309020205020404" pitchFamily="49" charset="0"/>
               </a:rPr>
-              <a:t>” /</a:t>
+              <a:t>” /&gt;</a:t>
+            </a:r>
+          </a:p>
+          <a:p>
+            <a:r>
+              <a:rPr kumimoji="1" lang="en-US" altLang="ja-JP" sz="1100" dirty="0">
+                <a:latin typeface="Courier New" panose="02070309020205020404" pitchFamily="49" charset="0"/>
+                <a:ea typeface="ＭＳ Ｐゴシック" charset="-128"/>
+                <a:cs typeface="Courier New" panose="02070309020205020404" pitchFamily="49" charset="0"/>
+              </a:rPr>
+              <a:t> </a:t>
             </a:r>
             <a:r>
               <a:rPr kumimoji="1" lang="en-US" altLang="ja-JP" sz="1100" dirty="0" smtClean="0">
                 <a:latin typeface="Courier New" panose="02070309020205020404" pitchFamily="49" charset="0"/>
-                <a:cs typeface="Courier New" panose="02070309020205020404" pitchFamily="49" charset="0"/>
-              </a:rPr>
-              <a:t>&gt;</a:t>
-            </a:r>
-          </a:p>
-          <a:p>
-            <a:r>
-              <a:rPr kumimoji="1" lang="en-US" altLang="ja-JP" sz="1100">
-                <a:latin typeface="Courier New" panose="02070309020205020404" pitchFamily="49" charset="0"/>
-                <a:ea typeface="ＭＳ Ｐゴシック" charset="-128"/>
-                <a:cs typeface="Courier New" panose="02070309020205020404" pitchFamily="49" charset="0"/>
-              </a:rPr>
-              <a:t> </a:t>
-            </a:r>
-            <a:r>
-              <a:rPr kumimoji="1" lang="en-US" altLang="ja-JP" sz="1100" smtClean="0">
-                <a:latin typeface="Courier New" panose="02070309020205020404" pitchFamily="49" charset="0"/>
-                <a:ea typeface="ＭＳ Ｐゴシック" charset="-128"/>
-                <a:cs typeface="Courier New" panose="02070309020205020404" pitchFamily="49" charset="0"/>
-              </a:rPr>
-              <a:t>     </a:t>
-            </a:r>
-            <a:r>
-              <a:rPr kumimoji="1" lang="en-US" altLang="ja-JP" sz="1100" smtClean="0">
-                <a:latin typeface="Courier New" panose="02070309020205020404" pitchFamily="49" charset="0"/>
-                <a:ea typeface="ＭＳ Ｐゴシック" charset="-128"/>
-                <a:cs typeface="Courier New" panose="02070309020205020404" pitchFamily="49" charset="0"/>
-              </a:rPr>
-              <a:t>&lt;</a:t>
-            </a:r>
-            <a:r>
-              <a:rPr kumimoji="1" lang="en-US" altLang="ja-JP" sz="1100" dirty="0" smtClean="0">
-                <a:latin typeface="Courier New" panose="02070309020205020404" pitchFamily="49" charset="0"/>
-                <a:ea typeface="ＭＳ Ｐゴシック" charset="-128"/>
-                <a:cs typeface="Courier New" panose="02070309020205020404" pitchFamily="49" charset="0"/>
-              </a:rPr>
-              <a:t>property name=“</a:t>
-            </a:r>
-            <a:r>
-              <a:rPr kumimoji="1" lang="en-US" altLang="ja-JP" sz="1100" dirty="0" err="1" smtClean="0">
-                <a:latin typeface="Courier New" panose="02070309020205020404" pitchFamily="49" charset="0"/>
-                <a:ea typeface="ＭＳ Ｐゴシック" charset="-128"/>
-                <a:cs typeface="Courier New" panose="02070309020205020404" pitchFamily="49" charset="0"/>
-              </a:rPr>
-              <a:t>sqlSessionTemplate</a:t>
-            </a:r>
-            <a:r>
-              <a:rPr kumimoji="1" lang="en-US" altLang="ja-JP" sz="1100" dirty="0" smtClean="0">
-                <a:latin typeface="Courier New" panose="02070309020205020404" pitchFamily="49" charset="0"/>
-                <a:ea typeface="ＭＳ Ｐゴシック" charset="-128"/>
-                <a:cs typeface="Courier New" panose="02070309020205020404" pitchFamily="49" charset="0"/>
-              </a:rPr>
-              <a:t>” ref=“</a:t>
-            </a:r>
-            <a:r>
-              <a:rPr kumimoji="1" lang="en-US" altLang="ja-JP" sz="1100" dirty="0" err="1">
-                <a:latin typeface="Courier New" panose="02070309020205020404" pitchFamily="49" charset="0"/>
-                <a:ea typeface="ＭＳ Ｐゴシック" charset="-128"/>
-                <a:cs typeface="Courier New" panose="02070309020205020404" pitchFamily="49" charset="0"/>
-              </a:rPr>
-              <a:t>s</a:t>
-            </a:r>
-            <a:r>
-              <a:rPr kumimoji="1" lang="en-US" altLang="ja-JP" sz="1100" dirty="0" err="1" smtClean="0">
-                <a:latin typeface="Courier New" panose="02070309020205020404" pitchFamily="49" charset="0"/>
-                <a:ea typeface="ＭＳ Ｐゴシック" charset="-128"/>
-                <a:cs typeface="Courier New" panose="02070309020205020404" pitchFamily="49" charset="0"/>
-              </a:rPr>
-              <a:t>qlSessionTemplate</a:t>
-            </a:r>
-            <a:r>
-              <a:rPr kumimoji="1" lang="en-US" altLang="ja-JP" sz="1100" dirty="0" smtClean="0">
-                <a:latin typeface="Courier New" panose="02070309020205020404" pitchFamily="49" charset="0"/>
-                <a:ea typeface="ＭＳ Ｐゴシック" charset="-128"/>
-                <a:cs typeface="Courier New" panose="02070309020205020404" pitchFamily="49" charset="0"/>
-              </a:rPr>
-              <a:t>” /&gt;</a:t>
-            </a:r>
-          </a:p>
-          <a:p>
-            <a:r>
-              <a:rPr kumimoji="1" lang="en-US" altLang="ja-JP" sz="1100" dirty="0">
-                <a:latin typeface="Courier New" panose="02070309020205020404" pitchFamily="49" charset="0"/>
-                <a:ea typeface="ＭＳ Ｐゴシック" charset="-128"/>
-                <a:cs typeface="Courier New" panose="02070309020205020404" pitchFamily="49" charset="0"/>
-              </a:rPr>
-              <a:t> </a:t>
-            </a:r>
-            <a:r>
-              <a:rPr kumimoji="1" lang="en-US" altLang="ja-JP" sz="1100" dirty="0" smtClean="0">
-                <a:latin typeface="Courier New" panose="02070309020205020404" pitchFamily="49" charset="0"/>
-                <a:ea typeface="ＭＳ Ｐゴシック" charset="-128"/>
-                <a:cs typeface="Courier New" panose="02070309020205020404" pitchFamily="49" charset="0"/>
-              </a:rPr>
-              <a:t> </a:t>
-            </a:r>
-            <a:r>
-              <a:rPr kumimoji="1" lang="en-US" altLang="ja-JP" sz="1100" dirty="0" smtClean="0">
-                <a:latin typeface="Courier New" panose="02070309020205020404" pitchFamily="49" charset="0"/>
-                <a:ea typeface="ＭＳ Ｐゴシック" charset="-128"/>
-                <a:cs typeface="Courier New" panose="02070309020205020404" pitchFamily="49" charset="0"/>
-              </a:rPr>
-              <a:t>&lt;/</a:t>
-            </a:r>
-            <a:r>
-              <a:rPr kumimoji="1" lang="en-US" altLang="ja-JP" sz="1100" dirty="0" smtClean="0">
-                <a:latin typeface="Courier New" panose="02070309020205020404" pitchFamily="49" charset="0"/>
-                <a:ea typeface="ＭＳ Ｐゴシック" charset="-128"/>
-                <a:cs typeface="Courier New" panose="02070309020205020404" pitchFamily="49" charset="0"/>
-              </a:rPr>
-              <a:t>bean&gt;</a:t>
+                <a:ea typeface="ＭＳ Ｐゴシック" charset="-128"/>
+                <a:cs typeface="Courier New" panose="02070309020205020404" pitchFamily="49" charset="0"/>
+              </a:rPr>
+              <a:t> &lt;/bean&gt;</a:t>
             </a:r>
           </a:p>
         </p:txBody>
@@ -8791,15 +8753,7 @@
                 <a:ea typeface="ＭＳ Ｐゴシック" charset="-128"/>
                 <a:cs typeface="Courier New" panose="02070309020205020404" pitchFamily="49" charset="0"/>
               </a:rPr>
-              <a:t>　　　</a:t>
-            </a:r>
-            <a:r>
-              <a:rPr kumimoji="1" lang="ja-JP" altLang="en-US" sz="1100" dirty="0" smtClean="0">
-                <a:latin typeface="Courier New" panose="02070309020205020404" pitchFamily="49" charset="0"/>
-                <a:ea typeface="ＭＳ Ｐゴシック" charset="-128"/>
-                <a:cs typeface="Courier New" panose="02070309020205020404" pitchFamily="49" charset="0"/>
-              </a:rPr>
-              <a:t>    </a:t>
+              <a:t>　　　    </a:t>
             </a:r>
             <a:r>
               <a:rPr kumimoji="1" lang="en-US" altLang="ja-JP" sz="1100" dirty="0" smtClean="0">
@@ -8809,11 +8763,6 @@
               </a:rPr>
               <a:t>WHERE</a:t>
             </a:r>
-            <a:endParaRPr kumimoji="1" lang="en-US" altLang="ja-JP" sz="1100" dirty="0" smtClean="0">
-              <a:latin typeface="Courier New" panose="02070309020205020404" pitchFamily="49" charset="0"/>
-              <a:ea typeface="ＭＳ Ｐゴシック" charset="-128"/>
-              <a:cs typeface="Courier New" panose="02070309020205020404" pitchFamily="49" charset="0"/>
-            </a:endParaRPr>
           </a:p>
           <a:p>
             <a:r>
@@ -12200,15 +12149,17 @@
                 <a:ea typeface="ＭＳ Ｐゴシック" panose="020B0600070205080204" pitchFamily="50" charset="-128"/>
                 <a:cs typeface="Courier New" panose="02070309020205020404" pitchFamily="49" charset="0"/>
               </a:rPr>
-              <a:t>    </a:t>
-            </a:r>
+              <a:t>    @InputFileColumn(</a:t>
+            </a:r>
+          </a:p>
+          <a:p>
             <a:r>
               <a:rPr lang="en-US" altLang="ja-JP" sz="1050" dirty="0" smtClean="0">
                 <a:latin typeface="Courier New" panose="02070309020205020404" pitchFamily="49" charset="0"/>
                 <a:ea typeface="ＭＳ Ｐゴシック" panose="020B0600070205080204" pitchFamily="50" charset="-128"/>
                 <a:cs typeface="Courier New" panose="02070309020205020404" pitchFamily="49" charset="0"/>
               </a:rPr>
-              <a:t>@InputFileColumn(</a:t>
+              <a:t>         columnIndex = 0,</a:t>
             </a:r>
           </a:p>
           <a:p>
@@ -12221,12 +12172,30 @@
               <a:t>         </a:t>
             </a:r>
             <a:r>
+              <a:rPr lang="en-US" altLang="ja-JP" sz="1050" dirty="0" err="1" smtClean="0">
+                <a:latin typeface="Courier New" panose="02070309020205020404" pitchFamily="49" charset="0"/>
+                <a:ea typeface="ＭＳ Ｐゴシック" panose="020B0600070205080204" pitchFamily="50" charset="-128"/>
+                <a:cs typeface="Courier New" panose="02070309020205020404" pitchFamily="49" charset="0"/>
+              </a:rPr>
+              <a:t>columnFormat</a:t>
+            </a:r>
+            <a:r>
               <a:rPr lang="en-US" altLang="ja-JP" sz="1050" dirty="0" smtClean="0">
                 <a:latin typeface="Courier New" panose="02070309020205020404" pitchFamily="49" charset="0"/>
                 <a:ea typeface="ＭＳ Ｐゴシック" panose="020B0600070205080204" pitchFamily="50" charset="-128"/>
                 <a:cs typeface="Courier New" panose="02070309020205020404" pitchFamily="49" charset="0"/>
               </a:rPr>
-              <a:t>columnIndex </a:t>
+              <a:t>=”yyyy/MM/dd”)</a:t>
+            </a:r>
+          </a:p>
+          <a:p>
+            <a:r>
+              <a:rPr lang="ja-JP" altLang="en-US" sz="1050" dirty="0" smtClean="0">
+                <a:latin typeface="Courier New" panose="02070309020205020404" pitchFamily="49" charset="0"/>
+                <a:ea typeface="ＭＳ Ｐゴシック" panose="020B0600070205080204" pitchFamily="50" charset="-128"/>
+                <a:cs typeface="Courier New" panose="02070309020205020404" pitchFamily="49" charset="0"/>
+              </a:rPr>
+              <a:t>　   </a:t>
             </a:r>
             <a:r>
               <a:rPr lang="en-US" altLang="ja-JP" sz="1050" dirty="0" smtClean="0">
@@ -12234,83 +12203,7 @@
                 <a:ea typeface="ＭＳ Ｐゴシック" panose="020B0600070205080204" pitchFamily="50" charset="-128"/>
                 <a:cs typeface="Courier New" panose="02070309020205020404" pitchFamily="49" charset="0"/>
               </a:rPr>
-              <a:t>= 0,</a:t>
-            </a:r>
-          </a:p>
-          <a:p>
-            <a:r>
-              <a:rPr lang="en-US" altLang="ja-JP" sz="1050" dirty="0" smtClean="0">
-                <a:latin typeface="Courier New" panose="02070309020205020404" pitchFamily="49" charset="0"/>
-                <a:ea typeface="ＭＳ Ｐゴシック" panose="020B0600070205080204" pitchFamily="50" charset="-128"/>
-                <a:cs typeface="Courier New" panose="02070309020205020404" pitchFamily="49" charset="0"/>
-              </a:rPr>
-              <a:t>        </a:t>
-            </a:r>
-            <a:r>
-              <a:rPr lang="en-US" altLang="ja-JP" sz="1050" dirty="0" smtClean="0">
-                <a:latin typeface="Courier New" panose="02070309020205020404" pitchFamily="49" charset="0"/>
-                <a:ea typeface="ＭＳ Ｐゴシック" panose="020B0600070205080204" pitchFamily="50" charset="-128"/>
-                <a:cs typeface="Courier New" panose="02070309020205020404" pitchFamily="49" charset="0"/>
-              </a:rPr>
-              <a:t> </a:t>
-            </a:r>
-            <a:r>
-              <a:rPr lang="en-US" altLang="ja-JP" sz="1050" dirty="0" err="1" smtClean="0">
-                <a:latin typeface="Courier New" panose="02070309020205020404" pitchFamily="49" charset="0"/>
-                <a:ea typeface="ＭＳ Ｐゴシック" panose="020B0600070205080204" pitchFamily="50" charset="-128"/>
-                <a:cs typeface="Courier New" panose="02070309020205020404" pitchFamily="49" charset="0"/>
-              </a:rPr>
-              <a:t>columnFormat</a:t>
-            </a:r>
-            <a:r>
-              <a:rPr lang="en-US" altLang="ja-JP" sz="1050" dirty="0" smtClean="0">
-                <a:latin typeface="Courier New" panose="02070309020205020404" pitchFamily="49" charset="0"/>
-                <a:ea typeface="ＭＳ Ｐゴシック" panose="020B0600070205080204" pitchFamily="50" charset="-128"/>
-                <a:cs typeface="Courier New" panose="02070309020205020404" pitchFamily="49" charset="0"/>
-              </a:rPr>
-              <a:t>=”yyyy/MM/dd</a:t>
-            </a:r>
-            <a:r>
-              <a:rPr lang="en-US" altLang="ja-JP" sz="1050" dirty="0" smtClean="0">
-                <a:latin typeface="Courier New" panose="02070309020205020404" pitchFamily="49" charset="0"/>
-                <a:ea typeface="ＭＳ Ｐゴシック" panose="020B0600070205080204" pitchFamily="50" charset="-128"/>
-                <a:cs typeface="Courier New" panose="02070309020205020404" pitchFamily="49" charset="0"/>
-              </a:rPr>
-              <a:t>”)</a:t>
-            </a:r>
-          </a:p>
-          <a:p>
-            <a:r>
-              <a:rPr lang="ja-JP" altLang="en-US" sz="1050" dirty="0" smtClean="0">
-                <a:latin typeface="Courier New" panose="02070309020205020404" pitchFamily="49" charset="0"/>
-                <a:ea typeface="ＭＳ Ｐゴシック" panose="020B0600070205080204" pitchFamily="50" charset="-128"/>
-                <a:cs typeface="Courier New" panose="02070309020205020404" pitchFamily="49" charset="0"/>
-              </a:rPr>
-              <a:t>　 </a:t>
-            </a:r>
-            <a:r>
-              <a:rPr lang="ja-JP" altLang="en-US" sz="1050" dirty="0" smtClean="0">
-                <a:latin typeface="Courier New" panose="02070309020205020404" pitchFamily="49" charset="0"/>
-                <a:ea typeface="ＭＳ Ｐゴシック" panose="020B0600070205080204" pitchFamily="50" charset="-128"/>
-                <a:cs typeface="Courier New" panose="02070309020205020404" pitchFamily="49" charset="0"/>
-              </a:rPr>
-              <a:t>  </a:t>
-            </a:r>
-            <a:r>
-              <a:rPr lang="en-US" altLang="ja-JP" sz="1050" dirty="0" smtClean="0">
-                <a:latin typeface="Courier New" panose="02070309020205020404" pitchFamily="49" charset="0"/>
-                <a:ea typeface="ＭＳ Ｐゴシック" panose="020B0600070205080204" pitchFamily="50" charset="-128"/>
-                <a:cs typeface="Courier New" panose="02070309020205020404" pitchFamily="49" charset="0"/>
-              </a:rPr>
-              <a:t>private </a:t>
-            </a:r>
-            <a:r>
-              <a:rPr lang="en-US" altLang="ja-JP" sz="1050" dirty="0" smtClean="0">
-                <a:latin typeface="Courier New" panose="02070309020205020404" pitchFamily="49" charset="0"/>
-                <a:ea typeface="ＭＳ Ｐゴシック" panose="020B0600070205080204" pitchFamily="50" charset="-128"/>
-                <a:cs typeface="Courier New" panose="02070309020205020404" pitchFamily="49" charset="0"/>
-              </a:rPr>
-              <a:t>Date </a:t>
+              <a:t>private Date </a:t>
             </a:r>
             <a:r>
               <a:rPr lang="en-US" altLang="ja-JP" sz="1050" dirty="0" err="1" smtClean="0">
@@ -12343,24 +12236,42 @@
                 <a:ea typeface="ＭＳ Ｐゴシック" panose="020B0600070205080204" pitchFamily="50" charset="-128"/>
                 <a:cs typeface="Courier New" panose="02070309020205020404" pitchFamily="49" charset="0"/>
               </a:rPr>
-              <a:t>    </a:t>
-            </a:r>
+              <a:t>    @InputFileColumn(</a:t>
+            </a:r>
+          </a:p>
+          <a:p>
             <a:r>
               <a:rPr lang="en-US" altLang="ja-JP" sz="1050" dirty="0" smtClean="0">
                 <a:latin typeface="Courier New" panose="02070309020205020404" pitchFamily="49" charset="0"/>
                 <a:ea typeface="ＭＳ Ｐゴシック" panose="020B0600070205080204" pitchFamily="50" charset="-128"/>
                 <a:cs typeface="Courier New" panose="02070309020205020404" pitchFamily="49" charset="0"/>
               </a:rPr>
-              <a:t>@InputFileColumn(</a:t>
-            </a:r>
-          </a:p>
-          <a:p>
+              <a:t>            </a:t>
+            </a:r>
+            <a:r>
+              <a:rPr lang="en-US" altLang="ja-JP" sz="1050" dirty="0" err="1" smtClean="0">
+                <a:latin typeface="Courier New" panose="02070309020205020404" pitchFamily="49" charset="0"/>
+                <a:ea typeface="ＭＳ Ｐゴシック" panose="020B0600070205080204" pitchFamily="50" charset="-128"/>
+                <a:cs typeface="Courier New" panose="02070309020205020404" pitchFamily="49" charset="0"/>
+              </a:rPr>
+              <a:t>columnIndex</a:t>
+            </a:r>
             <a:r>
               <a:rPr lang="en-US" altLang="ja-JP" sz="1050" dirty="0" smtClean="0">
                 <a:latin typeface="Courier New" panose="02070309020205020404" pitchFamily="49" charset="0"/>
                 <a:ea typeface="ＭＳ Ｐゴシック" panose="020B0600070205080204" pitchFamily="50" charset="-128"/>
                 <a:cs typeface="Courier New" panose="02070309020205020404" pitchFamily="49" charset="0"/>
               </a:rPr>
+              <a:t> = 1,</a:t>
+            </a:r>
+          </a:p>
+          <a:p>
+            <a:r>
+              <a:rPr lang="en-US" altLang="ja-JP" sz="1050" dirty="0" smtClean="0">
+                <a:latin typeface="Courier New" panose="02070309020205020404" pitchFamily="49" charset="0"/>
+                <a:ea typeface="ＭＳ Ｐゴシック" panose="020B0600070205080204" pitchFamily="50" charset="-128"/>
+                <a:cs typeface="Courier New" panose="02070309020205020404" pitchFamily="49" charset="0"/>
+              </a:rPr>
               <a:t>            </a:t>
             </a:r>
             <a:r>
@@ -12369,7 +12280,7 @@
                 <a:ea typeface="ＭＳ Ｐゴシック" panose="020B0600070205080204" pitchFamily="50" charset="-128"/>
                 <a:cs typeface="Courier New" panose="02070309020205020404" pitchFamily="49" charset="0"/>
               </a:rPr>
-              <a:t>columnIndex</a:t>
+              <a:t>stringConverter</a:t>
             </a:r>
             <a:r>
               <a:rPr lang="en-US" altLang="ja-JP" sz="1050" dirty="0" smtClean="0">
@@ -12377,59 +12288,25 @@
                 <a:ea typeface="ＭＳ Ｐゴシック" panose="020B0600070205080204" pitchFamily="50" charset="-128"/>
                 <a:cs typeface="Courier New" panose="02070309020205020404" pitchFamily="49" charset="0"/>
               </a:rPr>
-              <a:t> = 1,</a:t>
-            </a:r>
-          </a:p>
-          <a:p>
+              <a:t> =</a:t>
+            </a:r>
+          </a:p>
+          <a:p>
+            <a:r>
+              <a:rPr lang="en-US" altLang="ja-JP" sz="1050" dirty="0">
+                <a:latin typeface="Courier New" panose="02070309020205020404" pitchFamily="49" charset="0"/>
+                <a:ea typeface="ＭＳ Ｐゴシック" panose="020B0600070205080204" pitchFamily="50" charset="-128"/>
+                <a:cs typeface="Courier New" panose="02070309020205020404" pitchFamily="49" charset="0"/>
+              </a:rPr>
+              <a:t> </a:t>
+            </a:r>
             <a:r>
               <a:rPr lang="en-US" altLang="ja-JP" sz="1050" dirty="0" smtClean="0">
                 <a:latin typeface="Courier New" panose="02070309020205020404" pitchFamily="49" charset="0"/>
                 <a:ea typeface="ＭＳ Ｐゴシック" panose="020B0600070205080204" pitchFamily="50" charset="-128"/>
                 <a:cs typeface="Courier New" panose="02070309020205020404" pitchFamily="49" charset="0"/>
               </a:rPr>
-              <a:t>            </a:t>
-            </a:r>
-            <a:r>
-              <a:rPr lang="en-US" altLang="ja-JP" sz="1050" dirty="0" err="1" smtClean="0">
-                <a:latin typeface="Courier New" panose="02070309020205020404" pitchFamily="49" charset="0"/>
-                <a:ea typeface="ＭＳ Ｐゴシック" panose="020B0600070205080204" pitchFamily="50" charset="-128"/>
-                <a:cs typeface="Courier New" panose="02070309020205020404" pitchFamily="49" charset="0"/>
-              </a:rPr>
-              <a:t>stringConverter</a:t>
-            </a:r>
-            <a:r>
-              <a:rPr lang="en-US" altLang="ja-JP" sz="1050" dirty="0" smtClean="0">
-                <a:latin typeface="Courier New" panose="02070309020205020404" pitchFamily="49" charset="0"/>
-                <a:ea typeface="ＭＳ Ｐゴシック" panose="020B0600070205080204" pitchFamily="50" charset="-128"/>
-                <a:cs typeface="Courier New" panose="02070309020205020404" pitchFamily="49" charset="0"/>
-              </a:rPr>
-              <a:t> =</a:t>
-            </a:r>
-          </a:p>
-          <a:p>
-            <a:r>
-              <a:rPr lang="en-US" altLang="ja-JP" sz="1050" dirty="0">
-                <a:latin typeface="Courier New" panose="02070309020205020404" pitchFamily="49" charset="0"/>
-                <a:ea typeface="ＭＳ Ｐゴシック" panose="020B0600070205080204" pitchFamily="50" charset="-128"/>
-                <a:cs typeface="Courier New" panose="02070309020205020404" pitchFamily="49" charset="0"/>
-              </a:rPr>
-              <a:t> </a:t>
-            </a:r>
-            <a:r>
-              <a:rPr lang="en-US" altLang="ja-JP" sz="1050" dirty="0" smtClean="0">
-                <a:latin typeface="Courier New" panose="02070309020205020404" pitchFamily="49" charset="0"/>
-                <a:ea typeface="ＭＳ Ｐゴシック" panose="020B0600070205080204" pitchFamily="50" charset="-128"/>
-                <a:cs typeface="Courier New" panose="02070309020205020404" pitchFamily="49" charset="0"/>
-              </a:rPr>
-              <a:t>             </a:t>
-            </a:r>
-            <a:r>
-              <a:rPr lang="en-US" altLang="ja-JP" sz="1050" dirty="0" smtClean="0">
-                <a:latin typeface="Courier New" panose="02070309020205020404" pitchFamily="49" charset="0"/>
-                <a:ea typeface="ＭＳ Ｐゴシック" panose="020B0600070205080204" pitchFamily="50" charset="-128"/>
-                <a:cs typeface="Courier New" panose="02070309020205020404" pitchFamily="49" charset="0"/>
-              </a:rPr>
-              <a:t>  </a:t>
+              <a:t>               </a:t>
             </a:r>
             <a:r>
               <a:rPr lang="en-US" altLang="ja-JP" sz="1050" dirty="0" err="1" smtClean="0">
@@ -12488,15 +12365,7 @@
                 <a:ea typeface="ＭＳ Ｐゴシック" panose="020B0600070205080204" pitchFamily="50" charset="-128"/>
                 <a:cs typeface="Courier New" panose="02070309020205020404" pitchFamily="49" charset="0"/>
               </a:rPr>
-              <a:t>    </a:t>
-            </a:r>
-            <a:r>
-              <a:rPr lang="en-US" altLang="ja-JP" sz="1050" dirty="0" smtClean="0">
-                <a:latin typeface="Courier New" panose="02070309020205020404" pitchFamily="49" charset="0"/>
-                <a:ea typeface="ＭＳ Ｐゴシック" panose="020B0600070205080204" pitchFamily="50" charset="-128"/>
-                <a:cs typeface="Courier New" panose="02070309020205020404" pitchFamily="49" charset="0"/>
-              </a:rPr>
-              <a:t>@InputFileColumn(</a:t>
+              <a:t>    @InputFileColumn(</a:t>
             </a:r>
           </a:p>
           <a:p>
@@ -12866,14 +12735,7 @@
                 <a:latin typeface="Tahoma" pitchFamily="34" charset="0"/>
                 <a:ea typeface="ＭＳ Ｐゴシック" charset="-128"/>
               </a:rPr>
-              <a:t>/</a:t>
-            </a:r>
-            <a:r>
-              <a:rPr kumimoji="1" lang="ja-JP" altLang="ja-JP" sz="1000" b="0" dirty="0" smtClean="0">
-                <a:latin typeface="Tahoma" pitchFamily="34" charset="0"/>
-                <a:ea typeface="ＭＳ Ｐゴシック" charset="-128"/>
-              </a:rPr>
-              <a:t>/</a:t>
+              <a:t>//</a:t>
             </a:r>
             <a:r>
               <a:rPr lang="ja-JP" altLang="en-US" sz="1000" dirty="0">
@@ -12937,15 +12799,7 @@
                 <a:ea typeface="ＭＳ Ｐゴシック" charset="-128"/>
                 <a:cs typeface="Courier New" panose="02070309020205020404" pitchFamily="49" charset="0"/>
               </a:rPr>
-              <a:t>　　　　</a:t>
-            </a:r>
-            <a:r>
-              <a:rPr kumimoji="1" lang="ja-JP" altLang="en-US" sz="1000" b="0" dirty="0" smtClean="0">
-                <a:latin typeface="Courier New" panose="02070309020205020404" pitchFamily="49" charset="0"/>
-                <a:ea typeface="ＭＳ Ｐゴシック" charset="-128"/>
-                <a:cs typeface="Courier New" panose="02070309020205020404" pitchFamily="49" charset="0"/>
-              </a:rPr>
-              <a:t> </a:t>
+              <a:t>　　　　 </a:t>
             </a:r>
             <a:r>
               <a:rPr kumimoji="1" lang="ja-JP" altLang="ja-JP" sz="1000" b="0" dirty="0" smtClean="0">
@@ -12953,15 +12807,7 @@
                 <a:ea typeface="ＭＳ Ｐゴシック" charset="-128"/>
                 <a:cs typeface="Courier New" panose="02070309020205020404" pitchFamily="49" charset="0"/>
               </a:rPr>
-              <a:t>= </a:t>
-            </a:r>
-            <a:r>
-              <a:rPr kumimoji="1" lang="ja-JP" altLang="ja-JP" sz="1000" b="0" dirty="0" smtClean="0">
-                <a:latin typeface="Courier New" panose="02070309020205020404" pitchFamily="49" charset="0"/>
-                <a:ea typeface="ＭＳ Ｐゴシック" charset="-128"/>
-                <a:cs typeface="Courier New" panose="02070309020205020404" pitchFamily="49" charset="0"/>
-              </a:rPr>
-              <a:t>csvFileQuery</a:t>
+              <a:t>= csvFileQuery</a:t>
             </a:r>
             <a:r>
               <a:rPr kumimoji="1" lang="en-US" altLang="ja-JP" sz="1000" b="0" dirty="0" smtClean="0">
@@ -13131,28 +12977,14 @@
                 <a:latin typeface="Tahoma" pitchFamily="34" charset="0"/>
                 <a:ea typeface="ＭＳ Ｐゴシック" charset="-128"/>
               </a:rPr>
-              <a:t>　　　</a:t>
-            </a:r>
-            <a:r>
-              <a:rPr kumimoji="1" lang="ja-JP" altLang="en-US" sz="1000" b="0" dirty="0" smtClean="0">
-                <a:latin typeface="Tahoma" pitchFamily="34" charset="0"/>
-                <a:ea typeface="ＭＳ Ｐゴシック" charset="-128"/>
-              </a:rPr>
-              <a:t> </a:t>
+              <a:t>　　　 </a:t>
             </a:r>
             <a:r>
               <a:rPr kumimoji="1" lang="ja-JP" altLang="ja-JP" sz="1000" b="0" dirty="0" smtClean="0">
                 <a:latin typeface="Tahoma" pitchFamily="34" charset="0"/>
                 <a:ea typeface="ＭＳ Ｐゴシック" charset="-128"/>
               </a:rPr>
-              <a:t>/</a:t>
-            </a:r>
-            <a:r>
-              <a:rPr kumimoji="1" lang="ja-JP" altLang="ja-JP" sz="1000" b="0" dirty="0" smtClean="0">
-                <a:latin typeface="Tahoma" pitchFamily="34" charset="0"/>
-                <a:ea typeface="ＭＳ Ｐゴシック" charset="-128"/>
-              </a:rPr>
-              <a:t>/</a:t>
+              <a:t>//</a:t>
             </a:r>
             <a:r>
               <a:rPr kumimoji="1" lang="en-US" altLang="ja-JP" sz="1000" b="0" dirty="0" smtClean="0">
@@ -13197,15 +13029,7 @@
                 <a:ea typeface="ＭＳ Ｐゴシック" charset="-128"/>
                 <a:cs typeface="Courier New" panose="02070309020205020404" pitchFamily="49" charset="0"/>
               </a:rPr>
-              <a:t> </a:t>
-            </a:r>
-            <a:r>
-              <a:rPr kumimoji="1" lang="ja-JP" altLang="ja-JP" sz="1000" b="0" dirty="0" smtClean="0">
-                <a:latin typeface="Courier New" panose="02070309020205020404" pitchFamily="49" charset="0"/>
-                <a:ea typeface="ＭＳ Ｐゴシック" charset="-128"/>
-                <a:cs typeface="Courier New" panose="02070309020205020404" pitchFamily="49" charset="0"/>
-              </a:rPr>
-              <a:t>List</a:t>
+              <a:t> List</a:t>
             </a:r>
             <a:r>
               <a:rPr kumimoji="1" lang="ja-JP" altLang="ja-JP" sz="1000" b="0" dirty="0">
@@ -13277,14 +13101,7 @@
                 <a:latin typeface="Tahoma" pitchFamily="34" charset="0"/>
                 <a:ea typeface="ＭＳ Ｐゴシック" charset="-128"/>
               </a:rPr>
-              <a:t>　　</a:t>
-            </a:r>
-            <a:r>
-              <a:rPr kumimoji="1" lang="ja-JP" altLang="en-US" sz="1000" b="0" dirty="0" smtClean="0">
-                <a:latin typeface="Tahoma" pitchFamily="34" charset="0"/>
-                <a:ea typeface="ＭＳ Ｐゴシック" charset="-128"/>
-              </a:rPr>
-              <a:t> 　</a:t>
+              <a:t>　　 　</a:t>
             </a:r>
             <a:r>
               <a:rPr lang="ja-JP" altLang="en-US" sz="1000" dirty="0" smtClean="0">
@@ -13326,14 +13143,7 @@
                 <a:latin typeface="Courier New" pitchFamily="49" charset="0"/>
                 <a:cs typeface="Courier New" pitchFamily="49" charset="0"/>
               </a:rPr>
-              <a:t>読み込んだヘッダ部に対する</a:t>
-            </a:r>
-            <a:r>
-              <a:rPr lang="ja-JP" altLang="en-US" sz="1000" dirty="0" smtClean="0">
-                <a:latin typeface="Courier New" pitchFamily="49" charset="0"/>
-                <a:cs typeface="Courier New" pitchFamily="49" charset="0"/>
-              </a:rPr>
-              <a:t>処理</a:t>
+              <a:t>読み込んだヘッダ部に対する処理</a:t>
             </a:r>
             <a:endParaRPr kumimoji="1" lang="ja-JP" altLang="ja-JP" sz="1000" b="0" dirty="0" smtClean="0">
               <a:latin typeface="Tahoma" pitchFamily="34" charset="0"/>
@@ -13631,14 +13441,7 @@
                 <a:latin typeface="Tahoma" pitchFamily="34" charset="0"/>
                 <a:ea typeface="ＭＳ Ｐゴシック" charset="-128"/>
               </a:rPr>
-              <a:t>/</a:t>
-            </a:r>
-            <a:r>
-              <a:rPr kumimoji="1" lang="ja-JP" altLang="ja-JP" sz="1000" b="0" dirty="0" smtClean="0">
-                <a:latin typeface="Tahoma" pitchFamily="34" charset="0"/>
-                <a:ea typeface="ＭＳ Ｐゴシック" charset="-128"/>
-              </a:rPr>
-              <a:t>/</a:t>
+              <a:t>//</a:t>
             </a:r>
             <a:r>
               <a:rPr lang="ja-JP" altLang="en-US" sz="1000" dirty="0">
@@ -13753,63 +13556,49 @@
                 <a:latin typeface="Courier New" pitchFamily="49" charset="0"/>
                 <a:cs typeface="Courier New" pitchFamily="49" charset="0"/>
               </a:rPr>
-              <a:t>  </a:t>
+              <a:t>      ・</a:t>
+            </a:r>
+            <a:r>
+              <a:rPr lang="ja-JP" altLang="en-US" sz="1000" dirty="0">
+                <a:latin typeface="Courier New" pitchFamily="49" charset="0"/>
+                <a:cs typeface="Courier New" pitchFamily="49" charset="0"/>
+              </a:rPr>
+              <a:t>・・</a:t>
+            </a:r>
+            <a:r>
+              <a:rPr kumimoji="1" lang="ja-JP" altLang="ja-JP" sz="1000" b="0" dirty="0" smtClean="0">
+                <a:latin typeface="Tahoma" pitchFamily="34" charset="0"/>
+                <a:ea typeface="ＭＳ Ｐゴシック" charset="-128"/>
+              </a:rPr>
+              <a:t> </a:t>
+            </a:r>
+            <a:r>
+              <a:rPr kumimoji="1" lang="ja-JP" altLang="ja-JP" sz="1000" b="0" dirty="0">
+                <a:latin typeface="Tahoma" pitchFamily="34" charset="0"/>
+                <a:ea typeface="ＭＳ Ｐゴシック" charset="-128"/>
+              </a:rPr>
+              <a:t>/</a:t>
+            </a:r>
+            <a:r>
+              <a:rPr kumimoji="1" lang="ja-JP" altLang="ja-JP" sz="1000" b="0" dirty="0" smtClean="0">
+                <a:latin typeface="Tahoma" pitchFamily="34" charset="0"/>
+                <a:ea typeface="ＭＳ Ｐゴシック" charset="-128"/>
+              </a:rPr>
+              <a:t>/</a:t>
+            </a:r>
+            <a:r>
+              <a:rPr lang="ja-JP" altLang="en-US" sz="1000" dirty="0">
+                <a:latin typeface="Courier New" pitchFamily="49" charset="0"/>
+                <a:cs typeface="Courier New" pitchFamily="49" charset="0"/>
+              </a:rPr>
+              <a:t> </a:t>
             </a:r>
             <a:r>
               <a:rPr lang="ja-JP" altLang="en-US" sz="1000" dirty="0" smtClean="0">
                 <a:latin typeface="Courier New" pitchFamily="49" charset="0"/>
                 <a:cs typeface="Courier New" pitchFamily="49" charset="0"/>
               </a:rPr>
-              <a:t>    ・</a:t>
-            </a:r>
-            <a:r>
-              <a:rPr lang="ja-JP" altLang="en-US" sz="1000" dirty="0">
-                <a:latin typeface="Courier New" pitchFamily="49" charset="0"/>
-                <a:cs typeface="Courier New" pitchFamily="49" charset="0"/>
-              </a:rPr>
-              <a:t>・・</a:t>
-            </a:r>
-            <a:r>
-              <a:rPr kumimoji="1" lang="ja-JP" altLang="ja-JP" sz="1000" b="0" dirty="0" smtClean="0">
-                <a:latin typeface="Tahoma" pitchFamily="34" charset="0"/>
-                <a:ea typeface="ＭＳ Ｐゴシック" charset="-128"/>
-              </a:rPr>
-              <a:t> </a:t>
-            </a:r>
-            <a:r>
-              <a:rPr kumimoji="1" lang="ja-JP" altLang="ja-JP" sz="1000" b="0" dirty="0">
-                <a:latin typeface="Tahoma" pitchFamily="34" charset="0"/>
-                <a:ea typeface="ＭＳ Ｐゴシック" charset="-128"/>
-              </a:rPr>
-              <a:t>/</a:t>
-            </a:r>
-            <a:r>
-              <a:rPr kumimoji="1" lang="ja-JP" altLang="ja-JP" sz="1000" b="0" dirty="0" smtClean="0">
-                <a:latin typeface="Tahoma" pitchFamily="34" charset="0"/>
-                <a:ea typeface="ＭＳ Ｐゴシック" charset="-128"/>
-              </a:rPr>
-              <a:t>/</a:t>
-            </a:r>
-            <a:r>
-              <a:rPr lang="ja-JP" altLang="en-US" sz="1000" dirty="0">
-                <a:latin typeface="Courier New" pitchFamily="49" charset="0"/>
-                <a:cs typeface="Courier New" pitchFamily="49" charset="0"/>
-              </a:rPr>
-              <a:t> </a:t>
-            </a:r>
-            <a:r>
-              <a:rPr lang="ja-JP" altLang="en-US" sz="1000" dirty="0" smtClean="0">
-                <a:latin typeface="Courier New" pitchFamily="49" charset="0"/>
-                <a:cs typeface="Courier New" pitchFamily="49" charset="0"/>
-              </a:rPr>
-              <a:t>読み込んだトレイラ部に対する</a:t>
-            </a:r>
-            <a:r>
-              <a:rPr lang="ja-JP" altLang="en-US" sz="1000" dirty="0" smtClean="0">
-                <a:latin typeface="Courier New" pitchFamily="49" charset="0"/>
-                <a:cs typeface="Courier New" pitchFamily="49" charset="0"/>
-              </a:rPr>
-              <a:t>処理</a:t>
+              <a:t>読み込んだトレイラ部に対する処理</a:t>
             </a:r>
             <a:endParaRPr kumimoji="1" lang="en-US" altLang="ja-JP" sz="1000" dirty="0">
               <a:latin typeface="Tahoma" pitchFamily="34" charset="0"/>
@@ -13870,14 +13659,7 @@
                 <a:latin typeface="Tahoma" pitchFamily="34" charset="0"/>
                 <a:ea typeface="ＭＳ Ｐゴシック" charset="-128"/>
               </a:rPr>
-              <a:t>/</a:t>
-            </a:r>
-            <a:r>
-              <a:rPr kumimoji="1" lang="ja-JP" altLang="ja-JP" sz="1000" b="0" dirty="0" smtClean="0">
-                <a:latin typeface="Tahoma" pitchFamily="34" charset="0"/>
-                <a:ea typeface="ＭＳ Ｐゴシック" charset="-128"/>
-              </a:rPr>
-              <a:t>/</a:t>
+              <a:t>//</a:t>
             </a:r>
             <a:r>
               <a:rPr lang="ja-JP" altLang="en-US" sz="1000" dirty="0">
@@ -14845,14 +14627,7 @@
                 <a:latin typeface="Courier New" pitchFamily="49" charset="0"/>
                 <a:cs typeface="Courier New" pitchFamily="49" charset="0"/>
               </a:rPr>
-              <a:t>・</a:t>
-            </a:r>
-            <a:r>
-              <a:rPr lang="ja-JP" altLang="en-US" sz="1200" dirty="0" smtClean="0">
-                <a:latin typeface="Courier New" pitchFamily="49" charset="0"/>
-                <a:cs typeface="Courier New" pitchFamily="49" charset="0"/>
-              </a:rPr>
-              <a:t>・・省略</a:t>
+              <a:t>・・・省略</a:t>
             </a:r>
             <a:endParaRPr lang="en-US" altLang="ja-JP" sz="1200" b="1" dirty="0" smtClean="0">
               <a:solidFill>
@@ -15310,21 +15085,7 @@
                 <a:latin typeface="Courier New" pitchFamily="49" charset="0"/>
                 <a:cs typeface="Courier New" pitchFamily="49" charset="0"/>
               </a:rPr>
-              <a:t>・</a:t>
-            </a:r>
-            <a:r>
-              <a:rPr lang="ja-JP" altLang="en-US" sz="1200" dirty="0" smtClean="0">
-                <a:latin typeface="Courier New" pitchFamily="49" charset="0"/>
-                <a:cs typeface="Courier New" pitchFamily="49" charset="0"/>
-              </a:rPr>
-              <a:t>・・</a:t>
-            </a:r>
-            <a:r>
-              <a:rPr lang="ja-JP" altLang="en-US" sz="1200" dirty="0" smtClean="0">
-                <a:latin typeface="Courier New" pitchFamily="49" charset="0"/>
-                <a:cs typeface="Courier New" pitchFamily="49" charset="0"/>
-              </a:rPr>
-              <a:t>省略</a:t>
+              <a:t>・・・省略</a:t>
             </a:r>
             <a:endParaRPr lang="en-US" altLang="ja-JP" sz="1200" dirty="0" smtClean="0">
               <a:latin typeface="Courier New" pitchFamily="49" charset="0"/>
@@ -15396,10 +15157,6 @@
               </a:rPr>
               <a:t>}</a:t>
             </a:r>
-            <a:endParaRPr lang="en-US" altLang="ja-JP" sz="1200" dirty="0" smtClean="0">
-              <a:latin typeface="Courier New" pitchFamily="49" charset="0"/>
-              <a:cs typeface="Courier New" pitchFamily="49" charset="0"/>
-            </a:endParaRPr>
           </a:p>
         </p:txBody>
       </p:sp>
@@ -15836,7 +15593,15 @@
                 <a:ea typeface="ＭＳ ゴシック" pitchFamily="49" charset="-128"/>
                 <a:cs typeface="Courier New" panose="02070309020205020404" pitchFamily="49" charset="0"/>
               </a:rPr>
-              <a:t>       </a:t>
+              <a:t>           new </a:t>
+            </a:r>
+            <a:r>
+              <a:rPr lang="en-US" altLang="ja-JP" sz="1200" dirty="0" err="1" smtClean="0">
+                <a:latin typeface="Courier New" panose="02070309020205020404" pitchFamily="49" charset="0"/>
+                <a:ea typeface="ＭＳ ゴシック" pitchFamily="49" charset="-128"/>
+                <a:cs typeface="Courier New" panose="02070309020205020404" pitchFamily="49" charset="0"/>
+              </a:rPr>
+              <a:t>DaoValidateCollector</a:t>
             </a:r>
             <a:r>
               <a:rPr lang="en-US" altLang="ja-JP" sz="1200" dirty="0" smtClean="0">
@@ -15844,7 +15609,15 @@
                 <a:ea typeface="ＭＳ ゴシック" pitchFamily="49" charset="-128"/>
                 <a:cs typeface="Courier New" panose="02070309020205020404" pitchFamily="49" charset="0"/>
               </a:rPr>
-              <a:t>    </a:t>
+              <a:t>&lt;</a:t>
+            </a:r>
+            <a:r>
+              <a:rPr lang="en-US" altLang="ja-JP" sz="1200" dirty="0" err="1" smtClean="0">
+                <a:latin typeface="Courier New" panose="02070309020205020404" pitchFamily="49" charset="0"/>
+                <a:ea typeface="ＭＳ ゴシック" pitchFamily="49" charset="-128"/>
+                <a:cs typeface="Courier New" panose="02070309020205020404" pitchFamily="49" charset="0"/>
+              </a:rPr>
+              <a:t>UserBean</a:t>
             </a:r>
             <a:r>
               <a:rPr lang="en-US" altLang="ja-JP" sz="1200" dirty="0" smtClean="0">
@@ -15852,7 +15625,17 @@
                 <a:ea typeface="ＭＳ ゴシック" pitchFamily="49" charset="-128"/>
                 <a:cs typeface="Courier New" panose="02070309020205020404" pitchFamily="49" charset="0"/>
               </a:rPr>
-              <a:t>new </a:t>
+              <a:t>&gt;(</a:t>
+            </a:r>
+          </a:p>
+          <a:p>
+            <a:r>
+              <a:rPr lang="en-US" altLang="ja-JP" sz="1200" dirty="0" smtClean="0">
+                <a:latin typeface="Courier New" panose="02070309020205020404" pitchFamily="49" charset="0"/>
+                <a:ea typeface="ＭＳ ゴシック" pitchFamily="49" charset="-128"/>
+                <a:cs typeface="Courier New" panose="02070309020205020404" pitchFamily="49" charset="0"/>
+              </a:rPr>
+              <a:t>                </a:t>
             </a:r>
             <a:r>
               <a:rPr lang="en-US" altLang="ja-JP" sz="1200" dirty="0" err="1" smtClean="0">
@@ -15860,7 +15643,7 @@
                 <a:ea typeface="ＭＳ ゴシック" pitchFamily="49" charset="-128"/>
                 <a:cs typeface="Courier New" panose="02070309020205020404" pitchFamily="49" charset="0"/>
               </a:rPr>
-              <a:t>DaoValidateCollector</a:t>
+              <a:t>this.sampleDao</a:t>
             </a:r>
             <a:r>
               <a:rPr lang="en-US" altLang="ja-JP" sz="1200" dirty="0" smtClean="0">
@@ -15868,83 +15651,17 @@
                 <a:ea typeface="ＭＳ ゴシック" pitchFamily="49" charset="-128"/>
                 <a:cs typeface="Courier New" panose="02070309020205020404" pitchFamily="49" charset="0"/>
               </a:rPr>
-              <a:t>&lt;</a:t>
-            </a:r>
-            <a:r>
-              <a:rPr lang="en-US" altLang="ja-JP" sz="1200" dirty="0" err="1" smtClean="0">
-                <a:latin typeface="Courier New" panose="02070309020205020404" pitchFamily="49" charset="0"/>
-                <a:ea typeface="ＭＳ ゴシック" pitchFamily="49" charset="-128"/>
-                <a:cs typeface="Courier New" panose="02070309020205020404" pitchFamily="49" charset="0"/>
-              </a:rPr>
-              <a:t>UserBean</a:t>
-            </a:r>
+              <a:t>, “colletData01",</a:t>
+            </a:r>
+          </a:p>
+          <a:p>
             <a:r>
               <a:rPr lang="en-US" altLang="ja-JP" sz="1200" dirty="0" smtClean="0">
                 <a:latin typeface="Courier New" panose="02070309020205020404" pitchFamily="49" charset="0"/>
                 <a:ea typeface="ＭＳ ゴシック" pitchFamily="49" charset="-128"/>
                 <a:cs typeface="Courier New" panose="02070309020205020404" pitchFamily="49" charset="0"/>
               </a:rPr>
-              <a:t>&gt;(</a:t>
-            </a:r>
-          </a:p>
-          <a:p>
-            <a:r>
-              <a:rPr lang="en-US" altLang="ja-JP" sz="1200" dirty="0" smtClean="0">
-                <a:latin typeface="Courier New" panose="02070309020205020404" pitchFamily="49" charset="0"/>
-                <a:ea typeface="ＭＳ ゴシック" pitchFamily="49" charset="-128"/>
-                <a:cs typeface="Courier New" panose="02070309020205020404" pitchFamily="49" charset="0"/>
-              </a:rPr>
-              <a:t>        </a:t>
-            </a:r>
-            <a:r>
-              <a:rPr lang="en-US" altLang="ja-JP" sz="1200" dirty="0" smtClean="0">
-                <a:latin typeface="Courier New" panose="02070309020205020404" pitchFamily="49" charset="0"/>
-                <a:ea typeface="ＭＳ ゴシック" pitchFamily="49" charset="-128"/>
-                <a:cs typeface="Courier New" panose="02070309020205020404" pitchFamily="49" charset="0"/>
-              </a:rPr>
-              <a:t>        </a:t>
-            </a:r>
-            <a:r>
-              <a:rPr lang="en-US" altLang="ja-JP" sz="1200" dirty="0" err="1" smtClean="0">
-                <a:latin typeface="Courier New" panose="02070309020205020404" pitchFamily="49" charset="0"/>
-                <a:ea typeface="ＭＳ ゴシック" pitchFamily="49" charset="-128"/>
-                <a:cs typeface="Courier New" panose="02070309020205020404" pitchFamily="49" charset="0"/>
-              </a:rPr>
-              <a:t>this.sampleDao</a:t>
-            </a:r>
-            <a:r>
-              <a:rPr lang="en-US" altLang="ja-JP" sz="1200" dirty="0" smtClean="0">
-                <a:latin typeface="Courier New" panose="02070309020205020404" pitchFamily="49" charset="0"/>
-                <a:ea typeface="ＭＳ ゴシック" pitchFamily="49" charset="-128"/>
-                <a:cs typeface="Courier New" panose="02070309020205020404" pitchFamily="49" charset="0"/>
-              </a:rPr>
-              <a:t>, “colletData01",</a:t>
-            </a:r>
-          </a:p>
-          <a:p>
-            <a:r>
-              <a:rPr lang="en-US" altLang="ja-JP" sz="1200" dirty="0" smtClean="0">
-                <a:latin typeface="Courier New" panose="02070309020205020404" pitchFamily="49" charset="0"/>
-                <a:ea typeface="ＭＳ ゴシック" pitchFamily="49" charset="-128"/>
-                <a:cs typeface="Courier New" panose="02070309020205020404" pitchFamily="49" charset="0"/>
-              </a:rPr>
-              <a:t>        </a:t>
-            </a:r>
-            <a:r>
-              <a:rPr lang="en-US" altLang="ja-JP" sz="1200" dirty="0" smtClean="0">
-                <a:latin typeface="Courier New" panose="02070309020205020404" pitchFamily="49" charset="0"/>
-                <a:ea typeface="ＭＳ ゴシック" pitchFamily="49" charset="-128"/>
-                <a:cs typeface="Courier New" panose="02070309020205020404" pitchFamily="49" charset="0"/>
-              </a:rPr>
-              <a:t>        </a:t>
-            </a:r>
-            <a:r>
-              <a:rPr lang="en-US" altLang="ja-JP" sz="1200" dirty="0" smtClean="0">
-                <a:latin typeface="Courier New" panose="02070309020205020404" pitchFamily="49" charset="0"/>
-                <a:ea typeface="ＭＳ ゴシック" pitchFamily="49" charset="-128"/>
-                <a:cs typeface="Courier New" panose="02070309020205020404" pitchFamily="49" charset="0"/>
-              </a:rPr>
-              <a:t>null, </a:t>
+              <a:t>                null, </a:t>
             </a:r>
             <a:r>
               <a:rPr lang="en-US" altLang="ja-JP" sz="1200" dirty="0" smtClean="0">
@@ -15991,33 +15708,43 @@
                 <a:ea typeface="ＭＳ ゴシック" pitchFamily="49" charset="-128"/>
                 <a:cs typeface="Courier New" panose="02070309020205020404" pitchFamily="49" charset="0"/>
               </a:rPr>
-              <a:t>try </a:t>
-            </a:r>
+              <a:t>try {</a:t>
+            </a:r>
+          </a:p>
+          <a:p>
             <a:r>
               <a:rPr lang="en-US" altLang="ja-JP" sz="1200" dirty="0" smtClean="0">
                 <a:latin typeface="Courier New" panose="02070309020205020404" pitchFamily="49" charset="0"/>
                 <a:ea typeface="ＭＳ ゴシック" pitchFamily="49" charset="-128"/>
                 <a:cs typeface="Courier New" panose="02070309020205020404" pitchFamily="49" charset="0"/>
               </a:rPr>
-              <a:t>{</a:t>
-            </a:r>
-          </a:p>
-          <a:p>
+              <a:t>            </a:t>
+            </a:r>
+            <a:r>
+              <a:rPr lang="en-US" altLang="ja-JP" sz="1200" dirty="0" err="1" smtClean="0">
+                <a:latin typeface="Courier New" panose="02070309020205020404" pitchFamily="49" charset="0"/>
+                <a:ea typeface="ＭＳ ゴシック" pitchFamily="49" charset="-128"/>
+                <a:cs typeface="Courier New" panose="02070309020205020404" pitchFamily="49" charset="0"/>
+              </a:rPr>
+              <a:t>UserBean</a:t>
+            </a:r>
             <a:r>
               <a:rPr lang="en-US" altLang="ja-JP" sz="1200" dirty="0" smtClean="0">
                 <a:latin typeface="Courier New" panose="02070309020205020404" pitchFamily="49" charset="0"/>
                 <a:ea typeface="ＭＳ ゴシック" pitchFamily="49" charset="-128"/>
                 <a:cs typeface="Courier New" panose="02070309020205020404" pitchFamily="49" charset="0"/>
               </a:rPr>
-              <a:t>        </a:t>
-            </a:r>
+              <a:t> bean = null;</a:t>
+            </a:r>
+          </a:p>
+          <a:p>
             <a:r>
               <a:rPr lang="en-US" altLang="ja-JP" sz="1200" dirty="0" smtClean="0">
                 <a:latin typeface="Courier New" panose="02070309020205020404" pitchFamily="49" charset="0"/>
                 <a:ea typeface="ＭＳ ゴシック" pitchFamily="49" charset="-128"/>
                 <a:cs typeface="Courier New" panose="02070309020205020404" pitchFamily="49" charset="0"/>
               </a:rPr>
-              <a:t>    </a:t>
+              <a:t>            while (</a:t>
             </a:r>
             <a:r>
               <a:rPr lang="en-US" altLang="ja-JP" sz="1200" dirty="0" err="1" smtClean="0">
@@ -16025,7 +15752,7 @@
                 <a:ea typeface="ＭＳ ゴシック" pitchFamily="49" charset="-128"/>
                 <a:cs typeface="Courier New" panose="02070309020205020404" pitchFamily="49" charset="0"/>
               </a:rPr>
-              <a:t>UserBean</a:t>
+              <a:t>collector.hasNext</a:t>
             </a:r>
             <a:r>
               <a:rPr lang="en-US" altLang="ja-JP" sz="1200" dirty="0" smtClean="0">
@@ -16033,7 +15760,7 @@
                 <a:ea typeface="ＭＳ ゴシック" pitchFamily="49" charset="-128"/>
                 <a:cs typeface="Courier New" panose="02070309020205020404" pitchFamily="49" charset="0"/>
               </a:rPr>
-              <a:t> bean = null;</a:t>
+              <a:t>()) {</a:t>
             </a:r>
           </a:p>
           <a:p>
@@ -16043,65 +15770,7 @@
                 <a:ea typeface="ＭＳ ゴシック" pitchFamily="49" charset="-128"/>
                 <a:cs typeface="Courier New" panose="02070309020205020404" pitchFamily="49" charset="0"/>
               </a:rPr>
-              <a:t>        </a:t>
-            </a:r>
-            <a:r>
-              <a:rPr lang="en-US" altLang="ja-JP" sz="1200" dirty="0" smtClean="0">
-                <a:latin typeface="Courier New" panose="02070309020205020404" pitchFamily="49" charset="0"/>
-                <a:ea typeface="ＭＳ ゴシック" pitchFamily="49" charset="-128"/>
-                <a:cs typeface="Courier New" panose="02070309020205020404" pitchFamily="49" charset="0"/>
-              </a:rPr>
-              <a:t>    </a:t>
-            </a:r>
-            <a:r>
-              <a:rPr lang="en-US" altLang="ja-JP" sz="1200" dirty="0" smtClean="0">
-                <a:latin typeface="Courier New" panose="02070309020205020404" pitchFamily="49" charset="0"/>
-                <a:ea typeface="ＭＳ ゴシック" pitchFamily="49" charset="-128"/>
-                <a:cs typeface="Courier New" panose="02070309020205020404" pitchFamily="49" charset="0"/>
-              </a:rPr>
-              <a:t>while (</a:t>
-            </a:r>
-            <a:r>
-              <a:rPr lang="en-US" altLang="ja-JP" sz="1200" dirty="0" err="1" smtClean="0">
-                <a:latin typeface="Courier New" panose="02070309020205020404" pitchFamily="49" charset="0"/>
-                <a:ea typeface="ＭＳ ゴシック" pitchFamily="49" charset="-128"/>
-                <a:cs typeface="Courier New" panose="02070309020205020404" pitchFamily="49" charset="0"/>
-              </a:rPr>
-              <a:t>collector.hasNext</a:t>
-            </a:r>
-            <a:r>
-              <a:rPr lang="en-US" altLang="ja-JP" sz="1200" dirty="0" smtClean="0">
-                <a:latin typeface="Courier New" panose="02070309020205020404" pitchFamily="49" charset="0"/>
-                <a:ea typeface="ＭＳ ゴシック" pitchFamily="49" charset="-128"/>
-                <a:cs typeface="Courier New" panose="02070309020205020404" pitchFamily="49" charset="0"/>
-              </a:rPr>
-              <a:t>()) {</a:t>
-            </a:r>
-          </a:p>
-          <a:p>
-            <a:r>
-              <a:rPr lang="en-US" altLang="ja-JP" sz="1200" dirty="0" smtClean="0">
-                <a:latin typeface="Courier New" panose="02070309020205020404" pitchFamily="49" charset="0"/>
-                <a:ea typeface="ＭＳ ゴシック" pitchFamily="49" charset="-128"/>
-                <a:cs typeface="Courier New" panose="02070309020205020404" pitchFamily="49" charset="0"/>
-              </a:rPr>
-              <a:t>        </a:t>
-            </a:r>
-            <a:r>
-              <a:rPr lang="en-US" altLang="ja-JP" sz="1200" dirty="0" smtClean="0">
-                <a:latin typeface="Courier New" panose="02070309020205020404" pitchFamily="49" charset="0"/>
-                <a:ea typeface="ＭＳ ゴシック" pitchFamily="49" charset="-128"/>
-                <a:cs typeface="Courier New" panose="02070309020205020404" pitchFamily="49" charset="0"/>
-              </a:rPr>
-              <a:t>    </a:t>
-            </a:r>
-            <a:r>
-              <a:rPr lang="en-US" altLang="ja-JP" sz="1200" dirty="0" smtClean="0">
-                <a:latin typeface="Courier New" panose="02070309020205020404" pitchFamily="49" charset="0"/>
-                <a:ea typeface="ＭＳ ゴシック" pitchFamily="49" charset="-128"/>
-                <a:cs typeface="Courier New" panose="02070309020205020404" pitchFamily="49" charset="0"/>
-              </a:rPr>
-              <a:t>// </a:t>
+              <a:t>            // </a:t>
             </a:r>
             <a:r>
               <a:rPr lang="ja-JP" altLang="en-US" sz="1200" dirty="0" smtClean="0">
@@ -16123,15 +15792,7 @@
                 <a:ea typeface="ＭＳ ゴシック" pitchFamily="49" charset="-128"/>
                 <a:cs typeface="Courier New" panose="02070309020205020404" pitchFamily="49" charset="0"/>
               </a:rPr>
-              <a:t>        </a:t>
-            </a:r>
-            <a:r>
-              <a:rPr lang="ja-JP" altLang="en-US" sz="1200" dirty="0" smtClean="0">
-                <a:latin typeface="Courier New" panose="02070309020205020404" pitchFamily="49" charset="0"/>
-                <a:ea typeface="ＭＳ ゴシック" pitchFamily="49" charset="-128"/>
-                <a:cs typeface="Courier New" panose="02070309020205020404" pitchFamily="49" charset="0"/>
-              </a:rPr>
-              <a:t>    </a:t>
+              <a:t>            </a:t>
             </a:r>
             <a:r>
               <a:rPr lang="en-US" altLang="ja-JP" sz="1200" dirty="0" smtClean="0">
@@ -16178,21 +15839,7 @@
                 <a:latin typeface="Courier New" pitchFamily="49" charset="0"/>
                 <a:cs typeface="Courier New" pitchFamily="49" charset="0"/>
               </a:rPr>
-              <a:t>        </a:t>
-            </a:r>
-            <a:r>
-              <a:rPr lang="ja-JP" altLang="en-US" sz="1200" dirty="0" smtClean="0">
-                <a:latin typeface="Courier New" pitchFamily="49" charset="0"/>
-                <a:cs typeface="Courier New" pitchFamily="49" charset="0"/>
-              </a:rPr>
-              <a:t>    </a:t>
-            </a:r>
-            <a:r>
-              <a:rPr lang="ja-JP" altLang="en-US" sz="1200" dirty="0" smtClean="0">
-                <a:latin typeface="Courier New" pitchFamily="49" charset="0"/>
-                <a:cs typeface="Courier New" pitchFamily="49" charset="0"/>
-              </a:rPr>
-              <a:t>・・・省略</a:t>
+              <a:t>            ・・・省略</a:t>
             </a:r>
             <a:endParaRPr lang="en-US" altLang="ja-JP" sz="1200" dirty="0" smtClean="0">
               <a:latin typeface="Courier New" panose="02070309020205020404" pitchFamily="49" charset="0"/>
@@ -16207,15 +15854,7 @@
                 <a:ea typeface="ＭＳ Ｐゴシック" charset="-128"/>
                 <a:cs typeface="Courier New" panose="02070309020205020404" pitchFamily="49" charset="0"/>
               </a:rPr>
-              <a:t>        </a:t>
-            </a:r>
-            <a:r>
-              <a:rPr lang="en-US" altLang="ja-JP" sz="1200" dirty="0" smtClean="0">
-                <a:latin typeface="Courier New" panose="02070309020205020404" pitchFamily="49" charset="0"/>
-                <a:ea typeface="ＭＳ Ｐゴシック" charset="-128"/>
-                <a:cs typeface="Courier New" panose="02070309020205020404" pitchFamily="49" charset="0"/>
-              </a:rPr>
-              <a:t>}</a:t>
+              <a:t>        }</a:t>
             </a:r>
             <a:endParaRPr kumimoji="1" lang="en-US" altLang="ja-JP" sz="1200" b="0" dirty="0" smtClean="0">
               <a:latin typeface="Courier New" panose="02070309020205020404" pitchFamily="49" charset="0"/>
@@ -23728,7 +23367,7 @@
           <a:graphicData uri="http://schemas.openxmlformats.org/presentationml/2006/ole">
             <mc:AlternateContent xmlns:mc="http://schemas.openxmlformats.org/markup-compatibility/2006">
               <mc:Choice xmlns:v="urn:schemas-microsoft-com:vml" Requires="v">
-                <p:oleObj spid="_x0000_s5172" name="Visio" r:id="rId3" imgW="1028666" imgH="1219320" progId="Visio.Drawing.11">
+                <p:oleObj spid="_x0000_s5183" name="Visio" r:id="rId3" imgW="1028666" imgH="1219320" progId="Visio.Drawing.11">
                   <p:embed/>
                 </p:oleObj>
               </mc:Choice>
@@ -27919,18 +27558,11 @@
           <a:p>
             <a:pPr eaLnBrk="1" hangingPunct="1"/>
             <a:r>
-              <a:rPr lang="ja-JP" altLang="en-US" sz="1000" b="0" dirty="0">
-                <a:latin typeface="Arial" charset="0"/>
-                <a:ea typeface="ＭＳ Ｐゴシック" charset="-128"/>
-              </a:rPr>
-              <a:t>③</a:t>
-            </a:r>
-            <a:r>
               <a:rPr kumimoji="1" lang="ja-JP" altLang="en-US" sz="1000" b="0" dirty="0" smtClean="0">
                 <a:latin typeface="Arial" charset="0"/>
                 <a:ea typeface="ＭＳ Ｐゴシック" charset="-128"/>
               </a:rPr>
-              <a:t>空き</a:t>
+              <a:t>④空き</a:t>
             </a:r>
             <a:r>
               <a:rPr kumimoji="1" lang="ja-JP" altLang="en-US" sz="1000" b="0" dirty="0">
@@ -28475,13 +28107,14 @@
         </p:nvSpPr>
         <p:spPr bwMode="auto">
           <a:xfrm>
-            <a:off x="4856905" y="2394924"/>
-            <a:ext cx="104897" cy="2743415"/>
+            <a:off x="4752722" y="2410837"/>
+            <a:ext cx="246907" cy="2178153"/>
           </a:xfrm>
-          <a:prstGeom prst="upArrow">
+          <a:prstGeom prst="bentUpArrow">
             <a:avLst>
-              <a:gd name="adj1" fmla="val 50000"/>
-              <a:gd name="adj2" fmla="val 272024"/>
+              <a:gd name="adj1" fmla="val 25000"/>
+              <a:gd name="adj2" fmla="val 27957"/>
+              <a:gd name="adj3" fmla="val 50000"/>
             </a:avLst>
           </a:prstGeom>
           <a:solidFill>
@@ -28792,7 +28425,7 @@
                 <a:latin typeface="Arial" charset="0"/>
                 <a:ea typeface="ＭＳ Ｐゴシック" charset="-128"/>
               </a:rPr>
-              <a:t>④</a:t>
+              <a:t>③</a:t>
             </a:r>
             <a:r>
               <a:rPr kumimoji="1" lang="ja-JP" altLang="en-US" sz="1000" b="0" dirty="0" smtClean="0">
@@ -30280,12 +29913,12 @@
         <p:spPr bwMode="auto">
           <a:xfrm>
             <a:off x="5042156" y="2410837"/>
-            <a:ext cx="104897" cy="2743415"/>
+            <a:ext cx="121567" cy="2743415"/>
           </a:xfrm>
           <a:prstGeom prst="upArrow">
             <a:avLst>
               <a:gd name="adj1" fmla="val 50000"/>
-              <a:gd name="adj2" fmla="val 272024"/>
+              <a:gd name="adj2" fmla="val 103798"/>
             </a:avLst>
           </a:prstGeom>
           <a:solidFill>
@@ -30437,8 +30070,8 @@
         </p:nvSpPr>
         <p:spPr bwMode="auto">
           <a:xfrm flipV="1">
-            <a:off x="4890804" y="3072134"/>
-            <a:ext cx="960182" cy="419100"/>
+            <a:off x="4950344" y="3072134"/>
+            <a:ext cx="900641" cy="409314"/>
           </a:xfrm>
           <a:prstGeom prst="line">
             <a:avLst/>
@@ -31187,6 +30820,164 @@
       </p:grpSpPr>
       <p:sp>
         <p:nvSpPr>
+          <p:cNvPr id="57" name="AutoShape 68"/>
+          <p:cNvSpPr>
+            <a:spLocks noChangeArrowheads="1"/>
+          </p:cNvSpPr>
+          <p:nvPr/>
+        </p:nvSpPr>
+        <p:spPr bwMode="auto">
+          <a:xfrm>
+            <a:off x="6469096" y="3408076"/>
+            <a:ext cx="182582" cy="1895448"/>
+          </a:xfrm>
+          <a:prstGeom prst="upArrow">
+            <a:avLst>
+              <a:gd name="adj1" fmla="val 50000"/>
+              <a:gd name="adj2" fmla="val 181878"/>
+            </a:avLst>
+          </a:prstGeom>
+          <a:solidFill>
+            <a:schemeClr val="bg1"/>
+          </a:solidFill>
+          <a:ln w="9525">
+            <a:solidFill>
+              <a:schemeClr val="tx1"/>
+            </a:solidFill>
+            <a:miter lim="800000"/>
+            <a:headEnd/>
+            <a:tailEnd/>
+          </a:ln>
+          <a:effectLst/>
+          <a:extLst>
+            <a:ext uri="{AF507438-7753-43E0-B8FC-AC1667EBCBE1}">
+              <a14:hiddenEffects xmlns:a14="http://schemas.microsoft.com/office/drawing/2010/main">
+                <a:effectLst>
+                  <a:outerShdw dist="35921" dir="2700000" algn="ctr" rotWithShape="0">
+                    <a:schemeClr val="bg2"/>
+                  </a:outerShdw>
+                </a:effectLst>
+              </a14:hiddenEffects>
+            </a:ext>
+          </a:extLst>
+        </p:spPr>
+        <p:txBody>
+          <a:bodyPr wrap="none" lIns="90000" tIns="46800" rIns="90000" bIns="46800" anchor="ctr"/>
+          <a:lstStyle>
+            <a:lvl1pPr eaLnBrk="0" hangingPunct="0">
+              <a:defRPr sz="900" b="1">
+                <a:solidFill>
+                  <a:schemeClr val="tx1"/>
+                </a:solidFill>
+                <a:latin typeface="Times New Roman" pitchFamily="18" charset="0"/>
+                <a:ea typeface="ＭＳ Ｐ明朝" charset="-128"/>
+              </a:defRPr>
+            </a:lvl1pPr>
+            <a:lvl2pPr marL="742950" indent="-285750" eaLnBrk="0" hangingPunct="0">
+              <a:defRPr sz="900" b="1">
+                <a:solidFill>
+                  <a:schemeClr val="tx1"/>
+                </a:solidFill>
+                <a:latin typeface="Times New Roman" pitchFamily="18" charset="0"/>
+                <a:ea typeface="ＭＳ Ｐ明朝" charset="-128"/>
+              </a:defRPr>
+            </a:lvl2pPr>
+            <a:lvl3pPr marL="1143000" indent="-228600" eaLnBrk="0" hangingPunct="0">
+              <a:defRPr sz="900" b="1">
+                <a:solidFill>
+                  <a:schemeClr val="tx1"/>
+                </a:solidFill>
+                <a:latin typeface="Times New Roman" pitchFamily="18" charset="0"/>
+                <a:ea typeface="ＭＳ Ｐ明朝" charset="-128"/>
+              </a:defRPr>
+            </a:lvl3pPr>
+            <a:lvl4pPr marL="1600200" indent="-228600" eaLnBrk="0" hangingPunct="0">
+              <a:defRPr sz="900" b="1">
+                <a:solidFill>
+                  <a:schemeClr val="tx1"/>
+                </a:solidFill>
+                <a:latin typeface="Times New Roman" pitchFamily="18" charset="0"/>
+                <a:ea typeface="ＭＳ Ｐ明朝" charset="-128"/>
+              </a:defRPr>
+            </a:lvl4pPr>
+            <a:lvl5pPr marL="2057400" indent="-228600" eaLnBrk="0" hangingPunct="0">
+              <a:defRPr sz="900" b="1">
+                <a:solidFill>
+                  <a:schemeClr val="tx1"/>
+                </a:solidFill>
+                <a:latin typeface="Times New Roman" pitchFamily="18" charset="0"/>
+                <a:ea typeface="ＭＳ Ｐ明朝" charset="-128"/>
+              </a:defRPr>
+            </a:lvl5pPr>
+            <a:lvl6pPr marL="2514600" indent="-228600" algn="ctr" eaLnBrk="0" fontAlgn="base" hangingPunct="0">
+              <a:spcBef>
+                <a:spcPct val="0"/>
+              </a:spcBef>
+              <a:spcAft>
+                <a:spcPct val="0"/>
+              </a:spcAft>
+              <a:defRPr sz="900" b="1">
+                <a:solidFill>
+                  <a:schemeClr val="tx1"/>
+                </a:solidFill>
+                <a:latin typeface="Times New Roman" pitchFamily="18" charset="0"/>
+                <a:ea typeface="ＭＳ Ｐ明朝" charset="-128"/>
+              </a:defRPr>
+            </a:lvl6pPr>
+            <a:lvl7pPr marL="2971800" indent="-228600" algn="ctr" eaLnBrk="0" fontAlgn="base" hangingPunct="0">
+              <a:spcBef>
+                <a:spcPct val="0"/>
+              </a:spcBef>
+              <a:spcAft>
+                <a:spcPct val="0"/>
+              </a:spcAft>
+              <a:defRPr sz="900" b="1">
+                <a:solidFill>
+                  <a:schemeClr val="tx1"/>
+                </a:solidFill>
+                <a:latin typeface="Times New Roman" pitchFamily="18" charset="0"/>
+                <a:ea typeface="ＭＳ Ｐ明朝" charset="-128"/>
+              </a:defRPr>
+            </a:lvl7pPr>
+            <a:lvl8pPr marL="3429000" indent="-228600" algn="ctr" eaLnBrk="0" fontAlgn="base" hangingPunct="0">
+              <a:spcBef>
+                <a:spcPct val="0"/>
+              </a:spcBef>
+              <a:spcAft>
+                <a:spcPct val="0"/>
+              </a:spcAft>
+              <a:defRPr sz="900" b="1">
+                <a:solidFill>
+                  <a:schemeClr val="tx1"/>
+                </a:solidFill>
+                <a:latin typeface="Times New Roman" pitchFamily="18" charset="0"/>
+                <a:ea typeface="ＭＳ Ｐ明朝" charset="-128"/>
+              </a:defRPr>
+            </a:lvl8pPr>
+            <a:lvl9pPr marL="3886200" indent="-228600" algn="ctr" eaLnBrk="0" fontAlgn="base" hangingPunct="0">
+              <a:spcBef>
+                <a:spcPct val="0"/>
+              </a:spcBef>
+              <a:spcAft>
+                <a:spcPct val="0"/>
+              </a:spcAft>
+              <a:defRPr sz="900" b="1">
+                <a:solidFill>
+                  <a:schemeClr val="tx1"/>
+                </a:solidFill>
+                <a:latin typeface="Times New Roman" pitchFamily="18" charset="0"/>
+                <a:ea typeface="ＭＳ Ｐ明朝" charset="-128"/>
+              </a:defRPr>
+            </a:lvl9pPr>
+          </a:lstStyle>
+          <a:p>
+            <a:pPr eaLnBrk="1" hangingPunct="1"/>
+            <a:endParaRPr lang="ja-JP" altLang="en-US" dirty="0"/>
+          </a:p>
+        </p:txBody>
+      </p:sp>
+      <p:sp>
+        <p:nvSpPr>
           <p:cNvPr id="44035" name="タイトル 1"/>
           <p:cNvSpPr>
             <a:spLocks noGrp="1"/>
@@ -32435,7 +32226,7 @@
             <a:graphicData uri="http://schemas.openxmlformats.org/presentationml/2006/ole">
               <mc:AlternateContent xmlns:mc="http://schemas.openxmlformats.org/markup-compatibility/2006">
                 <mc:Choice xmlns:v="urn:schemas-microsoft-com:vml" Requires="v">
-                  <p:oleObj spid="_x0000_s3176" name="Visio" r:id="rId3" imgW="1046765" imgH="1232170" progId="">
+                  <p:oleObj spid="_x0000_s3187" name="Visio" r:id="rId3" imgW="1046765" imgH="1232170" progId="">
                     <p:embed/>
                   </p:oleObj>
                 </mc:Choice>
@@ -33467,164 +33258,6 @@
       </p:sp>
       <p:sp>
         <p:nvSpPr>
-          <p:cNvPr id="395" name="AutoShape 68"/>
-          <p:cNvSpPr>
-            <a:spLocks noChangeArrowheads="1"/>
-          </p:cNvSpPr>
-          <p:nvPr/>
-        </p:nvSpPr>
-        <p:spPr bwMode="auto">
-          <a:xfrm>
-            <a:off x="6682588" y="3107603"/>
-            <a:ext cx="104897" cy="1113932"/>
-          </a:xfrm>
-          <a:prstGeom prst="upArrow">
-            <a:avLst>
-              <a:gd name="adj1" fmla="val 50000"/>
-              <a:gd name="adj2" fmla="val 272024"/>
-            </a:avLst>
-          </a:prstGeom>
-          <a:solidFill>
-            <a:schemeClr val="bg1"/>
-          </a:solidFill>
-          <a:ln w="9525">
-            <a:solidFill>
-              <a:schemeClr val="tx1"/>
-            </a:solidFill>
-            <a:miter lim="800000"/>
-            <a:headEnd/>
-            <a:tailEnd/>
-          </a:ln>
-          <a:effectLst/>
-          <a:extLst>
-            <a:ext uri="{AF507438-7753-43E0-B8FC-AC1667EBCBE1}">
-              <a14:hiddenEffects xmlns:a14="http://schemas.microsoft.com/office/drawing/2010/main">
-                <a:effectLst>
-                  <a:outerShdw dist="35921" dir="2700000" algn="ctr" rotWithShape="0">
-                    <a:schemeClr val="bg2"/>
-                  </a:outerShdw>
-                </a:effectLst>
-              </a14:hiddenEffects>
-            </a:ext>
-          </a:extLst>
-        </p:spPr>
-        <p:txBody>
-          <a:bodyPr wrap="none" lIns="90000" tIns="46800" rIns="90000" bIns="46800" anchor="ctr"/>
-          <a:lstStyle>
-            <a:lvl1pPr eaLnBrk="0" hangingPunct="0">
-              <a:defRPr sz="900" b="1">
-                <a:solidFill>
-                  <a:schemeClr val="tx1"/>
-                </a:solidFill>
-                <a:latin typeface="Times New Roman" pitchFamily="18" charset="0"/>
-                <a:ea typeface="ＭＳ Ｐ明朝" charset="-128"/>
-              </a:defRPr>
-            </a:lvl1pPr>
-            <a:lvl2pPr marL="742950" indent="-285750" eaLnBrk="0" hangingPunct="0">
-              <a:defRPr sz="900" b="1">
-                <a:solidFill>
-                  <a:schemeClr val="tx1"/>
-                </a:solidFill>
-                <a:latin typeface="Times New Roman" pitchFamily="18" charset="0"/>
-                <a:ea typeface="ＭＳ Ｐ明朝" charset="-128"/>
-              </a:defRPr>
-            </a:lvl2pPr>
-            <a:lvl3pPr marL="1143000" indent="-228600" eaLnBrk="0" hangingPunct="0">
-              <a:defRPr sz="900" b="1">
-                <a:solidFill>
-                  <a:schemeClr val="tx1"/>
-                </a:solidFill>
-                <a:latin typeface="Times New Roman" pitchFamily="18" charset="0"/>
-                <a:ea typeface="ＭＳ Ｐ明朝" charset="-128"/>
-              </a:defRPr>
-            </a:lvl3pPr>
-            <a:lvl4pPr marL="1600200" indent="-228600" eaLnBrk="0" hangingPunct="0">
-              <a:defRPr sz="900" b="1">
-                <a:solidFill>
-                  <a:schemeClr val="tx1"/>
-                </a:solidFill>
-                <a:latin typeface="Times New Roman" pitchFamily="18" charset="0"/>
-                <a:ea typeface="ＭＳ Ｐ明朝" charset="-128"/>
-              </a:defRPr>
-            </a:lvl4pPr>
-            <a:lvl5pPr marL="2057400" indent="-228600" eaLnBrk="0" hangingPunct="0">
-              <a:defRPr sz="900" b="1">
-                <a:solidFill>
-                  <a:schemeClr val="tx1"/>
-                </a:solidFill>
-                <a:latin typeface="Times New Roman" pitchFamily="18" charset="0"/>
-                <a:ea typeface="ＭＳ Ｐ明朝" charset="-128"/>
-              </a:defRPr>
-            </a:lvl5pPr>
-            <a:lvl6pPr marL="2514600" indent="-228600" algn="ctr" eaLnBrk="0" fontAlgn="base" hangingPunct="0">
-              <a:spcBef>
-                <a:spcPct val="0"/>
-              </a:spcBef>
-              <a:spcAft>
-                <a:spcPct val="0"/>
-              </a:spcAft>
-              <a:defRPr sz="900" b="1">
-                <a:solidFill>
-                  <a:schemeClr val="tx1"/>
-                </a:solidFill>
-                <a:latin typeface="Times New Roman" pitchFamily="18" charset="0"/>
-                <a:ea typeface="ＭＳ Ｐ明朝" charset="-128"/>
-              </a:defRPr>
-            </a:lvl6pPr>
-            <a:lvl7pPr marL="2971800" indent="-228600" algn="ctr" eaLnBrk="0" fontAlgn="base" hangingPunct="0">
-              <a:spcBef>
-                <a:spcPct val="0"/>
-              </a:spcBef>
-              <a:spcAft>
-                <a:spcPct val="0"/>
-              </a:spcAft>
-              <a:defRPr sz="900" b="1">
-                <a:solidFill>
-                  <a:schemeClr val="tx1"/>
-                </a:solidFill>
-                <a:latin typeface="Times New Roman" pitchFamily="18" charset="0"/>
-                <a:ea typeface="ＭＳ Ｐ明朝" charset="-128"/>
-              </a:defRPr>
-            </a:lvl7pPr>
-            <a:lvl8pPr marL="3429000" indent="-228600" algn="ctr" eaLnBrk="0" fontAlgn="base" hangingPunct="0">
-              <a:spcBef>
-                <a:spcPct val="0"/>
-              </a:spcBef>
-              <a:spcAft>
-                <a:spcPct val="0"/>
-              </a:spcAft>
-              <a:defRPr sz="900" b="1">
-                <a:solidFill>
-                  <a:schemeClr val="tx1"/>
-                </a:solidFill>
-                <a:latin typeface="Times New Roman" pitchFamily="18" charset="0"/>
-                <a:ea typeface="ＭＳ Ｐ明朝" charset="-128"/>
-              </a:defRPr>
-            </a:lvl8pPr>
-            <a:lvl9pPr marL="3886200" indent="-228600" algn="ctr" eaLnBrk="0" fontAlgn="base" hangingPunct="0">
-              <a:spcBef>
-                <a:spcPct val="0"/>
-              </a:spcBef>
-              <a:spcAft>
-                <a:spcPct val="0"/>
-              </a:spcAft>
-              <a:defRPr sz="900" b="1">
-                <a:solidFill>
-                  <a:schemeClr val="tx1"/>
-                </a:solidFill>
-                <a:latin typeface="Times New Roman" pitchFamily="18" charset="0"/>
-                <a:ea typeface="ＭＳ Ｐ明朝" charset="-128"/>
-              </a:defRPr>
-            </a:lvl9pPr>
-          </a:lstStyle>
-          <a:p>
-            <a:pPr eaLnBrk="1" hangingPunct="1"/>
-            <a:endParaRPr lang="ja-JP" altLang="en-US" dirty="0"/>
-          </a:p>
-        </p:txBody>
-      </p:sp>
-      <p:sp>
-        <p:nvSpPr>
           <p:cNvPr id="401" name="AutoShape 68"/>
           <p:cNvSpPr>
             <a:spLocks noChangeArrowheads="1"/>
@@ -33633,13 +33266,13 @@
         </p:nvSpPr>
         <p:spPr bwMode="auto">
           <a:xfrm>
-            <a:off x="6867839" y="3123515"/>
-            <a:ext cx="99465" cy="1098019"/>
+            <a:off x="6810418" y="3394418"/>
+            <a:ext cx="148032" cy="897456"/>
           </a:xfrm>
           <a:prstGeom prst="upArrow">
             <a:avLst>
               <a:gd name="adj1" fmla="val 50000"/>
-              <a:gd name="adj2" fmla="val 272024"/>
+              <a:gd name="adj2" fmla="val 181878"/>
             </a:avLst>
           </a:prstGeom>
           <a:solidFill>
@@ -34828,8 +34461,8 @@
         </p:nvSpPr>
         <p:spPr bwMode="auto">
           <a:xfrm flipV="1">
-            <a:off x="6746793" y="3518309"/>
-            <a:ext cx="726487" cy="183826"/>
+            <a:off x="6668437" y="3602446"/>
+            <a:ext cx="816109" cy="215612"/>
           </a:xfrm>
           <a:prstGeom prst="line">
             <a:avLst/>
@@ -35103,57 +34736,6 @@
               <a:latin typeface="Arial" charset="0"/>
               <a:ea typeface="ＭＳ Ｐゴシック" charset="-128"/>
             </a:endParaRPr>
-          </a:p>
-        </p:txBody>
-      </p:sp>
-      <p:sp>
-        <p:nvSpPr>
-          <p:cNvPr id="416" name="Line 73"/>
-          <p:cNvSpPr>
-            <a:spLocks noChangeShapeType="1"/>
-          </p:cNvSpPr>
-          <p:nvPr/>
-        </p:nvSpPr>
-        <p:spPr bwMode="auto">
-          <a:xfrm flipV="1">
-            <a:off x="6929375" y="3851955"/>
-            <a:ext cx="726487" cy="183826"/>
-          </a:xfrm>
-          <a:prstGeom prst="line">
-            <a:avLst/>
-          </a:prstGeom>
-          <a:noFill/>
-          <a:ln w="9525">
-            <a:solidFill>
-              <a:schemeClr val="tx1"/>
-            </a:solidFill>
-            <a:round/>
-            <a:headEnd/>
-            <a:tailEnd/>
-          </a:ln>
-          <a:effectLst/>
-          <a:extLst>
-            <a:ext uri="{909E8E84-426E-40DD-AFC4-6F175D3DCCD1}">
-              <a14:hiddenFill xmlns:a14="http://schemas.microsoft.com/office/drawing/2010/main">
-                <a:noFill/>
-              </a14:hiddenFill>
-            </a:ext>
-            <a:ext uri="{AF507438-7753-43E0-B8FC-AC1667EBCBE1}">
-              <a14:hiddenEffects xmlns:a14="http://schemas.microsoft.com/office/drawing/2010/main">
-                <a:effectLst>
-                  <a:outerShdw dist="35921" dir="2700000" algn="ctr" rotWithShape="0">
-                    <a:schemeClr val="bg2"/>
-                  </a:outerShdw>
-                </a:effectLst>
-              </a14:hiddenEffects>
-            </a:ext>
-          </a:extLst>
-        </p:spPr>
-        <p:txBody>
-          <a:bodyPr wrap="none" lIns="90000" tIns="46800" rIns="90000" bIns="46800" anchor="ctr"/>
-          <a:lstStyle/>
-          <a:p>
-            <a:endParaRPr lang="ja-JP" altLang="en-US" dirty="0"/>
           </a:p>
         </p:txBody>
       </p:sp>
@@ -35695,6 +35277,57 @@
               <a:latin typeface="Arial" charset="0"/>
               <a:ea typeface="ＭＳ Ｐゴシック" charset="-128"/>
             </a:endParaRPr>
+          </a:p>
+        </p:txBody>
+      </p:sp>
+      <p:sp>
+        <p:nvSpPr>
+          <p:cNvPr id="52" name="Line 73"/>
+          <p:cNvSpPr>
+            <a:spLocks noChangeShapeType="1"/>
+          </p:cNvSpPr>
+          <p:nvPr/>
+        </p:nvSpPr>
+        <p:spPr bwMode="auto">
+          <a:xfrm flipV="1">
+            <a:off x="6925511" y="3857319"/>
+            <a:ext cx="709899" cy="187552"/>
+          </a:xfrm>
+          <a:prstGeom prst="line">
+            <a:avLst/>
+          </a:prstGeom>
+          <a:noFill/>
+          <a:ln w="9525">
+            <a:solidFill>
+              <a:schemeClr val="tx1"/>
+            </a:solidFill>
+            <a:round/>
+            <a:headEnd/>
+            <a:tailEnd/>
+          </a:ln>
+          <a:effectLst/>
+          <a:extLst>
+            <a:ext uri="{909E8E84-426E-40DD-AFC4-6F175D3DCCD1}">
+              <a14:hiddenFill xmlns:a14="http://schemas.microsoft.com/office/drawing/2010/main">
+                <a:noFill/>
+              </a14:hiddenFill>
+            </a:ext>
+            <a:ext uri="{AF507438-7753-43E0-B8FC-AC1667EBCBE1}">
+              <a14:hiddenEffects xmlns:a14="http://schemas.microsoft.com/office/drawing/2010/main">
+                <a:effectLst>
+                  <a:outerShdw dist="35921" dir="2700000" algn="ctr" rotWithShape="0">
+                    <a:schemeClr val="bg2"/>
+                  </a:outerShdw>
+                </a:effectLst>
+              </a14:hiddenEffects>
+            </a:ext>
+          </a:extLst>
+        </p:spPr>
+        <p:txBody>
+          <a:bodyPr wrap="none" lIns="90000" tIns="46800" rIns="90000" bIns="46800" anchor="ctr"/>
+          <a:lstStyle/>
+          <a:p>
+            <a:endParaRPr lang="ja-JP" altLang="en-US" dirty="0"/>
           </a:p>
         </p:txBody>
       </p:sp>
@@ -36918,15 +36551,7 @@
                 <a:ea typeface="ＭＳ Ｐゴシック" charset="-128"/>
                 <a:cs typeface="Courier New" panose="02070309020205020404" pitchFamily="49" charset="0"/>
               </a:rPr>
-              <a:t>        try </a:t>
-            </a:r>
-            <a:r>
-              <a:rPr lang="en-US" altLang="ja-JP" sz="1100" dirty="0" smtClean="0">
-                <a:latin typeface="Courier New" panose="02070309020205020404" pitchFamily="49" charset="0"/>
-                <a:ea typeface="ＭＳ Ｐゴシック" charset="-128"/>
-                <a:cs typeface="Courier New" panose="02070309020205020404" pitchFamily="49" charset="0"/>
-              </a:rPr>
-              <a:t>{</a:t>
+              <a:t>        try {</a:t>
             </a:r>
           </a:p>
           <a:p>
@@ -37164,21 +36789,7 @@
                 <a:latin typeface="Courier New" pitchFamily="49" charset="0"/>
                 <a:cs typeface="Courier New" pitchFamily="49" charset="0"/>
               </a:rPr>
-              <a:t>    </a:t>
-            </a:r>
-            <a:r>
-              <a:rPr lang="ja-JP" altLang="en-US" sz="1100" dirty="0" smtClean="0">
-                <a:latin typeface="Courier New" pitchFamily="49" charset="0"/>
-                <a:cs typeface="Courier New" pitchFamily="49" charset="0"/>
-              </a:rPr>
-              <a:t>    ・</a:t>
-            </a:r>
-            <a:r>
-              <a:rPr lang="ja-JP" altLang="en-US" sz="1100" dirty="0" smtClean="0">
-                <a:latin typeface="Courier New" pitchFamily="49" charset="0"/>
-                <a:cs typeface="Courier New" pitchFamily="49" charset="0"/>
-              </a:rPr>
-              <a:t>・・省略</a:t>
+              <a:t>        ・・・省略</a:t>
             </a:r>
             <a:r>
               <a:rPr lang="en-US" altLang="ja-JP" sz="1100" dirty="0" smtClean="0">
@@ -37222,7 +36833,15 @@
                 <a:ea typeface="ＭＳ Ｐゴシック" charset="-128"/>
                 <a:cs typeface="Courier New" panose="02070309020205020404" pitchFamily="49" charset="0"/>
               </a:rPr>
-              <a:t>                   </a:t>
+              <a:t>                    </a:t>
+            </a:r>
+            <a:r>
+              <a:rPr lang="en-US" altLang="ja-JP" sz="1100" dirty="0" err="1" smtClean="0">
+                <a:latin typeface="Courier New" panose="02070309020205020404" pitchFamily="49" charset="0"/>
+                <a:ea typeface="ＭＳ Ｐゴシック" charset="-128"/>
+                <a:cs typeface="Courier New" panose="02070309020205020404" pitchFamily="49" charset="0"/>
+              </a:rPr>
+              <a:t>BatchUtil.commitTransaction</a:t>
             </a:r>
             <a:r>
               <a:rPr lang="en-US" altLang="ja-JP" sz="1100" dirty="0" smtClean="0">
@@ -37230,57 +36849,17 @@
                 <a:ea typeface="ＭＳ Ｐゴシック" charset="-128"/>
                 <a:cs typeface="Courier New" panose="02070309020205020404" pitchFamily="49" charset="0"/>
               </a:rPr>
-              <a:t> </a:t>
-            </a:r>
-            <a:r>
-              <a:rPr lang="en-US" altLang="ja-JP" sz="1100" dirty="0" err="1" smtClean="0">
-                <a:latin typeface="Courier New" panose="02070309020205020404" pitchFamily="49" charset="0"/>
-                <a:ea typeface="ＭＳ Ｐゴシック" charset="-128"/>
-                <a:cs typeface="Courier New" panose="02070309020205020404" pitchFamily="49" charset="0"/>
-              </a:rPr>
-              <a:t>BatchUtil.commitTransaction</a:t>
-            </a:r>
+              <a:t>(transactionManager, stat);</a:t>
+            </a:r>
+          </a:p>
+          <a:p>
             <a:r>
               <a:rPr lang="en-US" altLang="ja-JP" sz="1100" dirty="0" smtClean="0">
                 <a:latin typeface="Courier New" panose="02070309020205020404" pitchFamily="49" charset="0"/>
                 <a:ea typeface="ＭＳ Ｐゴシック" charset="-128"/>
                 <a:cs typeface="Courier New" panose="02070309020205020404" pitchFamily="49" charset="0"/>
               </a:rPr>
-              <a:t>(transactionManager</a:t>
-            </a:r>
-            <a:r>
-              <a:rPr lang="en-US" altLang="ja-JP" sz="1100" dirty="0" smtClean="0">
-                <a:latin typeface="Courier New" panose="02070309020205020404" pitchFamily="49" charset="0"/>
-                <a:ea typeface="ＭＳ Ｐゴシック" charset="-128"/>
-                <a:cs typeface="Courier New" panose="02070309020205020404" pitchFamily="49" charset="0"/>
-              </a:rPr>
-              <a:t>, stat);</a:t>
-            </a:r>
-          </a:p>
-          <a:p>
-            <a:r>
-              <a:rPr lang="en-US" altLang="ja-JP" sz="1100" dirty="0" smtClean="0">
-                <a:latin typeface="Courier New" panose="02070309020205020404" pitchFamily="49" charset="0"/>
-                <a:ea typeface="ＭＳ Ｐゴシック" charset="-128"/>
-                <a:cs typeface="Courier New" panose="02070309020205020404" pitchFamily="49" charset="0"/>
-              </a:rPr>
-              <a:t>                   </a:t>
-            </a:r>
-            <a:r>
-              <a:rPr lang="en-US" altLang="ja-JP" sz="1100" dirty="0" smtClean="0">
-                <a:latin typeface="Courier New" panose="02070309020205020404" pitchFamily="49" charset="0"/>
-                <a:ea typeface="ＭＳ Ｐゴシック" charset="-128"/>
-                <a:cs typeface="Courier New" panose="02070309020205020404" pitchFamily="49" charset="0"/>
-              </a:rPr>
-              <a:t> stat </a:t>
-            </a:r>
-            <a:r>
-              <a:rPr lang="en-US" altLang="ja-JP" sz="1100" dirty="0" smtClean="0">
-                <a:latin typeface="Courier New" panose="02070309020205020404" pitchFamily="49" charset="0"/>
-                <a:ea typeface="ＭＳ Ｐゴシック" charset="-128"/>
-                <a:cs typeface="Courier New" panose="02070309020205020404" pitchFamily="49" charset="0"/>
-              </a:rPr>
-              <a:t>= </a:t>
+              <a:t>                    stat = </a:t>
             </a:r>
             <a:r>
               <a:rPr lang="en-US" altLang="ja-JP" sz="1100" dirty="0" err="1" smtClean="0">
@@ -37491,15 +37070,7 @@
                 <a:ea typeface="ＭＳ Ｐゴシック" charset="-128"/>
                 <a:cs typeface="Courier New" panose="02070309020205020404" pitchFamily="49" charset="0"/>
               </a:rPr>
-              <a:t>・・</a:t>
-            </a:r>
-            <a:r>
-              <a:rPr lang="ja-JP" altLang="en-US" sz="1100" dirty="0" smtClean="0">
-                <a:latin typeface="Courier New" panose="02070309020205020404" pitchFamily="49" charset="0"/>
-                <a:ea typeface="ＭＳ Ｐゴシック" charset="-128"/>
-                <a:cs typeface="Courier New" panose="02070309020205020404" pitchFamily="49" charset="0"/>
-              </a:rPr>
-              <a:t>・</a:t>
+              <a:t>・・・</a:t>
             </a:r>
             <a:endParaRPr lang="en-US" altLang="ja-JP" sz="1100" dirty="0" smtClean="0">
               <a:latin typeface="Courier New" panose="02070309020205020404" pitchFamily="49" charset="0"/>

</xml_diff>

<commit_message>
modify the version name #181
</commit_message>
<xml_diff>
--- a/architecture/TERASOLUNA Batch Framework for Java Version 3.x 説明資料.pptx
+++ b/architecture/TERASOLUNA Batch Framework for Java Version 3.x 説明資料.pptx
@@ -42,15 +42,15 @@
       <p:regular r:id="rId23"/>
     </p:embeddedFont>
     <p:embeddedFont>
-      <p:font typeface="HGP創英角ｺﾞｼｯｸUB" panose="020B0900000000000000" pitchFamily="50" charset="-128"/>
+      <p:font typeface="Calibri" panose="020F0502020204030204" pitchFamily="34" charset="0"/>
       <p:regular r:id="rId24"/>
+      <p:bold r:id="rId25"/>
+      <p:italic r:id="rId26"/>
+      <p:boldItalic r:id="rId27"/>
     </p:embeddedFont>
     <p:embeddedFont>
-      <p:font typeface="Calibri" panose="020F0502020204030204" pitchFamily="34" charset="0"/>
-      <p:regular r:id="rId25"/>
-      <p:bold r:id="rId26"/>
-      <p:italic r:id="rId27"/>
-      <p:boldItalic r:id="rId28"/>
+      <p:font typeface="HGP創英角ｺﾞｼｯｸUB" panose="020B0900000000000000" pitchFamily="50" charset="-128"/>
+      <p:regular r:id="rId28"/>
     </p:embeddedFont>
   </p:embeddedFontLst>
   <p:defaultTextStyle>
@@ -269,7 +269,7 @@
             <a:fld id="{BB253DA6-D017-4D4C-A6F0-8D6175E3AD1A}" type="datetime1">
               <a:rPr lang="ja-JP" altLang="en-US" smtClean="0"/>
               <a:pPr/>
-              <a:t>2016/2/23</a:t>
+              <a:t>2016/7/4</a:t>
             </a:fld>
             <a:endParaRPr lang="en-US"/>
           </a:p>
@@ -437,7 +437,7 @@
             <a:fld id="{971E307F-04E7-4216-B3F9-BBF58478B729}" type="datetime1">
               <a:rPr lang="ja-JP" altLang="en-US" smtClean="0"/>
               <a:pPr/>
-              <a:t>2016/2/23</a:t>
+              <a:t>2016/7/4</a:t>
             </a:fld>
             <a:endParaRPr lang="en-US"/>
           </a:p>
@@ -795,7 +795,7 @@
             <a:fld id="{BB7B7D7C-7587-458D-9F40-96275B4E0BF8}" type="datetime1">
               <a:rPr lang="ja-JP" altLang="en-US" smtClean="0"/>
               <a:pPr/>
-              <a:t>2016/2/23</a:t>
+              <a:t>2016/7/4</a:t>
             </a:fld>
             <a:endParaRPr lang="en-US"/>
           </a:p>
@@ -1018,7 +1018,7 @@
             <a:fld id="{79DDA3DF-8EBA-4683-A96B-9C379AE68A32}" type="datetime1">
               <a:rPr lang="ja-JP" altLang="en-US" smtClean="0"/>
               <a:pPr/>
-              <a:t>2016/2/23</a:t>
+              <a:t>2016/7/4</a:t>
             </a:fld>
             <a:endParaRPr lang="en-US"/>
           </a:p>
@@ -7949,11 +7949,15 @@
             </a:r>
             <a:r>
               <a:rPr lang="en-US" altLang="ja-JP" dirty="0" smtClean="0"/>
-              <a:t>3.6.0</a:t>
+              <a:t>3.6.1</a:t>
             </a:r>
             <a:r>
               <a:rPr lang="ja-JP" altLang="en-US" dirty="0" smtClean="0"/>
-              <a:t> 説明資料</a:t>
+              <a:t> </a:t>
+            </a:r>
+            <a:r>
+              <a:rPr lang="ja-JP" altLang="en-US" dirty="0" smtClean="0"/>
+              <a:t>説明資料</a:t>
             </a:r>
           </a:p>
         </p:txBody>
@@ -20269,11 +20273,15 @@
             </a:r>
             <a:r>
               <a:rPr kumimoji="1" lang="en-US" altLang="ja-JP" dirty="0" smtClean="0"/>
-              <a:t>3.6.0</a:t>
+              <a:t>3.6.1</a:t>
             </a:r>
             <a:r>
               <a:rPr kumimoji="1" lang="ja-JP" altLang="en-US" dirty="0" smtClean="0"/>
-              <a:t>アーキテクチャのコンセプト</a:t>
+              <a:t>アーキテクチャ</a:t>
+            </a:r>
+            <a:r>
+              <a:rPr kumimoji="1" lang="ja-JP" altLang="en-US" dirty="0" smtClean="0"/>
+              <a:t>のコンセプト</a:t>
             </a:r>
             <a:endParaRPr kumimoji="1" lang="ja-JP" altLang="en-US" dirty="0"/>
           </a:p>
@@ -23367,7 +23375,7 @@
           <a:graphicData uri="http://schemas.openxmlformats.org/presentationml/2006/ole">
             <mc:AlternateContent xmlns:mc="http://schemas.openxmlformats.org/markup-compatibility/2006">
               <mc:Choice xmlns:v="urn:schemas-microsoft-com:vml" Requires="v">
-                <p:oleObj spid="_x0000_s5183" name="Visio" r:id="rId3" imgW="1028666" imgH="1219320" progId="Visio.Drawing.11">
+                <p:oleObj spid="_x0000_s5185" name="Visio" r:id="rId3" imgW="1028666" imgH="1219320" progId="Visio.Drawing.11">
                   <p:embed/>
                 </p:oleObj>
               </mc:Choice>
@@ -32226,7 +32234,7 @@
             <a:graphicData uri="http://schemas.openxmlformats.org/presentationml/2006/ole">
               <mc:AlternateContent xmlns:mc="http://schemas.openxmlformats.org/markup-compatibility/2006">
                 <mc:Choice xmlns:v="urn:schemas-microsoft-com:vml" Requires="v">
-                  <p:oleObj spid="_x0000_s3187" name="Visio" r:id="rId3" imgW="1046765" imgH="1232170" progId="">
+                  <p:oleObj spid="_x0000_s3189" name="Visio" r:id="rId3" imgW="1046765" imgH="1232170" progId="">
                     <p:embed/>
                   </p:oleObj>
                 </mc:Choice>

</xml_diff>

<commit_message>
update framework version to 3.6.2, concatenating of pdf is yet #184 #185
</commit_message>
<xml_diff>
--- a/architecture/TERASOLUNA Batch Framework for Java Version 3.x 説明資料.pptx
+++ b/architecture/TERASOLUNA Batch Framework for Java Version 3.x 説明資料.pptx
@@ -38,7 +38,7 @@
       <p:bold r:id="rId22"/>
     </p:embeddedFont>
     <p:embeddedFont>
-      <p:font typeface="HGPｺﾞｼｯｸE" panose="020B0900000000000000" pitchFamily="50" charset="-128"/>
+      <p:font typeface="HGP創英角ｺﾞｼｯｸUB" panose="020B0900000000000000" pitchFamily="50" charset="-128"/>
       <p:regular r:id="rId23"/>
     </p:embeddedFont>
     <p:embeddedFont>
@@ -49,7 +49,7 @@
       <p:boldItalic r:id="rId27"/>
     </p:embeddedFont>
     <p:embeddedFont>
-      <p:font typeface="HGP創英角ｺﾞｼｯｸUB" panose="020B0900000000000000" pitchFamily="50" charset="-128"/>
+      <p:font typeface="HGPｺﾞｼｯｸE" panose="020B0900000000000000" pitchFamily="50" charset="-128"/>
       <p:regular r:id="rId28"/>
     </p:embeddedFont>
   </p:embeddedFontLst>
@@ -269,7 +269,7 @@
             <a:fld id="{BB253DA6-D017-4D4C-A6F0-8D6175E3AD1A}" type="datetime1">
               <a:rPr lang="ja-JP" altLang="en-US" smtClean="0"/>
               <a:pPr/>
-              <a:t>2016/7/4</a:t>
+              <a:t>2017/2/28</a:t>
             </a:fld>
             <a:endParaRPr lang="en-US"/>
           </a:p>
@@ -437,7 +437,7 @@
             <a:fld id="{971E307F-04E7-4216-B3F9-BBF58478B729}" type="datetime1">
               <a:rPr lang="ja-JP" altLang="en-US" smtClean="0"/>
               <a:pPr/>
-              <a:t>2016/7/4</a:t>
+              <a:t>2017/2/28</a:t>
             </a:fld>
             <a:endParaRPr lang="en-US"/>
           </a:p>
@@ -795,7 +795,7 @@
             <a:fld id="{BB7B7D7C-7587-458D-9F40-96275B4E0BF8}" type="datetime1">
               <a:rPr lang="ja-JP" altLang="en-US" smtClean="0"/>
               <a:pPr/>
-              <a:t>2016/7/4</a:t>
+              <a:t>2017/2/28</a:t>
             </a:fld>
             <a:endParaRPr lang="en-US"/>
           </a:p>
@@ -1018,7 +1018,7 @@
             <a:fld id="{79DDA3DF-8EBA-4683-A96B-9C379AE68A32}" type="datetime1">
               <a:rPr lang="ja-JP" altLang="en-US" smtClean="0"/>
               <a:pPr/>
-              <a:t>2016/7/4</a:t>
+              <a:t>2017/2/28</a:t>
             </a:fld>
             <a:endParaRPr lang="en-US"/>
           </a:p>
@@ -1255,7 +1255,21 @@
                 <a:latin typeface="Arial"/>
                 <a:cs typeface="Arial"/>
               </a:rPr>
-              <a:t>Copyright © 2015-2016 NTT DATA </a:t>
+              <a:t>Copyright © </a:t>
+            </a:r>
+            <a:r>
+              <a:rPr lang="en-US" sz="600" dirty="0" smtClean="0">
+                <a:latin typeface="Arial"/>
+                <a:cs typeface="Arial"/>
+              </a:rPr>
+              <a:t>2016-2017 </a:t>
+            </a:r>
+            <a:r>
+              <a:rPr lang="en-US" sz="600" dirty="0" smtClean="0">
+                <a:latin typeface="Arial"/>
+                <a:cs typeface="Arial"/>
+              </a:rPr>
+              <a:t>NTT DATA </a:t>
             </a:r>
             <a:r>
               <a:rPr lang="en-US" sz="600" baseline="0" dirty="0" smtClean="0">
@@ -2388,13 +2402,20 @@
           <a:lstStyle/>
           <a:p>
             <a:r>
-              <a:rPr lang="en-US" sz="600" dirty="0" smtClean="0">
+              <a:rPr lang="en-US" altLang="ja-JP" sz="600" dirty="0" smtClean="0">
                 <a:latin typeface="Arial"/>
                 <a:cs typeface="Arial"/>
               </a:rPr>
-              <a:t>Copyright © 2015-2016 NTT DATA Corporation</a:t>
-            </a:r>
-            <a:endParaRPr lang="en-US" sz="600" dirty="0">
+              <a:t>Copyright © 2016-2017 NTT DATA </a:t>
+            </a:r>
+            <a:r>
+              <a:rPr lang="en-US" altLang="ja-JP" sz="600" baseline="0" dirty="0" smtClean="0">
+                <a:latin typeface="Arial"/>
+                <a:cs typeface="Arial"/>
+              </a:rPr>
+              <a:t>Corporation</a:t>
+            </a:r>
+            <a:endParaRPr lang="en-US" altLang="ja-JP" sz="600" dirty="0">
               <a:latin typeface="Arial"/>
               <a:cs typeface="Arial"/>
             </a:endParaRPr>
@@ -2674,7 +2695,21 @@
                 <a:latin typeface="Arial"/>
                 <a:cs typeface="Arial"/>
               </a:rPr>
-              <a:t>Copyright © 2015-2016 NTT DATA </a:t>
+              <a:t>Copyright © </a:t>
+            </a:r>
+            <a:r>
+              <a:rPr lang="en-US" sz="600" dirty="0" smtClean="0">
+                <a:latin typeface="Arial"/>
+                <a:cs typeface="Arial"/>
+              </a:rPr>
+              <a:t>2016-2017 </a:t>
+            </a:r>
+            <a:r>
+              <a:rPr lang="en-US" sz="600" dirty="0" smtClean="0">
+                <a:latin typeface="Arial"/>
+                <a:cs typeface="Arial"/>
+              </a:rPr>
+              <a:t>NTT DATA </a:t>
             </a:r>
             <a:r>
               <a:rPr lang="en-US" sz="600" baseline="0" dirty="0" smtClean="0">
@@ -3314,7 +3349,21 @@
                 <a:latin typeface="Arial"/>
                 <a:cs typeface="Arial"/>
               </a:rPr>
-              <a:t>Copyright © 2015-2016 NTT DATA </a:t>
+              <a:t>Copyright © </a:t>
+            </a:r>
+            <a:r>
+              <a:rPr lang="en-US" sz="600" dirty="0" smtClean="0">
+                <a:latin typeface="Arial"/>
+                <a:cs typeface="Arial"/>
+              </a:rPr>
+              <a:t>2016-2017 </a:t>
+            </a:r>
+            <a:r>
+              <a:rPr lang="en-US" sz="600" dirty="0" smtClean="0">
+                <a:latin typeface="Arial"/>
+                <a:cs typeface="Arial"/>
+              </a:rPr>
+              <a:t>NTT DATA </a:t>
             </a:r>
             <a:r>
               <a:rPr lang="en-US" sz="600" baseline="0" dirty="0" smtClean="0">
@@ -3954,19 +4003,8 @@
                 <a:latin typeface="Arial"/>
                 <a:cs typeface="Arial"/>
               </a:rPr>
-              <a:t>Copyright © 2015-2016 NTT DATA </a:t>
-            </a:r>
-            <a:r>
-              <a:rPr lang="en-US" sz="600" baseline="0" dirty="0" smtClean="0">
-                <a:latin typeface="Arial"/>
-                <a:cs typeface="Arial"/>
-              </a:rPr>
-              <a:t>Corporation</a:t>
-            </a:r>
-            <a:endParaRPr lang="en-US" sz="600" dirty="0">
-              <a:latin typeface="Arial"/>
-              <a:cs typeface="Arial"/>
-            </a:endParaRPr>
+              <a:t>Copyright © 2016-2017 NTT DATA Corporation</a:t>
+            </a:r>
           </a:p>
         </p:txBody>
       </p:sp>
@@ -4588,19 +4626,8 @@
                 <a:latin typeface="Arial"/>
                 <a:cs typeface="Arial"/>
               </a:rPr>
-              <a:t>Copyright © 2015-2016 NTT DATA </a:t>
-            </a:r>
-            <a:r>
-              <a:rPr lang="en-US" sz="600" baseline="0" dirty="0" smtClean="0">
-                <a:latin typeface="Arial"/>
-                <a:cs typeface="Arial"/>
-              </a:rPr>
-              <a:t>Corporation</a:t>
-            </a:r>
-            <a:endParaRPr lang="en-US" sz="600" dirty="0">
-              <a:latin typeface="Arial"/>
-              <a:cs typeface="Arial"/>
-            </a:endParaRPr>
+              <a:t>Copyright © 2016-2017 NTT DATA Corporation</a:t>
+            </a:r>
           </a:p>
         </p:txBody>
       </p:sp>
@@ -5222,7 +5249,21 @@
                 <a:latin typeface="Arial"/>
                 <a:cs typeface="Arial"/>
               </a:rPr>
-              <a:t>Copyright © 2015-2016 NTT DATA </a:t>
+              <a:t>Copyright © </a:t>
+            </a:r>
+            <a:r>
+              <a:rPr lang="en-US" sz="600" dirty="0" smtClean="0">
+                <a:latin typeface="Arial"/>
+                <a:cs typeface="Arial"/>
+              </a:rPr>
+              <a:t>2016-2017 </a:t>
+            </a:r>
+            <a:r>
+              <a:rPr lang="en-US" sz="600" dirty="0" smtClean="0">
+                <a:latin typeface="Arial"/>
+                <a:cs typeface="Arial"/>
+              </a:rPr>
+              <a:t>NTT DATA </a:t>
             </a:r>
             <a:r>
               <a:rPr lang="en-US" sz="600" baseline="0" dirty="0" smtClean="0">
@@ -5770,12 +5811,8 @@
                 <a:latin typeface="Arial"/>
                 <a:cs typeface="Arial"/>
               </a:rPr>
-              <a:t>Copyright © 2015-2016 NTT DATA Corporation</a:t>
-            </a:r>
-            <a:endParaRPr lang="en-US" sz="600" dirty="0">
-              <a:latin typeface="Arial"/>
-              <a:cs typeface="Arial"/>
-            </a:endParaRPr>
+              <a:t>Copyright © 2016-2017 NTT DATA Corporation</a:t>
+            </a:r>
           </a:p>
         </p:txBody>
       </p:sp>
@@ -6588,12 +6625,8 @@
                 <a:latin typeface="Arial"/>
                 <a:cs typeface="Arial"/>
               </a:rPr>
-              <a:t>Copyright © 2015-2016 NTT DATA Corporation</a:t>
-            </a:r>
-            <a:endParaRPr lang="en-US" sz="600" dirty="0">
-              <a:latin typeface="Arial"/>
-              <a:cs typeface="Arial"/>
-            </a:endParaRPr>
+              <a:t>Copyright © 2016-2017 NTT DATA Corporation</a:t>
+            </a:r>
           </a:p>
         </p:txBody>
       </p:sp>
@@ -7523,7 +7556,21 @@
                 <a:latin typeface="Arial"/>
                 <a:cs typeface="Arial"/>
               </a:rPr>
-              <a:t>Copyright © 2015-2016 NTT DATA </a:t>
+              <a:t>Copyright © </a:t>
+            </a:r>
+            <a:r>
+              <a:rPr lang="en-US" sz="600" dirty="0" smtClean="0">
+                <a:latin typeface="Arial"/>
+                <a:cs typeface="Arial"/>
+              </a:rPr>
+              <a:t>2016-2017 </a:t>
+            </a:r>
+            <a:r>
+              <a:rPr lang="en-US" sz="600" dirty="0" smtClean="0">
+                <a:latin typeface="Arial"/>
+                <a:cs typeface="Arial"/>
+              </a:rPr>
+              <a:t>NTT DATA </a:t>
             </a:r>
             <a:r>
               <a:rPr lang="en-US" sz="600" baseline="0" dirty="0" smtClean="0">
@@ -7949,7 +7996,7 @@
             </a:r>
             <a:r>
               <a:rPr lang="en-US" altLang="ja-JP" dirty="0" smtClean="0"/>
-              <a:t>3.6.1</a:t>
+              <a:t>3.6.2</a:t>
             </a:r>
             <a:r>
               <a:rPr lang="ja-JP" altLang="en-US" dirty="0" smtClean="0"/>
@@ -20273,7 +20320,7 @@
             </a:r>
             <a:r>
               <a:rPr kumimoji="1" lang="en-US" altLang="ja-JP" dirty="0" smtClean="0"/>
-              <a:t>3.6.1</a:t>
+              <a:t>3.6.2</a:t>
             </a:r>
             <a:r>
               <a:rPr kumimoji="1" lang="ja-JP" altLang="en-US" dirty="0" smtClean="0"/>
@@ -23375,7 +23422,7 @@
           <a:graphicData uri="http://schemas.openxmlformats.org/presentationml/2006/ole">
             <mc:AlternateContent xmlns:mc="http://schemas.openxmlformats.org/markup-compatibility/2006">
               <mc:Choice xmlns:v="urn:schemas-microsoft-com:vml" Requires="v">
-                <p:oleObj spid="_x0000_s5185" name="Visio" r:id="rId3" imgW="1028666" imgH="1219320" progId="Visio.Drawing.11">
+                <p:oleObj spid="_x0000_s5192" name="Visio" r:id="rId3" imgW="1028666" imgH="1219320" progId="Visio.Drawing.11">
                   <p:embed/>
                 </p:oleObj>
               </mc:Choice>
@@ -32234,7 +32281,7 @@
             <a:graphicData uri="http://schemas.openxmlformats.org/presentationml/2006/ole">
               <mc:AlternateContent xmlns:mc="http://schemas.openxmlformats.org/markup-compatibility/2006">
                 <mc:Choice xmlns:v="urn:schemas-microsoft-com:vml" Requires="v">
-                  <p:oleObj spid="_x0000_s3189" name="Visio" r:id="rId3" imgW="1046765" imgH="1232170" progId="">
+                  <p:oleObj spid="_x0000_s3196" name="Visio" r:id="rId3" imgW="1046765" imgH="1232170" progId="">
                     <p:embed/>
                   </p:oleObj>
                 </mc:Choice>

</xml_diff>

<commit_message>
review and modify. #185
</commit_message>
<xml_diff>
--- a/architecture/TERASOLUNA Batch Framework for Java Version 3.x 説明資料.pptx
+++ b/architecture/TERASOLUNA Batch Framework for Java Version 3.x 説明資料.pptx
@@ -33,23 +33,23 @@
   <p:notesSz cx="6794500" cy="9931400"/>
   <p:embeddedFontLst>
     <p:embeddedFont>
-      <p:font typeface="Tahoma" panose="020B0604030504040204" pitchFamily="34" charset="0"/>
+      <p:font typeface="Calibri" panose="020F0502020204030204" pitchFamily="34" charset="0"/>
       <p:regular r:id="rId21"/>
       <p:bold r:id="rId22"/>
+      <p:italic r:id="rId23"/>
+      <p:boldItalic r:id="rId24"/>
+    </p:embeddedFont>
+    <p:embeddedFont>
+      <p:font typeface="HGPｺﾞｼｯｸE" panose="020B0900000000000000" pitchFamily="50" charset="-128"/>
+      <p:regular r:id="rId25"/>
+    </p:embeddedFont>
+    <p:embeddedFont>
+      <p:font typeface="Tahoma" panose="020B0604030504040204" pitchFamily="34" charset="0"/>
+      <p:regular r:id="rId26"/>
+      <p:bold r:id="rId27"/>
     </p:embeddedFont>
     <p:embeddedFont>
       <p:font typeface="HGP創英角ｺﾞｼｯｸUB" panose="020B0900000000000000" pitchFamily="50" charset="-128"/>
-      <p:regular r:id="rId23"/>
-    </p:embeddedFont>
-    <p:embeddedFont>
-      <p:font typeface="Calibri" panose="020F0502020204030204" pitchFamily="34" charset="0"/>
-      <p:regular r:id="rId24"/>
-      <p:bold r:id="rId25"/>
-      <p:italic r:id="rId26"/>
-      <p:boldItalic r:id="rId27"/>
-    </p:embeddedFont>
-    <p:embeddedFont>
-      <p:font typeface="HGPｺﾞｼｯｸE" panose="020B0900000000000000" pitchFamily="50" charset="-128"/>
       <p:regular r:id="rId28"/>
     </p:embeddedFont>
   </p:embeddedFontLst>
@@ -269,7 +269,7 @@
             <a:fld id="{BB253DA6-D017-4D4C-A6F0-8D6175E3AD1A}" type="datetime1">
               <a:rPr lang="ja-JP" altLang="en-US" smtClean="0"/>
               <a:pPr/>
-              <a:t>2017/2/28</a:t>
+              <a:t>2017/3/13</a:t>
             </a:fld>
             <a:endParaRPr lang="en-US"/>
           </a:p>
@@ -437,7 +437,7 @@
             <a:fld id="{971E307F-04E7-4216-B3F9-BBF58478B729}" type="datetime1">
               <a:rPr lang="ja-JP" altLang="en-US" smtClean="0"/>
               <a:pPr/>
-              <a:t>2017/2/28</a:t>
+              <a:t>2017/3/13</a:t>
             </a:fld>
             <a:endParaRPr lang="en-US"/>
           </a:p>
@@ -795,7 +795,7 @@
             <a:fld id="{BB7B7D7C-7587-458D-9F40-96275B4E0BF8}" type="datetime1">
               <a:rPr lang="ja-JP" altLang="en-US" smtClean="0"/>
               <a:pPr/>
-              <a:t>2017/2/28</a:t>
+              <a:t>2017/3/13</a:t>
             </a:fld>
             <a:endParaRPr lang="en-US"/>
           </a:p>
@@ -1018,7 +1018,7 @@
             <a:fld id="{79DDA3DF-8EBA-4683-A96B-9C379AE68A32}" type="datetime1">
               <a:rPr lang="ja-JP" altLang="en-US" smtClean="0"/>
               <a:pPr/>
-              <a:t>2017/2/28</a:t>
+              <a:t>2017/3/13</a:t>
             </a:fld>
             <a:endParaRPr lang="en-US"/>
           </a:p>
@@ -1262,7 +1262,21 @@
                 <a:latin typeface="Arial"/>
                 <a:cs typeface="Arial"/>
               </a:rPr>
-              <a:t>2016-2017 </a:t>
+              <a:t>201</a:t>
+            </a:r>
+            <a:r>
+              <a:rPr lang="en-US" altLang="ja-JP" sz="600" dirty="0" smtClean="0">
+                <a:latin typeface="Arial"/>
+                <a:cs typeface="Arial"/>
+              </a:rPr>
+              <a:t>5</a:t>
+            </a:r>
+            <a:r>
+              <a:rPr lang="en-US" sz="600" dirty="0" smtClean="0">
+                <a:latin typeface="Arial"/>
+                <a:cs typeface="Arial"/>
+              </a:rPr>
+              <a:t>-2017 </a:t>
             </a:r>
             <a:r>
               <a:rPr lang="en-US" sz="600" dirty="0" smtClean="0">
@@ -2406,7 +2420,21 @@
                 <a:latin typeface="Arial"/>
                 <a:cs typeface="Arial"/>
               </a:rPr>
-              <a:t>Copyright © 2016-2017 NTT DATA </a:t>
+              <a:t>Copyright © </a:t>
+            </a:r>
+            <a:r>
+              <a:rPr lang="en-US" altLang="ja-JP" sz="600" dirty="0" smtClean="0">
+                <a:latin typeface="Arial"/>
+                <a:cs typeface="Arial"/>
+              </a:rPr>
+              <a:t>2015-2017 </a:t>
+            </a:r>
+            <a:r>
+              <a:rPr lang="en-US" altLang="ja-JP" sz="600" dirty="0" smtClean="0">
+                <a:latin typeface="Arial"/>
+                <a:cs typeface="Arial"/>
+              </a:rPr>
+              <a:t>NTT DATA </a:t>
             </a:r>
             <a:r>
               <a:rPr lang="en-US" altLang="ja-JP" sz="600" baseline="0" dirty="0" smtClean="0">
@@ -2702,7 +2730,7 @@
                 <a:latin typeface="Arial"/>
                 <a:cs typeface="Arial"/>
               </a:rPr>
-              <a:t>2016-2017 </a:t>
+              <a:t>2015-2017 </a:t>
             </a:r>
             <a:r>
               <a:rPr lang="en-US" sz="600" dirty="0" smtClean="0">
@@ -3356,7 +3384,7 @@
                 <a:latin typeface="Arial"/>
                 <a:cs typeface="Arial"/>
               </a:rPr>
-              <a:t>2016-2017 </a:t>
+              <a:t>2015-2017 </a:t>
             </a:r>
             <a:r>
               <a:rPr lang="en-US" sz="600" dirty="0" smtClean="0">
@@ -4003,7 +4031,21 @@
                 <a:latin typeface="Arial"/>
                 <a:cs typeface="Arial"/>
               </a:rPr>
-              <a:t>Copyright © 2016-2017 NTT DATA Corporation</a:t>
+              <a:t>Copyright © </a:t>
+            </a:r>
+            <a:r>
+              <a:rPr lang="en-US" sz="600" dirty="0" smtClean="0">
+                <a:latin typeface="Arial"/>
+                <a:cs typeface="Arial"/>
+              </a:rPr>
+              <a:t>2015-2017 </a:t>
+            </a:r>
+            <a:r>
+              <a:rPr lang="en-US" sz="600" dirty="0" smtClean="0">
+                <a:latin typeface="Arial"/>
+                <a:cs typeface="Arial"/>
+              </a:rPr>
+              <a:t>NTT DATA Corporation</a:t>
             </a:r>
           </a:p>
         </p:txBody>
@@ -4626,7 +4668,21 @@
                 <a:latin typeface="Arial"/>
                 <a:cs typeface="Arial"/>
               </a:rPr>
-              <a:t>Copyright © 2016-2017 NTT DATA Corporation</a:t>
+              <a:t>Copyright © </a:t>
+            </a:r>
+            <a:r>
+              <a:rPr lang="en-US" sz="600" dirty="0" smtClean="0">
+                <a:latin typeface="Arial"/>
+                <a:cs typeface="Arial"/>
+              </a:rPr>
+              <a:t>2015-2017 </a:t>
+            </a:r>
+            <a:r>
+              <a:rPr lang="en-US" sz="600" dirty="0" smtClean="0">
+                <a:latin typeface="Arial"/>
+                <a:cs typeface="Arial"/>
+              </a:rPr>
+              <a:t>NTT DATA Corporation</a:t>
             </a:r>
           </a:p>
         </p:txBody>
@@ -5256,7 +5312,7 @@
                 <a:latin typeface="Arial"/>
                 <a:cs typeface="Arial"/>
               </a:rPr>
-              <a:t>2016-2017 </a:t>
+              <a:t>2015-2017 </a:t>
             </a:r>
             <a:r>
               <a:rPr lang="en-US" sz="600" dirty="0" smtClean="0">
@@ -5811,7 +5867,21 @@
                 <a:latin typeface="Arial"/>
                 <a:cs typeface="Arial"/>
               </a:rPr>
-              <a:t>Copyright © 2016-2017 NTT DATA Corporation</a:t>
+              <a:t>Copyright © </a:t>
+            </a:r>
+            <a:r>
+              <a:rPr lang="en-US" sz="600" dirty="0" smtClean="0">
+                <a:latin typeface="Arial"/>
+                <a:cs typeface="Arial"/>
+              </a:rPr>
+              <a:t>2015-2017 </a:t>
+            </a:r>
+            <a:r>
+              <a:rPr lang="en-US" sz="600" dirty="0" smtClean="0">
+                <a:latin typeface="Arial"/>
+                <a:cs typeface="Arial"/>
+              </a:rPr>
+              <a:t>NTT DATA Corporation</a:t>
             </a:r>
           </a:p>
         </p:txBody>
@@ -6625,7 +6695,21 @@
                 <a:latin typeface="Arial"/>
                 <a:cs typeface="Arial"/>
               </a:rPr>
-              <a:t>Copyright © 2016-2017 NTT DATA Corporation</a:t>
+              <a:t>Copyright © </a:t>
+            </a:r>
+            <a:r>
+              <a:rPr lang="en-US" sz="600" dirty="0" smtClean="0">
+                <a:latin typeface="Arial"/>
+                <a:cs typeface="Arial"/>
+              </a:rPr>
+              <a:t>2015-2017 </a:t>
+            </a:r>
+            <a:r>
+              <a:rPr lang="en-US" sz="600" dirty="0" smtClean="0">
+                <a:latin typeface="Arial"/>
+                <a:cs typeface="Arial"/>
+              </a:rPr>
+              <a:t>NTT DATA Corporation</a:t>
             </a:r>
           </a:p>
         </p:txBody>
@@ -7563,7 +7647,21 @@
                 <a:latin typeface="Arial"/>
                 <a:cs typeface="Arial"/>
               </a:rPr>
-              <a:t>2016-2017 </a:t>
+              <a:t>201</a:t>
+            </a:r>
+            <a:r>
+              <a:rPr lang="en-US" altLang="ja-JP" sz="600" dirty="0" smtClean="0">
+                <a:latin typeface="Arial"/>
+                <a:cs typeface="Arial"/>
+              </a:rPr>
+              <a:t>5</a:t>
+            </a:r>
+            <a:r>
+              <a:rPr lang="en-US" sz="600" dirty="0" smtClean="0">
+                <a:latin typeface="Arial"/>
+                <a:cs typeface="Arial"/>
+              </a:rPr>
+              <a:t>-2017 </a:t>
             </a:r>
             <a:r>
               <a:rPr lang="en-US" sz="600" dirty="0" smtClean="0">
@@ -8000,11 +8098,7 @@
             </a:r>
             <a:r>
               <a:rPr lang="ja-JP" altLang="en-US" dirty="0" smtClean="0"/>
-              <a:t> </a:t>
-            </a:r>
-            <a:r>
-              <a:rPr lang="ja-JP" altLang="en-US" dirty="0" smtClean="0"/>
-              <a:t>説明資料</a:t>
+              <a:t> 説明資料</a:t>
             </a:r>
           </a:p>
         </p:txBody>
@@ -20324,11 +20418,7 @@
             </a:r>
             <a:r>
               <a:rPr kumimoji="1" lang="ja-JP" altLang="en-US" dirty="0" smtClean="0"/>
-              <a:t>アーキテクチャ</a:t>
-            </a:r>
-            <a:r>
-              <a:rPr kumimoji="1" lang="ja-JP" altLang="en-US" dirty="0" smtClean="0"/>
-              <a:t>のコンセプト</a:t>
+              <a:t>アーキテクチャのコンセプト</a:t>
             </a:r>
             <a:endParaRPr kumimoji="1" lang="ja-JP" altLang="en-US" dirty="0"/>
           </a:p>
@@ -23422,12 +23512,12 @@
           <a:graphicData uri="http://schemas.openxmlformats.org/presentationml/2006/ole">
             <mc:AlternateContent xmlns:mc="http://schemas.openxmlformats.org/markup-compatibility/2006">
               <mc:Choice xmlns:v="urn:schemas-microsoft-com:vml" Requires="v">
-                <p:oleObj spid="_x0000_s5192" name="Visio" r:id="rId3" imgW="1028666" imgH="1219320" progId="Visio.Drawing.11">
+                <p:oleObj spid="_x0000_s5193" name="Visio" r:id="rId4" imgW="1028666" imgH="1219320" progId="Visio.Drawing.11">
                   <p:embed/>
                 </p:oleObj>
               </mc:Choice>
               <mc:Fallback>
-                <p:oleObj name="Visio" r:id="rId3" imgW="1028666" imgH="1219320" progId="Visio.Drawing.11">
+                <p:oleObj name="Visio" r:id="rId4" imgW="1028666" imgH="1219320" progId="Visio.Drawing.11">
                   <p:embed/>
                   <p:pic>
                     <p:nvPicPr>
@@ -23438,7 +23528,7 @@
                       <p:nvPr/>
                     </p:nvPicPr>
                     <p:blipFill>
-                      <a:blip r:embed="rId4"/>
+                      <a:blip r:embed="rId5"/>
                       <a:srcRect/>
                       <a:stretch>
                         <a:fillRect/>
@@ -30425,7 +30515,7 @@
           <p:nvPr/>
         </p:nvPicPr>
         <p:blipFill>
-          <a:blip r:embed="rId5" cstate="print"/>
+          <a:blip r:embed="rId6" cstate="print"/>
           <a:srcRect/>
           <a:stretch>
             <a:fillRect/>
@@ -32281,7 +32371,7 @@
             <a:graphicData uri="http://schemas.openxmlformats.org/presentationml/2006/ole">
               <mc:AlternateContent xmlns:mc="http://schemas.openxmlformats.org/markup-compatibility/2006">
                 <mc:Choice xmlns:v="urn:schemas-microsoft-com:vml" Requires="v">
-                  <p:oleObj spid="_x0000_s3196" name="Visio" r:id="rId3" imgW="1046765" imgH="1232170" progId="">
+                  <p:oleObj spid="_x0000_s3197" name="Visio" r:id="rId3" imgW="1046765" imgH="1232170" progId="">
                     <p:embed/>
                   </p:oleObj>
                 </mc:Choice>

</xml_diff>